<commit_message>
finished the vacuum chamber section in chap2. changed fresnel figures from png's to pdf's.
</commit_message>
<xml_diff>
--- a/figures/chap2/chap 2 figures.pptx
+++ b/figures/chap2/chap 2 figures.pptx
@@ -8,6 +8,7 @@
     <p:sldId id="313" r:id="rId2"/>
     <p:sldId id="312" r:id="rId3"/>
     <p:sldId id="314" r:id="rId4"/>
+    <p:sldId id="256" r:id="rId5"/>
   </p:sldIdLst>
   <p:sldSz cx="12192000" cy="6858000"/>
   <p:notesSz cx="7315200" cy="9601200"/>
@@ -106,6 +107,11 @@
       </a:defRPr>
     </a:lvl9pPr>
   </p:defaultTextStyle>
+  <p:extLst>
+    <p:ext uri="{EFAFB233-063F-42B5-8137-9DF3F51BA10A}">
+      <p15:sldGuideLst xmlns:p15="http://schemas.microsoft.com/office/powerpoint/2012/main"/>
+    </p:ext>
+  </p:extLst>
 </p:presentation>
 </file>
 
@@ -256,7 +262,7 @@
           <a:p>
             <a:fld id="{AA564F96-03D1-4027-9EC9-68B19AA58132}" type="datetimeFigureOut">
               <a:rPr lang="en-US" smtClean="0"/>
-              <a:t>12/19/2019</a:t>
+              <a:t>1/13/2020</a:t>
             </a:fld>
             <a:endParaRPr lang="en-US"/>
           </a:p>
@@ -454,7 +460,7 @@
           <a:p>
             <a:fld id="{AA564F96-03D1-4027-9EC9-68B19AA58132}" type="datetimeFigureOut">
               <a:rPr lang="en-US" smtClean="0"/>
-              <a:t>12/19/2019</a:t>
+              <a:t>1/13/2020</a:t>
             </a:fld>
             <a:endParaRPr lang="en-US"/>
           </a:p>
@@ -662,7 +668,7 @@
           <a:p>
             <a:fld id="{AA564F96-03D1-4027-9EC9-68B19AA58132}" type="datetimeFigureOut">
               <a:rPr lang="en-US" smtClean="0"/>
-              <a:t>12/19/2019</a:t>
+              <a:t>1/13/2020</a:t>
             </a:fld>
             <a:endParaRPr lang="en-US"/>
           </a:p>
@@ -860,7 +866,7 @@
           <a:p>
             <a:fld id="{AA564F96-03D1-4027-9EC9-68B19AA58132}" type="datetimeFigureOut">
               <a:rPr lang="en-US" smtClean="0"/>
-              <a:t>12/19/2019</a:t>
+              <a:t>1/13/2020</a:t>
             </a:fld>
             <a:endParaRPr lang="en-US"/>
           </a:p>
@@ -1135,7 +1141,7 @@
           <a:p>
             <a:fld id="{AA564F96-03D1-4027-9EC9-68B19AA58132}" type="datetimeFigureOut">
               <a:rPr lang="en-US" smtClean="0"/>
-              <a:t>12/19/2019</a:t>
+              <a:t>1/13/2020</a:t>
             </a:fld>
             <a:endParaRPr lang="en-US"/>
           </a:p>
@@ -1400,7 +1406,7 @@
           <a:p>
             <a:fld id="{AA564F96-03D1-4027-9EC9-68B19AA58132}" type="datetimeFigureOut">
               <a:rPr lang="en-US" smtClean="0"/>
-              <a:t>12/19/2019</a:t>
+              <a:t>1/13/2020</a:t>
             </a:fld>
             <a:endParaRPr lang="en-US"/>
           </a:p>
@@ -1812,7 +1818,7 @@
           <a:p>
             <a:fld id="{AA564F96-03D1-4027-9EC9-68B19AA58132}" type="datetimeFigureOut">
               <a:rPr lang="en-US" smtClean="0"/>
-              <a:t>12/19/2019</a:t>
+              <a:t>1/13/2020</a:t>
             </a:fld>
             <a:endParaRPr lang="en-US"/>
           </a:p>
@@ -1953,7 +1959,7 @@
           <a:p>
             <a:fld id="{AA564F96-03D1-4027-9EC9-68B19AA58132}" type="datetimeFigureOut">
               <a:rPr lang="en-US" smtClean="0"/>
-              <a:t>12/19/2019</a:t>
+              <a:t>1/13/2020</a:t>
             </a:fld>
             <a:endParaRPr lang="en-US"/>
           </a:p>
@@ -2066,7 +2072,7 @@
           <a:p>
             <a:fld id="{AA564F96-03D1-4027-9EC9-68B19AA58132}" type="datetimeFigureOut">
               <a:rPr lang="en-US" smtClean="0"/>
-              <a:t>12/19/2019</a:t>
+              <a:t>1/13/2020</a:t>
             </a:fld>
             <a:endParaRPr lang="en-US"/>
           </a:p>
@@ -2377,7 +2383,7 @@
           <a:p>
             <a:fld id="{AA564F96-03D1-4027-9EC9-68B19AA58132}" type="datetimeFigureOut">
               <a:rPr lang="en-US" smtClean="0"/>
-              <a:t>12/19/2019</a:t>
+              <a:t>1/13/2020</a:t>
             </a:fld>
             <a:endParaRPr lang="en-US"/>
           </a:p>
@@ -2665,7 +2671,7 @@
           <a:p>
             <a:fld id="{AA564F96-03D1-4027-9EC9-68B19AA58132}" type="datetimeFigureOut">
               <a:rPr lang="en-US" smtClean="0"/>
-              <a:t>12/19/2019</a:t>
+              <a:t>1/13/2020</a:t>
             </a:fld>
             <a:endParaRPr lang="en-US"/>
           </a:p>
@@ -2906,7 +2912,7 @@
           <a:p>
             <a:fld id="{AA564F96-03D1-4027-9EC9-68B19AA58132}" type="datetimeFigureOut">
               <a:rPr lang="en-US" smtClean="0"/>
-              <a:t>12/19/2019</a:t>
+              <a:t>1/13/2020</a:t>
             </a:fld>
             <a:endParaRPr lang="en-US"/>
           </a:p>
@@ -8377,6 +8383,3292 @@
 </p:sld>
 </file>
 
+<file path=ppt/slides/slide4.xml><?xml version="1.0" encoding="utf-8"?>
+<p:sld xmlns:a="http://schemas.openxmlformats.org/drawingml/2006/main" xmlns:r="http://schemas.openxmlformats.org/officeDocument/2006/relationships" xmlns:p="http://schemas.openxmlformats.org/presentationml/2006/main">
+  <p:cSld>
+    <p:spTree>
+      <p:nvGrpSpPr>
+        <p:cNvPr id="1" name=""/>
+        <p:cNvGrpSpPr/>
+        <p:nvPr/>
+      </p:nvGrpSpPr>
+      <p:grpSpPr>
+        <a:xfrm>
+          <a:off x="0" y="0"/>
+          <a:ext cx="0" cy="0"/>
+          <a:chOff x="0" y="0"/>
+          <a:chExt cx="0" cy="0"/>
+        </a:xfrm>
+      </p:grpSpPr>
+      <p:grpSp>
+        <p:nvGrpSpPr>
+          <p:cNvPr id="194" name="Group 193"/>
+          <p:cNvGrpSpPr/>
+          <p:nvPr/>
+        </p:nvGrpSpPr>
+        <p:grpSpPr>
+          <a:xfrm>
+            <a:off x="249936" y="453082"/>
+            <a:ext cx="6057310" cy="1301423"/>
+            <a:chOff x="249936" y="453082"/>
+            <a:chExt cx="6057310" cy="1301423"/>
+          </a:xfrm>
+        </p:grpSpPr>
+        <p:grpSp>
+          <p:nvGrpSpPr>
+            <p:cNvPr id="112" name="Group 111"/>
+            <p:cNvGrpSpPr/>
+            <p:nvPr/>
+          </p:nvGrpSpPr>
+          <p:grpSpPr>
+            <a:xfrm>
+              <a:off x="249936" y="534924"/>
+              <a:ext cx="3913633" cy="914401"/>
+              <a:chOff x="249936" y="534924"/>
+              <a:chExt cx="3913633" cy="914401"/>
+            </a:xfrm>
+          </p:grpSpPr>
+          <p:sp>
+            <p:nvSpPr>
+              <p:cNvPr id="5" name="Rectangle 4"/>
+              <p:cNvSpPr/>
+              <p:nvPr/>
+            </p:nvSpPr>
+            <p:spPr>
+              <a:xfrm>
+                <a:off x="249936" y="992125"/>
+                <a:ext cx="914400" cy="457200"/>
+              </a:xfrm>
+              <a:prstGeom prst="rect">
+                <a:avLst/>
+              </a:prstGeom>
+              <a:noFill/>
+              <a:ln w="38100">
+                <a:solidFill>
+                  <a:schemeClr val="tx1"/>
+                </a:solidFill>
+              </a:ln>
+            </p:spPr>
+            <p:style>
+              <a:lnRef idx="2">
+                <a:schemeClr val="accent1">
+                  <a:shade val="50000"/>
+                </a:schemeClr>
+              </a:lnRef>
+              <a:fillRef idx="1">
+                <a:schemeClr val="accent1"/>
+              </a:fillRef>
+              <a:effectRef idx="0">
+                <a:schemeClr val="accent1"/>
+              </a:effectRef>
+              <a:fontRef idx="minor">
+                <a:schemeClr val="lt1"/>
+              </a:fontRef>
+            </p:style>
+            <p:txBody>
+              <a:bodyPr rtlCol="0" anchor="ctr"/>
+              <a:lstStyle/>
+              <a:p>
+                <a:pPr algn="ctr"/>
+                <a:r>
+                  <a:rPr lang="en-US" sz="1400" dirty="0">
+                    <a:solidFill>
+                      <a:schemeClr val="tx1"/>
+                    </a:solidFill>
+                  </a:rPr>
+                  <a:t>D65B</a:t>
+                </a:r>
+              </a:p>
+            </p:txBody>
+          </p:sp>
+          <p:sp>
+            <p:nvSpPr>
+              <p:cNvPr id="51" name="Rectangle 50"/>
+              <p:cNvSpPr/>
+              <p:nvPr/>
+            </p:nvSpPr>
+            <p:spPr>
+              <a:xfrm>
+                <a:off x="1469136" y="992125"/>
+                <a:ext cx="914400" cy="457200"/>
+              </a:xfrm>
+              <a:prstGeom prst="rect">
+                <a:avLst/>
+              </a:prstGeom>
+              <a:noFill/>
+              <a:ln w="38100">
+                <a:solidFill>
+                  <a:schemeClr val="tx1"/>
+                </a:solidFill>
+              </a:ln>
+            </p:spPr>
+            <p:style>
+              <a:lnRef idx="2">
+                <a:schemeClr val="accent1">
+                  <a:shade val="50000"/>
+                </a:schemeClr>
+              </a:lnRef>
+              <a:fillRef idx="1">
+                <a:schemeClr val="accent1"/>
+              </a:fillRef>
+              <a:effectRef idx="0">
+                <a:schemeClr val="accent1"/>
+              </a:effectRef>
+              <a:fontRef idx="minor">
+                <a:schemeClr val="lt1"/>
+              </a:fontRef>
+            </p:style>
+            <p:txBody>
+              <a:bodyPr rtlCol="0" anchor="ctr"/>
+              <a:lstStyle/>
+              <a:p>
+                <a:pPr algn="ctr"/>
+                <a:r>
+                  <a:rPr lang="en-US" sz="1400" dirty="0">
+                    <a:solidFill>
+                      <a:schemeClr val="tx1"/>
+                    </a:solidFill>
+                  </a:rPr>
+                  <a:t>WSU501</a:t>
+                </a:r>
+              </a:p>
+            </p:txBody>
+          </p:sp>
+          <p:cxnSp>
+            <p:nvCxnSpPr>
+              <p:cNvPr id="57" name="Straight Connector 56"/>
+              <p:cNvCxnSpPr>
+                <a:stCxn id="5" idx="3"/>
+                <a:endCxn id="51" idx="1"/>
+              </p:cNvCxnSpPr>
+              <p:nvPr/>
+            </p:nvCxnSpPr>
+            <p:spPr>
+              <a:xfrm>
+                <a:off x="1164336" y="1220725"/>
+                <a:ext cx="304800" cy="0"/>
+              </a:xfrm>
+              <a:prstGeom prst="line">
+                <a:avLst/>
+              </a:prstGeom>
+              <a:ln w="38100">
+                <a:solidFill>
+                  <a:schemeClr val="tx1"/>
+                </a:solidFill>
+              </a:ln>
+            </p:spPr>
+            <p:style>
+              <a:lnRef idx="1">
+                <a:schemeClr val="accent1"/>
+              </a:lnRef>
+              <a:fillRef idx="0">
+                <a:schemeClr val="accent1"/>
+              </a:fillRef>
+              <a:effectRef idx="0">
+                <a:schemeClr val="accent1"/>
+              </a:effectRef>
+              <a:fontRef idx="minor">
+                <a:schemeClr val="tx1"/>
+              </a:fontRef>
+            </p:style>
+          </p:cxnSp>
+          <p:cxnSp>
+            <p:nvCxnSpPr>
+              <p:cNvPr id="63" name="Straight Connector 62"/>
+              <p:cNvCxnSpPr>
+                <a:stCxn id="51" idx="3"/>
+              </p:cNvCxnSpPr>
+              <p:nvPr/>
+            </p:nvCxnSpPr>
+            <p:spPr>
+              <a:xfrm flipV="1">
+                <a:off x="2383536" y="1220724"/>
+                <a:ext cx="1780033" cy="1"/>
+              </a:xfrm>
+              <a:prstGeom prst="line">
+                <a:avLst/>
+              </a:prstGeom>
+              <a:ln w="38100">
+                <a:solidFill>
+                  <a:schemeClr val="tx1"/>
+                </a:solidFill>
+              </a:ln>
+            </p:spPr>
+            <p:style>
+              <a:lnRef idx="1">
+                <a:schemeClr val="accent1"/>
+              </a:lnRef>
+              <a:fillRef idx="0">
+                <a:schemeClr val="accent1"/>
+              </a:fillRef>
+              <a:effectRef idx="0">
+                <a:schemeClr val="accent1"/>
+              </a:effectRef>
+              <a:fontRef idx="minor">
+                <a:schemeClr val="tx1"/>
+              </a:fontRef>
+            </p:style>
+          </p:cxnSp>
+          <p:cxnSp>
+            <p:nvCxnSpPr>
+              <p:cNvPr id="97" name="Straight Connector 96"/>
+              <p:cNvCxnSpPr/>
+              <p:nvPr/>
+            </p:nvCxnSpPr>
+            <p:spPr>
+              <a:xfrm>
+                <a:off x="2645664" y="763525"/>
+                <a:ext cx="0" cy="457200"/>
+              </a:xfrm>
+              <a:prstGeom prst="line">
+                <a:avLst/>
+              </a:prstGeom>
+              <a:ln w="38100">
+                <a:solidFill>
+                  <a:schemeClr val="tx1"/>
+                </a:solidFill>
+              </a:ln>
+            </p:spPr>
+            <p:style>
+              <a:lnRef idx="1">
+                <a:schemeClr val="accent1"/>
+              </a:lnRef>
+              <a:fillRef idx="0">
+                <a:schemeClr val="accent1"/>
+              </a:fillRef>
+              <a:effectRef idx="0">
+                <a:schemeClr val="accent1"/>
+              </a:effectRef>
+              <a:fontRef idx="minor">
+                <a:schemeClr val="tx1"/>
+              </a:fontRef>
+            </p:style>
+          </p:cxnSp>
+          <p:sp>
+            <p:nvSpPr>
+              <p:cNvPr id="98" name="Rectangle 97"/>
+              <p:cNvSpPr/>
+              <p:nvPr/>
+            </p:nvSpPr>
+            <p:spPr>
+              <a:xfrm>
+                <a:off x="2531364" y="534924"/>
+                <a:ext cx="228600" cy="228600"/>
+              </a:xfrm>
+              <a:prstGeom prst="rect">
+                <a:avLst/>
+              </a:prstGeom>
+              <a:noFill/>
+              <a:ln w="38100">
+                <a:solidFill>
+                  <a:srgbClr val="0070C0"/>
+                </a:solidFill>
+              </a:ln>
+            </p:spPr>
+            <p:style>
+              <a:lnRef idx="2">
+                <a:schemeClr val="accent1">
+                  <a:shade val="50000"/>
+                </a:schemeClr>
+              </a:lnRef>
+              <a:fillRef idx="1">
+                <a:schemeClr val="accent1"/>
+              </a:fillRef>
+              <a:effectRef idx="0">
+                <a:schemeClr val="accent1"/>
+              </a:effectRef>
+              <a:fontRef idx="minor">
+                <a:schemeClr val="lt1"/>
+              </a:fontRef>
+            </p:style>
+            <p:txBody>
+              <a:bodyPr rtlCol="0" anchor="ctr"/>
+              <a:lstStyle/>
+              <a:p>
+                <a:pPr algn="ctr"/>
+                <a:r>
+                  <a:rPr lang="en-US" sz="1400" dirty="0">
+                    <a:solidFill>
+                      <a:schemeClr val="tx1"/>
+                    </a:solidFill>
+                  </a:rPr>
+                  <a:t>P</a:t>
+                </a:r>
+              </a:p>
+            </p:txBody>
+          </p:sp>
+        </p:grpSp>
+        <p:grpSp>
+          <p:nvGrpSpPr>
+            <p:cNvPr id="140" name="Group 139"/>
+            <p:cNvGrpSpPr/>
+            <p:nvPr/>
+          </p:nvGrpSpPr>
+          <p:grpSpPr>
+            <a:xfrm>
+              <a:off x="4126993" y="726568"/>
+              <a:ext cx="2180253" cy="1027937"/>
+              <a:chOff x="4126993" y="726568"/>
+              <a:chExt cx="2180253" cy="1027937"/>
+            </a:xfrm>
+          </p:grpSpPr>
+          <p:grpSp>
+            <p:nvGrpSpPr>
+              <p:cNvPr id="111" name="Group 110"/>
+              <p:cNvGrpSpPr/>
+              <p:nvPr/>
+            </p:nvGrpSpPr>
+            <p:grpSpPr>
+              <a:xfrm>
+                <a:off x="4126993" y="726568"/>
+                <a:ext cx="1518475" cy="1027937"/>
+                <a:chOff x="5647373" y="1159766"/>
+                <a:chExt cx="1518475" cy="1027937"/>
+              </a:xfrm>
+            </p:grpSpPr>
+            <p:grpSp>
+              <p:nvGrpSpPr>
+                <p:cNvPr id="103" name="Group 102"/>
+                <p:cNvGrpSpPr/>
+                <p:nvPr/>
+              </p:nvGrpSpPr>
+              <p:grpSpPr>
+                <a:xfrm>
+                  <a:off x="5647373" y="1159766"/>
+                  <a:ext cx="1518475" cy="457200"/>
+                  <a:chOff x="5647373" y="1159766"/>
+                  <a:chExt cx="1518475" cy="457200"/>
+                </a:xfrm>
+              </p:grpSpPr>
+              <p:sp>
+                <p:nvSpPr>
+                  <p:cNvPr id="52" name="Rectangle 51"/>
+                  <p:cNvSpPr/>
+                  <p:nvPr/>
+                </p:nvSpPr>
+                <p:spPr>
+                  <a:xfrm>
+                    <a:off x="6251448" y="1159766"/>
+                    <a:ext cx="914400" cy="457200"/>
+                  </a:xfrm>
+                  <a:prstGeom prst="rect">
+                    <a:avLst/>
+                  </a:prstGeom>
+                  <a:noFill/>
+                  <a:ln w="38100">
+                    <a:solidFill>
+                      <a:schemeClr val="tx1"/>
+                    </a:solidFill>
+                  </a:ln>
+                </p:spPr>
+                <p:style>
+                  <a:lnRef idx="2">
+                    <a:schemeClr val="accent1">
+                      <a:shade val="50000"/>
+                    </a:schemeClr>
+                  </a:lnRef>
+                  <a:fillRef idx="1">
+                    <a:schemeClr val="accent1"/>
+                  </a:fillRef>
+                  <a:effectRef idx="0">
+                    <a:schemeClr val="accent1"/>
+                  </a:effectRef>
+                  <a:fontRef idx="minor">
+                    <a:schemeClr val="lt1"/>
+                  </a:fontRef>
+                </p:style>
+                <p:txBody>
+                  <a:bodyPr rtlCol="0" anchor="ctr"/>
+                  <a:lstStyle/>
+                  <a:p>
+                    <a:pPr algn="ctr"/>
+                    <a:r>
+                      <a:rPr lang="en-US" sz="1400" dirty="0">
+                        <a:solidFill>
+                          <a:schemeClr val="tx1"/>
+                        </a:solidFill>
+                      </a:rPr>
+                      <a:t>1300 </a:t>
+                    </a:r>
+                    <a:r>
+                      <a:rPr lang="en-US" sz="1400" dirty="0" err="1">
+                        <a:solidFill>
+                          <a:schemeClr val="tx1"/>
+                        </a:solidFill>
+                      </a:rPr>
+                      <a:t>iP</a:t>
+                    </a:r>
+                    <a:endParaRPr lang="en-US" sz="1400" dirty="0">
+                      <a:solidFill>
+                        <a:schemeClr val="tx1"/>
+                      </a:solidFill>
+                    </a:endParaRPr>
+                  </a:p>
+                </p:txBody>
+              </p:sp>
+              <p:sp>
+                <p:nvSpPr>
+                  <p:cNvPr id="54" name="Flowchart: Summing Junction 53"/>
+                  <p:cNvSpPr/>
+                  <p:nvPr/>
+                </p:nvSpPr>
+                <p:spPr>
+                  <a:xfrm>
+                    <a:off x="5879021" y="1274829"/>
+                    <a:ext cx="228600" cy="228600"/>
+                  </a:xfrm>
+                  <a:prstGeom prst="flowChartSummingJunction">
+                    <a:avLst/>
+                  </a:prstGeom>
+                  <a:noFill/>
+                  <a:ln w="38100">
+                    <a:solidFill>
+                      <a:srgbClr val="00B050"/>
+                    </a:solidFill>
+                  </a:ln>
+                </p:spPr>
+                <p:style>
+                  <a:lnRef idx="2">
+                    <a:schemeClr val="accent1">
+                      <a:shade val="50000"/>
+                    </a:schemeClr>
+                  </a:lnRef>
+                  <a:fillRef idx="1">
+                    <a:schemeClr val="accent1"/>
+                  </a:fillRef>
+                  <a:effectRef idx="0">
+                    <a:schemeClr val="accent1"/>
+                  </a:effectRef>
+                  <a:fontRef idx="minor">
+                    <a:schemeClr val="lt1"/>
+                  </a:fontRef>
+                </p:style>
+                <p:txBody>
+                  <a:bodyPr rtlCol="0" anchor="ctr"/>
+                  <a:lstStyle/>
+                  <a:p>
+                    <a:pPr algn="ctr"/>
+                    <a:endParaRPr lang="en-US"/>
+                  </a:p>
+                </p:txBody>
+              </p:sp>
+              <p:cxnSp>
+                <p:nvCxnSpPr>
+                  <p:cNvPr id="71" name="Straight Connector 70"/>
+                  <p:cNvCxnSpPr>
+                    <a:endCxn id="54" idx="2"/>
+                  </p:cNvCxnSpPr>
+                  <p:nvPr/>
+                </p:nvCxnSpPr>
+                <p:spPr>
+                  <a:xfrm flipV="1">
+                    <a:off x="5647373" y="1389129"/>
+                    <a:ext cx="231648" cy="0"/>
+                  </a:xfrm>
+                  <a:prstGeom prst="line">
+                    <a:avLst/>
+                  </a:prstGeom>
+                  <a:ln w="38100">
+                    <a:solidFill>
+                      <a:schemeClr val="tx1"/>
+                    </a:solidFill>
+                  </a:ln>
+                </p:spPr>
+                <p:style>
+                  <a:lnRef idx="1">
+                    <a:schemeClr val="accent1"/>
+                  </a:lnRef>
+                  <a:fillRef idx="0">
+                    <a:schemeClr val="accent1"/>
+                  </a:fillRef>
+                  <a:effectRef idx="0">
+                    <a:schemeClr val="accent1"/>
+                  </a:effectRef>
+                  <a:fontRef idx="minor">
+                    <a:schemeClr val="tx1"/>
+                  </a:fontRef>
+                </p:style>
+              </p:cxnSp>
+              <p:cxnSp>
+                <p:nvCxnSpPr>
+                  <p:cNvPr id="79" name="Straight Connector 78"/>
+                  <p:cNvCxnSpPr>
+                    <a:stCxn id="54" idx="6"/>
+                    <a:endCxn id="52" idx="1"/>
+                  </p:cNvCxnSpPr>
+                  <p:nvPr/>
+                </p:nvCxnSpPr>
+                <p:spPr>
+                  <a:xfrm flipV="1">
+                    <a:off x="6107621" y="1388366"/>
+                    <a:ext cx="143827" cy="763"/>
+                  </a:xfrm>
+                  <a:prstGeom prst="line">
+                    <a:avLst/>
+                  </a:prstGeom>
+                  <a:ln w="38100">
+                    <a:solidFill>
+                      <a:schemeClr val="tx1"/>
+                    </a:solidFill>
+                  </a:ln>
+                </p:spPr>
+                <p:style>
+                  <a:lnRef idx="1">
+                    <a:schemeClr val="accent1"/>
+                  </a:lnRef>
+                  <a:fillRef idx="0">
+                    <a:schemeClr val="accent1"/>
+                  </a:fillRef>
+                  <a:effectRef idx="0">
+                    <a:schemeClr val="accent1"/>
+                  </a:effectRef>
+                  <a:fontRef idx="minor">
+                    <a:schemeClr val="tx1"/>
+                  </a:fontRef>
+                </p:style>
+              </p:cxnSp>
+            </p:grpSp>
+            <p:grpSp>
+              <p:nvGrpSpPr>
+                <p:cNvPr id="104" name="Group 103"/>
+                <p:cNvGrpSpPr/>
+                <p:nvPr/>
+              </p:nvGrpSpPr>
+              <p:grpSpPr>
+                <a:xfrm>
+                  <a:off x="5647373" y="1730503"/>
+                  <a:ext cx="1518475" cy="457200"/>
+                  <a:chOff x="5647373" y="1159766"/>
+                  <a:chExt cx="1518475" cy="457200"/>
+                </a:xfrm>
+              </p:grpSpPr>
+              <p:sp>
+                <p:nvSpPr>
+                  <p:cNvPr id="105" name="Rectangle 104"/>
+                  <p:cNvSpPr/>
+                  <p:nvPr/>
+                </p:nvSpPr>
+                <p:spPr>
+                  <a:xfrm>
+                    <a:off x="6251448" y="1159766"/>
+                    <a:ext cx="914400" cy="457200"/>
+                  </a:xfrm>
+                  <a:prstGeom prst="rect">
+                    <a:avLst/>
+                  </a:prstGeom>
+                  <a:noFill/>
+                  <a:ln w="38100">
+                    <a:solidFill>
+                      <a:schemeClr val="tx1"/>
+                    </a:solidFill>
+                  </a:ln>
+                </p:spPr>
+                <p:style>
+                  <a:lnRef idx="2">
+                    <a:schemeClr val="accent1">
+                      <a:shade val="50000"/>
+                    </a:schemeClr>
+                  </a:lnRef>
+                  <a:fillRef idx="1">
+                    <a:schemeClr val="accent1"/>
+                  </a:fillRef>
+                  <a:effectRef idx="0">
+                    <a:schemeClr val="accent1"/>
+                  </a:effectRef>
+                  <a:fontRef idx="minor">
+                    <a:schemeClr val="lt1"/>
+                  </a:fontRef>
+                </p:style>
+                <p:txBody>
+                  <a:bodyPr rtlCol="0" anchor="ctr"/>
+                  <a:lstStyle/>
+                  <a:p>
+                    <a:pPr algn="ctr"/>
+                    <a:r>
+                      <a:rPr lang="en-US" sz="1400" dirty="0">
+                        <a:solidFill>
+                          <a:schemeClr val="tx1"/>
+                        </a:solidFill>
+                      </a:rPr>
+                      <a:t>400 </a:t>
+                    </a:r>
+                    <a:r>
+                      <a:rPr lang="en-US" sz="1400" dirty="0" err="1">
+                        <a:solidFill>
+                          <a:schemeClr val="tx1"/>
+                        </a:solidFill>
+                      </a:rPr>
+                      <a:t>iP</a:t>
+                    </a:r>
+                    <a:endParaRPr lang="en-US" sz="1400" dirty="0">
+                      <a:solidFill>
+                        <a:schemeClr val="tx1"/>
+                      </a:solidFill>
+                    </a:endParaRPr>
+                  </a:p>
+                </p:txBody>
+              </p:sp>
+              <p:sp>
+                <p:nvSpPr>
+                  <p:cNvPr id="106" name="Flowchart: Summing Junction 105"/>
+                  <p:cNvSpPr/>
+                  <p:nvPr/>
+                </p:nvSpPr>
+                <p:spPr>
+                  <a:xfrm>
+                    <a:off x="5879021" y="1274829"/>
+                    <a:ext cx="228600" cy="228600"/>
+                  </a:xfrm>
+                  <a:prstGeom prst="flowChartSummingJunction">
+                    <a:avLst/>
+                  </a:prstGeom>
+                  <a:noFill/>
+                  <a:ln w="38100">
+                    <a:solidFill>
+                      <a:srgbClr val="00B050"/>
+                    </a:solidFill>
+                  </a:ln>
+                </p:spPr>
+                <p:style>
+                  <a:lnRef idx="2">
+                    <a:schemeClr val="accent1">
+                      <a:shade val="50000"/>
+                    </a:schemeClr>
+                  </a:lnRef>
+                  <a:fillRef idx="1">
+                    <a:schemeClr val="accent1"/>
+                  </a:fillRef>
+                  <a:effectRef idx="0">
+                    <a:schemeClr val="accent1"/>
+                  </a:effectRef>
+                  <a:fontRef idx="minor">
+                    <a:schemeClr val="lt1"/>
+                  </a:fontRef>
+                </p:style>
+                <p:txBody>
+                  <a:bodyPr rtlCol="0" anchor="ctr"/>
+                  <a:lstStyle/>
+                  <a:p>
+                    <a:pPr algn="ctr"/>
+                    <a:endParaRPr lang="en-US"/>
+                  </a:p>
+                </p:txBody>
+              </p:sp>
+              <p:cxnSp>
+                <p:nvCxnSpPr>
+                  <p:cNvPr id="107" name="Straight Connector 106"/>
+                  <p:cNvCxnSpPr>
+                    <a:endCxn id="106" idx="2"/>
+                  </p:cNvCxnSpPr>
+                  <p:nvPr/>
+                </p:nvCxnSpPr>
+                <p:spPr>
+                  <a:xfrm flipV="1">
+                    <a:off x="5647373" y="1389129"/>
+                    <a:ext cx="231648" cy="0"/>
+                  </a:xfrm>
+                  <a:prstGeom prst="line">
+                    <a:avLst/>
+                  </a:prstGeom>
+                  <a:ln w="38100">
+                    <a:solidFill>
+                      <a:schemeClr val="tx1"/>
+                    </a:solidFill>
+                  </a:ln>
+                </p:spPr>
+                <p:style>
+                  <a:lnRef idx="1">
+                    <a:schemeClr val="accent1"/>
+                  </a:lnRef>
+                  <a:fillRef idx="0">
+                    <a:schemeClr val="accent1"/>
+                  </a:fillRef>
+                  <a:effectRef idx="0">
+                    <a:schemeClr val="accent1"/>
+                  </a:effectRef>
+                  <a:fontRef idx="minor">
+                    <a:schemeClr val="tx1"/>
+                  </a:fontRef>
+                </p:style>
+              </p:cxnSp>
+              <p:cxnSp>
+                <p:nvCxnSpPr>
+                  <p:cNvPr id="108" name="Straight Connector 107"/>
+                  <p:cNvCxnSpPr>
+                    <a:stCxn id="106" idx="6"/>
+                    <a:endCxn id="105" idx="1"/>
+                  </p:cNvCxnSpPr>
+                  <p:nvPr/>
+                </p:nvCxnSpPr>
+                <p:spPr>
+                  <a:xfrm flipV="1">
+                    <a:off x="6107621" y="1388366"/>
+                    <a:ext cx="143827" cy="763"/>
+                  </a:xfrm>
+                  <a:prstGeom prst="line">
+                    <a:avLst/>
+                  </a:prstGeom>
+                  <a:ln w="38100">
+                    <a:solidFill>
+                      <a:schemeClr val="tx1"/>
+                    </a:solidFill>
+                  </a:ln>
+                </p:spPr>
+                <p:style>
+                  <a:lnRef idx="1">
+                    <a:schemeClr val="accent1"/>
+                  </a:lnRef>
+                  <a:fillRef idx="0">
+                    <a:schemeClr val="accent1"/>
+                  </a:fillRef>
+                  <a:effectRef idx="0">
+                    <a:schemeClr val="accent1"/>
+                  </a:effectRef>
+                  <a:fontRef idx="minor">
+                    <a:schemeClr val="tx1"/>
+                  </a:fontRef>
+                </p:style>
+              </p:cxnSp>
+            </p:grpSp>
+            <p:cxnSp>
+              <p:nvCxnSpPr>
+                <p:cNvPr id="110" name="Straight Connector 109"/>
+                <p:cNvCxnSpPr/>
+                <p:nvPr/>
+              </p:nvCxnSpPr>
+              <p:spPr>
+                <a:xfrm>
+                  <a:off x="5665661" y="1394462"/>
+                  <a:ext cx="0" cy="560833"/>
+                </a:xfrm>
+                <a:prstGeom prst="line">
+                  <a:avLst/>
+                </a:prstGeom>
+                <a:ln w="38100">
+                  <a:solidFill>
+                    <a:schemeClr val="tx1"/>
+                  </a:solidFill>
+                </a:ln>
+              </p:spPr>
+              <p:style>
+                <a:lnRef idx="1">
+                  <a:schemeClr val="accent1"/>
+                </a:lnRef>
+                <a:fillRef idx="0">
+                  <a:schemeClr val="accent1"/>
+                </a:fillRef>
+                <a:effectRef idx="0">
+                  <a:schemeClr val="accent1"/>
+                </a:effectRef>
+                <a:fontRef idx="minor">
+                  <a:schemeClr val="tx1"/>
+                </a:fontRef>
+              </p:style>
+            </p:cxnSp>
+          </p:grpSp>
+          <p:sp>
+            <p:nvSpPr>
+              <p:cNvPr id="120" name="TextBox 119"/>
+              <p:cNvSpPr txBox="1"/>
+              <p:nvPr/>
+            </p:nvSpPr>
+            <p:spPr>
+              <a:xfrm>
+                <a:off x="5812075" y="812188"/>
+                <a:ext cx="298480" cy="307777"/>
+              </a:xfrm>
+              <a:prstGeom prst="rect">
+                <a:avLst/>
+              </a:prstGeom>
+              <a:noFill/>
+            </p:spPr>
+            <p:txBody>
+              <a:bodyPr wrap="none" rtlCol="0">
+                <a:spAutoFit/>
+              </a:bodyPr>
+              <a:lstStyle/>
+              <a:p>
+                <a:r>
+                  <a:rPr lang="en-US" sz="1400" dirty="0"/>
+                  <a:t>G</a:t>
+                </a:r>
+              </a:p>
+            </p:txBody>
+          </p:sp>
+          <p:sp>
+            <p:nvSpPr>
+              <p:cNvPr id="121" name="TextBox 120"/>
+              <p:cNvSpPr txBox="1"/>
+              <p:nvPr/>
+            </p:nvSpPr>
+            <p:spPr>
+              <a:xfrm>
+                <a:off x="5756737" y="1327023"/>
+                <a:ext cx="550509" cy="307777"/>
+              </a:xfrm>
+              <a:prstGeom prst="rect">
+                <a:avLst/>
+              </a:prstGeom>
+              <a:noFill/>
+            </p:spPr>
+            <p:txBody>
+              <a:bodyPr wrap="square" rtlCol="0">
+                <a:spAutoFit/>
+              </a:bodyPr>
+              <a:lstStyle/>
+              <a:p>
+                <a:r>
+                  <a:rPr lang="en-US" sz="1400" dirty="0"/>
+                  <a:t>DP</a:t>
+                </a:r>
+                <a:r>
+                  <a:rPr lang="en-US" sz="1400" baseline="-25000" dirty="0"/>
+                  <a:t>1</a:t>
+                </a:r>
+              </a:p>
+            </p:txBody>
+          </p:sp>
+        </p:grpSp>
+        <p:grpSp>
+          <p:nvGrpSpPr>
+            <p:cNvPr id="183" name="Group 182"/>
+            <p:cNvGrpSpPr/>
+            <p:nvPr/>
+          </p:nvGrpSpPr>
+          <p:grpSpPr>
+            <a:xfrm>
+              <a:off x="4030981" y="453082"/>
+              <a:ext cx="228600" cy="502921"/>
+              <a:chOff x="4030981" y="453082"/>
+              <a:chExt cx="228600" cy="502921"/>
+            </a:xfrm>
+          </p:grpSpPr>
+          <p:cxnSp>
+            <p:nvCxnSpPr>
+              <p:cNvPr id="181" name="Straight Connector 180"/>
+              <p:cNvCxnSpPr/>
+              <p:nvPr/>
+            </p:nvCxnSpPr>
+            <p:spPr>
+              <a:xfrm>
+                <a:off x="4145281" y="681683"/>
+                <a:ext cx="0" cy="274320"/>
+              </a:xfrm>
+              <a:prstGeom prst="line">
+                <a:avLst/>
+              </a:prstGeom>
+              <a:ln w="38100">
+                <a:solidFill>
+                  <a:schemeClr val="tx1"/>
+                </a:solidFill>
+              </a:ln>
+            </p:spPr>
+            <p:style>
+              <a:lnRef idx="1">
+                <a:schemeClr val="accent1"/>
+              </a:lnRef>
+              <a:fillRef idx="0">
+                <a:schemeClr val="accent1"/>
+              </a:fillRef>
+              <a:effectRef idx="0">
+                <a:schemeClr val="accent1"/>
+              </a:effectRef>
+              <a:fontRef idx="minor">
+                <a:schemeClr val="tx1"/>
+              </a:fontRef>
+            </p:style>
+          </p:cxnSp>
+          <p:sp>
+            <p:nvSpPr>
+              <p:cNvPr id="182" name="Rectangle 181"/>
+              <p:cNvSpPr/>
+              <p:nvPr/>
+            </p:nvSpPr>
+            <p:spPr>
+              <a:xfrm>
+                <a:off x="4030981" y="453082"/>
+                <a:ext cx="228600" cy="228600"/>
+              </a:xfrm>
+              <a:prstGeom prst="rect">
+                <a:avLst/>
+              </a:prstGeom>
+              <a:noFill/>
+              <a:ln w="38100">
+                <a:solidFill>
+                  <a:srgbClr val="0070C0"/>
+                </a:solidFill>
+              </a:ln>
+            </p:spPr>
+            <p:style>
+              <a:lnRef idx="2">
+                <a:schemeClr val="accent1">
+                  <a:shade val="50000"/>
+                </a:schemeClr>
+              </a:lnRef>
+              <a:fillRef idx="1">
+                <a:schemeClr val="accent1"/>
+              </a:fillRef>
+              <a:effectRef idx="0">
+                <a:schemeClr val="accent1"/>
+              </a:effectRef>
+              <a:fontRef idx="minor">
+                <a:schemeClr val="lt1"/>
+              </a:fontRef>
+            </p:style>
+            <p:txBody>
+              <a:bodyPr rtlCol="0" anchor="ctr"/>
+              <a:lstStyle/>
+              <a:p>
+                <a:pPr algn="ctr"/>
+                <a:r>
+                  <a:rPr lang="en-US" sz="1400" dirty="0">
+                    <a:solidFill>
+                      <a:schemeClr val="tx1"/>
+                    </a:solidFill>
+                  </a:rPr>
+                  <a:t>P</a:t>
+                </a:r>
+              </a:p>
+            </p:txBody>
+          </p:sp>
+        </p:grpSp>
+        <p:sp>
+          <p:nvSpPr>
+            <p:cNvPr id="55" name="Flowchart: Collate 54"/>
+            <p:cNvSpPr/>
+            <p:nvPr/>
+          </p:nvSpPr>
+          <p:spPr>
+            <a:xfrm>
+              <a:off x="3654552" y="992124"/>
+              <a:ext cx="228600" cy="457200"/>
+            </a:xfrm>
+            <a:prstGeom prst="flowChartCollate">
+              <a:avLst/>
+            </a:prstGeom>
+            <a:noFill/>
+            <a:ln w="38100">
+              <a:solidFill>
+                <a:srgbClr val="FF0000"/>
+              </a:solidFill>
+            </a:ln>
+          </p:spPr>
+          <p:style>
+            <a:lnRef idx="2">
+              <a:schemeClr val="accent1">
+                <a:shade val="50000"/>
+              </a:schemeClr>
+            </a:lnRef>
+            <a:fillRef idx="1">
+              <a:schemeClr val="accent1"/>
+            </a:fillRef>
+            <a:effectRef idx="0">
+              <a:schemeClr val="accent1"/>
+            </a:effectRef>
+            <a:fontRef idx="minor">
+              <a:schemeClr val="lt1"/>
+            </a:fontRef>
+          </p:style>
+          <p:txBody>
+            <a:bodyPr rtlCol="0" anchor="ctr"/>
+            <a:lstStyle/>
+            <a:p>
+              <a:pPr algn="ctr"/>
+              <a:endParaRPr lang="en-US">
+                <a:solidFill>
+                  <a:schemeClr val="tx1"/>
+                </a:solidFill>
+              </a:endParaRPr>
+            </a:p>
+          </p:txBody>
+        </p:sp>
+      </p:grpSp>
+      <p:grpSp>
+        <p:nvGrpSpPr>
+          <p:cNvPr id="193" name="Group 192"/>
+          <p:cNvGrpSpPr/>
+          <p:nvPr/>
+        </p:nvGrpSpPr>
+        <p:grpSpPr>
+          <a:xfrm>
+            <a:off x="254749" y="2536718"/>
+            <a:ext cx="6799605" cy="3920783"/>
+            <a:chOff x="146304" y="2536718"/>
+            <a:chExt cx="6799605" cy="3920783"/>
+          </a:xfrm>
+        </p:grpSpPr>
+        <p:grpSp>
+          <p:nvGrpSpPr>
+            <p:cNvPr id="113" name="Group 112"/>
+            <p:cNvGrpSpPr/>
+            <p:nvPr/>
+          </p:nvGrpSpPr>
+          <p:grpSpPr>
+            <a:xfrm>
+              <a:off x="146304" y="4230760"/>
+              <a:ext cx="2976753" cy="914401"/>
+              <a:chOff x="249936" y="534924"/>
+              <a:chExt cx="2976753" cy="914401"/>
+            </a:xfrm>
+          </p:grpSpPr>
+          <p:sp>
+            <p:nvSpPr>
+              <p:cNvPr id="114" name="Rectangle 113"/>
+              <p:cNvSpPr/>
+              <p:nvPr/>
+            </p:nvSpPr>
+            <p:spPr>
+              <a:xfrm>
+                <a:off x="249936" y="992125"/>
+                <a:ext cx="914400" cy="457200"/>
+              </a:xfrm>
+              <a:prstGeom prst="rect">
+                <a:avLst/>
+              </a:prstGeom>
+              <a:noFill/>
+              <a:ln w="38100">
+                <a:solidFill>
+                  <a:schemeClr val="tx1"/>
+                </a:solidFill>
+              </a:ln>
+            </p:spPr>
+            <p:style>
+              <a:lnRef idx="2">
+                <a:schemeClr val="accent1">
+                  <a:shade val="50000"/>
+                </a:schemeClr>
+              </a:lnRef>
+              <a:fillRef idx="1">
+                <a:schemeClr val="accent1"/>
+              </a:fillRef>
+              <a:effectRef idx="0">
+                <a:schemeClr val="accent1"/>
+              </a:effectRef>
+              <a:fontRef idx="minor">
+                <a:schemeClr val="lt1"/>
+              </a:fontRef>
+            </p:style>
+            <p:txBody>
+              <a:bodyPr rtlCol="0" anchor="ctr"/>
+              <a:lstStyle/>
+              <a:p>
+                <a:pPr algn="ctr"/>
+                <a:r>
+                  <a:rPr lang="en-US" sz="1400" dirty="0">
+                    <a:solidFill>
+                      <a:schemeClr val="tx1"/>
+                    </a:solidFill>
+                  </a:rPr>
+                  <a:t>D65B</a:t>
+                </a:r>
+              </a:p>
+            </p:txBody>
+          </p:sp>
+          <p:sp>
+            <p:nvSpPr>
+              <p:cNvPr id="115" name="Rectangle 114"/>
+              <p:cNvSpPr/>
+              <p:nvPr/>
+            </p:nvSpPr>
+            <p:spPr>
+              <a:xfrm>
+                <a:off x="1469136" y="992125"/>
+                <a:ext cx="914400" cy="457200"/>
+              </a:xfrm>
+              <a:prstGeom prst="rect">
+                <a:avLst/>
+              </a:prstGeom>
+              <a:noFill/>
+              <a:ln w="38100">
+                <a:solidFill>
+                  <a:schemeClr val="tx1"/>
+                </a:solidFill>
+              </a:ln>
+            </p:spPr>
+            <p:style>
+              <a:lnRef idx="2">
+                <a:schemeClr val="accent1">
+                  <a:shade val="50000"/>
+                </a:schemeClr>
+              </a:lnRef>
+              <a:fillRef idx="1">
+                <a:schemeClr val="accent1"/>
+              </a:fillRef>
+              <a:effectRef idx="0">
+                <a:schemeClr val="accent1"/>
+              </a:effectRef>
+              <a:fontRef idx="minor">
+                <a:schemeClr val="lt1"/>
+              </a:fontRef>
+            </p:style>
+            <p:txBody>
+              <a:bodyPr rtlCol="0" anchor="ctr"/>
+              <a:lstStyle/>
+              <a:p>
+                <a:pPr algn="ctr"/>
+                <a:r>
+                  <a:rPr lang="en-US" sz="1400" dirty="0">
+                    <a:solidFill>
+                      <a:schemeClr val="tx1"/>
+                    </a:solidFill>
+                  </a:rPr>
+                  <a:t>WA251</a:t>
+                </a:r>
+              </a:p>
+            </p:txBody>
+          </p:sp>
+          <p:cxnSp>
+            <p:nvCxnSpPr>
+              <p:cNvPr id="116" name="Straight Connector 115"/>
+              <p:cNvCxnSpPr>
+                <a:stCxn id="114" idx="3"/>
+                <a:endCxn id="115" idx="1"/>
+              </p:cNvCxnSpPr>
+              <p:nvPr/>
+            </p:nvCxnSpPr>
+            <p:spPr>
+              <a:xfrm>
+                <a:off x="1164336" y="1220725"/>
+                <a:ext cx="304800" cy="0"/>
+              </a:xfrm>
+              <a:prstGeom prst="line">
+                <a:avLst/>
+              </a:prstGeom>
+              <a:ln w="38100">
+                <a:solidFill>
+                  <a:schemeClr val="tx1"/>
+                </a:solidFill>
+              </a:ln>
+            </p:spPr>
+            <p:style>
+              <a:lnRef idx="1">
+                <a:schemeClr val="accent1"/>
+              </a:lnRef>
+              <a:fillRef idx="0">
+                <a:schemeClr val="accent1"/>
+              </a:fillRef>
+              <a:effectRef idx="0">
+                <a:schemeClr val="accent1"/>
+              </a:effectRef>
+              <a:fontRef idx="minor">
+                <a:schemeClr val="tx1"/>
+              </a:fontRef>
+            </p:style>
+          </p:cxnSp>
+          <p:cxnSp>
+            <p:nvCxnSpPr>
+              <p:cNvPr id="117" name="Straight Connector 116"/>
+              <p:cNvCxnSpPr>
+                <a:stCxn id="115" idx="3"/>
+              </p:cNvCxnSpPr>
+              <p:nvPr/>
+            </p:nvCxnSpPr>
+            <p:spPr>
+              <a:xfrm>
+                <a:off x="2383536" y="1220725"/>
+                <a:ext cx="843153" cy="0"/>
+              </a:xfrm>
+              <a:prstGeom prst="line">
+                <a:avLst/>
+              </a:prstGeom>
+              <a:ln w="38100">
+                <a:solidFill>
+                  <a:schemeClr val="tx1"/>
+                </a:solidFill>
+              </a:ln>
+            </p:spPr>
+            <p:style>
+              <a:lnRef idx="1">
+                <a:schemeClr val="accent1"/>
+              </a:lnRef>
+              <a:fillRef idx="0">
+                <a:schemeClr val="accent1"/>
+              </a:fillRef>
+              <a:effectRef idx="0">
+                <a:schemeClr val="accent1"/>
+              </a:effectRef>
+              <a:fontRef idx="minor">
+                <a:schemeClr val="tx1"/>
+              </a:fontRef>
+            </p:style>
+          </p:cxnSp>
+          <p:cxnSp>
+            <p:nvCxnSpPr>
+              <p:cNvPr id="118" name="Straight Connector 117"/>
+              <p:cNvCxnSpPr/>
+              <p:nvPr/>
+            </p:nvCxnSpPr>
+            <p:spPr>
+              <a:xfrm>
+                <a:off x="2645664" y="763525"/>
+                <a:ext cx="0" cy="457200"/>
+              </a:xfrm>
+              <a:prstGeom prst="line">
+                <a:avLst/>
+              </a:prstGeom>
+              <a:ln w="38100">
+                <a:solidFill>
+                  <a:schemeClr val="tx1"/>
+                </a:solidFill>
+              </a:ln>
+            </p:spPr>
+            <p:style>
+              <a:lnRef idx="1">
+                <a:schemeClr val="accent1"/>
+              </a:lnRef>
+              <a:fillRef idx="0">
+                <a:schemeClr val="accent1"/>
+              </a:fillRef>
+              <a:effectRef idx="0">
+                <a:schemeClr val="accent1"/>
+              </a:effectRef>
+              <a:fontRef idx="minor">
+                <a:schemeClr val="tx1"/>
+              </a:fontRef>
+            </p:style>
+          </p:cxnSp>
+          <p:sp>
+            <p:nvSpPr>
+              <p:cNvPr id="119" name="Rectangle 118"/>
+              <p:cNvSpPr/>
+              <p:nvPr/>
+            </p:nvSpPr>
+            <p:spPr>
+              <a:xfrm>
+                <a:off x="2531364" y="534924"/>
+                <a:ext cx="228600" cy="228600"/>
+              </a:xfrm>
+              <a:prstGeom prst="rect">
+                <a:avLst/>
+              </a:prstGeom>
+              <a:noFill/>
+              <a:ln w="38100">
+                <a:solidFill>
+                  <a:srgbClr val="0070C0"/>
+                </a:solidFill>
+              </a:ln>
+            </p:spPr>
+            <p:style>
+              <a:lnRef idx="2">
+                <a:schemeClr val="accent1">
+                  <a:shade val="50000"/>
+                </a:schemeClr>
+              </a:lnRef>
+              <a:fillRef idx="1">
+                <a:schemeClr val="accent1"/>
+              </a:fillRef>
+              <a:effectRef idx="0">
+                <a:schemeClr val="accent1"/>
+              </a:effectRef>
+              <a:fontRef idx="minor">
+                <a:schemeClr val="lt1"/>
+              </a:fontRef>
+            </p:style>
+            <p:txBody>
+              <a:bodyPr rtlCol="0" anchor="ctr"/>
+              <a:lstStyle/>
+              <a:p>
+                <a:pPr algn="ctr"/>
+                <a:r>
+                  <a:rPr lang="en-US" sz="1400" dirty="0">
+                    <a:solidFill>
+                      <a:schemeClr val="tx1"/>
+                    </a:solidFill>
+                  </a:rPr>
+                  <a:t>P</a:t>
+                </a:r>
+              </a:p>
+            </p:txBody>
+          </p:sp>
+        </p:grpSp>
+        <p:grpSp>
+          <p:nvGrpSpPr>
+            <p:cNvPr id="163" name="Group 162"/>
+            <p:cNvGrpSpPr/>
+            <p:nvPr/>
+          </p:nvGrpSpPr>
+          <p:grpSpPr>
+            <a:xfrm>
+              <a:off x="3123057" y="5429564"/>
+              <a:ext cx="2749594" cy="1027937"/>
+              <a:chOff x="4645724" y="2455925"/>
+              <a:chExt cx="2749594" cy="1027937"/>
+            </a:xfrm>
+          </p:grpSpPr>
+          <p:grpSp>
+            <p:nvGrpSpPr>
+              <p:cNvPr id="164" name="Group 163"/>
+              <p:cNvGrpSpPr/>
+              <p:nvPr/>
+            </p:nvGrpSpPr>
+            <p:grpSpPr>
+              <a:xfrm>
+                <a:off x="5476790" y="2455925"/>
+                <a:ext cx="1518475" cy="457200"/>
+                <a:chOff x="5647373" y="1159766"/>
+                <a:chExt cx="1518475" cy="457200"/>
+              </a:xfrm>
+            </p:grpSpPr>
+            <p:sp>
+              <p:nvSpPr>
+                <p:cNvPr id="171" name="Rectangle 170"/>
+                <p:cNvSpPr/>
+                <p:nvPr/>
+              </p:nvSpPr>
+              <p:spPr>
+                <a:xfrm>
+                  <a:off x="6251448" y="1159766"/>
+                  <a:ext cx="914400" cy="457200"/>
+                </a:xfrm>
+                <a:prstGeom prst="rect">
+                  <a:avLst/>
+                </a:prstGeom>
+                <a:noFill/>
+                <a:ln w="38100">
+                  <a:solidFill>
+                    <a:schemeClr val="tx1"/>
+                  </a:solidFill>
+                </a:ln>
+              </p:spPr>
+              <p:style>
+                <a:lnRef idx="2">
+                  <a:schemeClr val="accent1">
+                    <a:shade val="50000"/>
+                  </a:schemeClr>
+                </a:lnRef>
+                <a:fillRef idx="1">
+                  <a:schemeClr val="accent1"/>
+                </a:fillRef>
+                <a:effectRef idx="0">
+                  <a:schemeClr val="accent1"/>
+                </a:effectRef>
+                <a:fontRef idx="minor">
+                  <a:schemeClr val="lt1"/>
+                </a:fontRef>
+              </p:style>
+              <p:txBody>
+                <a:bodyPr rtlCol="0" anchor="ctr"/>
+                <a:lstStyle/>
+                <a:p>
+                  <a:pPr algn="ctr"/>
+                  <a:r>
+                    <a:rPr lang="en-US" sz="1400" dirty="0">
+                      <a:solidFill>
+                        <a:schemeClr val="tx1"/>
+                      </a:solidFill>
+                    </a:rPr>
+                    <a:t>400 </a:t>
+                  </a:r>
+                  <a:r>
+                    <a:rPr lang="en-US" sz="1400" dirty="0" err="1">
+                      <a:solidFill>
+                        <a:schemeClr val="tx1"/>
+                      </a:solidFill>
+                    </a:rPr>
+                    <a:t>iP</a:t>
+                  </a:r>
+                  <a:endParaRPr lang="en-US" sz="1400" dirty="0">
+                    <a:solidFill>
+                      <a:schemeClr val="tx1"/>
+                    </a:solidFill>
+                  </a:endParaRPr>
+                </a:p>
+              </p:txBody>
+            </p:sp>
+            <p:sp>
+              <p:nvSpPr>
+                <p:cNvPr id="172" name="Flowchart: Summing Junction 171"/>
+                <p:cNvSpPr/>
+                <p:nvPr/>
+              </p:nvSpPr>
+              <p:spPr>
+                <a:xfrm>
+                  <a:off x="5879021" y="1274829"/>
+                  <a:ext cx="228600" cy="228600"/>
+                </a:xfrm>
+                <a:prstGeom prst="flowChartSummingJunction">
+                  <a:avLst/>
+                </a:prstGeom>
+                <a:noFill/>
+                <a:ln w="38100">
+                  <a:solidFill>
+                    <a:srgbClr val="00B050"/>
+                  </a:solidFill>
+                </a:ln>
+              </p:spPr>
+              <p:style>
+                <a:lnRef idx="2">
+                  <a:schemeClr val="accent1">
+                    <a:shade val="50000"/>
+                  </a:schemeClr>
+                </a:lnRef>
+                <a:fillRef idx="1">
+                  <a:schemeClr val="accent1"/>
+                </a:fillRef>
+                <a:effectRef idx="0">
+                  <a:schemeClr val="accent1"/>
+                </a:effectRef>
+                <a:fontRef idx="minor">
+                  <a:schemeClr val="lt1"/>
+                </a:fontRef>
+              </p:style>
+              <p:txBody>
+                <a:bodyPr rtlCol="0" anchor="ctr"/>
+                <a:lstStyle/>
+                <a:p>
+                  <a:pPr algn="ctr"/>
+                  <a:endParaRPr lang="en-US"/>
+                </a:p>
+              </p:txBody>
+            </p:sp>
+            <p:cxnSp>
+              <p:nvCxnSpPr>
+                <p:cNvPr id="173" name="Straight Connector 172"/>
+                <p:cNvCxnSpPr>
+                  <a:endCxn id="172" idx="2"/>
+                </p:cNvCxnSpPr>
+                <p:nvPr/>
+              </p:nvCxnSpPr>
+              <p:spPr>
+                <a:xfrm flipV="1">
+                  <a:off x="5647373" y="1389129"/>
+                  <a:ext cx="231648" cy="0"/>
+                </a:xfrm>
+                <a:prstGeom prst="line">
+                  <a:avLst/>
+                </a:prstGeom>
+                <a:ln w="38100">
+                  <a:solidFill>
+                    <a:schemeClr val="tx1"/>
+                  </a:solidFill>
+                </a:ln>
+              </p:spPr>
+              <p:style>
+                <a:lnRef idx="1">
+                  <a:schemeClr val="accent1"/>
+                </a:lnRef>
+                <a:fillRef idx="0">
+                  <a:schemeClr val="accent1"/>
+                </a:fillRef>
+                <a:effectRef idx="0">
+                  <a:schemeClr val="accent1"/>
+                </a:effectRef>
+                <a:fontRef idx="minor">
+                  <a:schemeClr val="tx1"/>
+                </a:fontRef>
+              </p:style>
+            </p:cxnSp>
+            <p:cxnSp>
+              <p:nvCxnSpPr>
+                <p:cNvPr id="174" name="Straight Connector 173"/>
+                <p:cNvCxnSpPr>
+                  <a:stCxn id="172" idx="6"/>
+                  <a:endCxn id="171" idx="1"/>
+                </p:cNvCxnSpPr>
+                <p:nvPr/>
+              </p:nvCxnSpPr>
+              <p:spPr>
+                <a:xfrm flipV="1">
+                  <a:off x="6107621" y="1388366"/>
+                  <a:ext cx="143827" cy="763"/>
+                </a:xfrm>
+                <a:prstGeom prst="line">
+                  <a:avLst/>
+                </a:prstGeom>
+                <a:ln w="38100">
+                  <a:solidFill>
+                    <a:schemeClr val="tx1"/>
+                  </a:solidFill>
+                </a:ln>
+              </p:spPr>
+              <p:style>
+                <a:lnRef idx="1">
+                  <a:schemeClr val="accent1"/>
+                </a:lnRef>
+                <a:fillRef idx="0">
+                  <a:schemeClr val="accent1"/>
+                </a:fillRef>
+                <a:effectRef idx="0">
+                  <a:schemeClr val="accent1"/>
+                </a:effectRef>
+                <a:fontRef idx="minor">
+                  <a:schemeClr val="tx1"/>
+                </a:fontRef>
+              </p:style>
+            </p:cxnSp>
+          </p:grpSp>
+          <p:sp>
+            <p:nvSpPr>
+              <p:cNvPr id="165" name="Rectangle 164"/>
+              <p:cNvSpPr/>
+              <p:nvPr/>
+            </p:nvSpPr>
+            <p:spPr>
+              <a:xfrm>
+                <a:off x="6080865" y="3026662"/>
+                <a:ext cx="914400" cy="457200"/>
+              </a:xfrm>
+              <a:prstGeom prst="rect">
+                <a:avLst/>
+              </a:prstGeom>
+              <a:noFill/>
+              <a:ln w="38100">
+                <a:solidFill>
+                  <a:schemeClr val="tx1"/>
+                </a:solidFill>
+              </a:ln>
+            </p:spPr>
+            <p:style>
+              <a:lnRef idx="2">
+                <a:schemeClr val="accent1">
+                  <a:shade val="50000"/>
+                </a:schemeClr>
+              </a:lnRef>
+              <a:fillRef idx="1">
+                <a:schemeClr val="accent1"/>
+              </a:fillRef>
+              <a:effectRef idx="0">
+                <a:schemeClr val="accent1"/>
+              </a:effectRef>
+              <a:fontRef idx="minor">
+                <a:schemeClr val="lt1"/>
+              </a:fontRef>
+            </p:style>
+            <p:txBody>
+              <a:bodyPr rtlCol="0" anchor="ctr"/>
+              <a:lstStyle/>
+              <a:p>
+                <a:pPr algn="ctr"/>
+                <a:r>
+                  <a:rPr lang="en-US" sz="1400" dirty="0">
+                    <a:solidFill>
+                      <a:schemeClr val="tx1"/>
+                    </a:solidFill>
+                  </a:rPr>
+                  <a:t>DP groove</a:t>
+                </a:r>
+              </a:p>
+            </p:txBody>
+          </p:sp>
+          <p:cxnSp>
+            <p:nvCxnSpPr>
+              <p:cNvPr id="166" name="Straight Connector 165"/>
+              <p:cNvCxnSpPr>
+                <a:endCxn id="165" idx="1"/>
+              </p:cNvCxnSpPr>
+              <p:nvPr/>
+            </p:nvCxnSpPr>
+            <p:spPr>
+              <a:xfrm flipV="1">
+                <a:off x="5476790" y="3255262"/>
+                <a:ext cx="604075" cy="763"/>
+              </a:xfrm>
+              <a:prstGeom prst="line">
+                <a:avLst/>
+              </a:prstGeom>
+              <a:ln w="38100">
+                <a:solidFill>
+                  <a:schemeClr val="tx1"/>
+                </a:solidFill>
+              </a:ln>
+            </p:spPr>
+            <p:style>
+              <a:lnRef idx="1">
+                <a:schemeClr val="accent1"/>
+              </a:lnRef>
+              <a:fillRef idx="0">
+                <a:schemeClr val="accent1"/>
+              </a:fillRef>
+              <a:effectRef idx="0">
+                <a:schemeClr val="accent1"/>
+              </a:effectRef>
+              <a:fontRef idx="minor">
+                <a:schemeClr val="tx1"/>
+              </a:fontRef>
+            </p:style>
+          </p:cxnSp>
+          <p:cxnSp>
+            <p:nvCxnSpPr>
+              <p:cNvPr id="167" name="Straight Connector 166"/>
+              <p:cNvCxnSpPr/>
+              <p:nvPr/>
+            </p:nvCxnSpPr>
+            <p:spPr>
+              <a:xfrm>
+                <a:off x="5495078" y="2690621"/>
+                <a:ext cx="0" cy="560833"/>
+              </a:xfrm>
+              <a:prstGeom prst="line">
+                <a:avLst/>
+              </a:prstGeom>
+              <a:ln w="38100">
+                <a:solidFill>
+                  <a:schemeClr val="tx1"/>
+                </a:solidFill>
+              </a:ln>
+            </p:spPr>
+            <p:style>
+              <a:lnRef idx="1">
+                <a:schemeClr val="accent1"/>
+              </a:lnRef>
+              <a:fillRef idx="0">
+                <a:schemeClr val="accent1"/>
+              </a:fillRef>
+              <a:effectRef idx="0">
+                <a:schemeClr val="accent1"/>
+              </a:effectRef>
+              <a:fontRef idx="minor">
+                <a:schemeClr val="tx1"/>
+              </a:fontRef>
+            </p:style>
+          </p:cxnSp>
+          <p:sp>
+            <p:nvSpPr>
+              <p:cNvPr id="168" name="TextBox 167"/>
+              <p:cNvSpPr txBox="1"/>
+              <p:nvPr/>
+            </p:nvSpPr>
+            <p:spPr>
+              <a:xfrm>
+                <a:off x="7128898" y="2799588"/>
+                <a:ext cx="266420" cy="307777"/>
+              </a:xfrm>
+              <a:prstGeom prst="rect">
+                <a:avLst/>
+              </a:prstGeom>
+              <a:noFill/>
+            </p:spPr>
+            <p:txBody>
+              <a:bodyPr wrap="none" rtlCol="0">
+                <a:spAutoFit/>
+              </a:bodyPr>
+              <a:lstStyle/>
+              <a:p>
+                <a:r>
+                  <a:rPr lang="en-US" sz="1400" dirty="0"/>
+                  <a:t>S</a:t>
+                </a:r>
+              </a:p>
+            </p:txBody>
+          </p:sp>
+          <p:cxnSp>
+            <p:nvCxnSpPr>
+              <p:cNvPr id="170" name="Straight Connector 169"/>
+              <p:cNvCxnSpPr/>
+              <p:nvPr/>
+            </p:nvCxnSpPr>
+            <p:spPr>
+              <a:xfrm>
+                <a:off x="4645724" y="2964870"/>
+                <a:ext cx="843153" cy="0"/>
+              </a:xfrm>
+              <a:prstGeom prst="line">
+                <a:avLst/>
+              </a:prstGeom>
+              <a:ln w="38100">
+                <a:solidFill>
+                  <a:schemeClr val="tx1"/>
+                </a:solidFill>
+              </a:ln>
+            </p:spPr>
+            <p:style>
+              <a:lnRef idx="1">
+                <a:schemeClr val="accent1"/>
+              </a:lnRef>
+              <a:fillRef idx="0">
+                <a:schemeClr val="accent1"/>
+              </a:fillRef>
+              <a:effectRef idx="0">
+                <a:schemeClr val="accent1"/>
+              </a:effectRef>
+              <a:fontRef idx="minor">
+                <a:schemeClr val="tx1"/>
+              </a:fontRef>
+            </p:style>
+          </p:cxnSp>
+          <p:sp>
+            <p:nvSpPr>
+              <p:cNvPr id="169" name="Flowchart: Collate 168"/>
+              <p:cNvSpPr/>
+              <p:nvPr/>
+            </p:nvSpPr>
+            <p:spPr>
+              <a:xfrm>
+                <a:off x="5001017" y="2736270"/>
+                <a:ext cx="228600" cy="457200"/>
+              </a:xfrm>
+              <a:prstGeom prst="flowChartCollate">
+                <a:avLst/>
+              </a:prstGeom>
+              <a:noFill/>
+              <a:ln w="38100">
+                <a:solidFill>
+                  <a:srgbClr val="FF0000"/>
+                </a:solidFill>
+              </a:ln>
+            </p:spPr>
+            <p:style>
+              <a:lnRef idx="2">
+                <a:schemeClr val="accent1">
+                  <a:shade val="50000"/>
+                </a:schemeClr>
+              </a:lnRef>
+              <a:fillRef idx="1">
+                <a:schemeClr val="accent1"/>
+              </a:fillRef>
+              <a:effectRef idx="0">
+                <a:schemeClr val="accent1"/>
+              </a:effectRef>
+              <a:fontRef idx="minor">
+                <a:schemeClr val="lt1"/>
+              </a:fontRef>
+            </p:style>
+            <p:txBody>
+              <a:bodyPr rtlCol="0" anchor="ctr"/>
+              <a:lstStyle/>
+              <a:p>
+                <a:pPr algn="ctr"/>
+                <a:endParaRPr lang="en-US">
+                  <a:solidFill>
+                    <a:schemeClr val="tx1"/>
+                  </a:solidFill>
+                </a:endParaRPr>
+              </a:p>
+            </p:txBody>
+          </p:sp>
+        </p:grpSp>
+        <p:cxnSp>
+          <p:nvCxnSpPr>
+            <p:cNvPr id="175" name="Straight Connector 174"/>
+            <p:cNvCxnSpPr/>
+            <p:nvPr/>
+          </p:nvCxnSpPr>
+          <p:spPr>
+            <a:xfrm>
+              <a:off x="3140963" y="3835389"/>
+              <a:ext cx="0" cy="2103120"/>
+            </a:xfrm>
+            <a:prstGeom prst="line">
+              <a:avLst/>
+            </a:prstGeom>
+            <a:ln w="38100">
+              <a:solidFill>
+                <a:schemeClr val="tx1"/>
+              </a:solidFill>
+            </a:ln>
+          </p:spPr>
+          <p:style>
+            <a:lnRef idx="1">
+              <a:schemeClr val="accent1"/>
+            </a:lnRef>
+            <a:fillRef idx="0">
+              <a:schemeClr val="accent1"/>
+            </a:fillRef>
+            <a:effectRef idx="0">
+              <a:schemeClr val="accent1"/>
+            </a:effectRef>
+            <a:fontRef idx="minor">
+              <a:schemeClr val="tx1"/>
+            </a:fontRef>
+          </p:style>
+        </p:cxnSp>
+        <p:grpSp>
+          <p:nvGrpSpPr>
+            <p:cNvPr id="180" name="Group 179"/>
+            <p:cNvGrpSpPr/>
+            <p:nvPr/>
+          </p:nvGrpSpPr>
+          <p:grpSpPr>
+            <a:xfrm>
+              <a:off x="3124400" y="2696738"/>
+              <a:ext cx="3821509" cy="2382462"/>
+              <a:chOff x="3130496" y="2769890"/>
+              <a:chExt cx="3821509" cy="2382462"/>
+            </a:xfrm>
+          </p:grpSpPr>
+          <p:cxnSp>
+            <p:nvCxnSpPr>
+              <p:cNvPr id="177" name="Straight Connector 176"/>
+              <p:cNvCxnSpPr/>
+              <p:nvPr/>
+            </p:nvCxnSpPr>
+            <p:spPr>
+              <a:xfrm>
+                <a:off x="3130496" y="3920733"/>
+                <a:ext cx="843153" cy="0"/>
+              </a:xfrm>
+              <a:prstGeom prst="line">
+                <a:avLst/>
+              </a:prstGeom>
+              <a:ln w="38100">
+                <a:solidFill>
+                  <a:schemeClr val="tx1"/>
+                </a:solidFill>
+              </a:ln>
+            </p:spPr>
+            <p:style>
+              <a:lnRef idx="1">
+                <a:schemeClr val="accent1"/>
+              </a:lnRef>
+              <a:fillRef idx="0">
+                <a:schemeClr val="accent1"/>
+              </a:fillRef>
+              <a:effectRef idx="0">
+                <a:schemeClr val="accent1"/>
+              </a:effectRef>
+              <a:fontRef idx="minor">
+                <a:schemeClr val="tx1"/>
+              </a:fontRef>
+            </p:style>
+          </p:cxnSp>
+          <p:grpSp>
+            <p:nvGrpSpPr>
+              <p:cNvPr id="179" name="Group 178"/>
+              <p:cNvGrpSpPr/>
+              <p:nvPr/>
+            </p:nvGrpSpPr>
+            <p:grpSpPr>
+              <a:xfrm>
+                <a:off x="3954123" y="2769890"/>
+                <a:ext cx="2997882" cy="2382462"/>
+                <a:chOff x="4645724" y="2455925"/>
+                <a:chExt cx="2997882" cy="2382462"/>
+              </a:xfrm>
+            </p:grpSpPr>
+            <p:grpSp>
+              <p:nvGrpSpPr>
+                <p:cNvPr id="159" name="Group 158"/>
+                <p:cNvGrpSpPr/>
+                <p:nvPr/>
+              </p:nvGrpSpPr>
+              <p:grpSpPr>
+                <a:xfrm>
+                  <a:off x="4645724" y="2455925"/>
+                  <a:ext cx="2821728" cy="1027937"/>
+                  <a:chOff x="4645724" y="2455925"/>
+                  <a:chExt cx="2821728" cy="1027937"/>
+                </a:xfrm>
+              </p:grpSpPr>
+              <p:grpSp>
+                <p:nvGrpSpPr>
+                  <p:cNvPr id="123" name="Group 122"/>
+                  <p:cNvGrpSpPr/>
+                  <p:nvPr/>
+                </p:nvGrpSpPr>
+                <p:grpSpPr>
+                  <a:xfrm>
+                    <a:off x="5476790" y="2455925"/>
+                    <a:ext cx="1518475" cy="457200"/>
+                    <a:chOff x="5647373" y="1159766"/>
+                    <a:chExt cx="1518475" cy="457200"/>
+                  </a:xfrm>
+                </p:grpSpPr>
+                <p:sp>
+                  <p:nvSpPr>
+                    <p:cNvPr id="130" name="Rectangle 129"/>
+                    <p:cNvSpPr/>
+                    <p:nvPr/>
+                  </p:nvSpPr>
+                  <p:spPr>
+                    <a:xfrm>
+                      <a:off x="6251448" y="1159766"/>
+                      <a:ext cx="914400" cy="457200"/>
+                    </a:xfrm>
+                    <a:prstGeom prst="rect">
+                      <a:avLst/>
+                    </a:prstGeom>
+                    <a:noFill/>
+                    <a:ln w="38100">
+                      <a:solidFill>
+                        <a:schemeClr val="tx1"/>
+                      </a:solidFill>
+                    </a:ln>
+                  </p:spPr>
+                  <p:style>
+                    <a:lnRef idx="2">
+                      <a:schemeClr val="accent1">
+                        <a:shade val="50000"/>
+                      </a:schemeClr>
+                    </a:lnRef>
+                    <a:fillRef idx="1">
+                      <a:schemeClr val="accent1"/>
+                    </a:fillRef>
+                    <a:effectRef idx="0">
+                      <a:schemeClr val="accent1"/>
+                    </a:effectRef>
+                    <a:fontRef idx="minor">
+                      <a:schemeClr val="lt1"/>
+                    </a:fontRef>
+                  </p:style>
+                  <p:txBody>
+                    <a:bodyPr rtlCol="0" anchor="ctr"/>
+                    <a:lstStyle/>
+                    <a:p>
+                      <a:pPr algn="ctr"/>
+                      <a:r>
+                        <a:rPr lang="en-US" sz="1400" dirty="0">
+                          <a:solidFill>
+                            <a:schemeClr val="tx1"/>
+                          </a:solidFill>
+                        </a:rPr>
+                        <a:t>700 </a:t>
+                      </a:r>
+                      <a:r>
+                        <a:rPr lang="en-US" sz="1400" dirty="0" err="1">
+                          <a:solidFill>
+                            <a:schemeClr val="tx1"/>
+                          </a:solidFill>
+                        </a:rPr>
+                        <a:t>iP</a:t>
+                      </a:r>
+                      <a:endParaRPr lang="en-US" sz="1400" dirty="0">
+                        <a:solidFill>
+                          <a:schemeClr val="tx1"/>
+                        </a:solidFill>
+                      </a:endParaRPr>
+                    </a:p>
+                  </p:txBody>
+                </p:sp>
+                <p:sp>
+                  <p:nvSpPr>
+                    <p:cNvPr id="131" name="Flowchart: Summing Junction 130"/>
+                    <p:cNvSpPr/>
+                    <p:nvPr/>
+                  </p:nvSpPr>
+                  <p:spPr>
+                    <a:xfrm>
+                      <a:off x="5879021" y="1274829"/>
+                      <a:ext cx="228600" cy="228600"/>
+                    </a:xfrm>
+                    <a:prstGeom prst="flowChartSummingJunction">
+                      <a:avLst/>
+                    </a:prstGeom>
+                    <a:noFill/>
+                    <a:ln w="38100">
+                      <a:solidFill>
+                        <a:srgbClr val="00B050"/>
+                      </a:solidFill>
+                    </a:ln>
+                  </p:spPr>
+                  <p:style>
+                    <a:lnRef idx="2">
+                      <a:schemeClr val="accent1">
+                        <a:shade val="50000"/>
+                      </a:schemeClr>
+                    </a:lnRef>
+                    <a:fillRef idx="1">
+                      <a:schemeClr val="accent1"/>
+                    </a:fillRef>
+                    <a:effectRef idx="0">
+                      <a:schemeClr val="accent1"/>
+                    </a:effectRef>
+                    <a:fontRef idx="minor">
+                      <a:schemeClr val="lt1"/>
+                    </a:fontRef>
+                  </p:style>
+                  <p:txBody>
+                    <a:bodyPr rtlCol="0" anchor="ctr"/>
+                    <a:lstStyle/>
+                    <a:p>
+                      <a:pPr algn="ctr"/>
+                      <a:endParaRPr lang="en-US"/>
+                    </a:p>
+                  </p:txBody>
+                </p:sp>
+                <p:cxnSp>
+                  <p:nvCxnSpPr>
+                    <p:cNvPr id="132" name="Straight Connector 131"/>
+                    <p:cNvCxnSpPr>
+                      <a:endCxn id="131" idx="2"/>
+                    </p:cNvCxnSpPr>
+                    <p:nvPr/>
+                  </p:nvCxnSpPr>
+                  <p:spPr>
+                    <a:xfrm flipV="1">
+                      <a:off x="5647373" y="1389129"/>
+                      <a:ext cx="231648" cy="0"/>
+                    </a:xfrm>
+                    <a:prstGeom prst="line">
+                      <a:avLst/>
+                    </a:prstGeom>
+                    <a:ln w="38100">
+                      <a:solidFill>
+                        <a:schemeClr val="tx1"/>
+                      </a:solidFill>
+                    </a:ln>
+                  </p:spPr>
+                  <p:style>
+                    <a:lnRef idx="1">
+                      <a:schemeClr val="accent1"/>
+                    </a:lnRef>
+                    <a:fillRef idx="0">
+                      <a:schemeClr val="accent1"/>
+                    </a:fillRef>
+                    <a:effectRef idx="0">
+                      <a:schemeClr val="accent1"/>
+                    </a:effectRef>
+                    <a:fontRef idx="minor">
+                      <a:schemeClr val="tx1"/>
+                    </a:fontRef>
+                  </p:style>
+                </p:cxnSp>
+                <p:cxnSp>
+                  <p:nvCxnSpPr>
+                    <p:cNvPr id="133" name="Straight Connector 132"/>
+                    <p:cNvCxnSpPr>
+                      <a:stCxn id="131" idx="6"/>
+                      <a:endCxn id="130" idx="1"/>
+                    </p:cNvCxnSpPr>
+                    <p:nvPr/>
+                  </p:nvCxnSpPr>
+                  <p:spPr>
+                    <a:xfrm flipV="1">
+                      <a:off x="6107621" y="1388366"/>
+                      <a:ext cx="143827" cy="763"/>
+                    </a:xfrm>
+                    <a:prstGeom prst="line">
+                      <a:avLst/>
+                    </a:prstGeom>
+                    <a:ln w="38100">
+                      <a:solidFill>
+                        <a:schemeClr val="tx1"/>
+                      </a:solidFill>
+                    </a:ln>
+                  </p:spPr>
+                  <p:style>
+                    <a:lnRef idx="1">
+                      <a:schemeClr val="accent1"/>
+                    </a:lnRef>
+                    <a:fillRef idx="0">
+                      <a:schemeClr val="accent1"/>
+                    </a:fillRef>
+                    <a:effectRef idx="0">
+                      <a:schemeClr val="accent1"/>
+                    </a:effectRef>
+                    <a:fontRef idx="minor">
+                      <a:schemeClr val="tx1"/>
+                    </a:fontRef>
+                  </p:style>
+                </p:cxnSp>
+              </p:grpSp>
+              <p:sp>
+                <p:nvSpPr>
+                  <p:cNvPr id="126" name="Rectangle 125"/>
+                  <p:cNvSpPr/>
+                  <p:nvPr/>
+                </p:nvSpPr>
+                <p:spPr>
+                  <a:xfrm>
+                    <a:off x="6080865" y="3026662"/>
+                    <a:ext cx="914400" cy="457200"/>
+                  </a:xfrm>
+                  <a:prstGeom prst="rect">
+                    <a:avLst/>
+                  </a:prstGeom>
+                  <a:noFill/>
+                  <a:ln w="38100">
+                    <a:solidFill>
+                      <a:schemeClr val="tx1"/>
+                    </a:solidFill>
+                  </a:ln>
+                </p:spPr>
+                <p:style>
+                  <a:lnRef idx="2">
+                    <a:schemeClr val="accent1">
+                      <a:shade val="50000"/>
+                    </a:schemeClr>
+                  </a:lnRef>
+                  <a:fillRef idx="1">
+                    <a:schemeClr val="accent1"/>
+                  </a:fillRef>
+                  <a:effectRef idx="0">
+                    <a:schemeClr val="accent1"/>
+                  </a:effectRef>
+                  <a:fontRef idx="minor">
+                    <a:schemeClr val="lt1"/>
+                  </a:fontRef>
+                </p:style>
+                <p:txBody>
+                  <a:bodyPr rtlCol="0" anchor="ctr"/>
+                  <a:lstStyle/>
+                  <a:p>
+                    <a:pPr algn="ctr"/>
+                    <a:r>
+                      <a:rPr lang="en-US" sz="1400" dirty="0">
+                        <a:solidFill>
+                          <a:schemeClr val="tx1"/>
+                        </a:solidFill>
+                      </a:rPr>
+                      <a:t>DP groove</a:t>
+                    </a:r>
+                  </a:p>
+                </p:txBody>
+              </p:sp>
+              <p:cxnSp>
+                <p:nvCxnSpPr>
+                  <p:cNvPr id="128" name="Straight Connector 127"/>
+                  <p:cNvCxnSpPr>
+                    <a:endCxn id="126" idx="1"/>
+                  </p:cNvCxnSpPr>
+                  <p:nvPr/>
+                </p:nvCxnSpPr>
+                <p:spPr>
+                  <a:xfrm flipV="1">
+                    <a:off x="5476790" y="3255262"/>
+                    <a:ext cx="604075" cy="763"/>
+                  </a:xfrm>
+                  <a:prstGeom prst="line">
+                    <a:avLst/>
+                  </a:prstGeom>
+                  <a:ln w="38100">
+                    <a:solidFill>
+                      <a:schemeClr val="tx1"/>
+                    </a:solidFill>
+                  </a:ln>
+                </p:spPr>
+                <p:style>
+                  <a:lnRef idx="1">
+                    <a:schemeClr val="accent1"/>
+                  </a:lnRef>
+                  <a:fillRef idx="0">
+                    <a:schemeClr val="accent1"/>
+                  </a:fillRef>
+                  <a:effectRef idx="0">
+                    <a:schemeClr val="accent1"/>
+                  </a:effectRef>
+                  <a:fontRef idx="minor">
+                    <a:schemeClr val="tx1"/>
+                  </a:fontRef>
+                </p:style>
+              </p:cxnSp>
+              <p:cxnSp>
+                <p:nvCxnSpPr>
+                  <p:cNvPr id="125" name="Straight Connector 124"/>
+                  <p:cNvCxnSpPr/>
+                  <p:nvPr/>
+                </p:nvCxnSpPr>
+                <p:spPr>
+                  <a:xfrm>
+                    <a:off x="5495078" y="2690621"/>
+                    <a:ext cx="0" cy="560833"/>
+                  </a:xfrm>
+                  <a:prstGeom prst="line">
+                    <a:avLst/>
+                  </a:prstGeom>
+                  <a:ln w="38100">
+                    <a:solidFill>
+                      <a:schemeClr val="tx1"/>
+                    </a:solidFill>
+                  </a:ln>
+                </p:spPr>
+                <p:style>
+                  <a:lnRef idx="1">
+                    <a:schemeClr val="accent1"/>
+                  </a:lnRef>
+                  <a:fillRef idx="0">
+                    <a:schemeClr val="accent1"/>
+                  </a:fillRef>
+                  <a:effectRef idx="0">
+                    <a:schemeClr val="accent1"/>
+                  </a:effectRef>
+                  <a:fontRef idx="minor">
+                    <a:schemeClr val="tx1"/>
+                  </a:fontRef>
+                </p:style>
+              </p:cxnSp>
+              <p:sp>
+                <p:nvSpPr>
+                  <p:cNvPr id="134" name="TextBox 133"/>
+                  <p:cNvSpPr txBox="1"/>
+                  <p:nvPr/>
+                </p:nvSpPr>
+                <p:spPr>
+                  <a:xfrm>
+                    <a:off x="7128898" y="2799588"/>
+                    <a:ext cx="338554" cy="307777"/>
+                  </a:xfrm>
+                  <a:prstGeom prst="rect">
+                    <a:avLst/>
+                  </a:prstGeom>
+                  <a:noFill/>
+                </p:spPr>
+                <p:txBody>
+                  <a:bodyPr wrap="none" rtlCol="0">
+                    <a:spAutoFit/>
+                  </a:bodyPr>
+                  <a:lstStyle/>
+                  <a:p>
+                    <a:r>
+                      <a:rPr lang="en-US" sz="1400" dirty="0"/>
+                      <a:t>M</a:t>
+                    </a:r>
+                  </a:p>
+                </p:txBody>
+              </p:sp>
+              <p:cxnSp>
+                <p:nvCxnSpPr>
+                  <p:cNvPr id="158" name="Straight Connector 157"/>
+                  <p:cNvCxnSpPr/>
+                  <p:nvPr/>
+                </p:nvCxnSpPr>
+                <p:spPr>
+                  <a:xfrm>
+                    <a:off x="4645724" y="2964870"/>
+                    <a:ext cx="843153" cy="0"/>
+                  </a:xfrm>
+                  <a:prstGeom prst="line">
+                    <a:avLst/>
+                  </a:prstGeom>
+                  <a:ln w="38100">
+                    <a:solidFill>
+                      <a:schemeClr val="tx1"/>
+                    </a:solidFill>
+                  </a:ln>
+                </p:spPr>
+                <p:style>
+                  <a:lnRef idx="1">
+                    <a:schemeClr val="accent1"/>
+                  </a:lnRef>
+                  <a:fillRef idx="0">
+                    <a:schemeClr val="accent1"/>
+                  </a:fillRef>
+                  <a:effectRef idx="0">
+                    <a:schemeClr val="accent1"/>
+                  </a:effectRef>
+                  <a:fontRef idx="minor">
+                    <a:schemeClr val="tx1"/>
+                  </a:fontRef>
+                </p:style>
+              </p:cxnSp>
+              <p:sp>
+                <p:nvSpPr>
+                  <p:cNvPr id="157" name="Flowchart: Collate 156"/>
+                  <p:cNvSpPr/>
+                  <p:nvPr/>
+                </p:nvSpPr>
+                <p:spPr>
+                  <a:xfrm>
+                    <a:off x="5001017" y="2736270"/>
+                    <a:ext cx="228600" cy="457200"/>
+                  </a:xfrm>
+                  <a:prstGeom prst="flowChartCollate">
+                    <a:avLst/>
+                  </a:prstGeom>
+                  <a:noFill/>
+                  <a:ln w="38100">
+                    <a:solidFill>
+                      <a:srgbClr val="FF0000"/>
+                    </a:solidFill>
+                  </a:ln>
+                </p:spPr>
+                <p:style>
+                  <a:lnRef idx="2">
+                    <a:schemeClr val="accent1">
+                      <a:shade val="50000"/>
+                    </a:schemeClr>
+                  </a:lnRef>
+                  <a:fillRef idx="1">
+                    <a:schemeClr val="accent1"/>
+                  </a:fillRef>
+                  <a:effectRef idx="0">
+                    <a:schemeClr val="accent1"/>
+                  </a:effectRef>
+                  <a:fontRef idx="minor">
+                    <a:schemeClr val="lt1"/>
+                  </a:fontRef>
+                </p:style>
+                <p:txBody>
+                  <a:bodyPr rtlCol="0" anchor="ctr"/>
+                  <a:lstStyle/>
+                  <a:p>
+                    <a:pPr algn="ctr"/>
+                    <a:endParaRPr lang="en-US">
+                      <a:solidFill>
+                        <a:schemeClr val="tx1"/>
+                      </a:solidFill>
+                    </a:endParaRPr>
+                  </a:p>
+                </p:txBody>
+              </p:sp>
+            </p:grpSp>
+            <p:grpSp>
+              <p:nvGrpSpPr>
+                <p:cNvPr id="162" name="Group 161"/>
+                <p:cNvGrpSpPr/>
+                <p:nvPr/>
+              </p:nvGrpSpPr>
+              <p:grpSpPr>
+                <a:xfrm>
+                  <a:off x="4645724" y="3810450"/>
+                  <a:ext cx="2997882" cy="1027937"/>
+                  <a:chOff x="4476935" y="4015187"/>
+                  <a:chExt cx="2997882" cy="1027937"/>
+                </a:xfrm>
+              </p:grpSpPr>
+              <p:grpSp>
+                <p:nvGrpSpPr>
+                  <p:cNvPr id="141" name="Group 140"/>
+                  <p:cNvGrpSpPr/>
+                  <p:nvPr/>
+                </p:nvGrpSpPr>
+                <p:grpSpPr>
+                  <a:xfrm>
+                    <a:off x="5293040" y="4015187"/>
+                    <a:ext cx="2181777" cy="1027937"/>
+                    <a:chOff x="5069711" y="3232024"/>
+                    <a:chExt cx="2181777" cy="1027937"/>
+                  </a:xfrm>
+                </p:grpSpPr>
+                <p:grpSp>
+                  <p:nvGrpSpPr>
+                    <p:cNvPr id="142" name="Group 141"/>
+                    <p:cNvGrpSpPr/>
+                    <p:nvPr/>
+                  </p:nvGrpSpPr>
+                  <p:grpSpPr>
+                    <a:xfrm>
+                      <a:off x="5069711" y="3232024"/>
+                      <a:ext cx="1518475" cy="1027937"/>
+                      <a:chOff x="5647373" y="1159766"/>
+                      <a:chExt cx="1518475" cy="1027937"/>
+                    </a:xfrm>
+                  </p:grpSpPr>
+                  <p:grpSp>
+                    <p:nvGrpSpPr>
+                      <p:cNvPr id="145" name="Group 144"/>
+                      <p:cNvGrpSpPr/>
+                      <p:nvPr/>
+                    </p:nvGrpSpPr>
+                    <p:grpSpPr>
+                      <a:xfrm>
+                        <a:off x="5647373" y="1159766"/>
+                        <a:ext cx="1518475" cy="457200"/>
+                        <a:chOff x="5647373" y="1159766"/>
+                        <a:chExt cx="1518475" cy="457200"/>
+                      </a:xfrm>
+                    </p:grpSpPr>
+                    <p:sp>
+                      <p:nvSpPr>
+                        <p:cNvPr id="152" name="Rectangle 151"/>
+                        <p:cNvSpPr/>
+                        <p:nvPr/>
+                      </p:nvSpPr>
+                      <p:spPr>
+                        <a:xfrm>
+                          <a:off x="6251448" y="1159766"/>
+                          <a:ext cx="914400" cy="457200"/>
+                        </a:xfrm>
+                        <a:prstGeom prst="rect">
+                          <a:avLst/>
+                        </a:prstGeom>
+                        <a:noFill/>
+                        <a:ln w="38100">
+                          <a:solidFill>
+                            <a:schemeClr val="tx1"/>
+                          </a:solidFill>
+                        </a:ln>
+                      </p:spPr>
+                      <p:style>
+                        <a:lnRef idx="2">
+                          <a:schemeClr val="accent1">
+                            <a:shade val="50000"/>
+                          </a:schemeClr>
+                        </a:lnRef>
+                        <a:fillRef idx="1">
+                          <a:schemeClr val="accent1"/>
+                        </a:fillRef>
+                        <a:effectRef idx="0">
+                          <a:schemeClr val="accent1"/>
+                        </a:effectRef>
+                        <a:fontRef idx="minor">
+                          <a:schemeClr val="lt1"/>
+                        </a:fontRef>
+                      </p:style>
+                      <p:txBody>
+                        <a:bodyPr rtlCol="0" anchor="ctr"/>
+                        <a:lstStyle/>
+                        <a:p>
+                          <a:pPr algn="ctr"/>
+                          <a:r>
+                            <a:rPr lang="en-US" sz="1400" dirty="0">
+                              <a:solidFill>
+                                <a:schemeClr val="tx1"/>
+                              </a:solidFill>
+                            </a:rPr>
+                            <a:t>1300 </a:t>
+                          </a:r>
+                          <a:r>
+                            <a:rPr lang="en-US" sz="1400" dirty="0" err="1">
+                              <a:solidFill>
+                                <a:schemeClr val="tx1"/>
+                              </a:solidFill>
+                            </a:rPr>
+                            <a:t>iP</a:t>
+                          </a:r>
+                          <a:endParaRPr lang="en-US" sz="1400" dirty="0">
+                            <a:solidFill>
+                              <a:schemeClr val="tx1"/>
+                            </a:solidFill>
+                          </a:endParaRPr>
+                        </a:p>
+                      </p:txBody>
+                    </p:sp>
+                    <p:sp>
+                      <p:nvSpPr>
+                        <p:cNvPr id="153" name="Flowchart: Summing Junction 152"/>
+                        <p:cNvSpPr/>
+                        <p:nvPr/>
+                      </p:nvSpPr>
+                      <p:spPr>
+                        <a:xfrm>
+                          <a:off x="5879021" y="1274829"/>
+                          <a:ext cx="228600" cy="228600"/>
+                        </a:xfrm>
+                        <a:prstGeom prst="flowChartSummingJunction">
+                          <a:avLst/>
+                        </a:prstGeom>
+                        <a:noFill/>
+                        <a:ln w="38100">
+                          <a:solidFill>
+                            <a:srgbClr val="00B050"/>
+                          </a:solidFill>
+                        </a:ln>
+                      </p:spPr>
+                      <p:style>
+                        <a:lnRef idx="2">
+                          <a:schemeClr val="accent1">
+                            <a:shade val="50000"/>
+                          </a:schemeClr>
+                        </a:lnRef>
+                        <a:fillRef idx="1">
+                          <a:schemeClr val="accent1"/>
+                        </a:fillRef>
+                        <a:effectRef idx="0">
+                          <a:schemeClr val="accent1"/>
+                        </a:effectRef>
+                        <a:fontRef idx="minor">
+                          <a:schemeClr val="lt1"/>
+                        </a:fontRef>
+                      </p:style>
+                      <p:txBody>
+                        <a:bodyPr rtlCol="0" anchor="ctr"/>
+                        <a:lstStyle/>
+                        <a:p>
+                          <a:pPr algn="ctr"/>
+                          <a:endParaRPr lang="en-US"/>
+                        </a:p>
+                      </p:txBody>
+                    </p:sp>
+                    <p:cxnSp>
+                      <p:nvCxnSpPr>
+                        <p:cNvPr id="154" name="Straight Connector 153"/>
+                        <p:cNvCxnSpPr>
+                          <a:endCxn id="153" idx="2"/>
+                        </p:cNvCxnSpPr>
+                        <p:nvPr/>
+                      </p:nvCxnSpPr>
+                      <p:spPr>
+                        <a:xfrm flipV="1">
+                          <a:off x="5647373" y="1389129"/>
+                          <a:ext cx="231648" cy="0"/>
+                        </a:xfrm>
+                        <a:prstGeom prst="line">
+                          <a:avLst/>
+                        </a:prstGeom>
+                        <a:ln w="38100">
+                          <a:solidFill>
+                            <a:schemeClr val="tx1"/>
+                          </a:solidFill>
+                        </a:ln>
+                      </p:spPr>
+                      <p:style>
+                        <a:lnRef idx="1">
+                          <a:schemeClr val="accent1"/>
+                        </a:lnRef>
+                        <a:fillRef idx="0">
+                          <a:schemeClr val="accent1"/>
+                        </a:fillRef>
+                        <a:effectRef idx="0">
+                          <a:schemeClr val="accent1"/>
+                        </a:effectRef>
+                        <a:fontRef idx="minor">
+                          <a:schemeClr val="tx1"/>
+                        </a:fontRef>
+                      </p:style>
+                    </p:cxnSp>
+                    <p:cxnSp>
+                      <p:nvCxnSpPr>
+                        <p:cNvPr id="155" name="Straight Connector 154"/>
+                        <p:cNvCxnSpPr>
+                          <a:stCxn id="153" idx="6"/>
+                          <a:endCxn id="152" idx="1"/>
+                        </p:cNvCxnSpPr>
+                        <p:nvPr/>
+                      </p:nvCxnSpPr>
+                      <p:spPr>
+                        <a:xfrm flipV="1">
+                          <a:off x="6107621" y="1388366"/>
+                          <a:ext cx="143827" cy="763"/>
+                        </a:xfrm>
+                        <a:prstGeom prst="line">
+                          <a:avLst/>
+                        </a:prstGeom>
+                        <a:ln w="38100">
+                          <a:solidFill>
+                            <a:schemeClr val="tx1"/>
+                          </a:solidFill>
+                        </a:ln>
+                      </p:spPr>
+                      <p:style>
+                        <a:lnRef idx="1">
+                          <a:schemeClr val="accent1"/>
+                        </a:lnRef>
+                        <a:fillRef idx="0">
+                          <a:schemeClr val="accent1"/>
+                        </a:fillRef>
+                        <a:effectRef idx="0">
+                          <a:schemeClr val="accent1"/>
+                        </a:effectRef>
+                        <a:fontRef idx="minor">
+                          <a:schemeClr val="tx1"/>
+                        </a:fontRef>
+                      </p:style>
+                    </p:cxnSp>
+                  </p:grpSp>
+                  <p:grpSp>
+                    <p:nvGrpSpPr>
+                      <p:cNvPr id="146" name="Group 145"/>
+                      <p:cNvGrpSpPr/>
+                      <p:nvPr/>
+                    </p:nvGrpSpPr>
+                    <p:grpSpPr>
+                      <a:xfrm>
+                        <a:off x="5647373" y="1730503"/>
+                        <a:ext cx="1518475" cy="457200"/>
+                        <a:chOff x="5647373" y="1159766"/>
+                        <a:chExt cx="1518475" cy="457200"/>
+                      </a:xfrm>
+                    </p:grpSpPr>
+                    <p:sp>
+                      <p:nvSpPr>
+                        <p:cNvPr id="148" name="Rectangle 147"/>
+                        <p:cNvSpPr/>
+                        <p:nvPr/>
+                      </p:nvSpPr>
+                      <p:spPr>
+                        <a:xfrm>
+                          <a:off x="6251448" y="1159766"/>
+                          <a:ext cx="914400" cy="457200"/>
+                        </a:xfrm>
+                        <a:prstGeom prst="rect">
+                          <a:avLst/>
+                        </a:prstGeom>
+                        <a:noFill/>
+                        <a:ln w="38100">
+                          <a:solidFill>
+                            <a:schemeClr val="tx1"/>
+                          </a:solidFill>
+                        </a:ln>
+                      </p:spPr>
+                      <p:style>
+                        <a:lnRef idx="2">
+                          <a:schemeClr val="accent1">
+                            <a:shade val="50000"/>
+                          </a:schemeClr>
+                        </a:lnRef>
+                        <a:fillRef idx="1">
+                          <a:schemeClr val="accent1"/>
+                        </a:fillRef>
+                        <a:effectRef idx="0">
+                          <a:schemeClr val="accent1"/>
+                        </a:effectRef>
+                        <a:fontRef idx="minor">
+                          <a:schemeClr val="lt1"/>
+                        </a:fontRef>
+                      </p:style>
+                      <p:txBody>
+                        <a:bodyPr rtlCol="0" anchor="ctr"/>
+                        <a:lstStyle/>
+                        <a:p>
+                          <a:pPr algn="ctr"/>
+                          <a:r>
+                            <a:rPr lang="en-US" sz="1400" dirty="0">
+                              <a:solidFill>
+                                <a:schemeClr val="tx1"/>
+                              </a:solidFill>
+                            </a:rPr>
+                            <a:t>T400i</a:t>
+                          </a:r>
+                        </a:p>
+                      </p:txBody>
+                    </p:sp>
+                    <p:sp>
+                      <p:nvSpPr>
+                        <p:cNvPr id="149" name="Flowchart: Summing Junction 148"/>
+                        <p:cNvSpPr/>
+                        <p:nvPr/>
+                      </p:nvSpPr>
+                      <p:spPr>
+                        <a:xfrm>
+                          <a:off x="5879021" y="1274829"/>
+                          <a:ext cx="228600" cy="228600"/>
+                        </a:xfrm>
+                        <a:prstGeom prst="flowChartSummingJunction">
+                          <a:avLst/>
+                        </a:prstGeom>
+                        <a:noFill/>
+                        <a:ln w="38100">
+                          <a:solidFill>
+                            <a:srgbClr val="00B050"/>
+                          </a:solidFill>
+                        </a:ln>
+                      </p:spPr>
+                      <p:style>
+                        <a:lnRef idx="2">
+                          <a:schemeClr val="accent1">
+                            <a:shade val="50000"/>
+                          </a:schemeClr>
+                        </a:lnRef>
+                        <a:fillRef idx="1">
+                          <a:schemeClr val="accent1"/>
+                        </a:fillRef>
+                        <a:effectRef idx="0">
+                          <a:schemeClr val="accent1"/>
+                        </a:effectRef>
+                        <a:fontRef idx="minor">
+                          <a:schemeClr val="lt1"/>
+                        </a:fontRef>
+                      </p:style>
+                      <p:txBody>
+                        <a:bodyPr rtlCol="0" anchor="ctr"/>
+                        <a:lstStyle/>
+                        <a:p>
+                          <a:pPr algn="ctr"/>
+                          <a:endParaRPr lang="en-US"/>
+                        </a:p>
+                      </p:txBody>
+                    </p:sp>
+                    <p:cxnSp>
+                      <p:nvCxnSpPr>
+                        <p:cNvPr id="150" name="Straight Connector 149"/>
+                        <p:cNvCxnSpPr>
+                          <a:endCxn id="149" idx="2"/>
+                        </p:cNvCxnSpPr>
+                        <p:nvPr/>
+                      </p:nvCxnSpPr>
+                      <p:spPr>
+                        <a:xfrm flipV="1">
+                          <a:off x="5647373" y="1389129"/>
+                          <a:ext cx="231648" cy="0"/>
+                        </a:xfrm>
+                        <a:prstGeom prst="line">
+                          <a:avLst/>
+                        </a:prstGeom>
+                        <a:ln w="38100">
+                          <a:solidFill>
+                            <a:schemeClr val="tx1"/>
+                          </a:solidFill>
+                        </a:ln>
+                      </p:spPr>
+                      <p:style>
+                        <a:lnRef idx="1">
+                          <a:schemeClr val="accent1"/>
+                        </a:lnRef>
+                        <a:fillRef idx="0">
+                          <a:schemeClr val="accent1"/>
+                        </a:fillRef>
+                        <a:effectRef idx="0">
+                          <a:schemeClr val="accent1"/>
+                        </a:effectRef>
+                        <a:fontRef idx="minor">
+                          <a:schemeClr val="tx1"/>
+                        </a:fontRef>
+                      </p:style>
+                    </p:cxnSp>
+                    <p:cxnSp>
+                      <p:nvCxnSpPr>
+                        <p:cNvPr id="151" name="Straight Connector 150"/>
+                        <p:cNvCxnSpPr>
+                          <a:stCxn id="149" idx="6"/>
+                          <a:endCxn id="148" idx="1"/>
+                        </p:cNvCxnSpPr>
+                        <p:nvPr/>
+                      </p:nvCxnSpPr>
+                      <p:spPr>
+                        <a:xfrm flipV="1">
+                          <a:off x="6107621" y="1388366"/>
+                          <a:ext cx="143827" cy="763"/>
+                        </a:xfrm>
+                        <a:prstGeom prst="line">
+                          <a:avLst/>
+                        </a:prstGeom>
+                        <a:ln w="38100">
+                          <a:solidFill>
+                            <a:schemeClr val="tx1"/>
+                          </a:solidFill>
+                        </a:ln>
+                      </p:spPr>
+                      <p:style>
+                        <a:lnRef idx="1">
+                          <a:schemeClr val="accent1"/>
+                        </a:lnRef>
+                        <a:fillRef idx="0">
+                          <a:schemeClr val="accent1"/>
+                        </a:fillRef>
+                        <a:effectRef idx="0">
+                          <a:schemeClr val="accent1"/>
+                        </a:effectRef>
+                        <a:fontRef idx="minor">
+                          <a:schemeClr val="tx1"/>
+                        </a:fontRef>
+                      </p:style>
+                    </p:cxnSp>
+                  </p:grpSp>
+                  <p:cxnSp>
+                    <p:nvCxnSpPr>
+                      <p:cNvPr id="147" name="Straight Connector 146"/>
+                      <p:cNvCxnSpPr/>
+                      <p:nvPr/>
+                    </p:nvCxnSpPr>
+                    <p:spPr>
+                      <a:xfrm>
+                        <a:off x="5665661" y="1394462"/>
+                        <a:ext cx="0" cy="560833"/>
+                      </a:xfrm>
+                      <a:prstGeom prst="line">
+                        <a:avLst/>
+                      </a:prstGeom>
+                      <a:ln w="38100">
+                        <a:solidFill>
+                          <a:schemeClr val="tx1"/>
+                        </a:solidFill>
+                      </a:ln>
+                    </p:spPr>
+                    <p:style>
+                      <a:lnRef idx="1">
+                        <a:schemeClr val="accent1"/>
+                      </a:lnRef>
+                      <a:fillRef idx="0">
+                        <a:schemeClr val="accent1"/>
+                      </a:fillRef>
+                      <a:effectRef idx="0">
+                        <a:schemeClr val="accent1"/>
+                      </a:effectRef>
+                      <a:fontRef idx="minor">
+                        <a:schemeClr val="tx1"/>
+                      </a:fontRef>
+                    </p:style>
+                  </p:cxnSp>
+                </p:grpSp>
+                <p:sp>
+                  <p:nvSpPr>
+                    <p:cNvPr id="143" name="TextBox 142"/>
+                    <p:cNvSpPr txBox="1"/>
+                    <p:nvPr/>
+                  </p:nvSpPr>
+                  <p:spPr>
+                    <a:xfrm>
+                      <a:off x="6784175" y="3306735"/>
+                      <a:ext cx="272832" cy="307777"/>
+                    </a:xfrm>
+                    <a:prstGeom prst="rect">
+                      <a:avLst/>
+                    </a:prstGeom>
+                    <a:noFill/>
+                  </p:spPr>
+                  <p:txBody>
+                    <a:bodyPr wrap="none" rtlCol="0">
+                      <a:spAutoFit/>
+                    </a:bodyPr>
+                    <a:lstStyle/>
+                    <a:p>
+                      <a:r>
+                        <a:rPr lang="en-US" sz="1400" dirty="0"/>
+                        <a:t>T</a:t>
+                      </a:r>
+                    </a:p>
+                  </p:txBody>
+                </p:sp>
+                <p:sp>
+                  <p:nvSpPr>
+                    <p:cNvPr id="144" name="TextBox 143"/>
+                    <p:cNvSpPr txBox="1"/>
+                    <p:nvPr/>
+                  </p:nvSpPr>
+                  <p:spPr>
+                    <a:xfrm>
+                      <a:off x="6700979" y="3862614"/>
+                      <a:ext cx="550509" cy="307777"/>
+                    </a:xfrm>
+                    <a:prstGeom prst="rect">
+                      <a:avLst/>
+                    </a:prstGeom>
+                    <a:noFill/>
+                  </p:spPr>
+                  <p:txBody>
+                    <a:bodyPr wrap="square" rtlCol="0">
+                      <a:spAutoFit/>
+                    </a:bodyPr>
+                    <a:lstStyle/>
+                    <a:p>
+                      <a:r>
+                        <a:rPr lang="en-US" sz="1400" dirty="0"/>
+                        <a:t>DP</a:t>
+                      </a:r>
+                      <a:r>
+                        <a:rPr lang="en-US" sz="1400" baseline="-25000" dirty="0"/>
+                        <a:t>2</a:t>
+                      </a:r>
+                    </a:p>
+                  </p:txBody>
+                </p:sp>
+              </p:grpSp>
+              <p:cxnSp>
+                <p:nvCxnSpPr>
+                  <p:cNvPr id="161" name="Straight Connector 160"/>
+                  <p:cNvCxnSpPr/>
+                  <p:nvPr/>
+                </p:nvCxnSpPr>
+                <p:spPr>
+                  <a:xfrm>
+                    <a:off x="4476935" y="4514018"/>
+                    <a:ext cx="843153" cy="0"/>
+                  </a:xfrm>
+                  <a:prstGeom prst="line">
+                    <a:avLst/>
+                  </a:prstGeom>
+                  <a:ln w="38100">
+                    <a:solidFill>
+                      <a:schemeClr val="tx1"/>
+                    </a:solidFill>
+                  </a:ln>
+                </p:spPr>
+                <p:style>
+                  <a:lnRef idx="1">
+                    <a:schemeClr val="accent1"/>
+                  </a:lnRef>
+                  <a:fillRef idx="0">
+                    <a:schemeClr val="accent1"/>
+                  </a:fillRef>
+                  <a:effectRef idx="0">
+                    <a:schemeClr val="accent1"/>
+                  </a:effectRef>
+                  <a:fontRef idx="minor">
+                    <a:schemeClr val="tx1"/>
+                  </a:fontRef>
+                </p:style>
+              </p:cxnSp>
+              <p:sp>
+                <p:nvSpPr>
+                  <p:cNvPr id="160" name="Flowchart: Collate 159"/>
+                  <p:cNvSpPr/>
+                  <p:nvPr/>
+                </p:nvSpPr>
+                <p:spPr>
+                  <a:xfrm>
+                    <a:off x="4832228" y="4285418"/>
+                    <a:ext cx="228600" cy="457200"/>
+                  </a:xfrm>
+                  <a:prstGeom prst="flowChartCollate">
+                    <a:avLst/>
+                  </a:prstGeom>
+                  <a:noFill/>
+                  <a:ln w="38100">
+                    <a:solidFill>
+                      <a:srgbClr val="FF0000"/>
+                    </a:solidFill>
+                  </a:ln>
+                </p:spPr>
+                <p:style>
+                  <a:lnRef idx="2">
+                    <a:schemeClr val="accent1">
+                      <a:shade val="50000"/>
+                    </a:schemeClr>
+                  </a:lnRef>
+                  <a:fillRef idx="1">
+                    <a:schemeClr val="accent1"/>
+                  </a:fillRef>
+                  <a:effectRef idx="0">
+                    <a:schemeClr val="accent1"/>
+                  </a:effectRef>
+                  <a:fontRef idx="minor">
+                    <a:schemeClr val="lt1"/>
+                  </a:fontRef>
+                </p:style>
+                <p:txBody>
+                  <a:bodyPr rtlCol="0" anchor="ctr"/>
+                  <a:lstStyle/>
+                  <a:p>
+                    <a:pPr algn="ctr"/>
+                    <a:endParaRPr lang="en-US">
+                      <a:solidFill>
+                        <a:schemeClr val="tx1"/>
+                      </a:solidFill>
+                    </a:endParaRPr>
+                  </a:p>
+                </p:txBody>
+              </p:sp>
+            </p:grpSp>
+            <p:cxnSp>
+              <p:nvCxnSpPr>
+                <p:cNvPr id="178" name="Straight Connector 177"/>
+                <p:cNvCxnSpPr/>
+                <p:nvPr/>
+              </p:nvCxnSpPr>
+              <p:spPr>
+                <a:xfrm>
+                  <a:off x="4665250" y="2953476"/>
+                  <a:ext cx="0" cy="1371600"/>
+                </a:xfrm>
+                <a:prstGeom prst="line">
+                  <a:avLst/>
+                </a:prstGeom>
+                <a:ln w="38100">
+                  <a:solidFill>
+                    <a:schemeClr val="tx1"/>
+                  </a:solidFill>
+                </a:ln>
+              </p:spPr>
+              <p:style>
+                <a:lnRef idx="1">
+                  <a:schemeClr val="accent1"/>
+                </a:lnRef>
+                <a:fillRef idx="0">
+                  <a:schemeClr val="accent1"/>
+                </a:fillRef>
+                <a:effectRef idx="0">
+                  <a:schemeClr val="accent1"/>
+                </a:effectRef>
+                <a:fontRef idx="minor">
+                  <a:schemeClr val="tx1"/>
+                </a:fontRef>
+              </p:style>
+            </p:cxnSp>
+          </p:grpSp>
+        </p:grpSp>
+        <p:grpSp>
+          <p:nvGrpSpPr>
+            <p:cNvPr id="184" name="Group 183"/>
+            <p:cNvGrpSpPr/>
+            <p:nvPr/>
+          </p:nvGrpSpPr>
+          <p:grpSpPr>
+            <a:xfrm>
+              <a:off x="4683081" y="2536718"/>
+              <a:ext cx="228600" cy="502921"/>
+              <a:chOff x="4030981" y="453082"/>
+              <a:chExt cx="228600" cy="502921"/>
+            </a:xfrm>
+          </p:grpSpPr>
+          <p:cxnSp>
+            <p:nvCxnSpPr>
+              <p:cNvPr id="185" name="Straight Connector 184"/>
+              <p:cNvCxnSpPr/>
+              <p:nvPr/>
+            </p:nvCxnSpPr>
+            <p:spPr>
+              <a:xfrm>
+                <a:off x="4145281" y="681683"/>
+                <a:ext cx="0" cy="274320"/>
+              </a:xfrm>
+              <a:prstGeom prst="line">
+                <a:avLst/>
+              </a:prstGeom>
+              <a:ln w="38100">
+                <a:solidFill>
+                  <a:schemeClr val="tx1"/>
+                </a:solidFill>
+              </a:ln>
+            </p:spPr>
+            <p:style>
+              <a:lnRef idx="1">
+                <a:schemeClr val="accent1"/>
+              </a:lnRef>
+              <a:fillRef idx="0">
+                <a:schemeClr val="accent1"/>
+              </a:fillRef>
+              <a:effectRef idx="0">
+                <a:schemeClr val="accent1"/>
+              </a:effectRef>
+              <a:fontRef idx="minor">
+                <a:schemeClr val="tx1"/>
+              </a:fontRef>
+            </p:style>
+          </p:cxnSp>
+          <p:sp>
+            <p:nvSpPr>
+              <p:cNvPr id="186" name="Rectangle 185"/>
+              <p:cNvSpPr/>
+              <p:nvPr/>
+            </p:nvSpPr>
+            <p:spPr>
+              <a:xfrm>
+                <a:off x="4030981" y="453082"/>
+                <a:ext cx="228600" cy="228600"/>
+              </a:xfrm>
+              <a:prstGeom prst="rect">
+                <a:avLst/>
+              </a:prstGeom>
+              <a:noFill/>
+              <a:ln w="38100">
+                <a:solidFill>
+                  <a:srgbClr val="0070C0"/>
+                </a:solidFill>
+              </a:ln>
+            </p:spPr>
+            <p:style>
+              <a:lnRef idx="2">
+                <a:schemeClr val="accent1">
+                  <a:shade val="50000"/>
+                </a:schemeClr>
+              </a:lnRef>
+              <a:fillRef idx="1">
+                <a:schemeClr val="accent1"/>
+              </a:fillRef>
+              <a:effectRef idx="0">
+                <a:schemeClr val="accent1"/>
+              </a:effectRef>
+              <a:fontRef idx="minor">
+                <a:schemeClr val="lt1"/>
+              </a:fontRef>
+            </p:style>
+            <p:txBody>
+              <a:bodyPr rtlCol="0" anchor="ctr"/>
+              <a:lstStyle/>
+              <a:p>
+                <a:pPr algn="ctr"/>
+                <a:r>
+                  <a:rPr lang="en-US" sz="1400" dirty="0">
+                    <a:solidFill>
+                      <a:schemeClr val="tx1"/>
+                    </a:solidFill>
+                  </a:rPr>
+                  <a:t>P</a:t>
+                </a:r>
+              </a:p>
+            </p:txBody>
+          </p:sp>
+        </p:grpSp>
+        <p:grpSp>
+          <p:nvGrpSpPr>
+            <p:cNvPr id="187" name="Group 186"/>
+            <p:cNvGrpSpPr/>
+            <p:nvPr/>
+          </p:nvGrpSpPr>
+          <p:grpSpPr>
+            <a:xfrm>
+              <a:off x="4668120" y="3926834"/>
+              <a:ext cx="228600" cy="502921"/>
+              <a:chOff x="4030981" y="453082"/>
+              <a:chExt cx="228600" cy="502921"/>
+            </a:xfrm>
+          </p:grpSpPr>
+          <p:cxnSp>
+            <p:nvCxnSpPr>
+              <p:cNvPr id="188" name="Straight Connector 187"/>
+              <p:cNvCxnSpPr/>
+              <p:nvPr/>
+            </p:nvCxnSpPr>
+            <p:spPr>
+              <a:xfrm>
+                <a:off x="4145281" y="681683"/>
+                <a:ext cx="0" cy="274320"/>
+              </a:xfrm>
+              <a:prstGeom prst="line">
+                <a:avLst/>
+              </a:prstGeom>
+              <a:ln w="38100">
+                <a:solidFill>
+                  <a:schemeClr val="tx1"/>
+                </a:solidFill>
+              </a:ln>
+            </p:spPr>
+            <p:style>
+              <a:lnRef idx="1">
+                <a:schemeClr val="accent1"/>
+              </a:lnRef>
+              <a:fillRef idx="0">
+                <a:schemeClr val="accent1"/>
+              </a:fillRef>
+              <a:effectRef idx="0">
+                <a:schemeClr val="accent1"/>
+              </a:effectRef>
+              <a:fontRef idx="minor">
+                <a:schemeClr val="tx1"/>
+              </a:fontRef>
+            </p:style>
+          </p:cxnSp>
+          <p:sp>
+            <p:nvSpPr>
+              <p:cNvPr id="189" name="Rectangle 188"/>
+              <p:cNvSpPr/>
+              <p:nvPr/>
+            </p:nvSpPr>
+            <p:spPr>
+              <a:xfrm>
+                <a:off x="4030981" y="453082"/>
+                <a:ext cx="228600" cy="228600"/>
+              </a:xfrm>
+              <a:prstGeom prst="rect">
+                <a:avLst/>
+              </a:prstGeom>
+              <a:noFill/>
+              <a:ln w="38100">
+                <a:solidFill>
+                  <a:srgbClr val="0070C0"/>
+                </a:solidFill>
+              </a:ln>
+            </p:spPr>
+            <p:style>
+              <a:lnRef idx="2">
+                <a:schemeClr val="accent1">
+                  <a:shade val="50000"/>
+                </a:schemeClr>
+              </a:lnRef>
+              <a:fillRef idx="1">
+                <a:schemeClr val="accent1"/>
+              </a:fillRef>
+              <a:effectRef idx="0">
+                <a:schemeClr val="accent1"/>
+              </a:effectRef>
+              <a:fontRef idx="minor">
+                <a:schemeClr val="lt1"/>
+              </a:fontRef>
+            </p:style>
+            <p:txBody>
+              <a:bodyPr rtlCol="0" anchor="ctr"/>
+              <a:lstStyle/>
+              <a:p>
+                <a:pPr algn="ctr"/>
+                <a:r>
+                  <a:rPr lang="en-US" sz="1400" dirty="0">
+                    <a:solidFill>
+                      <a:schemeClr val="tx1"/>
+                    </a:solidFill>
+                  </a:rPr>
+                  <a:t>P</a:t>
+                </a:r>
+              </a:p>
+            </p:txBody>
+          </p:sp>
+        </p:grpSp>
+        <p:grpSp>
+          <p:nvGrpSpPr>
+            <p:cNvPr id="190" name="Group 189"/>
+            <p:cNvGrpSpPr/>
+            <p:nvPr/>
+          </p:nvGrpSpPr>
+          <p:grpSpPr>
+            <a:xfrm>
+              <a:off x="3858111" y="5307699"/>
+              <a:ext cx="228600" cy="502921"/>
+              <a:chOff x="4030981" y="453082"/>
+              <a:chExt cx="228600" cy="502921"/>
+            </a:xfrm>
+          </p:grpSpPr>
+          <p:cxnSp>
+            <p:nvCxnSpPr>
+              <p:cNvPr id="191" name="Straight Connector 190"/>
+              <p:cNvCxnSpPr/>
+              <p:nvPr/>
+            </p:nvCxnSpPr>
+            <p:spPr>
+              <a:xfrm>
+                <a:off x="4145281" y="681683"/>
+                <a:ext cx="0" cy="274320"/>
+              </a:xfrm>
+              <a:prstGeom prst="line">
+                <a:avLst/>
+              </a:prstGeom>
+              <a:ln w="38100">
+                <a:solidFill>
+                  <a:schemeClr val="tx1"/>
+                </a:solidFill>
+              </a:ln>
+            </p:spPr>
+            <p:style>
+              <a:lnRef idx="1">
+                <a:schemeClr val="accent1"/>
+              </a:lnRef>
+              <a:fillRef idx="0">
+                <a:schemeClr val="accent1"/>
+              </a:fillRef>
+              <a:effectRef idx="0">
+                <a:schemeClr val="accent1"/>
+              </a:effectRef>
+              <a:fontRef idx="minor">
+                <a:schemeClr val="tx1"/>
+              </a:fontRef>
+            </p:style>
+          </p:cxnSp>
+          <p:sp>
+            <p:nvSpPr>
+              <p:cNvPr id="192" name="Rectangle 191"/>
+              <p:cNvSpPr/>
+              <p:nvPr/>
+            </p:nvSpPr>
+            <p:spPr>
+              <a:xfrm>
+                <a:off x="4030981" y="453082"/>
+                <a:ext cx="228600" cy="228600"/>
+              </a:xfrm>
+              <a:prstGeom prst="rect">
+                <a:avLst/>
+              </a:prstGeom>
+              <a:noFill/>
+              <a:ln w="38100">
+                <a:solidFill>
+                  <a:srgbClr val="0070C0"/>
+                </a:solidFill>
+              </a:ln>
+            </p:spPr>
+            <p:style>
+              <a:lnRef idx="2">
+                <a:schemeClr val="accent1">
+                  <a:shade val="50000"/>
+                </a:schemeClr>
+              </a:lnRef>
+              <a:fillRef idx="1">
+                <a:schemeClr val="accent1"/>
+              </a:fillRef>
+              <a:effectRef idx="0">
+                <a:schemeClr val="accent1"/>
+              </a:effectRef>
+              <a:fontRef idx="minor">
+                <a:schemeClr val="lt1"/>
+              </a:fontRef>
+            </p:style>
+            <p:txBody>
+              <a:bodyPr rtlCol="0" anchor="ctr"/>
+              <a:lstStyle/>
+              <a:p>
+                <a:pPr algn="ctr"/>
+                <a:r>
+                  <a:rPr lang="en-US" sz="1400" dirty="0">
+                    <a:solidFill>
+                      <a:schemeClr val="tx1"/>
+                    </a:solidFill>
+                  </a:rPr>
+                  <a:t>P</a:t>
+                </a:r>
+              </a:p>
+            </p:txBody>
+          </p:sp>
+        </p:grpSp>
+      </p:grpSp>
+    </p:spTree>
+    <p:extLst>
+      <p:ext uri="{BB962C8B-B14F-4D97-AF65-F5344CB8AC3E}">
+        <p14:creationId xmlns:p14="http://schemas.microsoft.com/office/powerpoint/2010/main" val="1532562423"/>
+      </p:ext>
+    </p:extLst>
+  </p:cSld>
+  <p:clrMapOvr>
+    <a:masterClrMapping/>
+  </p:clrMapOvr>
+</p:sld>
+</file>
+
 <file path=ppt/theme/theme1.xml><?xml version="1.0" encoding="utf-8"?>
 <a:theme xmlns:a="http://schemas.openxmlformats.org/drawingml/2006/main" name="Office Theme">
   <a:themeElements>

</xml_diff>

<commit_message>
XUV optics: focusing conditions
</commit_message>
<xml_diff>
--- a/figures/chap2/chap 2 figures.pptx
+++ b/figures/chap2/chap 2 figures.pptx
@@ -9,6 +9,8 @@
     <p:sldId id="312" r:id="rId3"/>
     <p:sldId id="314" r:id="rId4"/>
     <p:sldId id="256" r:id="rId5"/>
+    <p:sldId id="271" r:id="rId6"/>
+    <p:sldId id="315" r:id="rId7"/>
   </p:sldIdLst>
   <p:sldSz cx="12192000" cy="6858000"/>
   <p:notesSz cx="7315200" cy="9601200"/>
@@ -262,7 +264,7 @@
           <a:p>
             <a:fld id="{AA564F96-03D1-4027-9EC9-68B19AA58132}" type="datetimeFigureOut">
               <a:rPr lang="en-US" smtClean="0"/>
-              <a:t>1/13/2020</a:t>
+              <a:t>1/17/2020</a:t>
             </a:fld>
             <a:endParaRPr lang="en-US"/>
           </a:p>
@@ -460,7 +462,7 @@
           <a:p>
             <a:fld id="{AA564F96-03D1-4027-9EC9-68B19AA58132}" type="datetimeFigureOut">
               <a:rPr lang="en-US" smtClean="0"/>
-              <a:t>1/13/2020</a:t>
+              <a:t>1/17/2020</a:t>
             </a:fld>
             <a:endParaRPr lang="en-US"/>
           </a:p>
@@ -668,7 +670,7 @@
           <a:p>
             <a:fld id="{AA564F96-03D1-4027-9EC9-68B19AA58132}" type="datetimeFigureOut">
               <a:rPr lang="en-US" smtClean="0"/>
-              <a:t>1/13/2020</a:t>
+              <a:t>1/17/2020</a:t>
             </a:fld>
             <a:endParaRPr lang="en-US"/>
           </a:p>
@@ -866,7 +868,7 @@
           <a:p>
             <a:fld id="{AA564F96-03D1-4027-9EC9-68B19AA58132}" type="datetimeFigureOut">
               <a:rPr lang="en-US" smtClean="0"/>
-              <a:t>1/13/2020</a:t>
+              <a:t>1/17/2020</a:t>
             </a:fld>
             <a:endParaRPr lang="en-US"/>
           </a:p>
@@ -1141,7 +1143,7 @@
           <a:p>
             <a:fld id="{AA564F96-03D1-4027-9EC9-68B19AA58132}" type="datetimeFigureOut">
               <a:rPr lang="en-US" smtClean="0"/>
-              <a:t>1/13/2020</a:t>
+              <a:t>1/17/2020</a:t>
             </a:fld>
             <a:endParaRPr lang="en-US"/>
           </a:p>
@@ -1406,7 +1408,7 @@
           <a:p>
             <a:fld id="{AA564F96-03D1-4027-9EC9-68B19AA58132}" type="datetimeFigureOut">
               <a:rPr lang="en-US" smtClean="0"/>
-              <a:t>1/13/2020</a:t>
+              <a:t>1/17/2020</a:t>
             </a:fld>
             <a:endParaRPr lang="en-US"/>
           </a:p>
@@ -1818,7 +1820,7 @@
           <a:p>
             <a:fld id="{AA564F96-03D1-4027-9EC9-68B19AA58132}" type="datetimeFigureOut">
               <a:rPr lang="en-US" smtClean="0"/>
-              <a:t>1/13/2020</a:t>
+              <a:t>1/17/2020</a:t>
             </a:fld>
             <a:endParaRPr lang="en-US"/>
           </a:p>
@@ -1959,7 +1961,7 @@
           <a:p>
             <a:fld id="{AA564F96-03D1-4027-9EC9-68B19AA58132}" type="datetimeFigureOut">
               <a:rPr lang="en-US" smtClean="0"/>
-              <a:t>1/13/2020</a:t>
+              <a:t>1/17/2020</a:t>
             </a:fld>
             <a:endParaRPr lang="en-US"/>
           </a:p>
@@ -2072,7 +2074,7 @@
           <a:p>
             <a:fld id="{AA564F96-03D1-4027-9EC9-68B19AA58132}" type="datetimeFigureOut">
               <a:rPr lang="en-US" smtClean="0"/>
-              <a:t>1/13/2020</a:t>
+              <a:t>1/17/2020</a:t>
             </a:fld>
             <a:endParaRPr lang="en-US"/>
           </a:p>
@@ -2383,7 +2385,7 @@
           <a:p>
             <a:fld id="{AA564F96-03D1-4027-9EC9-68B19AA58132}" type="datetimeFigureOut">
               <a:rPr lang="en-US" smtClean="0"/>
-              <a:t>1/13/2020</a:t>
+              <a:t>1/17/2020</a:t>
             </a:fld>
             <a:endParaRPr lang="en-US"/>
           </a:p>
@@ -2671,7 +2673,7 @@
           <a:p>
             <a:fld id="{AA564F96-03D1-4027-9EC9-68B19AA58132}" type="datetimeFigureOut">
               <a:rPr lang="en-US" smtClean="0"/>
-              <a:t>1/13/2020</a:t>
+              <a:t>1/17/2020</a:t>
             </a:fld>
             <a:endParaRPr lang="en-US"/>
           </a:p>
@@ -2912,7 +2914,7 @@
           <a:p>
             <a:fld id="{AA564F96-03D1-4027-9EC9-68B19AA58132}" type="datetimeFigureOut">
               <a:rPr lang="en-US" smtClean="0"/>
-              <a:t>1/13/2020</a:t>
+              <a:t>1/17/2020</a:t>
             </a:fld>
             <a:endParaRPr lang="en-US"/>
           </a:p>
@@ -11669,6 +11671,1865 @@
 </p:sld>
 </file>
 
+<file path=ppt/slides/slide5.xml><?xml version="1.0" encoding="utf-8"?>
+<p:sld xmlns:a="http://schemas.openxmlformats.org/drawingml/2006/main" xmlns:r="http://schemas.openxmlformats.org/officeDocument/2006/relationships" xmlns:p="http://schemas.openxmlformats.org/presentationml/2006/main">
+  <p:cSld>
+    <p:spTree>
+      <p:nvGrpSpPr>
+        <p:cNvPr id="1" name=""/>
+        <p:cNvGrpSpPr/>
+        <p:nvPr/>
+      </p:nvGrpSpPr>
+      <p:grpSpPr>
+        <a:xfrm>
+          <a:off x="0" y="0"/>
+          <a:ext cx="0" cy="0"/>
+          <a:chOff x="0" y="0"/>
+          <a:chExt cx="0" cy="0"/>
+        </a:xfrm>
+      </p:grpSpPr>
+      <p:sp>
+        <p:nvSpPr>
+          <p:cNvPr id="2" name="Title 1"/>
+          <p:cNvSpPr>
+            <a:spLocks noGrp="1"/>
+          </p:cNvSpPr>
+          <p:nvPr>
+            <p:ph type="title"/>
+          </p:nvPr>
+        </p:nvSpPr>
+        <p:spPr>
+          <a:xfrm>
+            <a:off x="0" y="-177095"/>
+            <a:ext cx="12192000" cy="1325563"/>
+          </a:xfrm>
+        </p:spPr>
+        <p:txBody>
+          <a:bodyPr/>
+          <a:lstStyle/>
+          <a:p>
+            <a:pPr algn="ctr"/>
+            <a:r>
+              <a:rPr lang="en-US" dirty="0"/>
+              <a:t>Single Toroid Mirror (TM) Configurations (M=2 or 3)</a:t>
+            </a:r>
+          </a:p>
+        </p:txBody>
+      </p:sp>
+      <p:grpSp>
+        <p:nvGrpSpPr>
+          <p:cNvPr id="9" name="Group 8"/>
+          <p:cNvGrpSpPr/>
+          <p:nvPr/>
+        </p:nvGrpSpPr>
+        <p:grpSpPr>
+          <a:xfrm>
+            <a:off x="6498167" y="1791022"/>
+            <a:ext cx="5187950" cy="1519825"/>
+            <a:chOff x="6737068" y="2268818"/>
+            <a:chExt cx="5187950" cy="1519825"/>
+          </a:xfrm>
+        </p:grpSpPr>
+        <p:pic>
+          <p:nvPicPr>
+            <p:cNvPr id="6" name="Picture 5"/>
+            <p:cNvPicPr>
+              <a:picLocks noChangeAspect="1"/>
+            </p:cNvPicPr>
+            <p:nvPr/>
+          </p:nvPicPr>
+          <p:blipFill>
+            <a:blip r:embed="rId2"/>
+            <a:stretch>
+              <a:fillRect/>
+            </a:stretch>
+          </p:blipFill>
+          <p:spPr>
+            <a:xfrm>
+              <a:off x="6737068" y="2268818"/>
+              <a:ext cx="5187950" cy="1490506"/>
+            </a:xfrm>
+            <a:prstGeom prst="rect">
+              <a:avLst/>
+            </a:prstGeom>
+          </p:spPr>
+        </p:pic>
+        <p:sp>
+          <p:nvSpPr>
+            <p:cNvPr id="20" name="TextBox 19"/>
+            <p:cNvSpPr txBox="1"/>
+            <p:nvPr/>
+          </p:nvSpPr>
+          <p:spPr>
+            <a:xfrm>
+              <a:off x="7019210" y="2876493"/>
+              <a:ext cx="817853" cy="369332"/>
+            </a:xfrm>
+            <a:prstGeom prst="rect">
+              <a:avLst/>
+            </a:prstGeom>
+            <a:noFill/>
+          </p:spPr>
+          <p:txBody>
+            <a:bodyPr wrap="none" rtlCol="0">
+              <a:spAutoFit/>
+            </a:bodyPr>
+            <a:lstStyle/>
+            <a:p>
+              <a:r>
+                <a:rPr lang="en-US" dirty="0">
+                  <a:solidFill>
+                    <a:schemeClr val="bg1"/>
+                  </a:solidFill>
+                </a:rPr>
+                <a:t>150cm</a:t>
+              </a:r>
+            </a:p>
+          </p:txBody>
+        </p:sp>
+        <p:sp>
+          <p:nvSpPr>
+            <p:cNvPr id="21" name="TextBox 20"/>
+            <p:cNvSpPr txBox="1"/>
+            <p:nvPr/>
+          </p:nvSpPr>
+          <p:spPr>
+            <a:xfrm rot="20195579">
+              <a:off x="9401722" y="2791240"/>
+              <a:ext cx="700833" cy="369332"/>
+            </a:xfrm>
+            <a:prstGeom prst="rect">
+              <a:avLst/>
+            </a:prstGeom>
+            <a:noFill/>
+          </p:spPr>
+          <p:txBody>
+            <a:bodyPr wrap="none" rtlCol="0">
+              <a:spAutoFit/>
+            </a:bodyPr>
+            <a:lstStyle/>
+            <a:p>
+              <a:r>
+                <a:rPr lang="en-US" dirty="0">
+                  <a:solidFill>
+                    <a:schemeClr val="bg1"/>
+                  </a:solidFill>
+                </a:rPr>
+                <a:t>75cm</a:t>
+              </a:r>
+            </a:p>
+          </p:txBody>
+        </p:sp>
+        <p:sp>
+          <p:nvSpPr>
+            <p:cNvPr id="22" name="TextBox 21"/>
+            <p:cNvSpPr txBox="1"/>
+            <p:nvPr/>
+          </p:nvSpPr>
+          <p:spPr>
+            <a:xfrm>
+              <a:off x="8421916" y="3419311"/>
+              <a:ext cx="494046" cy="369332"/>
+            </a:xfrm>
+            <a:prstGeom prst="rect">
+              <a:avLst/>
+            </a:prstGeom>
+            <a:noFill/>
+          </p:spPr>
+          <p:txBody>
+            <a:bodyPr wrap="none" rtlCol="0">
+              <a:spAutoFit/>
+            </a:bodyPr>
+            <a:lstStyle/>
+            <a:p>
+              <a:r>
+                <a:rPr lang="en-US" dirty="0">
+                  <a:solidFill>
+                    <a:schemeClr val="bg1"/>
+                  </a:solidFill>
+                </a:rPr>
+                <a:t>TM</a:t>
+              </a:r>
+            </a:p>
+          </p:txBody>
+        </p:sp>
+        <p:sp>
+          <p:nvSpPr>
+            <p:cNvPr id="23" name="TextBox 22"/>
+            <p:cNvSpPr txBox="1"/>
+            <p:nvPr/>
+          </p:nvSpPr>
+          <p:spPr>
+            <a:xfrm>
+              <a:off x="9200121" y="3329536"/>
+              <a:ext cx="487634" cy="369332"/>
+            </a:xfrm>
+            <a:prstGeom prst="rect">
+              <a:avLst/>
+            </a:prstGeom>
+            <a:noFill/>
+          </p:spPr>
+          <p:txBody>
+            <a:bodyPr wrap="none" rtlCol="0">
+              <a:spAutoFit/>
+            </a:bodyPr>
+            <a:lstStyle/>
+            <a:p>
+              <a:r>
+                <a:rPr lang="en-US" dirty="0">
+                  <a:solidFill>
+                    <a:schemeClr val="bg1"/>
+                  </a:solidFill>
+                </a:rPr>
+                <a:t>FM</a:t>
+              </a:r>
+            </a:p>
+          </p:txBody>
+        </p:sp>
+      </p:grpSp>
+      <mc:AlternateContent xmlns:mc="http://schemas.openxmlformats.org/markup-compatibility/2006" xmlns:a14="http://schemas.microsoft.com/office/drawing/2010/main">
+        <mc:Choice Requires="a14">
+          <p:sp>
+            <p:nvSpPr>
+              <p:cNvPr id="25" name="Content Placeholder 2"/>
+              <p:cNvSpPr>
+                <a:spLocks noGrp="1"/>
+              </p:cNvSpPr>
+              <p:nvPr>
+                <p:ph idx="1"/>
+              </p:nvPr>
+            </p:nvSpPr>
+            <p:spPr>
+              <a:xfrm>
+                <a:off x="0" y="968714"/>
+                <a:ext cx="5774724" cy="613635"/>
+              </a:xfrm>
+            </p:spPr>
+            <p:txBody>
+              <a:bodyPr/>
+              <a:lstStyle/>
+              <a:p>
+                <a:pPr lvl="1"/>
+                <a:r>
+                  <a:rPr lang="en-US" dirty="0"/>
+                  <a:t>TM1: </a:t>
+                </a:r>
+                <a14:m>
+                  <m:oMath xmlns:m="http://schemas.openxmlformats.org/officeDocument/2006/math">
+                    <m:r>
+                      <a:rPr lang="en-US" i="1" dirty="0" smtClean="0">
+                        <a:latin typeface="Cambria Math" panose="02040503050406030204" pitchFamily="18" charset="0"/>
+                      </a:rPr>
+                      <m:t>𝑟</m:t>
+                    </m:r>
+                    <m:r>
+                      <a:rPr lang="en-US" i="1" dirty="0" smtClean="0">
+                        <a:latin typeface="Cambria Math" panose="02040503050406030204" pitchFamily="18" charset="0"/>
+                      </a:rPr>
+                      <m:t>=150</m:t>
+                    </m:r>
+                    <m:r>
+                      <a:rPr lang="en-US" i="1" dirty="0" smtClean="0">
+                        <a:latin typeface="Cambria Math" panose="02040503050406030204" pitchFamily="18" charset="0"/>
+                      </a:rPr>
+                      <m:t>𝑐𝑚</m:t>
+                    </m:r>
+                  </m:oMath>
+                </a14:m>
+                <a:r>
+                  <a:rPr lang="en-US" dirty="0"/>
+                  <a:t>, </a:t>
+                </a:r>
+                <a14:m>
+                  <m:oMath xmlns:m="http://schemas.openxmlformats.org/officeDocument/2006/math">
+                    <m:r>
+                      <a:rPr lang="en-US" i="1" dirty="0" smtClean="0">
+                        <a:latin typeface="Cambria Math" panose="02040503050406030204" pitchFamily="18" charset="0"/>
+                      </a:rPr>
+                      <m:t>𝑟</m:t>
+                    </m:r>
+                    <m:r>
+                      <a:rPr lang="en-US" i="1" dirty="0" smtClean="0">
+                        <a:latin typeface="Cambria Math" panose="02040503050406030204" pitchFamily="18" charset="0"/>
+                      </a:rPr>
+                      <m:t>’=50</m:t>
+                    </m:r>
+                    <m:r>
+                      <a:rPr lang="en-US" i="1" dirty="0" smtClean="0">
+                        <a:latin typeface="Cambria Math" panose="02040503050406030204" pitchFamily="18" charset="0"/>
+                      </a:rPr>
+                      <m:t>𝑐𝑚</m:t>
+                    </m:r>
+                  </m:oMath>
+                </a14:m>
+                <a:endParaRPr lang="en-US" dirty="0"/>
+              </a:p>
+            </p:txBody>
+          </p:sp>
+        </mc:Choice>
+        <mc:Fallback xmlns="">
+          <p:sp>
+            <p:nvSpPr>
+              <p:cNvPr id="25" name="Content Placeholder 2"/>
+              <p:cNvSpPr>
+                <a:spLocks noGrp="1" noRot="1" noChangeAspect="1" noMove="1" noResize="1" noEditPoints="1" noAdjustHandles="1" noChangeArrowheads="1" noChangeShapeType="1" noTextEdit="1"/>
+              </p:cNvSpPr>
+              <p:nvPr>
+                <p:ph idx="1"/>
+              </p:nvPr>
+            </p:nvSpPr>
+            <p:spPr>
+              <a:xfrm>
+                <a:off x="0" y="968714"/>
+                <a:ext cx="5774724" cy="613635"/>
+              </a:xfrm>
+              <a:blipFill rotWithShape="0">
+                <a:blip r:embed="rId4"/>
+                <a:stretch>
+                  <a:fillRect t="-13861"/>
+                </a:stretch>
+              </a:blipFill>
+            </p:spPr>
+            <p:txBody>
+              <a:bodyPr/>
+              <a:lstStyle/>
+              <a:p>
+                <a:r>
+                  <a:rPr lang="en-US">
+                    <a:noFill/>
+                  </a:rPr>
+                  <a:t> </a:t>
+                </a:r>
+              </a:p>
+            </p:txBody>
+          </p:sp>
+        </mc:Fallback>
+      </mc:AlternateContent>
+      <p:cxnSp>
+        <p:nvCxnSpPr>
+          <p:cNvPr id="36" name="Straight Connector 35"/>
+          <p:cNvCxnSpPr/>
+          <p:nvPr/>
+        </p:nvCxnSpPr>
+        <p:spPr>
+          <a:xfrm>
+            <a:off x="5934126" y="1258277"/>
+            <a:ext cx="0" cy="5240214"/>
+          </a:xfrm>
+          <a:prstGeom prst="line">
+            <a:avLst/>
+          </a:prstGeom>
+          <a:ln w="38100">
+            <a:solidFill>
+              <a:srgbClr val="FF0000"/>
+            </a:solidFill>
+          </a:ln>
+        </p:spPr>
+        <p:style>
+          <a:lnRef idx="1">
+            <a:schemeClr val="accent1"/>
+          </a:lnRef>
+          <a:fillRef idx="0">
+            <a:schemeClr val="accent1"/>
+          </a:fillRef>
+          <a:effectRef idx="0">
+            <a:schemeClr val="accent1"/>
+          </a:effectRef>
+          <a:fontRef idx="minor">
+            <a:schemeClr val="tx1"/>
+          </a:fontRef>
+        </p:style>
+      </p:cxnSp>
+      <p:grpSp>
+        <p:nvGrpSpPr>
+          <p:cNvPr id="10" name="Group 9"/>
+          <p:cNvGrpSpPr/>
+          <p:nvPr/>
+        </p:nvGrpSpPr>
+        <p:grpSpPr>
+          <a:xfrm>
+            <a:off x="6493590" y="3387798"/>
+            <a:ext cx="5192527" cy="2901868"/>
+            <a:chOff x="6732491" y="3865594"/>
+            <a:chExt cx="5192527" cy="2901868"/>
+          </a:xfrm>
+        </p:grpSpPr>
+        <p:pic>
+          <p:nvPicPr>
+            <p:cNvPr id="5" name="Picture 4"/>
+            <p:cNvPicPr>
+              <a:picLocks noChangeAspect="1"/>
+            </p:cNvPicPr>
+            <p:nvPr/>
+          </p:nvPicPr>
+          <p:blipFill>
+            <a:blip r:embed="rId5"/>
+            <a:stretch>
+              <a:fillRect/>
+            </a:stretch>
+          </p:blipFill>
+          <p:spPr>
+            <a:xfrm>
+              <a:off x="6732491" y="3865594"/>
+              <a:ext cx="5192527" cy="2901868"/>
+            </a:xfrm>
+            <a:prstGeom prst="rect">
+              <a:avLst/>
+            </a:prstGeom>
+          </p:spPr>
+        </p:pic>
+        <p:sp>
+          <p:nvSpPr>
+            <p:cNvPr id="35" name="TextBox 34"/>
+            <p:cNvSpPr txBox="1"/>
+            <p:nvPr/>
+          </p:nvSpPr>
+          <p:spPr>
+            <a:xfrm>
+              <a:off x="9921683" y="3960127"/>
+              <a:ext cx="1698991" cy="369332"/>
+            </a:xfrm>
+            <a:prstGeom prst="rect">
+              <a:avLst/>
+            </a:prstGeom>
+            <a:noFill/>
+          </p:spPr>
+          <p:txBody>
+            <a:bodyPr wrap="none" rtlCol="0">
+              <a:spAutoFit/>
+            </a:bodyPr>
+            <a:lstStyle/>
+            <a:p>
+              <a:r>
+                <a:rPr lang="en-US" dirty="0">
+                  <a:solidFill>
+                    <a:schemeClr val="bg1"/>
+                  </a:solidFill>
+                </a:rPr>
+                <a:t>f-f configuration</a:t>
+              </a:r>
+            </a:p>
+          </p:txBody>
+        </p:sp>
+      </p:grpSp>
+      <mc:AlternateContent xmlns:mc="http://schemas.openxmlformats.org/markup-compatibility/2006" xmlns:a14="http://schemas.microsoft.com/office/drawing/2010/main">
+        <mc:Choice Requires="a14">
+          <p:sp>
+            <p:nvSpPr>
+              <p:cNvPr id="37" name="Content Placeholder 2"/>
+              <p:cNvSpPr txBox="1">
+                <a:spLocks/>
+              </p:cNvSpPr>
+              <p:nvPr/>
+            </p:nvSpPr>
+            <p:spPr>
+              <a:xfrm>
+                <a:off x="6732491" y="1194500"/>
+                <a:ext cx="5774724" cy="613635"/>
+              </a:xfrm>
+              <a:prstGeom prst="rect">
+                <a:avLst/>
+              </a:prstGeom>
+            </p:spPr>
+            <p:txBody>
+              <a:bodyPr vert="horz" lIns="91440" tIns="45720" rIns="91440" bIns="45720" rtlCol="0">
+                <a:normAutofit/>
+              </a:bodyPr>
+              <a:lstStyle>
+                <a:lvl1pPr marL="228600" indent="-228600" algn="l" defTabSz="914400" rtl="0" eaLnBrk="1" latinLnBrk="0" hangingPunct="1">
+                  <a:lnSpc>
+                    <a:spcPct val="90000"/>
+                  </a:lnSpc>
+                  <a:spcBef>
+                    <a:spcPts val="1000"/>
+                  </a:spcBef>
+                  <a:buFont typeface="Arial" panose="020B0604020202020204" pitchFamily="34" charset="0"/>
+                  <a:buChar char="•"/>
+                  <a:defRPr sz="2800" kern="1200">
+                    <a:solidFill>
+                      <a:schemeClr val="tx1"/>
+                    </a:solidFill>
+                    <a:latin typeface="+mn-lt"/>
+                    <a:ea typeface="+mn-ea"/>
+                    <a:cs typeface="+mn-cs"/>
+                  </a:defRPr>
+                </a:lvl1pPr>
+                <a:lvl2pPr marL="685800" indent="-228600" algn="l" defTabSz="914400" rtl="0" eaLnBrk="1" latinLnBrk="0" hangingPunct="1">
+                  <a:lnSpc>
+                    <a:spcPct val="90000"/>
+                  </a:lnSpc>
+                  <a:spcBef>
+                    <a:spcPts val="500"/>
+                  </a:spcBef>
+                  <a:buFont typeface="Arial" panose="020B0604020202020204" pitchFamily="34" charset="0"/>
+                  <a:buChar char="•"/>
+                  <a:defRPr sz="2400" kern="1200">
+                    <a:solidFill>
+                      <a:schemeClr val="tx1"/>
+                    </a:solidFill>
+                    <a:latin typeface="+mn-lt"/>
+                    <a:ea typeface="+mn-ea"/>
+                    <a:cs typeface="+mn-cs"/>
+                  </a:defRPr>
+                </a:lvl2pPr>
+                <a:lvl3pPr marL="1143000" indent="-228600" algn="l" defTabSz="914400" rtl="0" eaLnBrk="1" latinLnBrk="0" hangingPunct="1">
+                  <a:lnSpc>
+                    <a:spcPct val="90000"/>
+                  </a:lnSpc>
+                  <a:spcBef>
+                    <a:spcPts val="500"/>
+                  </a:spcBef>
+                  <a:buFont typeface="Arial" panose="020B0604020202020204" pitchFamily="34" charset="0"/>
+                  <a:buChar char="•"/>
+                  <a:defRPr sz="2000" kern="1200">
+                    <a:solidFill>
+                      <a:schemeClr val="tx1"/>
+                    </a:solidFill>
+                    <a:latin typeface="+mn-lt"/>
+                    <a:ea typeface="+mn-ea"/>
+                    <a:cs typeface="+mn-cs"/>
+                  </a:defRPr>
+                </a:lvl3pPr>
+                <a:lvl4pPr marL="1600200" indent="-228600" algn="l" defTabSz="914400" rtl="0" eaLnBrk="1" latinLnBrk="0" hangingPunct="1">
+                  <a:lnSpc>
+                    <a:spcPct val="90000"/>
+                  </a:lnSpc>
+                  <a:spcBef>
+                    <a:spcPts val="500"/>
+                  </a:spcBef>
+                  <a:buFont typeface="Arial" panose="020B0604020202020204" pitchFamily="34" charset="0"/>
+                  <a:buChar char="•"/>
+                  <a:defRPr sz="1800" kern="1200">
+                    <a:solidFill>
+                      <a:schemeClr val="tx1"/>
+                    </a:solidFill>
+                    <a:latin typeface="+mn-lt"/>
+                    <a:ea typeface="+mn-ea"/>
+                    <a:cs typeface="+mn-cs"/>
+                  </a:defRPr>
+                </a:lvl4pPr>
+                <a:lvl5pPr marL="2057400" indent="-228600" algn="l" defTabSz="914400" rtl="0" eaLnBrk="1" latinLnBrk="0" hangingPunct="1">
+                  <a:lnSpc>
+                    <a:spcPct val="90000"/>
+                  </a:lnSpc>
+                  <a:spcBef>
+                    <a:spcPts val="500"/>
+                  </a:spcBef>
+                  <a:buFont typeface="Arial" panose="020B0604020202020204" pitchFamily="34" charset="0"/>
+                  <a:buChar char="•"/>
+                  <a:defRPr sz="1800" kern="1200">
+                    <a:solidFill>
+                      <a:schemeClr val="tx1"/>
+                    </a:solidFill>
+                    <a:latin typeface="+mn-lt"/>
+                    <a:ea typeface="+mn-ea"/>
+                    <a:cs typeface="+mn-cs"/>
+                  </a:defRPr>
+                </a:lvl5pPr>
+                <a:lvl6pPr marL="2514600" indent="-228600" algn="l" defTabSz="914400" rtl="0" eaLnBrk="1" latinLnBrk="0" hangingPunct="1">
+                  <a:lnSpc>
+                    <a:spcPct val="90000"/>
+                  </a:lnSpc>
+                  <a:spcBef>
+                    <a:spcPts val="500"/>
+                  </a:spcBef>
+                  <a:buFont typeface="Arial" panose="020B0604020202020204" pitchFamily="34" charset="0"/>
+                  <a:buChar char="•"/>
+                  <a:defRPr sz="1800" kern="1200">
+                    <a:solidFill>
+                      <a:schemeClr val="tx1"/>
+                    </a:solidFill>
+                    <a:latin typeface="+mn-lt"/>
+                    <a:ea typeface="+mn-ea"/>
+                    <a:cs typeface="+mn-cs"/>
+                  </a:defRPr>
+                </a:lvl6pPr>
+                <a:lvl7pPr marL="2971800" indent="-228600" algn="l" defTabSz="914400" rtl="0" eaLnBrk="1" latinLnBrk="0" hangingPunct="1">
+                  <a:lnSpc>
+                    <a:spcPct val="90000"/>
+                  </a:lnSpc>
+                  <a:spcBef>
+                    <a:spcPts val="500"/>
+                  </a:spcBef>
+                  <a:buFont typeface="Arial" panose="020B0604020202020204" pitchFamily="34" charset="0"/>
+                  <a:buChar char="•"/>
+                  <a:defRPr sz="1800" kern="1200">
+                    <a:solidFill>
+                      <a:schemeClr val="tx1"/>
+                    </a:solidFill>
+                    <a:latin typeface="+mn-lt"/>
+                    <a:ea typeface="+mn-ea"/>
+                    <a:cs typeface="+mn-cs"/>
+                  </a:defRPr>
+                </a:lvl7pPr>
+                <a:lvl8pPr marL="3429000" indent="-228600" algn="l" defTabSz="914400" rtl="0" eaLnBrk="1" latinLnBrk="0" hangingPunct="1">
+                  <a:lnSpc>
+                    <a:spcPct val="90000"/>
+                  </a:lnSpc>
+                  <a:spcBef>
+                    <a:spcPts val="500"/>
+                  </a:spcBef>
+                  <a:buFont typeface="Arial" panose="020B0604020202020204" pitchFamily="34" charset="0"/>
+                  <a:buChar char="•"/>
+                  <a:defRPr sz="1800" kern="1200">
+                    <a:solidFill>
+                      <a:schemeClr val="tx1"/>
+                    </a:solidFill>
+                    <a:latin typeface="+mn-lt"/>
+                    <a:ea typeface="+mn-ea"/>
+                    <a:cs typeface="+mn-cs"/>
+                  </a:defRPr>
+                </a:lvl8pPr>
+                <a:lvl9pPr marL="3886200" indent="-228600" algn="l" defTabSz="914400" rtl="0" eaLnBrk="1" latinLnBrk="0" hangingPunct="1">
+                  <a:lnSpc>
+                    <a:spcPct val="90000"/>
+                  </a:lnSpc>
+                  <a:spcBef>
+                    <a:spcPts val="500"/>
+                  </a:spcBef>
+                  <a:buFont typeface="Arial" panose="020B0604020202020204" pitchFamily="34" charset="0"/>
+                  <a:buChar char="•"/>
+                  <a:defRPr sz="1800" kern="1200">
+                    <a:solidFill>
+                      <a:schemeClr val="tx1"/>
+                    </a:solidFill>
+                    <a:latin typeface="+mn-lt"/>
+                    <a:ea typeface="+mn-ea"/>
+                    <a:cs typeface="+mn-cs"/>
+                  </a:defRPr>
+                </a:lvl9pPr>
+              </a:lstStyle>
+              <a:p>
+                <a:pPr lvl="1"/>
+                <a:r>
+                  <a:rPr lang="en-US" dirty="0"/>
+                  <a:t>TM1: </a:t>
+                </a:r>
+                <a14:m>
+                  <m:oMath xmlns:m="http://schemas.openxmlformats.org/officeDocument/2006/math">
+                    <m:r>
+                      <a:rPr lang="en-US" i="1" dirty="0" smtClean="0">
+                        <a:latin typeface="Cambria Math" panose="02040503050406030204" pitchFamily="18" charset="0"/>
+                      </a:rPr>
+                      <m:t>𝑟</m:t>
+                    </m:r>
+                    <m:r>
+                      <a:rPr lang="en-US" i="1" dirty="0" smtClean="0">
+                        <a:latin typeface="Cambria Math" panose="02040503050406030204" pitchFamily="18" charset="0"/>
+                      </a:rPr>
+                      <m:t>=150</m:t>
+                    </m:r>
+                    <m:r>
+                      <a:rPr lang="en-US" i="1" dirty="0" smtClean="0">
+                        <a:latin typeface="Cambria Math" panose="02040503050406030204" pitchFamily="18" charset="0"/>
+                      </a:rPr>
+                      <m:t>𝑐𝑚</m:t>
+                    </m:r>
+                  </m:oMath>
+                </a14:m>
+                <a:r>
+                  <a:rPr lang="en-US" dirty="0"/>
+                  <a:t>, </a:t>
+                </a:r>
+                <a14:m>
+                  <m:oMath xmlns:m="http://schemas.openxmlformats.org/officeDocument/2006/math">
+                    <m:r>
+                      <a:rPr lang="en-US" i="1" dirty="0" smtClean="0">
+                        <a:latin typeface="Cambria Math" panose="02040503050406030204" pitchFamily="18" charset="0"/>
+                      </a:rPr>
+                      <m:t>𝑟</m:t>
+                    </m:r>
+                    <m:r>
+                      <a:rPr lang="en-US" i="1" dirty="0" smtClean="0">
+                        <a:latin typeface="Cambria Math" panose="02040503050406030204" pitchFamily="18" charset="0"/>
+                      </a:rPr>
+                      <m:t>’=75</m:t>
+                    </m:r>
+                    <m:r>
+                      <a:rPr lang="en-US" i="1" dirty="0" smtClean="0">
+                        <a:latin typeface="Cambria Math" panose="02040503050406030204" pitchFamily="18" charset="0"/>
+                      </a:rPr>
+                      <m:t>𝑐𝑚</m:t>
+                    </m:r>
+                  </m:oMath>
+                </a14:m>
+                <a:endParaRPr lang="en-US" dirty="0"/>
+              </a:p>
+            </p:txBody>
+          </p:sp>
+        </mc:Choice>
+        <mc:Fallback xmlns="">
+          <p:sp>
+            <p:nvSpPr>
+              <p:cNvPr id="37" name="Content Placeholder 2"/>
+              <p:cNvSpPr txBox="1">
+                <a:spLocks noRot="1" noChangeAspect="1" noMove="1" noResize="1" noEditPoints="1" noAdjustHandles="1" noChangeArrowheads="1" noChangeShapeType="1" noTextEdit="1"/>
+              </p:cNvSpPr>
+              <p:nvPr/>
+            </p:nvSpPr>
+            <p:spPr>
+              <a:xfrm>
+                <a:off x="6732491" y="1194500"/>
+                <a:ext cx="5774724" cy="613635"/>
+              </a:xfrm>
+              <a:prstGeom prst="rect">
+                <a:avLst/>
+              </a:prstGeom>
+              <a:blipFill rotWithShape="0">
+                <a:blip r:embed="rId7"/>
+                <a:stretch>
+                  <a:fillRect t="-13861"/>
+                </a:stretch>
+              </a:blipFill>
+            </p:spPr>
+            <p:txBody>
+              <a:bodyPr/>
+              <a:lstStyle/>
+              <a:p>
+                <a:r>
+                  <a:rPr lang="en-US">
+                    <a:noFill/>
+                  </a:rPr>
+                  <a:t> </a:t>
+                </a:r>
+              </a:p>
+            </p:txBody>
+          </p:sp>
+        </mc:Fallback>
+      </mc:AlternateContent>
+      <p:grpSp>
+        <p:nvGrpSpPr>
+          <p:cNvPr id="14" name="Group 13">
+            <a:extLst>
+              <a:ext uri="{FF2B5EF4-FFF2-40B4-BE49-F238E27FC236}">
+                <a16:creationId xmlns:a16="http://schemas.microsoft.com/office/drawing/2014/main" id="{1856684F-94A2-43C6-92C6-92C11E88169E}"/>
+              </a:ext>
+            </a:extLst>
+          </p:cNvPr>
+          <p:cNvGrpSpPr/>
+          <p:nvPr/>
+        </p:nvGrpSpPr>
+        <p:grpSpPr>
+          <a:xfrm>
+            <a:off x="393895" y="1849644"/>
+            <a:ext cx="5078768" cy="4440022"/>
+            <a:chOff x="393895" y="1849644"/>
+            <a:chExt cx="5078768" cy="4440022"/>
+          </a:xfrm>
+        </p:grpSpPr>
+        <p:grpSp>
+          <p:nvGrpSpPr>
+            <p:cNvPr id="8" name="Group 7"/>
+            <p:cNvGrpSpPr/>
+            <p:nvPr/>
+          </p:nvGrpSpPr>
+          <p:grpSpPr>
+            <a:xfrm>
+              <a:off x="393895" y="3235942"/>
+              <a:ext cx="5078768" cy="3053724"/>
+              <a:chOff x="210039" y="2984372"/>
+              <a:chExt cx="5078768" cy="3053724"/>
+            </a:xfrm>
+          </p:grpSpPr>
+          <p:pic>
+            <p:nvPicPr>
+              <p:cNvPr id="3" name="Picture 2"/>
+              <p:cNvPicPr>
+                <a:picLocks noChangeAspect="1"/>
+              </p:cNvPicPr>
+              <p:nvPr/>
+            </p:nvPicPr>
+            <p:blipFill>
+              <a:blip r:embed="rId8"/>
+              <a:stretch>
+                <a:fillRect/>
+              </a:stretch>
+            </p:blipFill>
+            <p:spPr>
+              <a:xfrm>
+                <a:off x="210039" y="2984372"/>
+                <a:ext cx="5078768" cy="3053724"/>
+              </a:xfrm>
+              <a:prstGeom prst="rect">
+                <a:avLst/>
+              </a:prstGeom>
+            </p:spPr>
+          </p:pic>
+          <p:sp>
+            <p:nvSpPr>
+              <p:cNvPr id="30" name="TextBox 29"/>
+              <p:cNvSpPr txBox="1"/>
+              <p:nvPr/>
+            </p:nvSpPr>
+            <p:spPr>
+              <a:xfrm>
+                <a:off x="3206382" y="3150952"/>
+                <a:ext cx="1785682" cy="369332"/>
+              </a:xfrm>
+              <a:prstGeom prst="rect">
+                <a:avLst/>
+              </a:prstGeom>
+              <a:noFill/>
+            </p:spPr>
+            <p:txBody>
+              <a:bodyPr wrap="none" rtlCol="0">
+                <a:spAutoFit/>
+              </a:bodyPr>
+              <a:lstStyle/>
+              <a:p>
+                <a:r>
+                  <a:rPr lang="en-US" dirty="0">
+                    <a:solidFill>
+                      <a:schemeClr val="bg1"/>
+                    </a:solidFill>
+                  </a:rPr>
+                  <a:t>Intensity at focus</a:t>
+                </a:r>
+              </a:p>
+            </p:txBody>
+          </p:sp>
+        </p:grpSp>
+        <p:grpSp>
+          <p:nvGrpSpPr>
+            <p:cNvPr id="12" name="Group 11"/>
+            <p:cNvGrpSpPr/>
+            <p:nvPr/>
+          </p:nvGrpSpPr>
+          <p:grpSpPr>
+            <a:xfrm>
+              <a:off x="455577" y="1849644"/>
+              <a:ext cx="4955403" cy="1296932"/>
+              <a:chOff x="403226" y="1800831"/>
+              <a:chExt cx="4955403" cy="1296932"/>
+            </a:xfrm>
+          </p:grpSpPr>
+          <p:sp>
+            <p:nvSpPr>
+              <p:cNvPr id="11" name="Rectangle 10"/>
+              <p:cNvSpPr/>
+              <p:nvPr/>
+            </p:nvSpPr>
+            <p:spPr>
+              <a:xfrm>
+                <a:off x="403226" y="2696547"/>
+                <a:ext cx="4952546" cy="401216"/>
+              </a:xfrm>
+              <a:prstGeom prst="rect">
+                <a:avLst/>
+              </a:prstGeom>
+              <a:solidFill>
+                <a:schemeClr val="tx1"/>
+              </a:solidFill>
+              <a:ln>
+                <a:noFill/>
+              </a:ln>
+            </p:spPr>
+            <p:style>
+              <a:lnRef idx="2">
+                <a:schemeClr val="accent1">
+                  <a:shade val="50000"/>
+                </a:schemeClr>
+              </a:lnRef>
+              <a:fillRef idx="1">
+                <a:schemeClr val="accent1"/>
+              </a:fillRef>
+              <a:effectRef idx="0">
+                <a:schemeClr val="accent1"/>
+              </a:effectRef>
+              <a:fontRef idx="minor">
+                <a:schemeClr val="lt1"/>
+              </a:fontRef>
+            </p:style>
+            <p:txBody>
+              <a:bodyPr rtlCol="0" anchor="ctr"/>
+              <a:lstStyle/>
+              <a:p>
+                <a:pPr algn="ctr"/>
+                <a:endParaRPr lang="en-US"/>
+              </a:p>
+            </p:txBody>
+          </p:sp>
+          <p:grpSp>
+            <p:nvGrpSpPr>
+              <p:cNvPr id="7" name="Group 6"/>
+              <p:cNvGrpSpPr/>
+              <p:nvPr/>
+            </p:nvGrpSpPr>
+            <p:grpSpPr>
+              <a:xfrm>
+                <a:off x="405039" y="1800831"/>
+                <a:ext cx="4953590" cy="1096324"/>
+                <a:chOff x="261786" y="2011173"/>
+                <a:chExt cx="4953590" cy="1096324"/>
+              </a:xfrm>
+            </p:grpSpPr>
+            <p:pic>
+              <p:nvPicPr>
+                <p:cNvPr id="4" name="Picture 3"/>
+                <p:cNvPicPr>
+                  <a:picLocks noChangeAspect="1"/>
+                </p:cNvPicPr>
+                <p:nvPr/>
+              </p:nvPicPr>
+              <p:blipFill>
+                <a:blip r:embed="rId9"/>
+                <a:stretch>
+                  <a:fillRect/>
+                </a:stretch>
+              </p:blipFill>
+              <p:spPr>
+                <a:xfrm>
+                  <a:off x="261786" y="2011173"/>
+                  <a:ext cx="4953590" cy="926633"/>
+                </a:xfrm>
+                <a:prstGeom prst="rect">
+                  <a:avLst/>
+                </a:prstGeom>
+              </p:spPr>
+            </p:pic>
+            <p:sp>
+              <p:nvSpPr>
+                <p:cNvPr id="32" name="TextBox 31"/>
+                <p:cNvSpPr txBox="1"/>
+                <p:nvPr/>
+              </p:nvSpPr>
+              <p:spPr>
+                <a:xfrm>
+                  <a:off x="2104588" y="2738165"/>
+                  <a:ext cx="494046" cy="369332"/>
+                </a:xfrm>
+                <a:prstGeom prst="rect">
+                  <a:avLst/>
+                </a:prstGeom>
+                <a:noFill/>
+              </p:spPr>
+              <p:txBody>
+                <a:bodyPr wrap="none" rtlCol="0">
+                  <a:spAutoFit/>
+                </a:bodyPr>
+                <a:lstStyle/>
+                <a:p>
+                  <a:r>
+                    <a:rPr lang="en-US" dirty="0">
+                      <a:solidFill>
+                        <a:schemeClr val="bg1"/>
+                      </a:solidFill>
+                    </a:rPr>
+                    <a:t>TM</a:t>
+                  </a:r>
+                </a:p>
+              </p:txBody>
+            </p:sp>
+            <p:sp>
+              <p:nvSpPr>
+                <p:cNvPr id="33" name="TextBox 32"/>
+                <p:cNvSpPr txBox="1"/>
+                <p:nvPr/>
+              </p:nvSpPr>
+              <p:spPr>
+                <a:xfrm>
+                  <a:off x="897772" y="2351609"/>
+                  <a:ext cx="1117614" cy="369332"/>
+                </a:xfrm>
+                <a:prstGeom prst="rect">
+                  <a:avLst/>
+                </a:prstGeom>
+                <a:noFill/>
+              </p:spPr>
+              <p:txBody>
+                <a:bodyPr wrap="none" rtlCol="0">
+                  <a:spAutoFit/>
+                </a:bodyPr>
+                <a:lstStyle/>
+                <a:p>
+                  <a:r>
+                    <a:rPr lang="en-US" dirty="0">
+                      <a:solidFill>
+                        <a:schemeClr val="bg1"/>
+                      </a:solidFill>
+                    </a:rPr>
+                    <a:t>l</a:t>
+                  </a:r>
+                  <a:r>
+                    <a:rPr lang="en-US" baseline="-25000" dirty="0">
+                      <a:solidFill>
+                        <a:schemeClr val="bg1"/>
+                      </a:solidFill>
+                    </a:rPr>
+                    <a:t>1</a:t>
+                  </a:r>
+                  <a:r>
+                    <a:rPr lang="en-US" dirty="0">
+                      <a:solidFill>
+                        <a:schemeClr val="bg1"/>
+                      </a:solidFill>
+                    </a:rPr>
+                    <a:t>=150 cm</a:t>
+                  </a:r>
+                </a:p>
+              </p:txBody>
+            </p:sp>
+            <p:sp>
+              <p:nvSpPr>
+                <p:cNvPr id="34" name="TextBox 33"/>
+                <p:cNvSpPr txBox="1"/>
+                <p:nvPr/>
+              </p:nvSpPr>
+              <p:spPr>
+                <a:xfrm rot="20959553">
+                  <a:off x="2296168" y="2214031"/>
+                  <a:ext cx="1000595" cy="369332"/>
+                </a:xfrm>
+                <a:prstGeom prst="rect">
+                  <a:avLst/>
+                </a:prstGeom>
+                <a:noFill/>
+              </p:spPr>
+              <p:txBody>
+                <a:bodyPr wrap="none" rtlCol="0">
+                  <a:spAutoFit/>
+                </a:bodyPr>
+                <a:lstStyle/>
+                <a:p>
+                  <a:r>
+                    <a:rPr lang="en-US" dirty="0">
+                      <a:solidFill>
+                        <a:schemeClr val="bg1"/>
+                      </a:solidFill>
+                    </a:rPr>
+                    <a:t>l</a:t>
+                  </a:r>
+                  <a:r>
+                    <a:rPr lang="en-US" baseline="-25000" dirty="0">
+                      <a:solidFill>
+                        <a:schemeClr val="bg1"/>
+                      </a:solidFill>
+                    </a:rPr>
+                    <a:t>2</a:t>
+                  </a:r>
+                  <a:r>
+                    <a:rPr lang="en-US" dirty="0">
+                      <a:solidFill>
+                        <a:schemeClr val="bg1"/>
+                      </a:solidFill>
+                    </a:rPr>
+                    <a:t>=50 cm</a:t>
+                  </a:r>
+                </a:p>
+              </p:txBody>
+            </p:sp>
+          </p:grpSp>
+        </p:grpSp>
+        <p:sp>
+          <p:nvSpPr>
+            <p:cNvPr id="26" name="TextBox 25">
+              <a:extLst>
+                <a:ext uri="{FF2B5EF4-FFF2-40B4-BE49-F238E27FC236}">
+                  <a16:creationId xmlns:a16="http://schemas.microsoft.com/office/drawing/2014/main" id="{8FF39D9B-B80B-4841-B503-17B8B322DD8A}"/>
+                </a:ext>
+              </a:extLst>
+            </p:cNvPr>
+            <p:cNvSpPr txBox="1"/>
+            <p:nvPr/>
+          </p:nvSpPr>
+          <p:spPr>
+            <a:xfrm>
+              <a:off x="3049472" y="2498110"/>
+              <a:ext cx="681533" cy="369332"/>
+            </a:xfrm>
+            <a:prstGeom prst="rect">
+              <a:avLst/>
+            </a:prstGeom>
+            <a:noFill/>
+          </p:spPr>
+          <p:txBody>
+            <a:bodyPr wrap="none" rtlCol="0">
+              <a:spAutoFit/>
+            </a:bodyPr>
+            <a:lstStyle/>
+            <a:p>
+              <a:r>
+                <a:rPr lang="en-US" dirty="0">
+                  <a:solidFill>
+                    <a:schemeClr val="bg1"/>
+                  </a:solidFill>
+                </a:rPr>
+                <a:t>focus</a:t>
+              </a:r>
+            </a:p>
+          </p:txBody>
+        </p:sp>
+        <p:sp>
+          <p:nvSpPr>
+            <p:cNvPr id="27" name="TextBox 26">
+              <a:extLst>
+                <a:ext uri="{FF2B5EF4-FFF2-40B4-BE49-F238E27FC236}">
+                  <a16:creationId xmlns:a16="http://schemas.microsoft.com/office/drawing/2014/main" id="{A1B17587-CD81-4678-8F08-E34C61151BE0}"/>
+                </a:ext>
+              </a:extLst>
+            </p:cNvPr>
+            <p:cNvSpPr txBox="1"/>
+            <p:nvPr/>
+          </p:nvSpPr>
+          <p:spPr>
+            <a:xfrm>
+              <a:off x="494215" y="2667074"/>
+              <a:ext cx="808042" cy="369332"/>
+            </a:xfrm>
+            <a:prstGeom prst="rect">
+              <a:avLst/>
+            </a:prstGeom>
+            <a:noFill/>
+          </p:spPr>
+          <p:txBody>
+            <a:bodyPr wrap="none" rtlCol="0">
+              <a:spAutoFit/>
+            </a:bodyPr>
+            <a:lstStyle/>
+            <a:p>
+              <a:r>
+                <a:rPr lang="en-US" dirty="0">
+                  <a:solidFill>
+                    <a:schemeClr val="bg1"/>
+                  </a:solidFill>
+                </a:rPr>
+                <a:t>source</a:t>
+              </a:r>
+            </a:p>
+          </p:txBody>
+        </p:sp>
+      </p:grpSp>
+    </p:spTree>
+    <p:extLst>
+      <p:ext uri="{BB962C8B-B14F-4D97-AF65-F5344CB8AC3E}">
+        <p14:creationId xmlns:p14="http://schemas.microsoft.com/office/powerpoint/2010/main" val="163530663"/>
+      </p:ext>
+    </p:extLst>
+  </p:cSld>
+  <p:clrMapOvr>
+    <a:masterClrMapping/>
+  </p:clrMapOvr>
+</p:sld>
+</file>
+
+<file path=ppt/slides/slide6.xml><?xml version="1.0" encoding="utf-8"?>
+<p:sld xmlns:a="http://schemas.openxmlformats.org/drawingml/2006/main" xmlns:r="http://schemas.openxmlformats.org/officeDocument/2006/relationships" xmlns:p="http://schemas.openxmlformats.org/presentationml/2006/main">
+  <p:cSld>
+    <p:spTree>
+      <p:nvGrpSpPr>
+        <p:cNvPr id="1" name=""/>
+        <p:cNvGrpSpPr/>
+        <p:nvPr/>
+      </p:nvGrpSpPr>
+      <p:grpSpPr>
+        <a:xfrm>
+          <a:off x="0" y="0"/>
+          <a:ext cx="0" cy="0"/>
+          <a:chOff x="0" y="0"/>
+          <a:chExt cx="0" cy="0"/>
+        </a:xfrm>
+      </p:grpSpPr>
+      <p:grpSp>
+        <p:nvGrpSpPr>
+          <p:cNvPr id="14" name="Group 13">
+            <a:extLst>
+              <a:ext uri="{FF2B5EF4-FFF2-40B4-BE49-F238E27FC236}">
+                <a16:creationId xmlns:a16="http://schemas.microsoft.com/office/drawing/2014/main" id="{CD1E26A7-F0C4-4084-AB41-EDB6567556CA}"/>
+              </a:ext>
+            </a:extLst>
+          </p:cNvPr>
+          <p:cNvGrpSpPr/>
+          <p:nvPr/>
+        </p:nvGrpSpPr>
+        <p:grpSpPr>
+          <a:xfrm>
+            <a:off x="2571079" y="849523"/>
+            <a:ext cx="6248400" cy="4437861"/>
+            <a:chOff x="2571079" y="849523"/>
+            <a:chExt cx="6248400" cy="4437861"/>
+          </a:xfrm>
+        </p:grpSpPr>
+        <p:pic>
+          <p:nvPicPr>
+            <p:cNvPr id="4" name="Picture 3">
+              <a:extLst>
+                <a:ext uri="{FF2B5EF4-FFF2-40B4-BE49-F238E27FC236}">
+                  <a16:creationId xmlns:a16="http://schemas.microsoft.com/office/drawing/2014/main" id="{A9452691-F5EA-4A65-B76A-0E83A8719145}"/>
+                </a:ext>
+              </a:extLst>
+            </p:cNvPr>
+            <p:cNvPicPr>
+              <a:picLocks noChangeAspect="1"/>
+            </p:cNvPicPr>
+            <p:nvPr/>
+          </p:nvPicPr>
+          <p:blipFill rotWithShape="1">
+            <a:blip r:embed="rId2"/>
+            <a:srcRect b="10401"/>
+            <a:stretch/>
+          </p:blipFill>
+          <p:spPr>
+            <a:xfrm>
+              <a:off x="2571079" y="849523"/>
+              <a:ext cx="6248400" cy="4437861"/>
+            </a:xfrm>
+            <a:prstGeom prst="rect">
+              <a:avLst/>
+            </a:prstGeom>
+          </p:spPr>
+        </p:pic>
+        <mc:AlternateContent xmlns:mc="http://schemas.openxmlformats.org/markup-compatibility/2006">
+          <mc:Choice xmlns:a14="http://schemas.microsoft.com/office/drawing/2010/main" Requires="a14">
+            <p:sp>
+              <p:nvSpPr>
+                <p:cNvPr id="5" name="TextBox 4">
+                  <a:extLst>
+                    <a:ext uri="{FF2B5EF4-FFF2-40B4-BE49-F238E27FC236}">
+                      <a16:creationId xmlns:a16="http://schemas.microsoft.com/office/drawing/2014/main" id="{43C46ECF-AC69-42F6-A585-44BDC63923B6}"/>
+                    </a:ext>
+                  </a:extLst>
+                </p:cNvPr>
+                <p:cNvSpPr txBox="1"/>
+                <p:nvPr/>
+              </p:nvSpPr>
+              <p:spPr>
+                <a:xfrm>
+                  <a:off x="3195020" y="3130475"/>
+                  <a:ext cx="486864" cy="461665"/>
+                </a:xfrm>
+                <a:prstGeom prst="rect">
+                  <a:avLst/>
+                </a:prstGeom>
+                <a:solidFill>
+                  <a:schemeClr val="bg1"/>
+                </a:solidFill>
+              </p:spPr>
+              <p:txBody>
+                <a:bodyPr wrap="none" rtlCol="0">
+                  <a:spAutoFit/>
+                </a:bodyPr>
+                <a:lstStyle/>
+                <a:p>
+                  <a14:m>
+                    <m:oMathPara xmlns:m="http://schemas.openxmlformats.org/officeDocument/2006/math">
+                      <m:oMathParaPr>
+                        <m:jc m:val="centerGroup"/>
+                      </m:oMathParaPr>
+                      <m:oMath xmlns:m="http://schemas.openxmlformats.org/officeDocument/2006/math">
+                        <m:sSub>
+                          <m:sSubPr>
+                            <m:ctrlPr>
+                              <a:rPr lang="en-US" sz="2400" b="0" i="1" smtClean="0">
+                                <a:latin typeface="Cambria Math" panose="02040503050406030204" pitchFamily="18" charset="0"/>
+                              </a:rPr>
+                            </m:ctrlPr>
+                          </m:sSubPr>
+                          <m:e>
+                            <m:r>
+                              <a:rPr lang="en-US" sz="2400" b="0" i="1" smtClean="0">
+                                <a:latin typeface="Cambria Math" panose="02040503050406030204" pitchFamily="18" charset="0"/>
+                              </a:rPr>
+                              <m:t>𝑙</m:t>
+                            </m:r>
+                          </m:e>
+                          <m:sub>
+                            <m:r>
+                              <a:rPr lang="en-US" sz="2400" b="0" i="1" smtClean="0">
+                                <a:latin typeface="Cambria Math" panose="02040503050406030204" pitchFamily="18" charset="0"/>
+                              </a:rPr>
+                              <m:t>1</m:t>
+                            </m:r>
+                          </m:sub>
+                        </m:sSub>
+                      </m:oMath>
+                    </m:oMathPara>
+                  </a14:m>
+                  <a:endParaRPr lang="en-US" sz="2400" dirty="0"/>
+                </a:p>
+              </p:txBody>
+            </p:sp>
+          </mc:Choice>
+          <mc:Fallback>
+            <p:sp>
+              <p:nvSpPr>
+                <p:cNvPr id="5" name="TextBox 4">
+                  <a:extLst>
+                    <a:ext uri="{FF2B5EF4-FFF2-40B4-BE49-F238E27FC236}">
+                      <a16:creationId xmlns:a16="http://schemas.microsoft.com/office/drawing/2014/main" id="{43C46ECF-AC69-42F6-A585-44BDC63923B6}"/>
+                    </a:ext>
+                  </a:extLst>
+                </p:cNvPr>
+                <p:cNvSpPr txBox="1">
+                  <a:spLocks noRot="1" noChangeAspect="1" noMove="1" noResize="1" noEditPoints="1" noAdjustHandles="1" noChangeArrowheads="1" noChangeShapeType="1" noTextEdit="1"/>
+                </p:cNvSpPr>
+                <p:nvPr/>
+              </p:nvSpPr>
+              <p:spPr>
+                <a:xfrm>
+                  <a:off x="3195020" y="3130475"/>
+                  <a:ext cx="486864" cy="461665"/>
+                </a:xfrm>
+                <a:prstGeom prst="rect">
+                  <a:avLst/>
+                </a:prstGeom>
+                <a:blipFill>
+                  <a:blip r:embed="rId3"/>
+                  <a:stretch>
+                    <a:fillRect b="-1333"/>
+                  </a:stretch>
+                </a:blipFill>
+              </p:spPr>
+              <p:txBody>
+                <a:bodyPr/>
+                <a:lstStyle/>
+                <a:p>
+                  <a:r>
+                    <a:rPr lang="en-US">
+                      <a:noFill/>
+                    </a:rPr>
+                    <a:t> </a:t>
+                  </a:r>
+                </a:p>
+              </p:txBody>
+            </p:sp>
+          </mc:Fallback>
+        </mc:AlternateContent>
+        <mc:AlternateContent xmlns:mc="http://schemas.openxmlformats.org/markup-compatibility/2006">
+          <mc:Choice xmlns:a14="http://schemas.microsoft.com/office/drawing/2010/main" Requires="a14">
+            <p:sp>
+              <p:nvSpPr>
+                <p:cNvPr id="6" name="TextBox 5">
+                  <a:extLst>
+                    <a:ext uri="{FF2B5EF4-FFF2-40B4-BE49-F238E27FC236}">
+                      <a16:creationId xmlns:a16="http://schemas.microsoft.com/office/drawing/2014/main" id="{CD8B46B1-CC3A-42AE-8C72-1A92D09BD186}"/>
+                    </a:ext>
+                  </a:extLst>
+                </p:cNvPr>
+                <p:cNvSpPr txBox="1"/>
+                <p:nvPr/>
+              </p:nvSpPr>
+              <p:spPr>
+                <a:xfrm>
+                  <a:off x="6291211" y="2261811"/>
+                  <a:ext cx="493981" cy="461665"/>
+                </a:xfrm>
+                <a:prstGeom prst="rect">
+                  <a:avLst/>
+                </a:prstGeom>
+                <a:noFill/>
+              </p:spPr>
+              <p:txBody>
+                <a:bodyPr wrap="none" rtlCol="0">
+                  <a:spAutoFit/>
+                </a:bodyPr>
+                <a:lstStyle/>
+                <a:p>
+                  <a14:m>
+                    <m:oMathPara xmlns:m="http://schemas.openxmlformats.org/officeDocument/2006/math">
+                      <m:oMathParaPr>
+                        <m:jc m:val="centerGroup"/>
+                      </m:oMathParaPr>
+                      <m:oMath xmlns:m="http://schemas.openxmlformats.org/officeDocument/2006/math">
+                        <m:sSub>
+                          <m:sSubPr>
+                            <m:ctrlPr>
+                              <a:rPr lang="en-US" sz="2400" b="0" i="1" smtClean="0">
+                                <a:latin typeface="Cambria Math" panose="02040503050406030204" pitchFamily="18" charset="0"/>
+                              </a:rPr>
+                            </m:ctrlPr>
+                          </m:sSubPr>
+                          <m:e>
+                            <m:r>
+                              <a:rPr lang="en-US" sz="2400" b="0" i="1" smtClean="0">
+                                <a:latin typeface="Cambria Math" panose="02040503050406030204" pitchFamily="18" charset="0"/>
+                              </a:rPr>
+                              <m:t>𝑙</m:t>
+                            </m:r>
+                          </m:e>
+                          <m:sub>
+                            <m:r>
+                              <a:rPr lang="en-US" sz="2400" b="0" i="1" smtClean="0">
+                                <a:latin typeface="Cambria Math" panose="02040503050406030204" pitchFamily="18" charset="0"/>
+                              </a:rPr>
+                              <m:t>2</m:t>
+                            </m:r>
+                          </m:sub>
+                        </m:sSub>
+                      </m:oMath>
+                    </m:oMathPara>
+                  </a14:m>
+                  <a:endParaRPr lang="en-US" sz="2400" dirty="0"/>
+                </a:p>
+              </p:txBody>
+            </p:sp>
+          </mc:Choice>
+          <mc:Fallback>
+            <p:sp>
+              <p:nvSpPr>
+                <p:cNvPr id="6" name="TextBox 5">
+                  <a:extLst>
+                    <a:ext uri="{FF2B5EF4-FFF2-40B4-BE49-F238E27FC236}">
+                      <a16:creationId xmlns:a16="http://schemas.microsoft.com/office/drawing/2014/main" id="{CD8B46B1-CC3A-42AE-8C72-1A92D09BD186}"/>
+                    </a:ext>
+                  </a:extLst>
+                </p:cNvPr>
+                <p:cNvSpPr txBox="1">
+                  <a:spLocks noRot="1" noChangeAspect="1" noMove="1" noResize="1" noEditPoints="1" noAdjustHandles="1" noChangeArrowheads="1" noChangeShapeType="1" noTextEdit="1"/>
+                </p:cNvSpPr>
+                <p:nvPr/>
+              </p:nvSpPr>
+              <p:spPr>
+                <a:xfrm>
+                  <a:off x="6291211" y="2261811"/>
+                  <a:ext cx="493981" cy="461665"/>
+                </a:xfrm>
+                <a:prstGeom prst="rect">
+                  <a:avLst/>
+                </a:prstGeom>
+                <a:blipFill>
+                  <a:blip r:embed="rId4"/>
+                  <a:stretch>
+                    <a:fillRect b="-1316"/>
+                  </a:stretch>
+                </a:blipFill>
+              </p:spPr>
+              <p:txBody>
+                <a:bodyPr/>
+                <a:lstStyle/>
+                <a:p>
+                  <a:r>
+                    <a:rPr lang="en-US">
+                      <a:noFill/>
+                    </a:rPr>
+                    <a:t> </a:t>
+                  </a:r>
+                </a:p>
+              </p:txBody>
+            </p:sp>
+          </mc:Fallback>
+        </mc:AlternateContent>
+        <p:sp>
+          <p:nvSpPr>
+            <p:cNvPr id="10" name="Rectangle 9">
+              <a:extLst>
+                <a:ext uri="{FF2B5EF4-FFF2-40B4-BE49-F238E27FC236}">
+                  <a16:creationId xmlns:a16="http://schemas.microsoft.com/office/drawing/2014/main" id="{8BA553F2-DA1D-4628-8D52-55F47C5F497F}"/>
+                </a:ext>
+              </a:extLst>
+            </p:cNvPr>
+            <p:cNvSpPr/>
+            <p:nvPr/>
+          </p:nvSpPr>
+          <p:spPr>
+            <a:xfrm>
+              <a:off x="4822946" y="2511910"/>
+              <a:ext cx="441063" cy="355002"/>
+            </a:xfrm>
+            <a:prstGeom prst="rect">
+              <a:avLst/>
+            </a:prstGeom>
+            <a:solidFill>
+              <a:schemeClr val="bg1"/>
+            </a:solidFill>
+            <a:ln>
+              <a:noFill/>
+            </a:ln>
+          </p:spPr>
+          <p:style>
+            <a:lnRef idx="2">
+              <a:schemeClr val="accent1">
+                <a:shade val="50000"/>
+              </a:schemeClr>
+            </a:lnRef>
+            <a:fillRef idx="1">
+              <a:schemeClr val="accent1"/>
+            </a:fillRef>
+            <a:effectRef idx="0">
+              <a:schemeClr val="accent1"/>
+            </a:effectRef>
+            <a:fontRef idx="minor">
+              <a:schemeClr val="lt1"/>
+            </a:fontRef>
+          </p:style>
+          <p:txBody>
+            <a:bodyPr rtlCol="0" anchor="ctr"/>
+            <a:lstStyle/>
+            <a:p>
+              <a:pPr algn="ctr"/>
+              <a:endParaRPr lang="en-US"/>
+            </a:p>
+          </p:txBody>
+        </p:sp>
+        <p:sp>
+          <p:nvSpPr>
+            <p:cNvPr id="11" name="Rectangle 10">
+              <a:extLst>
+                <a:ext uri="{FF2B5EF4-FFF2-40B4-BE49-F238E27FC236}">
+                  <a16:creationId xmlns:a16="http://schemas.microsoft.com/office/drawing/2014/main" id="{38E88372-B661-4277-B48E-B7A9BDABB291}"/>
+                </a:ext>
+              </a:extLst>
+            </p:cNvPr>
+            <p:cNvSpPr/>
+            <p:nvPr/>
+          </p:nvSpPr>
+          <p:spPr>
+            <a:xfrm>
+              <a:off x="5383043" y="2368474"/>
+              <a:ext cx="441063" cy="355002"/>
+            </a:xfrm>
+            <a:prstGeom prst="rect">
+              <a:avLst/>
+            </a:prstGeom>
+            <a:solidFill>
+              <a:schemeClr val="bg1"/>
+            </a:solidFill>
+            <a:ln>
+              <a:noFill/>
+            </a:ln>
+          </p:spPr>
+          <p:style>
+            <a:lnRef idx="2">
+              <a:schemeClr val="accent1">
+                <a:shade val="50000"/>
+              </a:schemeClr>
+            </a:lnRef>
+            <a:fillRef idx="1">
+              <a:schemeClr val="accent1"/>
+            </a:fillRef>
+            <a:effectRef idx="0">
+              <a:schemeClr val="accent1"/>
+            </a:effectRef>
+            <a:fontRef idx="minor">
+              <a:schemeClr val="lt1"/>
+            </a:fontRef>
+          </p:style>
+          <p:txBody>
+            <a:bodyPr rtlCol="0" anchor="ctr"/>
+            <a:lstStyle/>
+            <a:p>
+              <a:pPr algn="ctr"/>
+              <a:endParaRPr lang="en-US"/>
+            </a:p>
+          </p:txBody>
+        </p:sp>
+        <p:sp>
+          <p:nvSpPr>
+            <p:cNvPr id="12" name="Rectangle 11">
+              <a:extLst>
+                <a:ext uri="{FF2B5EF4-FFF2-40B4-BE49-F238E27FC236}">
+                  <a16:creationId xmlns:a16="http://schemas.microsoft.com/office/drawing/2014/main" id="{7E141A8C-92B8-4862-9F35-BEE73280B881}"/>
+                </a:ext>
+              </a:extLst>
+            </p:cNvPr>
+            <p:cNvSpPr/>
+            <p:nvPr/>
+          </p:nvSpPr>
+          <p:spPr>
+            <a:xfrm>
+              <a:off x="4216932" y="2952974"/>
+              <a:ext cx="441063" cy="355002"/>
+            </a:xfrm>
+            <a:prstGeom prst="rect">
+              <a:avLst/>
+            </a:prstGeom>
+            <a:solidFill>
+              <a:schemeClr val="bg1"/>
+            </a:solidFill>
+            <a:ln>
+              <a:noFill/>
+            </a:ln>
+          </p:spPr>
+          <p:style>
+            <a:lnRef idx="2">
+              <a:schemeClr val="accent1">
+                <a:shade val="50000"/>
+              </a:schemeClr>
+            </a:lnRef>
+            <a:fillRef idx="1">
+              <a:schemeClr val="accent1"/>
+            </a:fillRef>
+            <a:effectRef idx="0">
+              <a:schemeClr val="accent1"/>
+            </a:effectRef>
+            <a:fontRef idx="minor">
+              <a:schemeClr val="lt1"/>
+            </a:fontRef>
+          </p:style>
+          <p:txBody>
+            <a:bodyPr rtlCol="0" anchor="ctr"/>
+            <a:lstStyle/>
+            <a:p>
+              <a:pPr algn="ctr"/>
+              <a:endParaRPr lang="en-US"/>
+            </a:p>
+          </p:txBody>
+        </p:sp>
+        <mc:AlternateContent xmlns:mc="http://schemas.openxmlformats.org/markup-compatibility/2006">
+          <mc:Choice xmlns:a14="http://schemas.microsoft.com/office/drawing/2010/main" Requires="a14">
+            <p:sp>
+              <p:nvSpPr>
+                <p:cNvPr id="7" name="TextBox 6">
+                  <a:extLst>
+                    <a:ext uri="{FF2B5EF4-FFF2-40B4-BE49-F238E27FC236}">
+                      <a16:creationId xmlns:a16="http://schemas.microsoft.com/office/drawing/2014/main" id="{19F765AC-8FE9-4531-BEF1-0B96EAEE36C2}"/>
+                    </a:ext>
+                  </a:extLst>
+                </p:cNvPr>
+                <p:cNvSpPr txBox="1"/>
+                <p:nvPr/>
+              </p:nvSpPr>
+              <p:spPr>
+                <a:xfrm>
+                  <a:off x="4156671" y="2936837"/>
+                  <a:ext cx="799321" cy="562975"/>
+                </a:xfrm>
+                <a:prstGeom prst="rect">
+                  <a:avLst/>
+                </a:prstGeom>
+                <a:noFill/>
+              </p:spPr>
+              <p:txBody>
+                <a:bodyPr wrap="none" rtlCol="0">
+                  <a:spAutoFit/>
+                </a:bodyPr>
+                <a:lstStyle/>
+                <a:p>
+                  <a14:m>
+                    <m:oMathPara xmlns:m="http://schemas.openxmlformats.org/officeDocument/2006/math">
+                      <m:oMathParaPr>
+                        <m:jc m:val="centerGroup"/>
+                      </m:oMathParaPr>
+                      <m:oMath xmlns:m="http://schemas.openxmlformats.org/officeDocument/2006/math">
+                        <m:f>
+                          <m:fPr>
+                            <m:ctrlPr>
+                              <a:rPr lang="en-US" b="0" i="1" smtClean="0">
+                                <a:latin typeface="Cambria Math" panose="02040503050406030204" pitchFamily="18" charset="0"/>
+                              </a:rPr>
+                            </m:ctrlPr>
+                          </m:fPr>
+                          <m:num>
+                            <m:r>
+                              <a:rPr lang="en-US" b="0" i="1" smtClean="0">
+                                <a:latin typeface="Cambria Math" panose="02040503050406030204" pitchFamily="18" charset="0"/>
+                              </a:rPr>
+                              <m:t>𝜋</m:t>
+                            </m:r>
+                          </m:num>
+                          <m:den>
+                            <m:r>
+                              <a:rPr lang="en-US" b="0" i="1" smtClean="0">
+                                <a:latin typeface="Cambria Math" panose="02040503050406030204" pitchFamily="18" charset="0"/>
+                              </a:rPr>
+                              <m:t>2</m:t>
+                            </m:r>
+                          </m:den>
+                        </m:f>
+                        <m:r>
+                          <a:rPr lang="en-US" b="0" i="1" smtClean="0">
+                            <a:latin typeface="Cambria Math" panose="02040503050406030204" pitchFamily="18" charset="0"/>
+                          </a:rPr>
+                          <m:t>−</m:t>
+                        </m:r>
+                        <m:r>
+                          <a:rPr lang="en-US" b="0" i="1" smtClean="0">
+                            <a:latin typeface="Cambria Math" panose="02040503050406030204" pitchFamily="18" charset="0"/>
+                          </a:rPr>
+                          <m:t>𝛼</m:t>
+                        </m:r>
+                      </m:oMath>
+                    </m:oMathPara>
+                  </a14:m>
+                  <a:endParaRPr lang="en-US" dirty="0"/>
+                </a:p>
+              </p:txBody>
+            </p:sp>
+          </mc:Choice>
+          <mc:Fallback>
+            <p:sp>
+              <p:nvSpPr>
+                <p:cNvPr id="7" name="TextBox 6">
+                  <a:extLst>
+                    <a:ext uri="{FF2B5EF4-FFF2-40B4-BE49-F238E27FC236}">
+                      <a16:creationId xmlns:a16="http://schemas.microsoft.com/office/drawing/2014/main" id="{19F765AC-8FE9-4531-BEF1-0B96EAEE36C2}"/>
+                    </a:ext>
+                  </a:extLst>
+                </p:cNvPr>
+                <p:cNvSpPr txBox="1">
+                  <a:spLocks noRot="1" noChangeAspect="1" noMove="1" noResize="1" noEditPoints="1" noAdjustHandles="1" noChangeArrowheads="1" noChangeShapeType="1" noTextEdit="1"/>
+                </p:cNvSpPr>
+                <p:nvPr/>
+              </p:nvSpPr>
+              <p:spPr>
+                <a:xfrm>
+                  <a:off x="4156671" y="2936837"/>
+                  <a:ext cx="799321" cy="562975"/>
+                </a:xfrm>
+                <a:prstGeom prst="rect">
+                  <a:avLst/>
+                </a:prstGeom>
+                <a:blipFill>
+                  <a:blip r:embed="rId5"/>
+                  <a:stretch>
+                    <a:fillRect/>
+                  </a:stretch>
+                </a:blipFill>
+              </p:spPr>
+              <p:txBody>
+                <a:bodyPr/>
+                <a:lstStyle/>
+                <a:p>
+                  <a:r>
+                    <a:rPr lang="en-US">
+                      <a:noFill/>
+                    </a:rPr>
+                    <a:t> </a:t>
+                  </a:r>
+                </a:p>
+              </p:txBody>
+            </p:sp>
+          </mc:Fallback>
+        </mc:AlternateContent>
+        <mc:AlternateContent xmlns:mc="http://schemas.openxmlformats.org/markup-compatibility/2006">
+          <mc:Choice xmlns:a14="http://schemas.microsoft.com/office/drawing/2010/main" Requires="a14">
+            <p:sp>
+              <p:nvSpPr>
+                <p:cNvPr id="13" name="TextBox 12">
+                  <a:extLst>
+                    <a:ext uri="{FF2B5EF4-FFF2-40B4-BE49-F238E27FC236}">
+                      <a16:creationId xmlns:a16="http://schemas.microsoft.com/office/drawing/2014/main" id="{94487A5F-B1C6-4B35-B1EB-D9D581857B46}"/>
+                    </a:ext>
+                  </a:extLst>
+                </p:cNvPr>
+                <p:cNvSpPr txBox="1"/>
+                <p:nvPr/>
+              </p:nvSpPr>
+              <p:spPr>
+                <a:xfrm>
+                  <a:off x="4915938" y="2411748"/>
+                  <a:ext cx="799321" cy="562975"/>
+                </a:xfrm>
+                <a:prstGeom prst="rect">
+                  <a:avLst/>
+                </a:prstGeom>
+                <a:noFill/>
+              </p:spPr>
+              <p:txBody>
+                <a:bodyPr wrap="none" rtlCol="0">
+                  <a:spAutoFit/>
+                </a:bodyPr>
+                <a:lstStyle/>
+                <a:p>
+                  <a14:m>
+                    <m:oMathPara xmlns:m="http://schemas.openxmlformats.org/officeDocument/2006/math">
+                      <m:oMathParaPr>
+                        <m:jc m:val="centerGroup"/>
+                      </m:oMathParaPr>
+                      <m:oMath xmlns:m="http://schemas.openxmlformats.org/officeDocument/2006/math">
+                        <m:f>
+                          <m:fPr>
+                            <m:ctrlPr>
+                              <a:rPr lang="en-US" b="0" i="1" smtClean="0">
+                                <a:latin typeface="Cambria Math" panose="02040503050406030204" pitchFamily="18" charset="0"/>
+                              </a:rPr>
+                            </m:ctrlPr>
+                          </m:fPr>
+                          <m:num>
+                            <m:r>
+                              <a:rPr lang="en-US" b="0" i="1" smtClean="0">
+                                <a:latin typeface="Cambria Math" panose="02040503050406030204" pitchFamily="18" charset="0"/>
+                              </a:rPr>
+                              <m:t>𝜋</m:t>
+                            </m:r>
+                          </m:num>
+                          <m:den>
+                            <m:r>
+                              <a:rPr lang="en-US" b="0" i="1" smtClean="0">
+                                <a:latin typeface="Cambria Math" panose="02040503050406030204" pitchFamily="18" charset="0"/>
+                              </a:rPr>
+                              <m:t>2</m:t>
+                            </m:r>
+                          </m:den>
+                        </m:f>
+                        <m:r>
+                          <a:rPr lang="en-US" b="0" i="1" smtClean="0">
+                            <a:latin typeface="Cambria Math" panose="02040503050406030204" pitchFamily="18" charset="0"/>
+                          </a:rPr>
+                          <m:t>−</m:t>
+                        </m:r>
+                        <m:r>
+                          <a:rPr lang="en-US" b="0" i="1" smtClean="0">
+                            <a:latin typeface="Cambria Math" panose="02040503050406030204" pitchFamily="18" charset="0"/>
+                          </a:rPr>
+                          <m:t>𝛼</m:t>
+                        </m:r>
+                      </m:oMath>
+                    </m:oMathPara>
+                  </a14:m>
+                  <a:endParaRPr lang="en-US" dirty="0"/>
+                </a:p>
+              </p:txBody>
+            </p:sp>
+          </mc:Choice>
+          <mc:Fallback>
+            <p:sp>
+              <p:nvSpPr>
+                <p:cNvPr id="13" name="TextBox 12">
+                  <a:extLst>
+                    <a:ext uri="{FF2B5EF4-FFF2-40B4-BE49-F238E27FC236}">
+                      <a16:creationId xmlns:a16="http://schemas.microsoft.com/office/drawing/2014/main" id="{94487A5F-B1C6-4B35-B1EB-D9D581857B46}"/>
+                    </a:ext>
+                  </a:extLst>
+                </p:cNvPr>
+                <p:cNvSpPr txBox="1">
+                  <a:spLocks noRot="1" noChangeAspect="1" noMove="1" noResize="1" noEditPoints="1" noAdjustHandles="1" noChangeArrowheads="1" noChangeShapeType="1" noTextEdit="1"/>
+                </p:cNvSpPr>
+                <p:nvPr/>
+              </p:nvSpPr>
+              <p:spPr>
+                <a:xfrm>
+                  <a:off x="4915938" y="2411748"/>
+                  <a:ext cx="799321" cy="562975"/>
+                </a:xfrm>
+                <a:prstGeom prst="rect">
+                  <a:avLst/>
+                </a:prstGeom>
+                <a:blipFill>
+                  <a:blip r:embed="rId6"/>
+                  <a:stretch>
+                    <a:fillRect/>
+                  </a:stretch>
+                </a:blipFill>
+              </p:spPr>
+              <p:txBody>
+                <a:bodyPr/>
+                <a:lstStyle/>
+                <a:p>
+                  <a:r>
+                    <a:rPr lang="en-US">
+                      <a:noFill/>
+                    </a:rPr>
+                    <a:t> </a:t>
+                  </a:r>
+                </a:p>
+              </p:txBody>
+            </p:sp>
+          </mc:Fallback>
+        </mc:AlternateContent>
+      </p:grpSp>
+    </p:spTree>
+    <p:extLst>
+      <p:ext uri="{BB962C8B-B14F-4D97-AF65-F5344CB8AC3E}">
+        <p14:creationId xmlns:p14="http://schemas.microsoft.com/office/powerpoint/2010/main" val="4135448074"/>
+      </p:ext>
+    </p:extLst>
+  </p:cSld>
+  <p:clrMapOvr>
+    <a:masterClrMapping/>
+  </p:clrMapOvr>
+</p:sld>
+</file>
+
 <file path=ppt/theme/theme1.xml><?xml version="1.0" encoding="utf-8"?>
 <a:theme xmlns:a="http://schemas.openxmlformats.org/drawingml/2006/main" name="Office Theme">
   <a:themeElements>

</xml_diff>

<commit_message>
chap2: photon spectrometer calibration details.
</commit_message>
<xml_diff>
--- a/figures/chap2/chap 2 figures.pptx
+++ b/figures/chap2/chap 2 figures.pptx
@@ -4,6 +4,9 @@
   <p:sldMasterIdLst>
     <p:sldMasterId id="2147483648" r:id="rId1"/>
   </p:sldMasterIdLst>
+  <p:notesMasterIdLst>
+    <p:notesMasterId r:id="rId10"/>
+  </p:notesMasterIdLst>
   <p:sldIdLst>
     <p:sldId id="313" r:id="rId2"/>
     <p:sldId id="312" r:id="rId3"/>
@@ -11,6 +14,8 @@
     <p:sldId id="256" r:id="rId5"/>
     <p:sldId id="271" r:id="rId6"/>
     <p:sldId id="315" r:id="rId7"/>
+    <p:sldId id="316" r:id="rId8"/>
+    <p:sldId id="317" r:id="rId9"/>
   </p:sldIdLst>
   <p:sldSz cx="12192000" cy="6858000"/>
   <p:notesSz cx="7315200" cy="9601200"/>
@@ -115,6 +120,446 @@
     </p:ext>
   </p:extLst>
 </p:presentation>
+</file>
+
+<file path=ppt/notesMasters/notesMaster1.xml><?xml version="1.0" encoding="utf-8"?>
+<p:notesMaster xmlns:a="http://schemas.openxmlformats.org/drawingml/2006/main" xmlns:r="http://schemas.openxmlformats.org/officeDocument/2006/relationships" xmlns:p="http://schemas.openxmlformats.org/presentationml/2006/main">
+  <p:cSld>
+    <p:bg>
+      <p:bgRef idx="1001">
+        <a:schemeClr val="bg1"/>
+      </p:bgRef>
+    </p:bg>
+    <p:spTree>
+      <p:nvGrpSpPr>
+        <p:cNvPr id="1" name=""/>
+        <p:cNvGrpSpPr/>
+        <p:nvPr/>
+      </p:nvGrpSpPr>
+      <p:grpSpPr>
+        <a:xfrm>
+          <a:off x="0" y="0"/>
+          <a:ext cx="0" cy="0"/>
+          <a:chOff x="0" y="0"/>
+          <a:chExt cx="0" cy="0"/>
+        </a:xfrm>
+      </p:grpSpPr>
+      <p:sp>
+        <p:nvSpPr>
+          <p:cNvPr id="2" name="Header Placeholder 1"/>
+          <p:cNvSpPr>
+            <a:spLocks noGrp="1"/>
+          </p:cNvSpPr>
+          <p:nvPr>
+            <p:ph type="hdr" sz="quarter"/>
+          </p:nvPr>
+        </p:nvSpPr>
+        <p:spPr>
+          <a:xfrm>
+            <a:off x="0" y="0"/>
+            <a:ext cx="3170238" cy="481013"/>
+          </a:xfrm>
+          <a:prstGeom prst="rect">
+            <a:avLst/>
+          </a:prstGeom>
+        </p:spPr>
+        <p:txBody>
+          <a:bodyPr vert="horz" lIns="91440" tIns="45720" rIns="91440" bIns="45720" rtlCol="0"/>
+          <a:lstStyle>
+            <a:lvl1pPr algn="l">
+              <a:defRPr sz="1200"/>
+            </a:lvl1pPr>
+          </a:lstStyle>
+          <a:p>
+            <a:endParaRPr lang="en-US"/>
+          </a:p>
+        </p:txBody>
+      </p:sp>
+      <p:sp>
+        <p:nvSpPr>
+          <p:cNvPr id="3" name="Date Placeholder 2"/>
+          <p:cNvSpPr>
+            <a:spLocks noGrp="1"/>
+          </p:cNvSpPr>
+          <p:nvPr>
+            <p:ph type="dt" idx="1"/>
+          </p:nvPr>
+        </p:nvSpPr>
+        <p:spPr>
+          <a:xfrm>
+            <a:off x="4143375" y="0"/>
+            <a:ext cx="3170238" cy="481013"/>
+          </a:xfrm>
+          <a:prstGeom prst="rect">
+            <a:avLst/>
+          </a:prstGeom>
+        </p:spPr>
+        <p:txBody>
+          <a:bodyPr vert="horz" lIns="91440" tIns="45720" rIns="91440" bIns="45720" rtlCol="0"/>
+          <a:lstStyle>
+            <a:lvl1pPr algn="r">
+              <a:defRPr sz="1200"/>
+            </a:lvl1pPr>
+          </a:lstStyle>
+          <a:p>
+            <a:fld id="{45599496-F538-4EB7-8C96-81F06103CBD4}" type="datetimeFigureOut">
+              <a:rPr lang="en-US" smtClean="0"/>
+              <a:t>2/12/2020</a:t>
+            </a:fld>
+            <a:endParaRPr lang="en-US"/>
+          </a:p>
+        </p:txBody>
+      </p:sp>
+      <p:sp>
+        <p:nvSpPr>
+          <p:cNvPr id="4" name="Slide Image Placeholder 3"/>
+          <p:cNvSpPr>
+            <a:spLocks noGrp="1" noRot="1" noChangeAspect="1"/>
+          </p:cNvSpPr>
+          <p:nvPr>
+            <p:ph type="sldImg" idx="2"/>
+          </p:nvPr>
+        </p:nvSpPr>
+        <p:spPr>
+          <a:xfrm>
+            <a:off x="777875" y="1200150"/>
+            <a:ext cx="5759450" cy="3240088"/>
+          </a:xfrm>
+          <a:prstGeom prst="rect">
+            <a:avLst/>
+          </a:prstGeom>
+          <a:noFill/>
+          <a:ln w="12700">
+            <a:solidFill>
+              <a:prstClr val="black"/>
+            </a:solidFill>
+          </a:ln>
+        </p:spPr>
+        <p:txBody>
+          <a:bodyPr vert="horz" lIns="91440" tIns="45720" rIns="91440" bIns="45720" rtlCol="0" anchor="ctr"/>
+          <a:lstStyle/>
+          <a:p>
+            <a:endParaRPr lang="en-US"/>
+          </a:p>
+        </p:txBody>
+      </p:sp>
+      <p:sp>
+        <p:nvSpPr>
+          <p:cNvPr id="5" name="Notes Placeholder 4"/>
+          <p:cNvSpPr>
+            <a:spLocks noGrp="1"/>
+          </p:cNvSpPr>
+          <p:nvPr>
+            <p:ph type="body" sz="quarter" idx="3"/>
+          </p:nvPr>
+        </p:nvSpPr>
+        <p:spPr>
+          <a:xfrm>
+            <a:off x="731838" y="4621213"/>
+            <a:ext cx="5851525" cy="3779837"/>
+          </a:xfrm>
+          <a:prstGeom prst="rect">
+            <a:avLst/>
+          </a:prstGeom>
+        </p:spPr>
+        <p:txBody>
+          <a:bodyPr vert="horz" lIns="91440" tIns="45720" rIns="91440" bIns="45720" rtlCol="0"/>
+          <a:lstStyle/>
+          <a:p>
+            <a:pPr lvl="0"/>
+            <a:r>
+              <a:rPr lang="en-US"/>
+              <a:t>Click to edit Master text styles</a:t>
+            </a:r>
+          </a:p>
+          <a:p>
+            <a:pPr lvl="1"/>
+            <a:r>
+              <a:rPr lang="en-US"/>
+              <a:t>Second level</a:t>
+            </a:r>
+          </a:p>
+          <a:p>
+            <a:pPr lvl="2"/>
+            <a:r>
+              <a:rPr lang="en-US"/>
+              <a:t>Third level</a:t>
+            </a:r>
+          </a:p>
+          <a:p>
+            <a:pPr lvl="3"/>
+            <a:r>
+              <a:rPr lang="en-US"/>
+              <a:t>Fourth level</a:t>
+            </a:r>
+          </a:p>
+          <a:p>
+            <a:pPr lvl="4"/>
+            <a:r>
+              <a:rPr lang="en-US"/>
+              <a:t>Fifth level</a:t>
+            </a:r>
+          </a:p>
+        </p:txBody>
+      </p:sp>
+      <p:sp>
+        <p:nvSpPr>
+          <p:cNvPr id="6" name="Footer Placeholder 5"/>
+          <p:cNvSpPr>
+            <a:spLocks noGrp="1"/>
+          </p:cNvSpPr>
+          <p:nvPr>
+            <p:ph type="ftr" sz="quarter" idx="4"/>
+          </p:nvPr>
+        </p:nvSpPr>
+        <p:spPr>
+          <a:xfrm>
+            <a:off x="0" y="9120188"/>
+            <a:ext cx="3170238" cy="481012"/>
+          </a:xfrm>
+          <a:prstGeom prst="rect">
+            <a:avLst/>
+          </a:prstGeom>
+        </p:spPr>
+        <p:txBody>
+          <a:bodyPr vert="horz" lIns="91440" tIns="45720" rIns="91440" bIns="45720" rtlCol="0" anchor="b"/>
+          <a:lstStyle>
+            <a:lvl1pPr algn="l">
+              <a:defRPr sz="1200"/>
+            </a:lvl1pPr>
+          </a:lstStyle>
+          <a:p>
+            <a:endParaRPr lang="en-US"/>
+          </a:p>
+        </p:txBody>
+      </p:sp>
+      <p:sp>
+        <p:nvSpPr>
+          <p:cNvPr id="7" name="Slide Number Placeholder 6"/>
+          <p:cNvSpPr>
+            <a:spLocks noGrp="1"/>
+          </p:cNvSpPr>
+          <p:nvPr>
+            <p:ph type="sldNum" sz="quarter" idx="5"/>
+          </p:nvPr>
+        </p:nvSpPr>
+        <p:spPr>
+          <a:xfrm>
+            <a:off x="4143375" y="9120188"/>
+            <a:ext cx="3170238" cy="481012"/>
+          </a:xfrm>
+          <a:prstGeom prst="rect">
+            <a:avLst/>
+          </a:prstGeom>
+        </p:spPr>
+        <p:txBody>
+          <a:bodyPr vert="horz" lIns="91440" tIns="45720" rIns="91440" bIns="45720" rtlCol="0" anchor="b"/>
+          <a:lstStyle>
+            <a:lvl1pPr algn="r">
+              <a:defRPr sz="1200"/>
+            </a:lvl1pPr>
+          </a:lstStyle>
+          <a:p>
+            <a:fld id="{21C1E24E-1866-4788-B190-DCA7681C9D53}" type="slidenum">
+              <a:rPr lang="en-US" smtClean="0"/>
+              <a:t>‹#›</a:t>
+            </a:fld>
+            <a:endParaRPr lang="en-US"/>
+          </a:p>
+        </p:txBody>
+      </p:sp>
+    </p:spTree>
+    <p:extLst>
+      <p:ext uri="{BB962C8B-B14F-4D97-AF65-F5344CB8AC3E}">
+        <p14:creationId xmlns:p14="http://schemas.microsoft.com/office/powerpoint/2010/main" val="2068229886"/>
+      </p:ext>
+    </p:extLst>
+  </p:cSld>
+  <p:clrMap bg1="lt1" tx1="dk1" bg2="lt2" tx2="dk2" accent1="accent1" accent2="accent2" accent3="accent3" accent4="accent4" accent5="accent5" accent6="accent6" hlink="hlink" folHlink="folHlink"/>
+  <p:notesStyle>
+    <a:lvl1pPr marL="0" algn="l" defTabSz="914400" rtl="0" eaLnBrk="1" latinLnBrk="0" hangingPunct="1">
+      <a:defRPr sz="1200" kern="1200">
+        <a:solidFill>
+          <a:schemeClr val="tx1"/>
+        </a:solidFill>
+        <a:latin typeface="+mn-lt"/>
+        <a:ea typeface="+mn-ea"/>
+        <a:cs typeface="+mn-cs"/>
+      </a:defRPr>
+    </a:lvl1pPr>
+    <a:lvl2pPr marL="457200" algn="l" defTabSz="914400" rtl="0" eaLnBrk="1" latinLnBrk="0" hangingPunct="1">
+      <a:defRPr sz="1200" kern="1200">
+        <a:solidFill>
+          <a:schemeClr val="tx1"/>
+        </a:solidFill>
+        <a:latin typeface="+mn-lt"/>
+        <a:ea typeface="+mn-ea"/>
+        <a:cs typeface="+mn-cs"/>
+      </a:defRPr>
+    </a:lvl2pPr>
+    <a:lvl3pPr marL="914400" algn="l" defTabSz="914400" rtl="0" eaLnBrk="1" latinLnBrk="0" hangingPunct="1">
+      <a:defRPr sz="1200" kern="1200">
+        <a:solidFill>
+          <a:schemeClr val="tx1"/>
+        </a:solidFill>
+        <a:latin typeface="+mn-lt"/>
+        <a:ea typeface="+mn-ea"/>
+        <a:cs typeface="+mn-cs"/>
+      </a:defRPr>
+    </a:lvl3pPr>
+    <a:lvl4pPr marL="1371600" algn="l" defTabSz="914400" rtl="0" eaLnBrk="1" latinLnBrk="0" hangingPunct="1">
+      <a:defRPr sz="1200" kern="1200">
+        <a:solidFill>
+          <a:schemeClr val="tx1"/>
+        </a:solidFill>
+        <a:latin typeface="+mn-lt"/>
+        <a:ea typeface="+mn-ea"/>
+        <a:cs typeface="+mn-cs"/>
+      </a:defRPr>
+    </a:lvl4pPr>
+    <a:lvl5pPr marL="1828800" algn="l" defTabSz="914400" rtl="0" eaLnBrk="1" latinLnBrk="0" hangingPunct="1">
+      <a:defRPr sz="1200" kern="1200">
+        <a:solidFill>
+          <a:schemeClr val="tx1"/>
+        </a:solidFill>
+        <a:latin typeface="+mn-lt"/>
+        <a:ea typeface="+mn-ea"/>
+        <a:cs typeface="+mn-cs"/>
+      </a:defRPr>
+    </a:lvl5pPr>
+    <a:lvl6pPr marL="2286000" algn="l" defTabSz="914400" rtl="0" eaLnBrk="1" latinLnBrk="0" hangingPunct="1">
+      <a:defRPr sz="1200" kern="1200">
+        <a:solidFill>
+          <a:schemeClr val="tx1"/>
+        </a:solidFill>
+        <a:latin typeface="+mn-lt"/>
+        <a:ea typeface="+mn-ea"/>
+        <a:cs typeface="+mn-cs"/>
+      </a:defRPr>
+    </a:lvl6pPr>
+    <a:lvl7pPr marL="2743200" algn="l" defTabSz="914400" rtl="0" eaLnBrk="1" latinLnBrk="0" hangingPunct="1">
+      <a:defRPr sz="1200" kern="1200">
+        <a:solidFill>
+          <a:schemeClr val="tx1"/>
+        </a:solidFill>
+        <a:latin typeface="+mn-lt"/>
+        <a:ea typeface="+mn-ea"/>
+        <a:cs typeface="+mn-cs"/>
+      </a:defRPr>
+    </a:lvl7pPr>
+    <a:lvl8pPr marL="3200400" algn="l" defTabSz="914400" rtl="0" eaLnBrk="1" latinLnBrk="0" hangingPunct="1">
+      <a:defRPr sz="1200" kern="1200">
+        <a:solidFill>
+          <a:schemeClr val="tx1"/>
+        </a:solidFill>
+        <a:latin typeface="+mn-lt"/>
+        <a:ea typeface="+mn-ea"/>
+        <a:cs typeface="+mn-cs"/>
+      </a:defRPr>
+    </a:lvl8pPr>
+    <a:lvl9pPr marL="3657600" algn="l" defTabSz="914400" rtl="0" eaLnBrk="1" latinLnBrk="0" hangingPunct="1">
+      <a:defRPr sz="1200" kern="1200">
+        <a:solidFill>
+          <a:schemeClr val="tx1"/>
+        </a:solidFill>
+        <a:latin typeface="+mn-lt"/>
+        <a:ea typeface="+mn-ea"/>
+        <a:cs typeface="+mn-cs"/>
+      </a:defRPr>
+    </a:lvl9pPr>
+  </p:notesStyle>
+</p:notesMaster>
+</file>
+
+<file path=ppt/notesSlides/notesSlide1.xml><?xml version="1.0" encoding="utf-8"?>
+<p:notes xmlns:a="http://schemas.openxmlformats.org/drawingml/2006/main" xmlns:r="http://schemas.openxmlformats.org/officeDocument/2006/relationships" xmlns:p="http://schemas.openxmlformats.org/presentationml/2006/main">
+  <p:cSld>
+    <p:spTree>
+      <p:nvGrpSpPr>
+        <p:cNvPr id="1" name=""/>
+        <p:cNvGrpSpPr/>
+        <p:nvPr/>
+      </p:nvGrpSpPr>
+      <p:grpSpPr>
+        <a:xfrm>
+          <a:off x="0" y="0"/>
+          <a:ext cx="0" cy="0"/>
+          <a:chOff x="0" y="0"/>
+          <a:chExt cx="0" cy="0"/>
+        </a:xfrm>
+      </p:grpSpPr>
+      <p:sp>
+        <p:nvSpPr>
+          <p:cNvPr id="2" name="Slide Image Placeholder 1"/>
+          <p:cNvSpPr>
+            <a:spLocks noGrp="1" noRot="1" noChangeAspect="1"/>
+          </p:cNvSpPr>
+          <p:nvPr>
+            <p:ph type="sldImg"/>
+          </p:nvPr>
+        </p:nvSpPr>
+        <p:spPr/>
+      </p:sp>
+      <p:sp>
+        <p:nvSpPr>
+          <p:cNvPr id="3" name="Notes Placeholder 2"/>
+          <p:cNvSpPr>
+            <a:spLocks noGrp="1"/>
+          </p:cNvSpPr>
+          <p:nvPr>
+            <p:ph type="body" idx="1"/>
+          </p:nvPr>
+        </p:nvSpPr>
+        <p:spPr/>
+        <p:txBody>
+          <a:bodyPr/>
+          <a:lstStyle/>
+          <a:p>
+            <a:r>
+              <a:rPr lang="en-US" dirty="0" err="1"/>
+              <a:t>Erice</a:t>
+            </a:r>
+            <a:r>
+              <a:rPr lang="en-US" dirty="0"/>
+              <a:t> 2017 poster</a:t>
+            </a:r>
+          </a:p>
+        </p:txBody>
+      </p:sp>
+      <p:sp>
+        <p:nvSpPr>
+          <p:cNvPr id="4" name="Slide Number Placeholder 3"/>
+          <p:cNvSpPr>
+            <a:spLocks noGrp="1"/>
+          </p:cNvSpPr>
+          <p:nvPr>
+            <p:ph type="sldNum" sz="quarter" idx="5"/>
+          </p:nvPr>
+        </p:nvSpPr>
+        <p:spPr/>
+        <p:txBody>
+          <a:bodyPr/>
+          <a:lstStyle/>
+          <a:p>
+            <a:fld id="{21C1E24E-1866-4788-B190-DCA7681C9D53}" type="slidenum">
+              <a:rPr lang="en-US" smtClean="0"/>
+              <a:t>8</a:t>
+            </a:fld>
+            <a:endParaRPr lang="en-US"/>
+          </a:p>
+        </p:txBody>
+      </p:sp>
+    </p:spTree>
+    <p:extLst>
+      <p:ext uri="{BB962C8B-B14F-4D97-AF65-F5344CB8AC3E}">
+        <p14:creationId xmlns:p14="http://schemas.microsoft.com/office/powerpoint/2010/main" val="2040000070"/>
+      </p:ext>
+    </p:extLst>
+  </p:cSld>
+  <p:clrMapOvr>
+    <a:masterClrMapping/>
+  </p:clrMapOvr>
+</p:notes>
 </file>
 
 <file path=ppt/slideLayouts/slideLayout1.xml><?xml version="1.0" encoding="utf-8"?>
@@ -264,7 +709,7 @@
           <a:p>
             <a:fld id="{AA564F96-03D1-4027-9EC9-68B19AA58132}" type="datetimeFigureOut">
               <a:rPr lang="en-US" smtClean="0"/>
-              <a:t>1/17/2020</a:t>
+              <a:t>2/12/2020</a:t>
             </a:fld>
             <a:endParaRPr lang="en-US"/>
           </a:p>
@@ -462,7 +907,7 @@
           <a:p>
             <a:fld id="{AA564F96-03D1-4027-9EC9-68B19AA58132}" type="datetimeFigureOut">
               <a:rPr lang="en-US" smtClean="0"/>
-              <a:t>1/17/2020</a:t>
+              <a:t>2/12/2020</a:t>
             </a:fld>
             <a:endParaRPr lang="en-US"/>
           </a:p>
@@ -670,7 +1115,7 @@
           <a:p>
             <a:fld id="{AA564F96-03D1-4027-9EC9-68B19AA58132}" type="datetimeFigureOut">
               <a:rPr lang="en-US" smtClean="0"/>
-              <a:t>1/17/2020</a:t>
+              <a:t>2/12/2020</a:t>
             </a:fld>
             <a:endParaRPr lang="en-US"/>
           </a:p>
@@ -868,7 +1313,7 @@
           <a:p>
             <a:fld id="{AA564F96-03D1-4027-9EC9-68B19AA58132}" type="datetimeFigureOut">
               <a:rPr lang="en-US" smtClean="0"/>
-              <a:t>1/17/2020</a:t>
+              <a:t>2/12/2020</a:t>
             </a:fld>
             <a:endParaRPr lang="en-US"/>
           </a:p>
@@ -1143,7 +1588,7 @@
           <a:p>
             <a:fld id="{AA564F96-03D1-4027-9EC9-68B19AA58132}" type="datetimeFigureOut">
               <a:rPr lang="en-US" smtClean="0"/>
-              <a:t>1/17/2020</a:t>
+              <a:t>2/12/2020</a:t>
             </a:fld>
             <a:endParaRPr lang="en-US"/>
           </a:p>
@@ -1408,7 +1853,7 @@
           <a:p>
             <a:fld id="{AA564F96-03D1-4027-9EC9-68B19AA58132}" type="datetimeFigureOut">
               <a:rPr lang="en-US" smtClean="0"/>
-              <a:t>1/17/2020</a:t>
+              <a:t>2/12/2020</a:t>
             </a:fld>
             <a:endParaRPr lang="en-US"/>
           </a:p>
@@ -1820,7 +2265,7 @@
           <a:p>
             <a:fld id="{AA564F96-03D1-4027-9EC9-68B19AA58132}" type="datetimeFigureOut">
               <a:rPr lang="en-US" smtClean="0"/>
-              <a:t>1/17/2020</a:t>
+              <a:t>2/12/2020</a:t>
             </a:fld>
             <a:endParaRPr lang="en-US"/>
           </a:p>
@@ -1961,7 +2406,7 @@
           <a:p>
             <a:fld id="{AA564F96-03D1-4027-9EC9-68B19AA58132}" type="datetimeFigureOut">
               <a:rPr lang="en-US" smtClean="0"/>
-              <a:t>1/17/2020</a:t>
+              <a:t>2/12/2020</a:t>
             </a:fld>
             <a:endParaRPr lang="en-US"/>
           </a:p>
@@ -2074,7 +2519,7 @@
           <a:p>
             <a:fld id="{AA564F96-03D1-4027-9EC9-68B19AA58132}" type="datetimeFigureOut">
               <a:rPr lang="en-US" smtClean="0"/>
-              <a:t>1/17/2020</a:t>
+              <a:t>2/12/2020</a:t>
             </a:fld>
             <a:endParaRPr lang="en-US"/>
           </a:p>
@@ -2385,7 +2830,7 @@
           <a:p>
             <a:fld id="{AA564F96-03D1-4027-9EC9-68B19AA58132}" type="datetimeFigureOut">
               <a:rPr lang="en-US" smtClean="0"/>
-              <a:t>1/17/2020</a:t>
+              <a:t>2/12/2020</a:t>
             </a:fld>
             <a:endParaRPr lang="en-US"/>
           </a:p>
@@ -2673,7 +3118,7 @@
           <a:p>
             <a:fld id="{AA564F96-03D1-4027-9EC9-68B19AA58132}" type="datetimeFigureOut">
               <a:rPr lang="en-US" smtClean="0"/>
-              <a:t>1/17/2020</a:t>
+              <a:t>2/12/2020</a:t>
             </a:fld>
             <a:endParaRPr lang="en-US"/>
           </a:p>
@@ -2914,7 +3359,7 @@
           <a:p>
             <a:fld id="{AA564F96-03D1-4027-9EC9-68B19AA58132}" type="datetimeFigureOut">
               <a:rPr lang="en-US" smtClean="0"/>
-              <a:t>1/17/2020</a:t>
+              <a:t>2/12/2020</a:t>
             </a:fld>
             <a:endParaRPr lang="en-US"/>
           </a:p>
@@ -12878,8 +13323,8 @@
             </a:prstGeom>
           </p:spPr>
         </p:pic>
-        <mc:AlternateContent xmlns:mc="http://schemas.openxmlformats.org/markup-compatibility/2006">
-          <mc:Choice xmlns:a14="http://schemas.microsoft.com/office/drawing/2010/main" Requires="a14">
+        <mc:AlternateContent xmlns:mc="http://schemas.openxmlformats.org/markup-compatibility/2006" xmlns:a14="http://schemas.microsoft.com/office/drawing/2010/main">
+          <mc:Choice Requires="a14">
             <p:sp>
               <p:nvSpPr>
                 <p:cNvPr id="5" name="TextBox 4">
@@ -12910,6 +13355,7 @@
                 </a:bodyPr>
                 <a:lstStyle/>
                 <a:p>
+                  <a:pPr/>
                   <a14:m>
                     <m:oMathPara xmlns:m="http://schemas.openxmlformats.org/officeDocument/2006/math">
                       <m:oMathParaPr>
@@ -12949,7 +13395,7 @@
               </p:txBody>
             </p:sp>
           </mc:Choice>
-          <mc:Fallback>
+          <mc:Fallback xmlns="">
             <p:sp>
               <p:nvSpPr>
                 <p:cNvPr id="5" name="TextBox 4">
@@ -12994,8 +13440,8 @@
             </p:sp>
           </mc:Fallback>
         </mc:AlternateContent>
-        <mc:AlternateContent xmlns:mc="http://schemas.openxmlformats.org/markup-compatibility/2006">
-          <mc:Choice xmlns:a14="http://schemas.microsoft.com/office/drawing/2010/main" Requires="a14">
+        <mc:AlternateContent xmlns:mc="http://schemas.openxmlformats.org/markup-compatibility/2006" xmlns:a14="http://schemas.microsoft.com/office/drawing/2010/main">
+          <mc:Choice Requires="a14">
             <p:sp>
               <p:nvSpPr>
                 <p:cNvPr id="6" name="TextBox 5">
@@ -13024,6 +13470,7 @@
                 </a:bodyPr>
                 <a:lstStyle/>
                 <a:p>
+                  <a:pPr/>
                   <a14:m>
                     <m:oMathPara xmlns:m="http://schemas.openxmlformats.org/officeDocument/2006/math">
                       <m:oMathParaPr>
@@ -13063,7 +13510,7 @@
               </p:txBody>
             </p:sp>
           </mc:Choice>
-          <mc:Fallback>
+          <mc:Fallback xmlns="">
             <p:sp>
               <p:nvSpPr>
                 <p:cNvPr id="6" name="TextBox 5">
@@ -13264,8 +13711,8 @@
             </a:p>
           </p:txBody>
         </p:sp>
-        <mc:AlternateContent xmlns:mc="http://schemas.openxmlformats.org/markup-compatibility/2006">
-          <mc:Choice xmlns:a14="http://schemas.microsoft.com/office/drawing/2010/main" Requires="a14">
+        <mc:AlternateContent xmlns:mc="http://schemas.openxmlformats.org/markup-compatibility/2006" xmlns:a14="http://schemas.microsoft.com/office/drawing/2010/main">
+          <mc:Choice Requires="a14">
             <p:sp>
               <p:nvSpPr>
                 <p:cNvPr id="7" name="TextBox 6">
@@ -13294,6 +13741,7 @@
                 </a:bodyPr>
                 <a:lstStyle/>
                 <a:p>
+                  <a:pPr/>
                   <a14:m>
                     <m:oMathPara xmlns:m="http://schemas.openxmlformats.org/officeDocument/2006/math">
                       <m:oMathParaPr>
@@ -13345,7 +13793,7 @@
               </p:txBody>
             </p:sp>
           </mc:Choice>
-          <mc:Fallback>
+          <mc:Fallback xmlns="">
             <p:sp>
               <p:nvSpPr>
                 <p:cNvPr id="7" name="TextBox 6">
@@ -13390,8 +13838,8 @@
             </p:sp>
           </mc:Fallback>
         </mc:AlternateContent>
-        <mc:AlternateContent xmlns:mc="http://schemas.openxmlformats.org/markup-compatibility/2006">
-          <mc:Choice xmlns:a14="http://schemas.microsoft.com/office/drawing/2010/main" Requires="a14">
+        <mc:AlternateContent xmlns:mc="http://schemas.openxmlformats.org/markup-compatibility/2006" xmlns:a14="http://schemas.microsoft.com/office/drawing/2010/main">
+          <mc:Choice Requires="a14">
             <p:sp>
               <p:nvSpPr>
                 <p:cNvPr id="13" name="TextBox 12">
@@ -13420,6 +13868,7 @@
                 </a:bodyPr>
                 <a:lstStyle/>
                 <a:p>
+                  <a:pPr/>
                   <a14:m>
                     <m:oMathPara xmlns:m="http://schemas.openxmlformats.org/officeDocument/2006/math">
                       <m:oMathParaPr>
@@ -13471,7 +13920,7 @@
               </p:txBody>
             </p:sp>
           </mc:Choice>
-          <mc:Fallback>
+          <mc:Fallback xmlns="">
             <p:sp>
               <p:nvSpPr>
                 <p:cNvPr id="13" name="TextBox 12">
@@ -13521,6 +13970,3811 @@
     <p:extLst>
       <p:ext uri="{BB962C8B-B14F-4D97-AF65-F5344CB8AC3E}">
         <p14:creationId xmlns:p14="http://schemas.microsoft.com/office/powerpoint/2010/main" val="4135448074"/>
+      </p:ext>
+    </p:extLst>
+  </p:cSld>
+  <p:clrMapOvr>
+    <a:masterClrMapping/>
+  </p:clrMapOvr>
+</p:sld>
+</file>
+
+<file path=ppt/slides/slide7.xml><?xml version="1.0" encoding="utf-8"?>
+<p:sld xmlns:a="http://schemas.openxmlformats.org/drawingml/2006/main" xmlns:r="http://schemas.openxmlformats.org/officeDocument/2006/relationships" xmlns:p="http://schemas.openxmlformats.org/presentationml/2006/main">
+  <p:cSld>
+    <p:spTree>
+      <p:nvGrpSpPr>
+        <p:cNvPr id="1" name=""/>
+        <p:cNvGrpSpPr/>
+        <p:nvPr/>
+      </p:nvGrpSpPr>
+      <p:grpSpPr>
+        <a:xfrm>
+          <a:off x="0" y="0"/>
+          <a:ext cx="0" cy="0"/>
+          <a:chOff x="0" y="0"/>
+          <a:chExt cx="0" cy="0"/>
+        </a:xfrm>
+      </p:grpSpPr>
+      <p:grpSp>
+        <p:nvGrpSpPr>
+          <p:cNvPr id="2" name="Group 1">
+            <a:extLst>
+              <a:ext uri="{FF2B5EF4-FFF2-40B4-BE49-F238E27FC236}">
+                <a16:creationId xmlns:a16="http://schemas.microsoft.com/office/drawing/2014/main" id="{B8A0C9E7-9813-4A2E-BA7D-FA24EF95E659}"/>
+              </a:ext>
+            </a:extLst>
+          </p:cNvPr>
+          <p:cNvGrpSpPr>
+            <a:grpSpLocks noChangeAspect="1"/>
+          </p:cNvGrpSpPr>
+          <p:nvPr/>
+        </p:nvGrpSpPr>
+        <p:grpSpPr>
+          <a:xfrm>
+            <a:off x="5071789" y="1021080"/>
+            <a:ext cx="4390057" cy="2980868"/>
+            <a:chOff x="5035418" y="8142854"/>
+            <a:chExt cx="5853408" cy="3974491"/>
+          </a:xfrm>
+        </p:grpSpPr>
+        <p:grpSp>
+          <p:nvGrpSpPr>
+            <p:cNvPr id="3" name="Group 2">
+              <a:extLst>
+                <a:ext uri="{FF2B5EF4-FFF2-40B4-BE49-F238E27FC236}">
+                  <a16:creationId xmlns:a16="http://schemas.microsoft.com/office/drawing/2014/main" id="{BC97F2C4-5C67-41E4-BFBA-920006CD9E67}"/>
+                </a:ext>
+              </a:extLst>
+            </p:cNvPr>
+            <p:cNvGrpSpPr/>
+            <p:nvPr/>
+          </p:nvGrpSpPr>
+          <p:grpSpPr>
+            <a:xfrm>
+              <a:off x="5317511" y="8142854"/>
+              <a:ext cx="5188705" cy="2884522"/>
+              <a:chOff x="5544172" y="4889283"/>
+              <a:chExt cx="5188705" cy="2884522"/>
+            </a:xfrm>
+          </p:grpSpPr>
+          <p:grpSp>
+            <p:nvGrpSpPr>
+              <p:cNvPr id="32" name="Group 31">
+                <a:extLst>
+                  <a:ext uri="{FF2B5EF4-FFF2-40B4-BE49-F238E27FC236}">
+                    <a16:creationId xmlns:a16="http://schemas.microsoft.com/office/drawing/2014/main" id="{C612351B-625C-407D-A7D9-BEEE5617A3EE}"/>
+                  </a:ext>
+                </a:extLst>
+              </p:cNvPr>
+              <p:cNvGrpSpPr/>
+              <p:nvPr/>
+            </p:nvGrpSpPr>
+            <p:grpSpPr>
+              <a:xfrm>
+                <a:off x="6275305" y="7162800"/>
+                <a:ext cx="2941336" cy="441992"/>
+                <a:chOff x="4748321" y="4287570"/>
+                <a:chExt cx="2299391" cy="553207"/>
+              </a:xfrm>
+            </p:grpSpPr>
+            <p:cxnSp>
+              <p:nvCxnSpPr>
+                <p:cNvPr id="49" name="Straight Connector 48">
+                  <a:extLst>
+                    <a:ext uri="{FF2B5EF4-FFF2-40B4-BE49-F238E27FC236}">
+                      <a16:creationId xmlns:a16="http://schemas.microsoft.com/office/drawing/2014/main" id="{B6DCF856-A0D9-478A-94AB-C5DCEA94FF7D}"/>
+                    </a:ext>
+                  </a:extLst>
+                </p:cNvPr>
+                <p:cNvCxnSpPr/>
+                <p:nvPr/>
+              </p:nvCxnSpPr>
+              <p:spPr>
+                <a:xfrm>
+                  <a:off x="5021543" y="4287570"/>
+                  <a:ext cx="0" cy="548640"/>
+                </a:xfrm>
+                <a:prstGeom prst="line">
+                  <a:avLst/>
+                </a:prstGeom>
+                <a:ln w="38100">
+                  <a:solidFill>
+                    <a:srgbClr val="FF0000"/>
+                  </a:solidFill>
+                </a:ln>
+              </p:spPr>
+              <p:style>
+                <a:lnRef idx="1">
+                  <a:schemeClr val="accent1"/>
+                </a:lnRef>
+                <a:fillRef idx="0">
+                  <a:schemeClr val="accent1"/>
+                </a:fillRef>
+                <a:effectRef idx="0">
+                  <a:schemeClr val="accent1"/>
+                </a:effectRef>
+                <a:fontRef idx="minor">
+                  <a:schemeClr val="tx1"/>
+                </a:fontRef>
+              </p:style>
+            </p:cxnSp>
+            <p:cxnSp>
+              <p:nvCxnSpPr>
+                <p:cNvPr id="50" name="Straight Connector 49">
+                  <a:extLst>
+                    <a:ext uri="{FF2B5EF4-FFF2-40B4-BE49-F238E27FC236}">
+                      <a16:creationId xmlns:a16="http://schemas.microsoft.com/office/drawing/2014/main" id="{A05EEA45-497E-4C7F-A704-03472CBB020D}"/>
+                    </a:ext>
+                  </a:extLst>
+                </p:cNvPr>
+                <p:cNvCxnSpPr/>
+                <p:nvPr/>
+              </p:nvCxnSpPr>
+              <p:spPr>
+                <a:xfrm>
+                  <a:off x="5499490" y="4292137"/>
+                  <a:ext cx="0" cy="548640"/>
+                </a:xfrm>
+                <a:prstGeom prst="line">
+                  <a:avLst/>
+                </a:prstGeom>
+                <a:ln>
+                  <a:solidFill>
+                    <a:srgbClr val="FF0000"/>
+                  </a:solidFill>
+                </a:ln>
+              </p:spPr>
+              <p:style>
+                <a:lnRef idx="1">
+                  <a:schemeClr val="accent1"/>
+                </a:lnRef>
+                <a:fillRef idx="0">
+                  <a:schemeClr val="accent1"/>
+                </a:fillRef>
+                <a:effectRef idx="0">
+                  <a:schemeClr val="accent1"/>
+                </a:effectRef>
+                <a:fontRef idx="minor">
+                  <a:schemeClr val="tx1"/>
+                </a:fontRef>
+              </p:style>
+            </p:cxnSp>
+            <p:cxnSp>
+              <p:nvCxnSpPr>
+                <p:cNvPr id="51" name="Straight Connector 50">
+                  <a:extLst>
+                    <a:ext uri="{FF2B5EF4-FFF2-40B4-BE49-F238E27FC236}">
+                      <a16:creationId xmlns:a16="http://schemas.microsoft.com/office/drawing/2014/main" id="{8F88CC90-CCE9-437A-A18E-D227049EA1A4}"/>
+                    </a:ext>
+                  </a:extLst>
+                </p:cNvPr>
+                <p:cNvCxnSpPr/>
+                <p:nvPr/>
+              </p:nvCxnSpPr>
+              <p:spPr>
+                <a:xfrm>
+                  <a:off x="5912005" y="4292137"/>
+                  <a:ext cx="0" cy="548640"/>
+                </a:xfrm>
+                <a:prstGeom prst="line">
+                  <a:avLst/>
+                </a:prstGeom>
+                <a:ln>
+                  <a:solidFill>
+                    <a:srgbClr val="FF0000"/>
+                  </a:solidFill>
+                </a:ln>
+              </p:spPr>
+              <p:style>
+                <a:lnRef idx="1">
+                  <a:schemeClr val="accent1"/>
+                </a:lnRef>
+                <a:fillRef idx="0">
+                  <a:schemeClr val="accent1"/>
+                </a:fillRef>
+                <a:effectRef idx="0">
+                  <a:schemeClr val="accent1"/>
+                </a:effectRef>
+                <a:fontRef idx="minor">
+                  <a:schemeClr val="tx1"/>
+                </a:fontRef>
+              </p:style>
+            </p:cxnSp>
+            <p:cxnSp>
+              <p:nvCxnSpPr>
+                <p:cNvPr id="52" name="Straight Connector 51">
+                  <a:extLst>
+                    <a:ext uri="{FF2B5EF4-FFF2-40B4-BE49-F238E27FC236}">
+                      <a16:creationId xmlns:a16="http://schemas.microsoft.com/office/drawing/2014/main" id="{563A4EEB-4259-4288-9DEE-5CBCDCF12EE0}"/>
+                    </a:ext>
+                  </a:extLst>
+                </p:cNvPr>
+                <p:cNvCxnSpPr/>
+                <p:nvPr/>
+              </p:nvCxnSpPr>
+              <p:spPr>
+                <a:xfrm>
+                  <a:off x="6315664" y="4292137"/>
+                  <a:ext cx="0" cy="548640"/>
+                </a:xfrm>
+                <a:prstGeom prst="line">
+                  <a:avLst/>
+                </a:prstGeom>
+                <a:ln w="6350">
+                  <a:solidFill>
+                    <a:srgbClr val="FF0000"/>
+                  </a:solidFill>
+                </a:ln>
+              </p:spPr>
+              <p:style>
+                <a:lnRef idx="1">
+                  <a:schemeClr val="accent1"/>
+                </a:lnRef>
+                <a:fillRef idx="0">
+                  <a:schemeClr val="accent1"/>
+                </a:fillRef>
+                <a:effectRef idx="0">
+                  <a:schemeClr val="accent1"/>
+                </a:effectRef>
+                <a:fontRef idx="minor">
+                  <a:schemeClr val="tx1"/>
+                </a:fontRef>
+              </p:style>
+            </p:cxnSp>
+            <p:cxnSp>
+              <p:nvCxnSpPr>
+                <p:cNvPr id="53" name="Straight Connector 52">
+                  <a:extLst>
+                    <a:ext uri="{FF2B5EF4-FFF2-40B4-BE49-F238E27FC236}">
+                      <a16:creationId xmlns:a16="http://schemas.microsoft.com/office/drawing/2014/main" id="{C87C6B88-E390-45A4-885F-01881173062E}"/>
+                    </a:ext>
+                  </a:extLst>
+                </p:cNvPr>
+                <p:cNvCxnSpPr/>
+                <p:nvPr/>
+              </p:nvCxnSpPr>
+              <p:spPr>
+                <a:xfrm>
+                  <a:off x="6734821" y="4292132"/>
+                  <a:ext cx="0" cy="548639"/>
+                </a:xfrm>
+                <a:prstGeom prst="line">
+                  <a:avLst/>
+                </a:prstGeom>
+                <a:ln w="6350">
+                  <a:solidFill>
+                    <a:srgbClr val="FF0000"/>
+                  </a:solidFill>
+                </a:ln>
+              </p:spPr>
+              <p:style>
+                <a:lnRef idx="1">
+                  <a:schemeClr val="accent1"/>
+                </a:lnRef>
+                <a:fillRef idx="0">
+                  <a:schemeClr val="accent1"/>
+                </a:fillRef>
+                <a:effectRef idx="0">
+                  <a:schemeClr val="accent1"/>
+                </a:effectRef>
+                <a:fontRef idx="minor">
+                  <a:schemeClr val="tx1"/>
+                </a:fontRef>
+              </p:style>
+            </p:cxnSp>
+            <p:cxnSp>
+              <p:nvCxnSpPr>
+                <p:cNvPr id="54" name="Straight Connector 53">
+                  <a:extLst>
+                    <a:ext uri="{FF2B5EF4-FFF2-40B4-BE49-F238E27FC236}">
+                      <a16:creationId xmlns:a16="http://schemas.microsoft.com/office/drawing/2014/main" id="{08BC9DA3-381F-41BD-B1B0-EEF7B9992240}"/>
+                    </a:ext>
+                  </a:extLst>
+                </p:cNvPr>
+                <p:cNvCxnSpPr/>
+                <p:nvPr/>
+              </p:nvCxnSpPr>
+              <p:spPr>
+                <a:xfrm>
+                  <a:off x="7047712" y="4292135"/>
+                  <a:ext cx="0" cy="548640"/>
+                </a:xfrm>
+                <a:prstGeom prst="line">
+                  <a:avLst/>
+                </a:prstGeom>
+                <a:ln>
+                  <a:solidFill>
+                    <a:srgbClr val="FF0000"/>
+                  </a:solidFill>
+                </a:ln>
+              </p:spPr>
+              <p:style>
+                <a:lnRef idx="1">
+                  <a:schemeClr val="accent1"/>
+                </a:lnRef>
+                <a:fillRef idx="0">
+                  <a:schemeClr val="accent1"/>
+                </a:fillRef>
+                <a:effectRef idx="0">
+                  <a:schemeClr val="accent1"/>
+                </a:effectRef>
+                <a:fontRef idx="minor">
+                  <a:schemeClr val="tx1"/>
+                </a:fontRef>
+              </p:style>
+            </p:cxnSp>
+            <p:cxnSp>
+              <p:nvCxnSpPr>
+                <p:cNvPr id="55" name="Straight Connector 54">
+                  <a:extLst>
+                    <a:ext uri="{FF2B5EF4-FFF2-40B4-BE49-F238E27FC236}">
+                      <a16:creationId xmlns:a16="http://schemas.microsoft.com/office/drawing/2014/main" id="{3DCD232C-7EB5-4FBC-8A4C-609E7EC97BBA}"/>
+                    </a:ext>
+                  </a:extLst>
+                </p:cNvPr>
+                <p:cNvCxnSpPr/>
+                <p:nvPr/>
+              </p:nvCxnSpPr>
+              <p:spPr>
+                <a:xfrm>
+                  <a:off x="4748321" y="4287570"/>
+                  <a:ext cx="0" cy="548640"/>
+                </a:xfrm>
+                <a:prstGeom prst="line">
+                  <a:avLst/>
+                </a:prstGeom>
+                <a:ln>
+                  <a:solidFill>
+                    <a:srgbClr val="FF0000"/>
+                  </a:solidFill>
+                </a:ln>
+              </p:spPr>
+              <p:style>
+                <a:lnRef idx="1">
+                  <a:schemeClr val="accent1"/>
+                </a:lnRef>
+                <a:fillRef idx="0">
+                  <a:schemeClr val="accent1"/>
+                </a:fillRef>
+                <a:effectRef idx="0">
+                  <a:schemeClr val="accent1"/>
+                </a:effectRef>
+                <a:fontRef idx="minor">
+                  <a:schemeClr val="tx1"/>
+                </a:fontRef>
+              </p:style>
+            </p:cxnSp>
+          </p:grpSp>
+          <mc:AlternateContent xmlns:mc="http://schemas.openxmlformats.org/markup-compatibility/2006" xmlns:a14="http://schemas.microsoft.com/office/drawing/2010/main">
+            <mc:Choice Requires="a14">
+              <p:sp>
+                <p:nvSpPr>
+                  <p:cNvPr id="33" name="TextBox 32">
+                    <a:extLst>
+                      <a:ext uri="{FF2B5EF4-FFF2-40B4-BE49-F238E27FC236}">
+                        <a16:creationId xmlns:a16="http://schemas.microsoft.com/office/drawing/2014/main" id="{3D63B29D-35A8-48FE-B4D0-4E3D333ACDCB}"/>
+                      </a:ext>
+                    </a:extLst>
+                  </p:cNvPr>
+                  <p:cNvSpPr txBox="1"/>
+                  <p:nvPr/>
+                </p:nvSpPr>
+                <p:spPr>
+                  <a:xfrm rot="16200000">
+                    <a:off x="6082180" y="6442528"/>
+                    <a:ext cx="1078460" cy="410369"/>
+                  </a:xfrm>
+                  <a:prstGeom prst="rect">
+                    <a:avLst/>
+                  </a:prstGeom>
+                  <a:noFill/>
+                </p:spPr>
+                <p:txBody>
+                  <a:bodyPr wrap="square" rtlCol="0">
+                    <a:spAutoFit/>
+                  </a:bodyPr>
+                  <a:lstStyle/>
+                  <a:p>
+                    <a:pPr/>
+                    <a14:m>
+                      <m:oMathPara xmlns:m="http://schemas.openxmlformats.org/officeDocument/2006/math">
+                        <m:oMathParaPr>
+                          <m:jc m:val="centerGroup"/>
+                        </m:oMathParaPr>
+                        <m:oMath xmlns:m="http://schemas.openxmlformats.org/officeDocument/2006/math">
+                          <m:r>
+                            <a:rPr lang="en-US" sz="1400" i="1" dirty="0" smtClean="0">
+                              <a:solidFill>
+                                <a:srgbClr val="FF0000"/>
+                              </a:solidFill>
+                              <a:latin typeface="Cambria Math" panose="02040503050406030204" pitchFamily="18" charset="0"/>
+                              <a:cs typeface="Arial" panose="020B0604020202020204" pitchFamily="34" charset="0"/>
+                            </a:rPr>
+                            <m:t>4</m:t>
+                          </m:r>
+                          <m:r>
+                            <a:rPr lang="en-US" sz="1400" i="1" dirty="0" smtClean="0">
+                              <a:solidFill>
+                                <a:srgbClr val="FF0000"/>
+                              </a:solidFill>
+                              <a:latin typeface="Cambria Math" panose="02040503050406030204" pitchFamily="18" charset="0"/>
+                              <a:cs typeface="Arial" panose="020B0604020202020204" pitchFamily="34" charset="0"/>
+                            </a:rPr>
+                            <m:t>𝑞</m:t>
+                          </m:r>
+                          <m:r>
+                            <a:rPr lang="en-US" sz="1400" i="1" dirty="0" smtClean="0">
+                              <a:solidFill>
+                                <a:srgbClr val="FF0000"/>
+                              </a:solidFill>
+                              <a:latin typeface="Cambria Math" panose="02040503050406030204" pitchFamily="18" charset="0"/>
+                              <a:cs typeface="Arial" panose="020B0604020202020204" pitchFamily="34" charset="0"/>
+                            </a:rPr>
+                            <m:t>+1</m:t>
+                          </m:r>
+                        </m:oMath>
+                      </m:oMathPara>
+                    </a14:m>
+                    <a:endParaRPr lang="en-US" sz="1400" dirty="0">
+                      <a:solidFill>
+                        <a:srgbClr val="FF0000"/>
+                      </a:solidFill>
+                      <a:latin typeface="Arial" panose="020B0604020202020204" pitchFamily="34" charset="0"/>
+                      <a:cs typeface="Arial" panose="020B0604020202020204" pitchFamily="34" charset="0"/>
+                    </a:endParaRPr>
+                  </a:p>
+                </p:txBody>
+              </p:sp>
+            </mc:Choice>
+            <mc:Fallback xmlns="">
+              <p:sp>
+                <p:nvSpPr>
+                  <p:cNvPr id="261" name="TextBox 260"/>
+                  <p:cNvSpPr txBox="1">
+                    <a:spLocks noRot="1" noChangeAspect="1" noMove="1" noResize="1" noEditPoints="1" noAdjustHandles="1" noChangeArrowheads="1" noChangeShapeType="1" noTextEdit="1"/>
+                  </p:cNvSpPr>
+                  <p:nvPr/>
+                </p:nvSpPr>
+                <p:spPr>
+                  <a:xfrm rot="16200000">
+                    <a:off x="6082180" y="6442528"/>
+                    <a:ext cx="1078460" cy="410369"/>
+                  </a:xfrm>
+                  <a:prstGeom prst="rect">
+                    <a:avLst/>
+                  </a:prstGeom>
+                  <a:blipFill rotWithShape="0">
+                    <a:blip r:embed="rId20"/>
+                    <a:stretch>
+                      <a:fillRect r="-8000"/>
+                    </a:stretch>
+                  </a:blipFill>
+                </p:spPr>
+                <p:txBody>
+                  <a:bodyPr/>
+                  <a:lstStyle/>
+                  <a:p>
+                    <a:r>
+                      <a:rPr lang="en-US">
+                        <a:noFill/>
+                      </a:rPr>
+                      <a:t> </a:t>
+                    </a:r>
+                  </a:p>
+                </p:txBody>
+              </p:sp>
+            </mc:Fallback>
+          </mc:AlternateContent>
+          <p:grpSp>
+            <p:nvGrpSpPr>
+              <p:cNvPr id="34" name="Group 33">
+                <a:extLst>
+                  <a:ext uri="{FF2B5EF4-FFF2-40B4-BE49-F238E27FC236}">
+                    <a16:creationId xmlns:a16="http://schemas.microsoft.com/office/drawing/2014/main" id="{82A6D16F-764B-457D-8400-8E1F3D21760D}"/>
+                  </a:ext>
+                </a:extLst>
+              </p:cNvPr>
+              <p:cNvGrpSpPr/>
+              <p:nvPr/>
+            </p:nvGrpSpPr>
+            <p:grpSpPr>
+              <a:xfrm>
+                <a:off x="5544172" y="4889283"/>
+                <a:ext cx="5188705" cy="2884522"/>
+                <a:chOff x="4187367" y="486135"/>
+                <a:chExt cx="6494300" cy="3610337"/>
+              </a:xfrm>
+            </p:grpSpPr>
+            <p:grpSp>
+              <p:nvGrpSpPr>
+                <p:cNvPr id="35" name="Group 34">
+                  <a:extLst>
+                    <a:ext uri="{FF2B5EF4-FFF2-40B4-BE49-F238E27FC236}">
+                      <a16:creationId xmlns:a16="http://schemas.microsoft.com/office/drawing/2014/main" id="{B86F4169-27FB-4C7A-B0B3-E94263E00152}"/>
+                    </a:ext>
+                  </a:extLst>
+                </p:cNvPr>
+                <p:cNvGrpSpPr/>
+                <p:nvPr/>
+              </p:nvGrpSpPr>
+              <p:grpSpPr>
+                <a:xfrm>
+                  <a:off x="4696459" y="3182072"/>
+                  <a:ext cx="5985208" cy="914400"/>
+                  <a:chOff x="2386058" y="3283527"/>
+                  <a:chExt cx="5985208" cy="914400"/>
+                </a:xfrm>
+              </p:grpSpPr>
+              <p:cxnSp>
+                <p:nvCxnSpPr>
+                  <p:cNvPr id="41" name="Straight Connector 40">
+                    <a:extLst>
+                      <a:ext uri="{FF2B5EF4-FFF2-40B4-BE49-F238E27FC236}">
+                        <a16:creationId xmlns:a16="http://schemas.microsoft.com/office/drawing/2014/main" id="{D004512C-2E8A-4E90-829E-E47E2062A04E}"/>
+                      </a:ext>
+                    </a:extLst>
+                  </p:cNvPr>
+                  <p:cNvCxnSpPr/>
+                  <p:nvPr/>
+                </p:nvCxnSpPr>
+                <p:spPr>
+                  <a:xfrm>
+                    <a:off x="4819884" y="3283527"/>
+                    <a:ext cx="0" cy="914400"/>
+                  </a:xfrm>
+                  <a:prstGeom prst="line">
+                    <a:avLst/>
+                  </a:prstGeom>
+                </p:spPr>
+                <p:style>
+                  <a:lnRef idx="1">
+                    <a:schemeClr val="accent1"/>
+                  </a:lnRef>
+                  <a:fillRef idx="0">
+                    <a:schemeClr val="accent1"/>
+                  </a:fillRef>
+                  <a:effectRef idx="0">
+                    <a:schemeClr val="accent1"/>
+                  </a:effectRef>
+                  <a:fontRef idx="minor">
+                    <a:schemeClr val="tx1"/>
+                  </a:fontRef>
+                </p:style>
+              </p:cxnSp>
+              <p:cxnSp>
+                <p:nvCxnSpPr>
+                  <p:cNvPr id="42" name="Straight Connector 41">
+                    <a:extLst>
+                      <a:ext uri="{FF2B5EF4-FFF2-40B4-BE49-F238E27FC236}">
+                        <a16:creationId xmlns:a16="http://schemas.microsoft.com/office/drawing/2014/main" id="{91C3DCC2-6BBC-4D9A-B734-1F20F755D634}"/>
+                      </a:ext>
+                    </a:extLst>
+                  </p:cNvPr>
+                  <p:cNvCxnSpPr/>
+                  <p:nvPr/>
+                </p:nvCxnSpPr>
+                <p:spPr>
+                  <a:xfrm>
+                    <a:off x="5822031" y="3283527"/>
+                    <a:ext cx="0" cy="914400"/>
+                  </a:xfrm>
+                  <a:prstGeom prst="line">
+                    <a:avLst/>
+                  </a:prstGeom>
+                </p:spPr>
+                <p:style>
+                  <a:lnRef idx="1">
+                    <a:schemeClr val="accent1"/>
+                  </a:lnRef>
+                  <a:fillRef idx="0">
+                    <a:schemeClr val="accent1"/>
+                  </a:fillRef>
+                  <a:effectRef idx="0">
+                    <a:schemeClr val="accent1"/>
+                  </a:effectRef>
+                  <a:fontRef idx="minor">
+                    <a:schemeClr val="tx1"/>
+                  </a:fontRef>
+                </p:style>
+              </p:cxnSp>
+              <p:cxnSp>
+                <p:nvCxnSpPr>
+                  <p:cNvPr id="43" name="Straight Connector 42">
+                    <a:extLst>
+                      <a:ext uri="{FF2B5EF4-FFF2-40B4-BE49-F238E27FC236}">
+                        <a16:creationId xmlns:a16="http://schemas.microsoft.com/office/drawing/2014/main" id="{E2B9E0DC-E49E-4983-9896-4A77EAD9FAC0}"/>
+                      </a:ext>
+                    </a:extLst>
+                  </p:cNvPr>
+                  <p:cNvCxnSpPr/>
+                  <p:nvPr/>
+                </p:nvCxnSpPr>
+                <p:spPr>
+                  <a:xfrm>
+                    <a:off x="6750285" y="3283527"/>
+                    <a:ext cx="0" cy="914400"/>
+                  </a:xfrm>
+                  <a:prstGeom prst="line">
+                    <a:avLst/>
+                  </a:prstGeom>
+                </p:spPr>
+                <p:style>
+                  <a:lnRef idx="1">
+                    <a:schemeClr val="accent1"/>
+                  </a:lnRef>
+                  <a:fillRef idx="0">
+                    <a:schemeClr val="accent1"/>
+                  </a:fillRef>
+                  <a:effectRef idx="0">
+                    <a:schemeClr val="accent1"/>
+                  </a:effectRef>
+                  <a:fontRef idx="minor">
+                    <a:schemeClr val="tx1"/>
+                  </a:fontRef>
+                </p:style>
+              </p:cxnSp>
+              <p:cxnSp>
+                <p:nvCxnSpPr>
+                  <p:cNvPr id="44" name="Straight Connector 43">
+                    <a:extLst>
+                      <a:ext uri="{FF2B5EF4-FFF2-40B4-BE49-F238E27FC236}">
+                        <a16:creationId xmlns:a16="http://schemas.microsoft.com/office/drawing/2014/main" id="{E088C255-3512-49B6-B21E-88CC19AF0A4B}"/>
+                      </a:ext>
+                    </a:extLst>
+                  </p:cNvPr>
+                  <p:cNvCxnSpPr/>
+                  <p:nvPr/>
+                </p:nvCxnSpPr>
+                <p:spPr>
+                  <a:xfrm>
+                    <a:off x="7419921" y="3283527"/>
+                    <a:ext cx="0" cy="914400"/>
+                  </a:xfrm>
+                  <a:prstGeom prst="line">
+                    <a:avLst/>
+                  </a:prstGeom>
+                </p:spPr>
+                <p:style>
+                  <a:lnRef idx="1">
+                    <a:schemeClr val="accent1"/>
+                  </a:lnRef>
+                  <a:fillRef idx="0">
+                    <a:schemeClr val="accent1"/>
+                  </a:fillRef>
+                  <a:effectRef idx="0">
+                    <a:schemeClr val="accent1"/>
+                  </a:effectRef>
+                  <a:fontRef idx="minor">
+                    <a:schemeClr val="tx1"/>
+                  </a:fontRef>
+                </p:style>
+              </p:cxnSp>
+              <p:cxnSp>
+                <p:nvCxnSpPr>
+                  <p:cNvPr id="45" name="Straight Connector 44">
+                    <a:extLst>
+                      <a:ext uri="{FF2B5EF4-FFF2-40B4-BE49-F238E27FC236}">
+                        <a16:creationId xmlns:a16="http://schemas.microsoft.com/office/drawing/2014/main" id="{CDAA755C-C2E7-41BB-A494-EA667B1C393E}"/>
+                      </a:ext>
+                    </a:extLst>
+                  </p:cNvPr>
+                  <p:cNvCxnSpPr/>
+                  <p:nvPr/>
+                </p:nvCxnSpPr>
+                <p:spPr>
+                  <a:xfrm>
+                    <a:off x="7918685" y="3283527"/>
+                    <a:ext cx="0" cy="914400"/>
+                  </a:xfrm>
+                  <a:prstGeom prst="line">
+                    <a:avLst/>
+                  </a:prstGeom>
+                  <a:ln w="38100"/>
+                </p:spPr>
+                <p:style>
+                  <a:lnRef idx="1">
+                    <a:schemeClr val="accent1"/>
+                  </a:lnRef>
+                  <a:fillRef idx="0">
+                    <a:schemeClr val="accent1"/>
+                  </a:fillRef>
+                  <a:effectRef idx="0">
+                    <a:schemeClr val="accent1"/>
+                  </a:effectRef>
+                  <a:fontRef idx="minor">
+                    <a:schemeClr val="tx1"/>
+                  </a:fontRef>
+                </p:style>
+              </p:cxnSp>
+              <p:cxnSp>
+                <p:nvCxnSpPr>
+                  <p:cNvPr id="46" name="Straight Connector 45">
+                    <a:extLst>
+                      <a:ext uri="{FF2B5EF4-FFF2-40B4-BE49-F238E27FC236}">
+                        <a16:creationId xmlns:a16="http://schemas.microsoft.com/office/drawing/2014/main" id="{0DAB5C3A-0B77-46FC-8298-09B929FB8207}"/>
+                      </a:ext>
+                    </a:extLst>
+                  </p:cNvPr>
+                  <p:cNvCxnSpPr/>
+                  <p:nvPr/>
+                </p:nvCxnSpPr>
+                <p:spPr>
+                  <a:xfrm>
+                    <a:off x="8371266" y="3283527"/>
+                    <a:ext cx="0" cy="914400"/>
+                  </a:xfrm>
+                  <a:prstGeom prst="line">
+                    <a:avLst/>
+                  </a:prstGeom>
+                </p:spPr>
+                <p:style>
+                  <a:lnRef idx="1">
+                    <a:schemeClr val="accent1"/>
+                  </a:lnRef>
+                  <a:fillRef idx="0">
+                    <a:schemeClr val="accent1"/>
+                  </a:fillRef>
+                  <a:effectRef idx="0">
+                    <a:schemeClr val="accent1"/>
+                  </a:effectRef>
+                  <a:fontRef idx="minor">
+                    <a:schemeClr val="tx1"/>
+                  </a:fontRef>
+                </p:style>
+              </p:cxnSp>
+              <p:cxnSp>
+                <p:nvCxnSpPr>
+                  <p:cNvPr id="47" name="Straight Connector 46">
+                    <a:extLst>
+                      <a:ext uri="{FF2B5EF4-FFF2-40B4-BE49-F238E27FC236}">
+                        <a16:creationId xmlns:a16="http://schemas.microsoft.com/office/drawing/2014/main" id="{E261BF5F-A494-4239-9484-F212393710F6}"/>
+                      </a:ext>
+                    </a:extLst>
+                  </p:cNvPr>
+                  <p:cNvCxnSpPr/>
+                  <p:nvPr/>
+                </p:nvCxnSpPr>
+                <p:spPr>
+                  <a:xfrm>
+                    <a:off x="3702284" y="3283527"/>
+                    <a:ext cx="0" cy="914400"/>
+                  </a:xfrm>
+                  <a:prstGeom prst="line">
+                    <a:avLst/>
+                  </a:prstGeom>
+                </p:spPr>
+                <p:style>
+                  <a:lnRef idx="1">
+                    <a:schemeClr val="accent1"/>
+                  </a:lnRef>
+                  <a:fillRef idx="0">
+                    <a:schemeClr val="accent1"/>
+                  </a:fillRef>
+                  <a:effectRef idx="0">
+                    <a:schemeClr val="accent1"/>
+                  </a:effectRef>
+                  <a:fontRef idx="minor">
+                    <a:schemeClr val="tx1"/>
+                  </a:fontRef>
+                </p:style>
+              </p:cxnSp>
+              <p:cxnSp>
+                <p:nvCxnSpPr>
+                  <p:cNvPr id="48" name="Straight Connector 47">
+                    <a:extLst>
+                      <a:ext uri="{FF2B5EF4-FFF2-40B4-BE49-F238E27FC236}">
+                        <a16:creationId xmlns:a16="http://schemas.microsoft.com/office/drawing/2014/main" id="{2ADC3B64-6FD0-4111-BF15-11027673981D}"/>
+                      </a:ext>
+                    </a:extLst>
+                  </p:cNvPr>
+                  <p:cNvCxnSpPr/>
+                  <p:nvPr/>
+                </p:nvCxnSpPr>
+                <p:spPr>
+                  <a:xfrm>
+                    <a:off x="2386058" y="3283527"/>
+                    <a:ext cx="0" cy="914400"/>
+                  </a:xfrm>
+                  <a:prstGeom prst="line">
+                    <a:avLst/>
+                  </a:prstGeom>
+                </p:spPr>
+                <p:style>
+                  <a:lnRef idx="1">
+                    <a:schemeClr val="accent1"/>
+                  </a:lnRef>
+                  <a:fillRef idx="0">
+                    <a:schemeClr val="accent1"/>
+                  </a:fillRef>
+                  <a:effectRef idx="0">
+                    <a:schemeClr val="accent1"/>
+                  </a:effectRef>
+                  <a:fontRef idx="minor">
+                    <a:schemeClr val="tx1"/>
+                  </a:fontRef>
+                </p:style>
+              </p:cxnSp>
+            </p:grpSp>
+            <p:sp>
+              <p:nvSpPr>
+                <p:cNvPr id="36" name="TextBox 35">
+                  <a:extLst>
+                    <a:ext uri="{FF2B5EF4-FFF2-40B4-BE49-F238E27FC236}">
+                      <a16:creationId xmlns:a16="http://schemas.microsoft.com/office/drawing/2014/main" id="{D1E74469-87F5-441A-B688-ADC9681C655A}"/>
+                    </a:ext>
+                  </a:extLst>
+                </p:cNvPr>
+                <p:cNvSpPr txBox="1"/>
+                <p:nvPr/>
+              </p:nvSpPr>
+              <p:spPr>
+                <a:xfrm>
+                  <a:off x="4187367" y="2088220"/>
+                  <a:ext cx="1261582" cy="385222"/>
+                </a:xfrm>
+                <a:prstGeom prst="rect">
+                  <a:avLst/>
+                </a:prstGeom>
+                <a:noFill/>
+              </p:spPr>
+              <p:txBody>
+                <a:bodyPr wrap="square" rtlCol="0">
+                  <a:spAutoFit/>
+                </a:bodyPr>
+                <a:lstStyle/>
+                <a:p>
+                  <a:r>
+                    <a:rPr lang="en-US" sz="1400" dirty="0">
+                      <a:solidFill>
+                        <a:schemeClr val="accent1"/>
+                      </a:solidFill>
+                      <a:latin typeface="Arial" panose="020B0604020202020204" pitchFamily="34" charset="0"/>
+                      <a:cs typeface="Arial" panose="020B0604020202020204" pitchFamily="34" charset="0"/>
+                    </a:rPr>
+                    <a:t>m=1</a:t>
+                  </a:r>
+                  <a:r>
+                    <a:rPr lang="en-US" sz="1400" dirty="0">
+                      <a:latin typeface="Arial" panose="020B0604020202020204" pitchFamily="34" charset="0"/>
+                      <a:cs typeface="Arial" panose="020B0604020202020204" pitchFamily="34" charset="0"/>
+                    </a:rPr>
+                    <a:t>,</a:t>
+                  </a:r>
+                  <a:r>
+                    <a:rPr lang="en-US" sz="1400" dirty="0">
+                      <a:solidFill>
+                        <a:schemeClr val="accent1"/>
+                      </a:solidFill>
+                      <a:latin typeface="Arial" panose="020B0604020202020204" pitchFamily="34" charset="0"/>
+                      <a:cs typeface="Arial" panose="020B0604020202020204" pitchFamily="34" charset="0"/>
+                    </a:rPr>
+                    <a:t> </a:t>
+                  </a:r>
+                  <a:r>
+                    <a:rPr lang="en-US" sz="1400" dirty="0">
+                      <a:solidFill>
+                        <a:srgbClr val="FF0000"/>
+                      </a:solidFill>
+                      <a:latin typeface="Arial" panose="020B0604020202020204" pitchFamily="34" charset="0"/>
+                      <a:cs typeface="Arial" panose="020B0604020202020204" pitchFamily="34" charset="0"/>
+                    </a:rPr>
+                    <a:t>m=2</a:t>
+                  </a:r>
+                </a:p>
+              </p:txBody>
+            </p:sp>
+            <mc:AlternateContent xmlns:mc="http://schemas.openxmlformats.org/markup-compatibility/2006" xmlns:a14="http://schemas.microsoft.com/office/drawing/2010/main">
+              <mc:Choice Requires="a14">
+                <p:sp>
+                  <p:nvSpPr>
+                    <p:cNvPr id="37" name="TextBox 36">
+                      <a:extLst>
+                        <a:ext uri="{FF2B5EF4-FFF2-40B4-BE49-F238E27FC236}">
+                          <a16:creationId xmlns:a16="http://schemas.microsoft.com/office/drawing/2014/main" id="{C20911FA-D142-4A05-AFC6-341E41413781}"/>
+                        </a:ext>
+                      </a:extLst>
+                    </p:cNvPr>
+                    <p:cNvSpPr txBox="1"/>
+                    <p:nvPr/>
+                  </p:nvSpPr>
+                  <p:spPr>
+                    <a:xfrm rot="16200000">
+                      <a:off x="4503138" y="1720873"/>
+                      <a:ext cx="2983103" cy="513627"/>
+                    </a:xfrm>
+                    <a:prstGeom prst="rect">
+                      <a:avLst/>
+                    </a:prstGeom>
+                    <a:noFill/>
+                  </p:spPr>
+                  <p:txBody>
+                    <a:bodyPr wrap="square" rtlCol="0">
+                      <a:spAutoFit/>
+                    </a:bodyPr>
+                    <a:lstStyle/>
+                    <a:p>
+                      <a:pPr/>
+                      <a14:m>
+                        <m:oMathPara xmlns:m="http://schemas.openxmlformats.org/officeDocument/2006/math">
+                          <m:oMathParaPr>
+                            <m:jc m:val="centerGroup"/>
+                          </m:oMathParaPr>
+                          <m:oMath xmlns:m="http://schemas.openxmlformats.org/officeDocument/2006/math">
+                            <m:r>
+                              <a:rPr lang="en-US" sz="1400" b="0" i="1" dirty="0" smtClean="0">
+                                <a:solidFill>
+                                  <a:srgbClr val="FF0000"/>
+                                </a:solidFill>
+                                <a:latin typeface="Cambria Math" panose="02040503050406030204" pitchFamily="18" charset="0"/>
+                                <a:cs typeface="Arial" panose="020B0604020202020204" pitchFamily="34" charset="0"/>
+                              </a:rPr>
+                              <m:t>4</m:t>
+                            </m:r>
+                            <m:r>
+                              <a:rPr lang="en-US" sz="1400" b="0" i="1" dirty="0" smtClean="0">
+                                <a:solidFill>
+                                  <a:srgbClr val="FF0000"/>
+                                </a:solidFill>
+                                <a:latin typeface="Cambria Math" panose="02040503050406030204" pitchFamily="18" charset="0"/>
+                                <a:cs typeface="Arial" panose="020B0604020202020204" pitchFamily="34" charset="0"/>
+                              </a:rPr>
+                              <m:t>𝑞</m:t>
+                            </m:r>
+                            <m:r>
+                              <a:rPr lang="en-US" sz="1400" b="0" i="1" dirty="0" smtClean="0">
+                                <a:solidFill>
+                                  <a:srgbClr val="FF0000"/>
+                                </a:solidFill>
+                                <a:latin typeface="Cambria Math" panose="02040503050406030204" pitchFamily="18" charset="0"/>
+                                <a:cs typeface="Arial" panose="020B0604020202020204" pitchFamily="34" charset="0"/>
+                              </a:rPr>
+                              <m:t>+2  &amp;  2</m:t>
+                            </m:r>
+                            <m:r>
+                              <a:rPr lang="en-US" sz="1400" i="1" dirty="0" smtClean="0">
+                                <a:solidFill>
+                                  <a:srgbClr val="4F81BD"/>
+                                </a:solidFill>
+                                <a:latin typeface="Cambria Math" panose="02040503050406030204" pitchFamily="18" charset="0"/>
+                                <a:cs typeface="Arial" panose="020B0604020202020204" pitchFamily="34" charset="0"/>
+                              </a:rPr>
+                              <m:t>𝑞</m:t>
+                            </m:r>
+                            <m:r>
+                              <a:rPr lang="en-US" sz="1400" i="1" dirty="0" smtClean="0">
+                                <a:solidFill>
+                                  <a:srgbClr val="4F81BD"/>
+                                </a:solidFill>
+                                <a:latin typeface="Cambria Math" panose="02040503050406030204" pitchFamily="18" charset="0"/>
+                                <a:cs typeface="Arial" panose="020B0604020202020204" pitchFamily="34" charset="0"/>
+                              </a:rPr>
+                              <m:t>+1</m:t>
+                            </m:r>
+                          </m:oMath>
+                        </m:oMathPara>
+                      </a14:m>
+                      <a:endParaRPr lang="en-US" sz="1400" dirty="0">
+                        <a:solidFill>
+                          <a:srgbClr val="FF0000"/>
+                        </a:solidFill>
+                        <a:latin typeface="Arial" panose="020B0604020202020204" pitchFamily="34" charset="0"/>
+                        <a:cs typeface="Arial" panose="020B0604020202020204" pitchFamily="34" charset="0"/>
+                      </a:endParaRPr>
+                    </a:p>
+                  </p:txBody>
+                </p:sp>
+              </mc:Choice>
+              <mc:Fallback xmlns="">
+                <p:sp>
+                  <p:nvSpPr>
+                    <p:cNvPr id="265" name="TextBox 264"/>
+                    <p:cNvSpPr txBox="1">
+                      <a:spLocks noRot="1" noChangeAspect="1" noMove="1" noResize="1" noEditPoints="1" noAdjustHandles="1" noChangeArrowheads="1" noChangeShapeType="1" noTextEdit="1"/>
+                    </p:cNvSpPr>
+                    <p:nvPr/>
+                  </p:nvSpPr>
+                  <p:spPr>
+                    <a:xfrm rot="16200000">
+                      <a:off x="4503138" y="1720873"/>
+                      <a:ext cx="2983103" cy="513627"/>
+                    </a:xfrm>
+                    <a:prstGeom prst="rect">
+                      <a:avLst/>
+                    </a:prstGeom>
+                    <a:blipFill rotWithShape="0">
+                      <a:blip r:embed="rId21"/>
+                      <a:stretch>
+                        <a:fillRect r="-8000"/>
+                      </a:stretch>
+                    </a:blipFill>
+                  </p:spPr>
+                  <p:txBody>
+                    <a:bodyPr/>
+                    <a:lstStyle/>
+                    <a:p>
+                      <a:r>
+                        <a:rPr lang="en-US">
+                          <a:noFill/>
+                        </a:rPr>
+                        <a:t> </a:t>
+                      </a:r>
+                    </a:p>
+                  </p:txBody>
+                </p:sp>
+              </mc:Fallback>
+            </mc:AlternateContent>
+            <mc:AlternateContent xmlns:mc="http://schemas.openxmlformats.org/markup-compatibility/2006" xmlns:a14="http://schemas.microsoft.com/office/drawing/2010/main">
+              <mc:Choice Requires="a14">
+                <p:sp>
+                  <p:nvSpPr>
+                    <p:cNvPr id="38" name="TextBox 37">
+                      <a:extLst>
+                        <a:ext uri="{FF2B5EF4-FFF2-40B4-BE49-F238E27FC236}">
+                          <a16:creationId xmlns:a16="http://schemas.microsoft.com/office/drawing/2014/main" id="{35113021-7108-4862-963D-CDD03E944F29}"/>
+                        </a:ext>
+                      </a:extLst>
+                    </p:cNvPr>
+                    <p:cNvSpPr txBox="1"/>
+                    <p:nvPr/>
+                  </p:nvSpPr>
+                  <p:spPr>
+                    <a:xfrm rot="16200000">
+                      <a:off x="6372242" y="2360672"/>
+                      <a:ext cx="1465069" cy="513627"/>
+                    </a:xfrm>
+                    <a:prstGeom prst="rect">
+                      <a:avLst/>
+                    </a:prstGeom>
+                    <a:noFill/>
+                  </p:spPr>
+                  <p:txBody>
+                    <a:bodyPr wrap="square" rtlCol="0">
+                      <a:spAutoFit/>
+                    </a:bodyPr>
+                    <a:lstStyle/>
+                    <a:p>
+                      <a:pPr/>
+                      <a14:m>
+                        <m:oMathPara xmlns:m="http://schemas.openxmlformats.org/officeDocument/2006/math">
+                          <m:oMathParaPr>
+                            <m:jc m:val="centerGroup"/>
+                          </m:oMathParaPr>
+                          <m:oMath xmlns:m="http://schemas.openxmlformats.org/officeDocument/2006/math">
+                            <m:r>
+                              <a:rPr lang="en-US" sz="1400" i="1" dirty="0" smtClean="0">
+                                <a:solidFill>
+                                  <a:srgbClr val="4A7EBB"/>
+                                </a:solidFill>
+                                <a:latin typeface="Cambria Math" panose="02040503050406030204" pitchFamily="18" charset="0"/>
+                                <a:cs typeface="Arial" panose="020B0604020202020204" pitchFamily="34" charset="0"/>
+                              </a:rPr>
+                              <m:t>2</m:t>
+                            </m:r>
+                            <m:r>
+                              <a:rPr lang="en-US" sz="1400" i="1" dirty="0" smtClean="0">
+                                <a:solidFill>
+                                  <a:srgbClr val="4A7EBB"/>
+                                </a:solidFill>
+                                <a:latin typeface="Cambria Math" panose="02040503050406030204" pitchFamily="18" charset="0"/>
+                                <a:cs typeface="Arial" panose="020B0604020202020204" pitchFamily="34" charset="0"/>
+                              </a:rPr>
+                              <m:t>𝑞</m:t>
+                            </m:r>
+                            <m:r>
+                              <a:rPr lang="en-US" sz="1400" i="1" dirty="0" smtClean="0">
+                                <a:solidFill>
+                                  <a:srgbClr val="4A7EBB"/>
+                                </a:solidFill>
+                                <a:latin typeface="Cambria Math" panose="02040503050406030204" pitchFamily="18" charset="0"/>
+                                <a:cs typeface="Arial" panose="020B0604020202020204" pitchFamily="34" charset="0"/>
+                              </a:rPr>
+                              <m:t>+3</m:t>
+                            </m:r>
+                          </m:oMath>
+                        </m:oMathPara>
+                      </a14:m>
+                      <a:endParaRPr lang="en-US" sz="1400" dirty="0">
+                        <a:solidFill>
+                          <a:srgbClr val="4A7EBB"/>
+                        </a:solidFill>
+                        <a:latin typeface="Arial" panose="020B0604020202020204" pitchFamily="34" charset="0"/>
+                        <a:cs typeface="Arial" panose="020B0604020202020204" pitchFamily="34" charset="0"/>
+                      </a:endParaRPr>
+                    </a:p>
+                  </p:txBody>
+                </p:sp>
+              </mc:Choice>
+              <mc:Fallback xmlns="">
+                <p:sp>
+                  <p:nvSpPr>
+                    <p:cNvPr id="266" name="TextBox 265"/>
+                    <p:cNvSpPr txBox="1">
+                      <a:spLocks noRot="1" noChangeAspect="1" noMove="1" noResize="1" noEditPoints="1" noAdjustHandles="1" noChangeArrowheads="1" noChangeShapeType="1" noTextEdit="1"/>
+                    </p:cNvSpPr>
+                    <p:nvPr/>
+                  </p:nvSpPr>
+                  <p:spPr>
+                    <a:xfrm rot="16200000">
+                      <a:off x="6372242" y="2360672"/>
+                      <a:ext cx="1465069" cy="513627"/>
+                    </a:xfrm>
+                    <a:prstGeom prst="rect">
+                      <a:avLst/>
+                    </a:prstGeom>
+                    <a:blipFill rotWithShape="0">
+                      <a:blip r:embed="rId22"/>
+                      <a:stretch>
+                        <a:fillRect r="-7843"/>
+                      </a:stretch>
+                    </a:blipFill>
+                  </p:spPr>
+                  <p:txBody>
+                    <a:bodyPr/>
+                    <a:lstStyle/>
+                    <a:p>
+                      <a:r>
+                        <a:rPr lang="en-US">
+                          <a:noFill/>
+                        </a:rPr>
+                        <a:t> </a:t>
+                      </a:r>
+                    </a:p>
+                  </p:txBody>
+                </p:sp>
+              </mc:Fallback>
+            </mc:AlternateContent>
+            <mc:AlternateContent xmlns:mc="http://schemas.openxmlformats.org/markup-compatibility/2006" xmlns:a14="http://schemas.microsoft.com/office/drawing/2010/main">
+              <mc:Choice Requires="a14">
+                <p:sp>
+                  <p:nvSpPr>
+                    <p:cNvPr id="39" name="TextBox 38">
+                      <a:extLst>
+                        <a:ext uri="{FF2B5EF4-FFF2-40B4-BE49-F238E27FC236}">
+                          <a16:creationId xmlns:a16="http://schemas.microsoft.com/office/drawing/2014/main" id="{E4B38B60-4EBA-4255-A8F4-47A8706D71D3}"/>
+                        </a:ext>
+                      </a:extLst>
+                    </p:cNvPr>
+                    <p:cNvSpPr txBox="1"/>
+                    <p:nvPr/>
+                  </p:nvSpPr>
+                  <p:spPr>
+                    <a:xfrm rot="16200000">
+                      <a:off x="7313096" y="2299564"/>
+                      <a:ext cx="1587284" cy="513627"/>
+                    </a:xfrm>
+                    <a:prstGeom prst="rect">
+                      <a:avLst/>
+                    </a:prstGeom>
+                    <a:noFill/>
+                  </p:spPr>
+                  <p:txBody>
+                    <a:bodyPr wrap="square" rtlCol="0">
+                      <a:spAutoFit/>
+                    </a:bodyPr>
+                    <a:lstStyle/>
+                    <a:p>
+                      <a:pPr/>
+                      <a14:m>
+                        <m:oMathPara xmlns:m="http://schemas.openxmlformats.org/officeDocument/2006/math">
+                          <m:oMathParaPr>
+                            <m:jc m:val="centerGroup"/>
+                          </m:oMathParaPr>
+                          <m:oMath xmlns:m="http://schemas.openxmlformats.org/officeDocument/2006/math">
+                            <m:r>
+                              <a:rPr lang="en-US" sz="1400" i="1" dirty="0" smtClean="0">
+                                <a:solidFill>
+                                  <a:srgbClr val="4A7EBB"/>
+                                </a:solidFill>
+                                <a:latin typeface="Cambria Math" panose="02040503050406030204" pitchFamily="18" charset="0"/>
+                                <a:cs typeface="Arial" panose="020B0604020202020204" pitchFamily="34" charset="0"/>
+                              </a:rPr>
+                              <m:t>2</m:t>
+                            </m:r>
+                            <m:r>
+                              <a:rPr lang="en-US" sz="1400" i="1" dirty="0" smtClean="0">
+                                <a:solidFill>
+                                  <a:srgbClr val="4A7EBB"/>
+                                </a:solidFill>
+                                <a:latin typeface="Cambria Math" panose="02040503050406030204" pitchFamily="18" charset="0"/>
+                                <a:cs typeface="Arial" panose="020B0604020202020204" pitchFamily="34" charset="0"/>
+                              </a:rPr>
+                              <m:t>𝑞</m:t>
+                            </m:r>
+                            <m:r>
+                              <a:rPr lang="en-US" sz="1400" i="1" dirty="0" smtClean="0">
+                                <a:solidFill>
+                                  <a:srgbClr val="4A7EBB"/>
+                                </a:solidFill>
+                                <a:latin typeface="Cambria Math" panose="02040503050406030204" pitchFamily="18" charset="0"/>
+                                <a:cs typeface="Arial" panose="020B0604020202020204" pitchFamily="34" charset="0"/>
+                              </a:rPr>
+                              <m:t>+5</m:t>
+                            </m:r>
+                          </m:oMath>
+                        </m:oMathPara>
+                      </a14:m>
+                      <a:endParaRPr lang="en-US" sz="1400" dirty="0">
+                        <a:solidFill>
+                          <a:srgbClr val="4A7EBB"/>
+                        </a:solidFill>
+                        <a:latin typeface="Arial" panose="020B0604020202020204" pitchFamily="34" charset="0"/>
+                        <a:cs typeface="Arial" panose="020B0604020202020204" pitchFamily="34" charset="0"/>
+                      </a:endParaRPr>
+                    </a:p>
+                  </p:txBody>
+                </p:sp>
+              </mc:Choice>
+              <mc:Fallback xmlns="">
+                <p:sp>
+                  <p:nvSpPr>
+                    <p:cNvPr id="267" name="TextBox 266"/>
+                    <p:cNvSpPr txBox="1">
+                      <a:spLocks noRot="1" noChangeAspect="1" noMove="1" noResize="1" noEditPoints="1" noAdjustHandles="1" noChangeArrowheads="1" noChangeShapeType="1" noTextEdit="1"/>
+                    </p:cNvSpPr>
+                    <p:nvPr/>
+                  </p:nvSpPr>
+                  <p:spPr>
+                    <a:xfrm rot="16200000">
+                      <a:off x="7313096" y="2299564"/>
+                      <a:ext cx="1587284" cy="513627"/>
+                    </a:xfrm>
+                    <a:prstGeom prst="rect">
+                      <a:avLst/>
+                    </a:prstGeom>
+                    <a:blipFill rotWithShape="0">
+                      <a:blip r:embed="rId23"/>
+                      <a:stretch>
+                        <a:fillRect r="-8000"/>
+                      </a:stretch>
+                    </a:blipFill>
+                  </p:spPr>
+                  <p:txBody>
+                    <a:bodyPr/>
+                    <a:lstStyle/>
+                    <a:p>
+                      <a:r>
+                        <a:rPr lang="en-US">
+                          <a:noFill/>
+                        </a:rPr>
+                        <a:t> </a:t>
+                      </a:r>
+                    </a:p>
+                  </p:txBody>
+                </p:sp>
+              </mc:Fallback>
+            </mc:AlternateContent>
+            <mc:AlternateContent xmlns:mc="http://schemas.openxmlformats.org/markup-compatibility/2006" xmlns:a14="http://schemas.microsoft.com/office/drawing/2010/main">
+              <mc:Choice Requires="a14">
+                <p:sp>
+                  <p:nvSpPr>
+                    <p:cNvPr id="40" name="TextBox 39">
+                      <a:extLst>
+                        <a:ext uri="{FF2B5EF4-FFF2-40B4-BE49-F238E27FC236}">
+                          <a16:creationId xmlns:a16="http://schemas.microsoft.com/office/drawing/2014/main" id="{260DA89A-EB42-49AE-A0CF-10530977D8AF}"/>
+                        </a:ext>
+                      </a:extLst>
+                    </p:cNvPr>
+                    <p:cNvSpPr txBox="1"/>
+                    <p:nvPr/>
+                  </p:nvSpPr>
+                  <p:spPr>
+                    <a:xfrm rot="16200000">
+                      <a:off x="9539426" y="2384813"/>
+                      <a:ext cx="1297565" cy="513627"/>
+                    </a:xfrm>
+                    <a:prstGeom prst="rect">
+                      <a:avLst/>
+                    </a:prstGeom>
+                    <a:noFill/>
+                  </p:spPr>
+                  <p:txBody>
+                    <a:bodyPr wrap="square" rtlCol="0">
+                      <a:spAutoFit/>
+                    </a:bodyPr>
+                    <a:lstStyle/>
+                    <a:p>
+                      <a:pPr/>
+                      <a14:m>
+                        <m:oMathPara xmlns:m="http://schemas.openxmlformats.org/officeDocument/2006/math">
+                          <m:oMathParaPr>
+                            <m:jc m:val="centerGroup"/>
+                          </m:oMathParaPr>
+                          <m:oMath xmlns:m="http://schemas.openxmlformats.org/officeDocument/2006/math">
+                            <m:r>
+                              <a:rPr lang="en-US" sz="1400" i="1" dirty="0" smtClean="0">
+                                <a:solidFill>
+                                  <a:srgbClr val="4A7EBB"/>
+                                </a:solidFill>
+                                <a:latin typeface="Cambria Math" panose="02040503050406030204" pitchFamily="18" charset="0"/>
+                                <a:cs typeface="Arial" panose="020B0604020202020204" pitchFamily="34" charset="0"/>
+                              </a:rPr>
+                              <m:t>4</m:t>
+                            </m:r>
+                            <m:r>
+                              <a:rPr lang="en-US" sz="1400" i="1" dirty="0" smtClean="0">
+                                <a:solidFill>
+                                  <a:srgbClr val="4A7EBB"/>
+                                </a:solidFill>
+                                <a:latin typeface="Cambria Math" panose="02040503050406030204" pitchFamily="18" charset="0"/>
+                                <a:cs typeface="Arial" panose="020B0604020202020204" pitchFamily="34" charset="0"/>
+                              </a:rPr>
+                              <m:t>𝑞</m:t>
+                            </m:r>
+                            <m:r>
+                              <a:rPr lang="en-US" sz="1400" i="1" dirty="0" smtClean="0">
+                                <a:solidFill>
+                                  <a:srgbClr val="4A7EBB"/>
+                                </a:solidFill>
+                                <a:latin typeface="Cambria Math" panose="02040503050406030204" pitchFamily="18" charset="0"/>
+                                <a:cs typeface="Arial" panose="020B0604020202020204" pitchFamily="34" charset="0"/>
+                              </a:rPr>
+                              <m:t>+1</m:t>
+                            </m:r>
+                          </m:oMath>
+                        </m:oMathPara>
+                      </a14:m>
+                      <a:endParaRPr lang="en-US" sz="1400" dirty="0">
+                        <a:solidFill>
+                          <a:srgbClr val="4A7EBB"/>
+                        </a:solidFill>
+                        <a:latin typeface="Arial" panose="020B0604020202020204" pitchFamily="34" charset="0"/>
+                        <a:cs typeface="Arial" panose="020B0604020202020204" pitchFamily="34" charset="0"/>
+                      </a:endParaRPr>
+                    </a:p>
+                  </p:txBody>
+                </p:sp>
+              </mc:Choice>
+              <mc:Fallback xmlns="">
+                <p:sp>
+                  <p:nvSpPr>
+                    <p:cNvPr id="268" name="TextBox 267"/>
+                    <p:cNvSpPr txBox="1">
+                      <a:spLocks noRot="1" noChangeAspect="1" noMove="1" noResize="1" noEditPoints="1" noAdjustHandles="1" noChangeArrowheads="1" noChangeShapeType="1" noTextEdit="1"/>
+                    </p:cNvSpPr>
+                    <p:nvPr/>
+                  </p:nvSpPr>
+                  <p:spPr>
+                    <a:xfrm rot="16200000">
+                      <a:off x="9539426" y="2384813"/>
+                      <a:ext cx="1297565" cy="513627"/>
+                    </a:xfrm>
+                    <a:prstGeom prst="rect">
+                      <a:avLst/>
+                    </a:prstGeom>
+                    <a:blipFill rotWithShape="0">
+                      <a:blip r:embed="rId24"/>
+                      <a:stretch>
+                        <a:fillRect r="-7843"/>
+                      </a:stretch>
+                    </a:blipFill>
+                  </p:spPr>
+                  <p:txBody>
+                    <a:bodyPr/>
+                    <a:lstStyle/>
+                    <a:p>
+                      <a:r>
+                        <a:rPr lang="en-US">
+                          <a:noFill/>
+                        </a:rPr>
+                        <a:t> </a:t>
+                      </a:r>
+                    </a:p>
+                  </p:txBody>
+                </p:sp>
+              </mc:Fallback>
+            </mc:AlternateContent>
+          </p:grpSp>
+        </p:grpSp>
+        <p:grpSp>
+          <p:nvGrpSpPr>
+            <p:cNvPr id="4" name="Group 3">
+              <a:extLst>
+                <a:ext uri="{FF2B5EF4-FFF2-40B4-BE49-F238E27FC236}">
+                  <a16:creationId xmlns:a16="http://schemas.microsoft.com/office/drawing/2014/main" id="{788DDC93-F4E6-4F74-87DE-0DB528C79E98}"/>
+                </a:ext>
+              </a:extLst>
+            </p:cNvPr>
+            <p:cNvGrpSpPr/>
+            <p:nvPr/>
+          </p:nvGrpSpPr>
+          <p:grpSpPr>
+            <a:xfrm>
+              <a:off x="5035418" y="10417597"/>
+              <a:ext cx="1733194" cy="1699748"/>
+              <a:chOff x="6413856" y="7788952"/>
+              <a:chExt cx="1733194" cy="1699748"/>
+            </a:xfrm>
+          </p:grpSpPr>
+          <p:cxnSp>
+            <p:nvCxnSpPr>
+              <p:cNvPr id="28" name="Straight Arrow Connector 27">
+                <a:extLst>
+                  <a:ext uri="{FF2B5EF4-FFF2-40B4-BE49-F238E27FC236}">
+                    <a16:creationId xmlns:a16="http://schemas.microsoft.com/office/drawing/2014/main" id="{53A5661D-7DA5-49E7-A983-11004DCA523E}"/>
+                  </a:ext>
+                </a:extLst>
+              </p:cNvPr>
+              <p:cNvCxnSpPr/>
+              <p:nvPr/>
+            </p:nvCxnSpPr>
+            <p:spPr>
+              <a:xfrm>
+                <a:off x="6775450" y="9160552"/>
+                <a:ext cx="1371600" cy="0"/>
+              </a:xfrm>
+              <a:prstGeom prst="straightConnector1">
+                <a:avLst/>
+              </a:prstGeom>
+              <a:ln>
+                <a:solidFill>
+                  <a:schemeClr val="tx1"/>
+                </a:solidFill>
+                <a:tailEnd type="triangle"/>
+              </a:ln>
+            </p:spPr>
+            <p:style>
+              <a:lnRef idx="1">
+                <a:schemeClr val="accent1"/>
+              </a:lnRef>
+              <a:fillRef idx="0">
+                <a:schemeClr val="accent1"/>
+              </a:fillRef>
+              <a:effectRef idx="0">
+                <a:schemeClr val="accent1"/>
+              </a:effectRef>
+              <a:fontRef idx="minor">
+                <a:schemeClr val="tx1"/>
+              </a:fontRef>
+            </p:style>
+          </p:cxnSp>
+          <p:cxnSp>
+            <p:nvCxnSpPr>
+              <p:cNvPr id="29" name="Straight Arrow Connector 28">
+                <a:extLst>
+                  <a:ext uri="{FF2B5EF4-FFF2-40B4-BE49-F238E27FC236}">
+                    <a16:creationId xmlns:a16="http://schemas.microsoft.com/office/drawing/2014/main" id="{4E47A09D-4530-42AB-B1CE-B6F76BE7C9AA}"/>
+                  </a:ext>
+                </a:extLst>
+              </p:cNvPr>
+              <p:cNvCxnSpPr/>
+              <p:nvPr/>
+            </p:nvCxnSpPr>
+            <p:spPr>
+              <a:xfrm rot="16200000">
+                <a:off x="6089650" y="8474752"/>
+                <a:ext cx="1371600" cy="0"/>
+              </a:xfrm>
+              <a:prstGeom prst="straightConnector1">
+                <a:avLst/>
+              </a:prstGeom>
+              <a:ln>
+                <a:solidFill>
+                  <a:schemeClr val="tx1"/>
+                </a:solidFill>
+                <a:tailEnd type="triangle"/>
+              </a:ln>
+            </p:spPr>
+            <p:style>
+              <a:lnRef idx="1">
+                <a:schemeClr val="accent1"/>
+              </a:lnRef>
+              <a:fillRef idx="0">
+                <a:schemeClr val="accent1"/>
+              </a:fillRef>
+              <a:effectRef idx="0">
+                <a:schemeClr val="accent1"/>
+              </a:effectRef>
+              <a:fontRef idx="minor">
+                <a:schemeClr val="tx1"/>
+              </a:fontRef>
+            </p:style>
+          </p:cxnSp>
+          <p:sp>
+            <p:nvSpPr>
+              <p:cNvPr id="30" name="TextBox 29">
+                <a:extLst>
+                  <a:ext uri="{FF2B5EF4-FFF2-40B4-BE49-F238E27FC236}">
+                    <a16:creationId xmlns:a16="http://schemas.microsoft.com/office/drawing/2014/main" id="{2CD198CC-FE2F-4078-B33B-B833AD514A64}"/>
+                  </a:ext>
+                </a:extLst>
+              </p:cNvPr>
+              <p:cNvSpPr txBox="1"/>
+              <p:nvPr/>
+            </p:nvSpPr>
+            <p:spPr>
+              <a:xfrm>
+                <a:off x="6929672" y="9180923"/>
+                <a:ext cx="752129" cy="307777"/>
+              </a:xfrm>
+              <a:prstGeom prst="rect">
+                <a:avLst/>
+              </a:prstGeom>
+              <a:noFill/>
+            </p:spPr>
+            <p:txBody>
+              <a:bodyPr wrap="none" rtlCol="0">
+                <a:spAutoFit/>
+              </a:bodyPr>
+              <a:lstStyle/>
+              <a:p>
+                <a:r>
+                  <a:rPr lang="en-US" sz="1400" dirty="0">
+                    <a:latin typeface="Arial" panose="020B0604020202020204" pitchFamily="34" charset="0"/>
+                    <a:cs typeface="Arial" panose="020B0604020202020204" pitchFamily="34" charset="0"/>
+                  </a:rPr>
+                  <a:t>Energy</a:t>
+                </a:r>
+              </a:p>
+            </p:txBody>
+          </p:sp>
+          <p:sp>
+            <p:nvSpPr>
+              <p:cNvPr id="31" name="TextBox 30">
+                <a:extLst>
+                  <a:ext uri="{FF2B5EF4-FFF2-40B4-BE49-F238E27FC236}">
+                    <a16:creationId xmlns:a16="http://schemas.microsoft.com/office/drawing/2014/main" id="{83ED9235-A56B-465C-AF11-A49BF9A1065B}"/>
+                  </a:ext>
+                </a:extLst>
+              </p:cNvPr>
+              <p:cNvSpPr txBox="1"/>
+              <p:nvPr/>
+            </p:nvSpPr>
+            <p:spPr>
+              <a:xfrm rot="16200000">
+                <a:off x="6022563" y="8547103"/>
+                <a:ext cx="1090363" cy="307777"/>
+              </a:xfrm>
+              <a:prstGeom prst="rect">
+                <a:avLst/>
+              </a:prstGeom>
+              <a:noFill/>
+            </p:spPr>
+            <p:txBody>
+              <a:bodyPr wrap="none" rtlCol="0">
+                <a:spAutoFit/>
+              </a:bodyPr>
+              <a:lstStyle/>
+              <a:p>
+                <a:r>
+                  <a:rPr lang="en-US" sz="1400" dirty="0">
+                    <a:latin typeface="Arial" panose="020B0604020202020204" pitchFamily="34" charset="0"/>
+                    <a:cs typeface="Arial" panose="020B0604020202020204" pitchFamily="34" charset="0"/>
+                  </a:rPr>
+                  <a:t>Divergence</a:t>
+                </a:r>
+              </a:p>
+            </p:txBody>
+          </p:sp>
+        </p:grpSp>
+        <p:sp>
+          <p:nvSpPr>
+            <p:cNvPr id="5" name="Left Brace 4">
+              <a:extLst>
+                <a:ext uri="{FF2B5EF4-FFF2-40B4-BE49-F238E27FC236}">
+                  <a16:creationId xmlns:a16="http://schemas.microsoft.com/office/drawing/2014/main" id="{7B3681B6-A02C-48EA-B5D1-6AEAA1FFFA3F}"/>
+                </a:ext>
+              </a:extLst>
+            </p:cNvPr>
+            <p:cNvSpPr/>
+            <p:nvPr/>
+          </p:nvSpPr>
+          <p:spPr>
+            <a:xfrm rot="16200000">
+              <a:off x="8113874" y="9595421"/>
+              <a:ext cx="306714" cy="3738169"/>
+            </a:xfrm>
+            <a:prstGeom prst="leftBrace">
+              <a:avLst/>
+            </a:prstGeom>
+            <a:ln>
+              <a:solidFill>
+                <a:schemeClr val="tx1"/>
+              </a:solidFill>
+            </a:ln>
+          </p:spPr>
+          <p:style>
+            <a:lnRef idx="1">
+              <a:schemeClr val="accent1"/>
+            </a:lnRef>
+            <a:fillRef idx="0">
+              <a:schemeClr val="accent1"/>
+            </a:fillRef>
+            <a:effectRef idx="0">
+              <a:schemeClr val="accent1"/>
+            </a:effectRef>
+            <a:fontRef idx="minor">
+              <a:schemeClr val="tx1"/>
+            </a:fontRef>
+          </p:style>
+          <p:txBody>
+            <a:bodyPr rtlCol="0" anchor="ctr"/>
+            <a:lstStyle/>
+            <a:p>
+              <a:pPr algn="ctr"/>
+              <a:endParaRPr lang="en-US"/>
+            </a:p>
+          </p:txBody>
+        </p:sp>
+        <mc:AlternateContent xmlns:mc="http://schemas.openxmlformats.org/markup-compatibility/2006" xmlns:a14="http://schemas.microsoft.com/office/drawing/2010/main">
+          <mc:Choice Requires="a14">
+            <p:sp>
+              <p:nvSpPr>
+                <p:cNvPr id="6" name="TextBox 5">
+                  <a:extLst>
+                    <a:ext uri="{FF2B5EF4-FFF2-40B4-BE49-F238E27FC236}">
+                      <a16:creationId xmlns:a16="http://schemas.microsoft.com/office/drawing/2014/main" id="{24F29194-D0A4-485B-A26E-DBBA1048E977}"/>
+                    </a:ext>
+                  </a:extLst>
+                </p:cNvPr>
+                <p:cNvSpPr txBox="1"/>
+                <p:nvPr/>
+              </p:nvSpPr>
+              <p:spPr>
+                <a:xfrm>
+                  <a:off x="7802877" y="11624950"/>
+                  <a:ext cx="930816" cy="307777"/>
+                </a:xfrm>
+                <a:prstGeom prst="rect">
+                  <a:avLst/>
+                </a:prstGeom>
+                <a:noFill/>
+              </p:spPr>
+              <p:txBody>
+                <a:bodyPr wrap="square" rtlCol="0">
+                  <a:spAutoFit/>
+                </a:bodyPr>
+                <a:lstStyle/>
+                <a:p>
+                  <a:pPr/>
+                  <a14:m>
+                    <m:oMathPara xmlns:m="http://schemas.openxmlformats.org/officeDocument/2006/math">
+                      <m:oMathParaPr>
+                        <m:jc m:val="centerGroup"/>
+                      </m:oMathParaPr>
+                      <m:oMath xmlns:m="http://schemas.openxmlformats.org/officeDocument/2006/math">
+                        <m:r>
+                          <a:rPr lang="en-US" sz="1400" i="1" dirty="0" smtClean="0">
+                            <a:solidFill>
+                              <a:schemeClr val="tx1"/>
+                            </a:solidFill>
+                            <a:latin typeface="Cambria Math" panose="02040503050406030204" pitchFamily="18" charset="0"/>
+                            <a:cs typeface="Arial" panose="020B0604020202020204" pitchFamily="34" charset="0"/>
+                          </a:rPr>
+                          <m:t>𝑛</m:t>
+                        </m:r>
+                        <m:r>
+                          <a:rPr lang="en-US" sz="1400" i="1" dirty="0" smtClean="0">
+                            <a:solidFill>
+                              <a:schemeClr val="tx1"/>
+                            </a:solidFill>
+                            <a:latin typeface="Cambria Math" panose="02040503050406030204" pitchFamily="18" charset="0"/>
+                            <a:cs typeface="Arial" panose="020B0604020202020204" pitchFamily="34" charset="0"/>
+                          </a:rPr>
+                          <m:t>=6</m:t>
+                        </m:r>
+                      </m:oMath>
+                    </m:oMathPara>
+                  </a14:m>
+                  <a:endParaRPr lang="en-US" sz="1400" dirty="0">
+                    <a:solidFill>
+                      <a:schemeClr val="tx1"/>
+                    </a:solidFill>
+                    <a:latin typeface="Arial" panose="020B0604020202020204" pitchFamily="34" charset="0"/>
+                    <a:cs typeface="Arial" panose="020B0604020202020204" pitchFamily="34" charset="0"/>
+                  </a:endParaRPr>
+                </a:p>
+              </p:txBody>
+            </p:sp>
+          </mc:Choice>
+          <mc:Fallback xmlns="">
+            <p:sp>
+              <p:nvSpPr>
+                <p:cNvPr id="211" name="TextBox 210"/>
+                <p:cNvSpPr txBox="1">
+                  <a:spLocks noRot="1" noChangeAspect="1" noMove="1" noResize="1" noEditPoints="1" noAdjustHandles="1" noChangeArrowheads="1" noChangeShapeType="1" noTextEdit="1"/>
+                </p:cNvSpPr>
+                <p:nvPr/>
+              </p:nvSpPr>
+              <p:spPr>
+                <a:xfrm>
+                  <a:off x="7802877" y="11624950"/>
+                  <a:ext cx="930816" cy="307777"/>
+                </a:xfrm>
+                <a:prstGeom prst="rect">
+                  <a:avLst/>
+                </a:prstGeom>
+                <a:blipFill rotWithShape="0">
+                  <a:blip r:embed="rId25"/>
+                  <a:stretch>
+                    <a:fillRect/>
+                  </a:stretch>
+                </a:blipFill>
+              </p:spPr>
+              <p:txBody>
+                <a:bodyPr/>
+                <a:lstStyle/>
+                <a:p>
+                  <a:r>
+                    <a:rPr lang="en-US">
+                      <a:noFill/>
+                    </a:rPr>
+                    <a:t> </a:t>
+                  </a:r>
+                </a:p>
+              </p:txBody>
+            </p:sp>
+          </mc:Fallback>
+        </mc:AlternateContent>
+        <p:grpSp>
+          <p:nvGrpSpPr>
+            <p:cNvPr id="7" name="Group 6">
+              <a:extLst>
+                <a:ext uri="{FF2B5EF4-FFF2-40B4-BE49-F238E27FC236}">
+                  <a16:creationId xmlns:a16="http://schemas.microsoft.com/office/drawing/2014/main" id="{5949A8BE-D179-440D-B99A-E5BD1A45FE2C}"/>
+                </a:ext>
+              </a:extLst>
+            </p:cNvPr>
+            <p:cNvGrpSpPr/>
+            <p:nvPr/>
+          </p:nvGrpSpPr>
+          <p:grpSpPr>
+            <a:xfrm>
+              <a:off x="5551233" y="10985498"/>
+              <a:ext cx="5084309" cy="312010"/>
+              <a:chOff x="7579367" y="8458199"/>
+              <a:chExt cx="5084309" cy="312010"/>
+            </a:xfrm>
+          </p:grpSpPr>
+          <p:sp>
+            <p:nvSpPr>
+              <p:cNvPr id="20" name="TextBox 19">
+                <a:extLst>
+                  <a:ext uri="{FF2B5EF4-FFF2-40B4-BE49-F238E27FC236}">
+                    <a16:creationId xmlns:a16="http://schemas.microsoft.com/office/drawing/2014/main" id="{1C73A4F3-1D05-400C-878B-1C839BF2C021}"/>
+                  </a:ext>
+                </a:extLst>
+              </p:cNvPr>
+              <p:cNvSpPr txBox="1"/>
+              <p:nvPr/>
+            </p:nvSpPr>
+            <p:spPr>
+              <a:xfrm>
+                <a:off x="11939182" y="8458199"/>
+                <a:ext cx="367408" cy="307777"/>
+              </a:xfrm>
+              <a:prstGeom prst="rect">
+                <a:avLst/>
+              </a:prstGeom>
+              <a:noFill/>
+            </p:spPr>
+            <p:txBody>
+              <a:bodyPr wrap="none" rtlCol="0">
+                <a:spAutoFit/>
+              </a:bodyPr>
+              <a:lstStyle/>
+              <a:p>
+                <a:r>
+                  <a:rPr lang="en-US" sz="1400" dirty="0">
+                    <a:solidFill>
+                      <a:srgbClr val="4A7EBB"/>
+                    </a:solidFill>
+                  </a:rPr>
+                  <a:t>21</a:t>
+                </a:r>
+              </a:p>
+            </p:txBody>
+          </p:sp>
+          <p:sp>
+            <p:nvSpPr>
+              <p:cNvPr id="21" name="TextBox 20">
+                <a:extLst>
+                  <a:ext uri="{FF2B5EF4-FFF2-40B4-BE49-F238E27FC236}">
+                    <a16:creationId xmlns:a16="http://schemas.microsoft.com/office/drawing/2014/main" id="{84467FB6-9770-46C0-B28A-CB801B5B0040}"/>
+                  </a:ext>
+                </a:extLst>
+              </p:cNvPr>
+              <p:cNvSpPr txBox="1"/>
+              <p:nvPr/>
+            </p:nvSpPr>
+            <p:spPr>
+              <a:xfrm>
+                <a:off x="11533225" y="8458199"/>
+                <a:ext cx="367408" cy="307777"/>
+              </a:xfrm>
+              <a:prstGeom prst="rect">
+                <a:avLst/>
+              </a:prstGeom>
+              <a:noFill/>
+            </p:spPr>
+            <p:txBody>
+              <a:bodyPr wrap="none" rtlCol="0">
+                <a:spAutoFit/>
+              </a:bodyPr>
+              <a:lstStyle/>
+              <a:p>
+                <a:r>
+                  <a:rPr lang="en-US" sz="1400" dirty="0">
+                    <a:solidFill>
+                      <a:srgbClr val="4A7EBB"/>
+                    </a:solidFill>
+                  </a:rPr>
+                  <a:t>19</a:t>
+                </a:r>
+              </a:p>
+            </p:txBody>
+          </p:sp>
+          <p:sp>
+            <p:nvSpPr>
+              <p:cNvPr id="22" name="TextBox 21">
+                <a:extLst>
+                  <a:ext uri="{FF2B5EF4-FFF2-40B4-BE49-F238E27FC236}">
+                    <a16:creationId xmlns:a16="http://schemas.microsoft.com/office/drawing/2014/main" id="{FBBF9F5B-C0A2-43C9-9DEF-74EB98382A07}"/>
+                  </a:ext>
+                </a:extLst>
+              </p:cNvPr>
+              <p:cNvSpPr txBox="1"/>
+              <p:nvPr/>
+            </p:nvSpPr>
+            <p:spPr>
+              <a:xfrm>
+                <a:off x="11008020" y="8462432"/>
+                <a:ext cx="367408" cy="307777"/>
+              </a:xfrm>
+              <a:prstGeom prst="rect">
+                <a:avLst/>
+              </a:prstGeom>
+              <a:noFill/>
+            </p:spPr>
+            <p:txBody>
+              <a:bodyPr wrap="none" rtlCol="0">
+                <a:spAutoFit/>
+              </a:bodyPr>
+              <a:lstStyle/>
+              <a:p>
+                <a:r>
+                  <a:rPr lang="en-US" sz="1400" dirty="0">
+                    <a:solidFill>
+                      <a:srgbClr val="4A7EBB"/>
+                    </a:solidFill>
+                  </a:rPr>
+                  <a:t>17</a:t>
+                </a:r>
+              </a:p>
+            </p:txBody>
+          </p:sp>
+          <p:sp>
+            <p:nvSpPr>
+              <p:cNvPr id="23" name="TextBox 22">
+                <a:extLst>
+                  <a:ext uri="{FF2B5EF4-FFF2-40B4-BE49-F238E27FC236}">
+                    <a16:creationId xmlns:a16="http://schemas.microsoft.com/office/drawing/2014/main" id="{E66DEA34-5EC2-4A24-A697-D486A7054B13}"/>
+                  </a:ext>
+                </a:extLst>
+              </p:cNvPr>
+              <p:cNvSpPr txBox="1"/>
+              <p:nvPr/>
+            </p:nvSpPr>
+            <p:spPr>
+              <a:xfrm>
+                <a:off x="10255673" y="8458199"/>
+                <a:ext cx="367408" cy="307777"/>
+              </a:xfrm>
+              <a:prstGeom prst="rect">
+                <a:avLst/>
+              </a:prstGeom>
+              <a:noFill/>
+            </p:spPr>
+            <p:txBody>
+              <a:bodyPr wrap="none" rtlCol="0">
+                <a:spAutoFit/>
+              </a:bodyPr>
+              <a:lstStyle/>
+              <a:p>
+                <a:r>
+                  <a:rPr lang="en-US" sz="1400" dirty="0">
+                    <a:solidFill>
+                      <a:srgbClr val="4A7EBB"/>
+                    </a:solidFill>
+                  </a:rPr>
+                  <a:t>15</a:t>
+                </a:r>
+              </a:p>
+            </p:txBody>
+          </p:sp>
+          <p:sp>
+            <p:nvSpPr>
+              <p:cNvPr id="24" name="TextBox 23">
+                <a:extLst>
+                  <a:ext uri="{FF2B5EF4-FFF2-40B4-BE49-F238E27FC236}">
+                    <a16:creationId xmlns:a16="http://schemas.microsoft.com/office/drawing/2014/main" id="{AA70ACE6-A423-4F37-BB4F-6E813BAF9A62}"/>
+                  </a:ext>
+                </a:extLst>
+              </p:cNvPr>
+              <p:cNvSpPr txBox="1"/>
+              <p:nvPr/>
+            </p:nvSpPr>
+            <p:spPr>
+              <a:xfrm>
+                <a:off x="9461303" y="8458199"/>
+                <a:ext cx="367408" cy="307777"/>
+              </a:xfrm>
+              <a:prstGeom prst="rect">
+                <a:avLst/>
+              </a:prstGeom>
+              <a:noFill/>
+            </p:spPr>
+            <p:txBody>
+              <a:bodyPr wrap="none" rtlCol="0">
+                <a:spAutoFit/>
+              </a:bodyPr>
+              <a:lstStyle/>
+              <a:p>
+                <a:r>
+                  <a:rPr lang="en-US" sz="1400" dirty="0">
+                    <a:solidFill>
+                      <a:srgbClr val="4A7EBB"/>
+                    </a:solidFill>
+                  </a:rPr>
+                  <a:t>13</a:t>
+                </a:r>
+              </a:p>
+            </p:txBody>
+          </p:sp>
+          <p:sp>
+            <p:nvSpPr>
+              <p:cNvPr id="25" name="TextBox 24">
+                <a:extLst>
+                  <a:ext uri="{FF2B5EF4-FFF2-40B4-BE49-F238E27FC236}">
+                    <a16:creationId xmlns:a16="http://schemas.microsoft.com/office/drawing/2014/main" id="{C16A14C8-15DA-4F6E-9F2A-D42F3E715DED}"/>
+                  </a:ext>
+                </a:extLst>
+              </p:cNvPr>
+              <p:cNvSpPr txBox="1"/>
+              <p:nvPr/>
+            </p:nvSpPr>
+            <p:spPr>
+              <a:xfrm>
+                <a:off x="8558160" y="8458199"/>
+                <a:ext cx="367408" cy="307777"/>
+              </a:xfrm>
+              <a:prstGeom prst="rect">
+                <a:avLst/>
+              </a:prstGeom>
+              <a:noFill/>
+            </p:spPr>
+            <p:txBody>
+              <a:bodyPr wrap="none" rtlCol="0">
+                <a:spAutoFit/>
+              </a:bodyPr>
+              <a:lstStyle/>
+              <a:p>
+                <a:r>
+                  <a:rPr lang="en-US" sz="1400" dirty="0">
+                    <a:solidFill>
+                      <a:srgbClr val="4A7EBB"/>
+                    </a:solidFill>
+                  </a:rPr>
+                  <a:t>11</a:t>
+                </a:r>
+              </a:p>
+            </p:txBody>
+          </p:sp>
+          <p:sp>
+            <p:nvSpPr>
+              <p:cNvPr id="26" name="TextBox 25">
+                <a:extLst>
+                  <a:ext uri="{FF2B5EF4-FFF2-40B4-BE49-F238E27FC236}">
+                    <a16:creationId xmlns:a16="http://schemas.microsoft.com/office/drawing/2014/main" id="{5E26EFE3-4D7E-4335-A540-A86F82CA3CB3}"/>
+                  </a:ext>
+                </a:extLst>
+              </p:cNvPr>
+              <p:cNvSpPr txBox="1"/>
+              <p:nvPr/>
+            </p:nvSpPr>
+            <p:spPr>
+              <a:xfrm>
+                <a:off x="7579367" y="8458199"/>
+                <a:ext cx="276039" cy="307777"/>
+              </a:xfrm>
+              <a:prstGeom prst="rect">
+                <a:avLst/>
+              </a:prstGeom>
+              <a:noFill/>
+            </p:spPr>
+            <p:txBody>
+              <a:bodyPr wrap="none" rtlCol="0">
+                <a:spAutoFit/>
+              </a:bodyPr>
+              <a:lstStyle/>
+              <a:p>
+                <a:r>
+                  <a:rPr lang="en-US" sz="1400" dirty="0">
+                    <a:solidFill>
+                      <a:srgbClr val="4A7EBB"/>
+                    </a:solidFill>
+                  </a:rPr>
+                  <a:t>9</a:t>
+                </a:r>
+              </a:p>
+            </p:txBody>
+          </p:sp>
+          <p:sp>
+            <p:nvSpPr>
+              <p:cNvPr id="27" name="TextBox 26">
+                <a:extLst>
+                  <a:ext uri="{FF2B5EF4-FFF2-40B4-BE49-F238E27FC236}">
+                    <a16:creationId xmlns:a16="http://schemas.microsoft.com/office/drawing/2014/main" id="{45C7165A-4D34-4406-8DFE-5C21BEC10C77}"/>
+                  </a:ext>
+                </a:extLst>
+              </p:cNvPr>
+              <p:cNvSpPr txBox="1"/>
+              <p:nvPr/>
+            </p:nvSpPr>
+            <p:spPr>
+              <a:xfrm>
+                <a:off x="12296268" y="8458199"/>
+                <a:ext cx="367408" cy="307777"/>
+              </a:xfrm>
+              <a:prstGeom prst="rect">
+                <a:avLst/>
+              </a:prstGeom>
+              <a:noFill/>
+            </p:spPr>
+            <p:txBody>
+              <a:bodyPr wrap="none" rtlCol="0">
+                <a:spAutoFit/>
+              </a:bodyPr>
+              <a:lstStyle/>
+              <a:p>
+                <a:r>
+                  <a:rPr lang="en-US" sz="1400" dirty="0">
+                    <a:solidFill>
+                      <a:srgbClr val="4A7EBB"/>
+                    </a:solidFill>
+                  </a:rPr>
+                  <a:t>23</a:t>
+                </a:r>
+              </a:p>
+            </p:txBody>
+          </p:sp>
+        </p:grpSp>
+        <p:grpSp>
+          <p:nvGrpSpPr>
+            <p:cNvPr id="8" name="Group 7">
+              <a:extLst>
+                <a:ext uri="{FF2B5EF4-FFF2-40B4-BE49-F238E27FC236}">
+                  <a16:creationId xmlns:a16="http://schemas.microsoft.com/office/drawing/2014/main" id="{7A4194E0-A25F-43EC-868E-0A72778D0415}"/>
+                </a:ext>
+              </a:extLst>
+            </p:cNvPr>
+            <p:cNvGrpSpPr/>
+            <p:nvPr/>
+          </p:nvGrpSpPr>
+          <p:grpSpPr>
+            <a:xfrm>
+              <a:off x="5807828" y="10787566"/>
+              <a:ext cx="3322378" cy="311425"/>
+              <a:chOff x="5807828" y="10787566"/>
+              <a:chExt cx="3322378" cy="311425"/>
+            </a:xfrm>
+          </p:grpSpPr>
+          <p:sp>
+            <p:nvSpPr>
+              <p:cNvPr id="13" name="TextBox 12">
+                <a:extLst>
+                  <a:ext uri="{FF2B5EF4-FFF2-40B4-BE49-F238E27FC236}">
+                    <a16:creationId xmlns:a16="http://schemas.microsoft.com/office/drawing/2014/main" id="{65A5DF36-3D89-47F7-B239-DC6ABF6F4FD4}"/>
+                  </a:ext>
+                </a:extLst>
+              </p:cNvPr>
+              <p:cNvSpPr txBox="1"/>
+              <p:nvPr/>
+            </p:nvSpPr>
+            <p:spPr>
+              <a:xfrm>
+                <a:off x="8368329" y="10791214"/>
+                <a:ext cx="367408" cy="307777"/>
+              </a:xfrm>
+              <a:prstGeom prst="rect">
+                <a:avLst/>
+              </a:prstGeom>
+              <a:noFill/>
+            </p:spPr>
+            <p:txBody>
+              <a:bodyPr wrap="none" rtlCol="0">
+                <a:spAutoFit/>
+              </a:bodyPr>
+              <a:lstStyle/>
+              <a:p>
+                <a:r>
+                  <a:rPr lang="en-US" sz="1400" dirty="0">
+                    <a:solidFill>
+                      <a:srgbClr val="FF0000"/>
+                    </a:solidFill>
+                  </a:rPr>
+                  <a:t>29</a:t>
+                </a:r>
+              </a:p>
+            </p:txBody>
+          </p:sp>
+          <p:sp>
+            <p:nvSpPr>
+              <p:cNvPr id="14" name="TextBox 13">
+                <a:extLst>
+                  <a:ext uri="{FF2B5EF4-FFF2-40B4-BE49-F238E27FC236}">
+                    <a16:creationId xmlns:a16="http://schemas.microsoft.com/office/drawing/2014/main" id="{35E33812-63C8-4EE6-95FC-5719D8167C52}"/>
+                  </a:ext>
+                </a:extLst>
+              </p:cNvPr>
+              <p:cNvSpPr txBox="1"/>
+              <p:nvPr/>
+            </p:nvSpPr>
+            <p:spPr>
+              <a:xfrm>
+                <a:off x="7817735" y="10791214"/>
+                <a:ext cx="367408" cy="307777"/>
+              </a:xfrm>
+              <a:prstGeom prst="rect">
+                <a:avLst/>
+              </a:prstGeom>
+              <a:noFill/>
+            </p:spPr>
+            <p:txBody>
+              <a:bodyPr wrap="none" rtlCol="0">
+                <a:spAutoFit/>
+              </a:bodyPr>
+              <a:lstStyle/>
+              <a:p>
+                <a:r>
+                  <a:rPr lang="en-US" sz="1400" dirty="0">
+                    <a:solidFill>
+                      <a:srgbClr val="FF0000"/>
+                    </a:solidFill>
+                  </a:rPr>
+                  <a:t>27</a:t>
+                </a:r>
+              </a:p>
+            </p:txBody>
+          </p:sp>
+          <p:sp>
+            <p:nvSpPr>
+              <p:cNvPr id="15" name="TextBox 14">
+                <a:extLst>
+                  <a:ext uri="{FF2B5EF4-FFF2-40B4-BE49-F238E27FC236}">
+                    <a16:creationId xmlns:a16="http://schemas.microsoft.com/office/drawing/2014/main" id="{EBBE6185-83F3-447C-BC42-B3C60766DA86}"/>
+                  </a:ext>
+                </a:extLst>
+              </p:cNvPr>
+              <p:cNvSpPr txBox="1"/>
+              <p:nvPr/>
+            </p:nvSpPr>
+            <p:spPr>
+              <a:xfrm>
+                <a:off x="7297963" y="10791214"/>
+                <a:ext cx="367408" cy="307777"/>
+              </a:xfrm>
+              <a:prstGeom prst="rect">
+                <a:avLst/>
+              </a:prstGeom>
+              <a:noFill/>
+            </p:spPr>
+            <p:txBody>
+              <a:bodyPr wrap="none" rtlCol="0">
+                <a:spAutoFit/>
+              </a:bodyPr>
+              <a:lstStyle/>
+              <a:p>
+                <a:r>
+                  <a:rPr lang="en-US" sz="1400" dirty="0">
+                    <a:solidFill>
+                      <a:srgbClr val="FF0000"/>
+                    </a:solidFill>
+                  </a:rPr>
+                  <a:t>25</a:t>
+                </a:r>
+              </a:p>
+            </p:txBody>
+          </p:sp>
+          <p:sp>
+            <p:nvSpPr>
+              <p:cNvPr id="16" name="TextBox 15">
+                <a:extLst>
+                  <a:ext uri="{FF2B5EF4-FFF2-40B4-BE49-F238E27FC236}">
+                    <a16:creationId xmlns:a16="http://schemas.microsoft.com/office/drawing/2014/main" id="{94A6B087-D232-43DA-8DE8-1672D5A87B99}"/>
+                  </a:ext>
+                </a:extLst>
+              </p:cNvPr>
+              <p:cNvSpPr txBox="1"/>
+              <p:nvPr/>
+            </p:nvSpPr>
+            <p:spPr>
+              <a:xfrm>
+                <a:off x="6766709" y="10791214"/>
+                <a:ext cx="367408" cy="307777"/>
+              </a:xfrm>
+              <a:prstGeom prst="rect">
+                <a:avLst/>
+              </a:prstGeom>
+              <a:noFill/>
+            </p:spPr>
+            <p:txBody>
+              <a:bodyPr wrap="none" rtlCol="0">
+                <a:spAutoFit/>
+              </a:bodyPr>
+              <a:lstStyle/>
+              <a:p>
+                <a:r>
+                  <a:rPr lang="en-US" sz="1400" dirty="0">
+                    <a:solidFill>
+                      <a:srgbClr val="FF0000"/>
+                    </a:solidFill>
+                  </a:rPr>
+                  <a:t>23</a:t>
+                </a:r>
+              </a:p>
+            </p:txBody>
+          </p:sp>
+          <p:sp>
+            <p:nvSpPr>
+              <p:cNvPr id="17" name="TextBox 16">
+                <a:extLst>
+                  <a:ext uri="{FF2B5EF4-FFF2-40B4-BE49-F238E27FC236}">
+                    <a16:creationId xmlns:a16="http://schemas.microsoft.com/office/drawing/2014/main" id="{2A9B73CE-A071-4A71-9073-EBAC354DF8FA}"/>
+                  </a:ext>
+                </a:extLst>
+              </p:cNvPr>
+              <p:cNvSpPr txBox="1"/>
+              <p:nvPr/>
+            </p:nvSpPr>
+            <p:spPr>
+              <a:xfrm>
+                <a:off x="6163963" y="10791214"/>
+                <a:ext cx="367408" cy="307777"/>
+              </a:xfrm>
+              <a:prstGeom prst="rect">
+                <a:avLst/>
+              </a:prstGeom>
+              <a:noFill/>
+            </p:spPr>
+            <p:txBody>
+              <a:bodyPr wrap="none" rtlCol="0">
+                <a:spAutoFit/>
+              </a:bodyPr>
+              <a:lstStyle/>
+              <a:p>
+                <a:r>
+                  <a:rPr lang="en-US" sz="1400" dirty="0">
+                    <a:solidFill>
+                      <a:srgbClr val="FF0000"/>
+                    </a:solidFill>
+                  </a:rPr>
+                  <a:t>21</a:t>
+                </a:r>
+              </a:p>
+            </p:txBody>
+          </p:sp>
+          <p:sp>
+            <p:nvSpPr>
+              <p:cNvPr id="18" name="TextBox 17">
+                <a:extLst>
+                  <a:ext uri="{FF2B5EF4-FFF2-40B4-BE49-F238E27FC236}">
+                    <a16:creationId xmlns:a16="http://schemas.microsoft.com/office/drawing/2014/main" id="{4A0145A5-9B89-48C0-B038-11847D8531C2}"/>
+                  </a:ext>
+                </a:extLst>
+              </p:cNvPr>
+              <p:cNvSpPr txBox="1"/>
+              <p:nvPr/>
+            </p:nvSpPr>
+            <p:spPr>
+              <a:xfrm>
+                <a:off x="5807828" y="10787566"/>
+                <a:ext cx="367408" cy="307777"/>
+              </a:xfrm>
+              <a:prstGeom prst="rect">
+                <a:avLst/>
+              </a:prstGeom>
+              <a:noFill/>
+            </p:spPr>
+            <p:txBody>
+              <a:bodyPr wrap="none" rtlCol="0">
+                <a:spAutoFit/>
+              </a:bodyPr>
+              <a:lstStyle/>
+              <a:p>
+                <a:r>
+                  <a:rPr lang="en-US" sz="1400" dirty="0">
+                    <a:solidFill>
+                      <a:srgbClr val="FF0000"/>
+                    </a:solidFill>
+                  </a:rPr>
+                  <a:t>19</a:t>
+                </a:r>
+              </a:p>
+            </p:txBody>
+          </p:sp>
+          <p:sp>
+            <p:nvSpPr>
+              <p:cNvPr id="19" name="TextBox 18">
+                <a:extLst>
+                  <a:ext uri="{FF2B5EF4-FFF2-40B4-BE49-F238E27FC236}">
+                    <a16:creationId xmlns:a16="http://schemas.microsoft.com/office/drawing/2014/main" id="{16EB78C0-ABFD-4913-A1C3-24155E782EF4}"/>
+                  </a:ext>
+                </a:extLst>
+              </p:cNvPr>
+              <p:cNvSpPr txBox="1"/>
+              <p:nvPr/>
+            </p:nvSpPr>
+            <p:spPr>
+              <a:xfrm>
+                <a:off x="8762798" y="10791214"/>
+                <a:ext cx="367408" cy="307777"/>
+              </a:xfrm>
+              <a:prstGeom prst="rect">
+                <a:avLst/>
+              </a:prstGeom>
+              <a:noFill/>
+            </p:spPr>
+            <p:txBody>
+              <a:bodyPr wrap="none" rtlCol="0">
+                <a:spAutoFit/>
+              </a:bodyPr>
+              <a:lstStyle/>
+              <a:p>
+                <a:r>
+                  <a:rPr lang="en-US" sz="1400" dirty="0">
+                    <a:solidFill>
+                      <a:srgbClr val="FF0000"/>
+                    </a:solidFill>
+                  </a:rPr>
+                  <a:t>31</a:t>
+                </a:r>
+              </a:p>
+            </p:txBody>
+          </p:sp>
+        </p:grpSp>
+        <mc:AlternateContent xmlns:mc="http://schemas.openxmlformats.org/markup-compatibility/2006" xmlns:a14="http://schemas.microsoft.com/office/drawing/2010/main">
+          <mc:Choice Requires="a14">
+            <p:sp>
+              <p:nvSpPr>
+                <p:cNvPr id="9" name="TextBox 8">
+                  <a:extLst>
+                    <a:ext uri="{FF2B5EF4-FFF2-40B4-BE49-F238E27FC236}">
+                      <a16:creationId xmlns:a16="http://schemas.microsoft.com/office/drawing/2014/main" id="{B765D52F-B934-49C6-A26A-7CD6C0D080CC}"/>
+                    </a:ext>
+                  </a:extLst>
+                </p:cNvPr>
+                <p:cNvSpPr txBox="1"/>
+                <p:nvPr/>
+              </p:nvSpPr>
+              <p:spPr>
+                <a:xfrm>
+                  <a:off x="8839988" y="9666239"/>
+                  <a:ext cx="835307" cy="307777"/>
+                </a:xfrm>
+                <a:prstGeom prst="rect">
+                  <a:avLst/>
+                </a:prstGeom>
+                <a:noFill/>
+              </p:spPr>
+              <p:txBody>
+                <a:bodyPr wrap="square" rtlCol="0">
+                  <a:spAutoFit/>
+                </a:bodyPr>
+                <a:lstStyle/>
+                <a:p>
+                  <a:pPr/>
+                  <a14:m>
+                    <m:oMathPara xmlns:m="http://schemas.openxmlformats.org/officeDocument/2006/math">
+                      <m:oMathParaPr>
+                        <m:jc m:val="centerGroup"/>
+                      </m:oMathParaPr>
+                      <m:oMath xmlns:m="http://schemas.openxmlformats.org/officeDocument/2006/math">
+                        <m:r>
+                          <a:rPr lang="en-US" sz="1400" i="1" dirty="0" smtClean="0">
+                            <a:solidFill>
+                              <a:srgbClr val="4A7EBB"/>
+                            </a:solidFill>
+                            <a:latin typeface="Cambria Math" panose="02040503050406030204" pitchFamily="18" charset="0"/>
+                            <a:cs typeface="Arial" panose="020B0604020202020204" pitchFamily="34" charset="0"/>
+                          </a:rPr>
+                          <m:t>…</m:t>
+                        </m:r>
+                      </m:oMath>
+                    </m:oMathPara>
+                  </a14:m>
+                  <a:endParaRPr lang="en-US" sz="1400" dirty="0">
+                    <a:solidFill>
+                      <a:srgbClr val="4A7EBB"/>
+                    </a:solidFill>
+                    <a:latin typeface="Arial" panose="020B0604020202020204" pitchFamily="34" charset="0"/>
+                    <a:cs typeface="Arial" panose="020B0604020202020204" pitchFamily="34" charset="0"/>
+                  </a:endParaRPr>
+                </a:p>
+              </p:txBody>
+            </p:sp>
+          </mc:Choice>
+          <mc:Fallback xmlns="">
+            <p:sp>
+              <p:nvSpPr>
+                <p:cNvPr id="261" name="TextBox 260"/>
+                <p:cNvSpPr txBox="1">
+                  <a:spLocks noRot="1" noChangeAspect="1" noMove="1" noResize="1" noEditPoints="1" noAdjustHandles="1" noChangeArrowheads="1" noChangeShapeType="1" noTextEdit="1"/>
+                </p:cNvSpPr>
+                <p:nvPr/>
+              </p:nvSpPr>
+              <p:spPr>
+                <a:xfrm>
+                  <a:off x="8839988" y="9666239"/>
+                  <a:ext cx="835307" cy="307777"/>
+                </a:xfrm>
+                <a:prstGeom prst="rect">
+                  <a:avLst/>
+                </a:prstGeom>
+                <a:blipFill rotWithShape="0">
+                  <a:blip r:embed="rId26"/>
+                  <a:stretch>
+                    <a:fillRect/>
+                  </a:stretch>
+                </a:blipFill>
+              </p:spPr>
+              <p:txBody>
+                <a:bodyPr/>
+                <a:lstStyle/>
+                <a:p>
+                  <a:r>
+                    <a:rPr lang="en-US">
+                      <a:noFill/>
+                    </a:rPr>
+                    <a:t> </a:t>
+                  </a:r>
+                </a:p>
+              </p:txBody>
+            </p:sp>
+          </mc:Fallback>
+        </mc:AlternateContent>
+        <p:grpSp>
+          <p:nvGrpSpPr>
+            <p:cNvPr id="10" name="Group 9">
+              <a:extLst>
+                <a:ext uri="{FF2B5EF4-FFF2-40B4-BE49-F238E27FC236}">
+                  <a16:creationId xmlns:a16="http://schemas.microsoft.com/office/drawing/2014/main" id="{7FE63471-1C8C-4949-8B19-B17E0EBF54A2}"/>
+                </a:ext>
+              </a:extLst>
+            </p:cNvPr>
+            <p:cNvGrpSpPr/>
+            <p:nvPr/>
+          </p:nvGrpSpPr>
+          <p:grpSpPr>
+            <a:xfrm>
+              <a:off x="7721961" y="8507574"/>
+              <a:ext cx="3166865" cy="792074"/>
+              <a:chOff x="8326762" y="11959003"/>
+              <a:chExt cx="3166865" cy="792074"/>
+            </a:xfrm>
+          </p:grpSpPr>
+          <mc:AlternateContent xmlns:mc="http://schemas.openxmlformats.org/markup-compatibility/2006" xmlns:a14="http://schemas.microsoft.com/office/drawing/2010/main">
+            <mc:Choice Requires="a14">
+              <p:sp>
+                <p:nvSpPr>
+                  <p:cNvPr id="11" name="TextBox 10">
+                    <a:extLst>
+                      <a:ext uri="{FF2B5EF4-FFF2-40B4-BE49-F238E27FC236}">
+                        <a16:creationId xmlns:a16="http://schemas.microsoft.com/office/drawing/2014/main" id="{09F286E9-32F1-4459-91FB-F08AE78BB44C}"/>
+                      </a:ext>
+                    </a:extLst>
+                  </p:cNvPr>
+                  <p:cNvSpPr txBox="1"/>
+                  <p:nvPr/>
+                </p:nvSpPr>
+                <p:spPr>
+                  <a:xfrm>
+                    <a:off x="8326762" y="11959003"/>
+                    <a:ext cx="3166865" cy="287258"/>
+                  </a:xfrm>
+                  <a:prstGeom prst="rect">
+                    <a:avLst/>
+                  </a:prstGeom>
+                  <a:noFill/>
+                </p:spPr>
+                <p:txBody>
+                  <a:bodyPr wrap="square" lIns="0" tIns="0" rIns="0" bIns="0" rtlCol="0">
+                    <a:spAutoFit/>
+                  </a:bodyPr>
+                  <a:lstStyle/>
+                  <a:p>
+                    <a:pPr/>
+                    <a14:m>
+                      <m:oMathPara xmlns:m="http://schemas.openxmlformats.org/officeDocument/2006/math">
+                        <m:oMathParaPr>
+                          <m:jc m:val="centerGroup"/>
+                        </m:oMathParaPr>
+                        <m:oMath xmlns:m="http://schemas.openxmlformats.org/officeDocument/2006/math">
+                          <m:r>
+                            <a:rPr lang="en-US" sz="1400" b="0" i="1" smtClean="0">
+                              <a:latin typeface="Cambria Math" panose="02040503050406030204" pitchFamily="18" charset="0"/>
+                            </a:rPr>
+                            <m:t>4</m:t>
+                          </m:r>
+                          <m:r>
+                            <a:rPr lang="en-US" sz="1400" b="0" i="1" smtClean="0">
+                              <a:latin typeface="Cambria Math" panose="02040503050406030204" pitchFamily="18" charset="0"/>
+                            </a:rPr>
+                            <m:t>𝑞</m:t>
+                          </m:r>
+                          <m:r>
+                            <a:rPr lang="en-US" sz="1400" b="0" i="1" smtClean="0">
+                              <a:latin typeface="Cambria Math" panose="02040503050406030204" pitchFamily="18" charset="0"/>
+                            </a:rPr>
+                            <m:t>+1=</m:t>
+                          </m:r>
+                          <m:d>
+                            <m:dPr>
+                              <m:ctrlPr>
+                                <a:rPr lang="en-US" sz="1400" b="0" i="1" smtClean="0">
+                                  <a:latin typeface="Cambria Math" panose="02040503050406030204" pitchFamily="18" charset="0"/>
+                                </a:rPr>
+                              </m:ctrlPr>
+                            </m:dPr>
+                            <m:e>
+                              <m:r>
+                                <a:rPr lang="en-US" sz="1400" b="0" i="1" smtClean="0">
+                                  <a:latin typeface="Cambria Math" panose="02040503050406030204" pitchFamily="18" charset="0"/>
+                                </a:rPr>
+                                <m:t>2</m:t>
+                              </m:r>
+                              <m:r>
+                                <a:rPr lang="en-US" sz="1400" b="0" i="1" smtClean="0">
+                                  <a:latin typeface="Cambria Math" panose="02040503050406030204" pitchFamily="18" charset="0"/>
+                                </a:rPr>
+                                <m:t>𝑞</m:t>
+                              </m:r>
+                              <m:r>
+                                <a:rPr lang="en-US" sz="1400" b="0" i="1" smtClean="0">
+                                  <a:latin typeface="Cambria Math" panose="02040503050406030204" pitchFamily="18" charset="0"/>
+                                </a:rPr>
+                                <m:t>+1</m:t>
+                              </m:r>
+                            </m:e>
+                          </m:d>
+                          <m:r>
+                            <a:rPr lang="en-US" sz="1400" b="0" i="1" smtClean="0">
+                              <a:latin typeface="Cambria Math" panose="02040503050406030204" pitchFamily="18" charset="0"/>
+                            </a:rPr>
+                            <m:t>+2</m:t>
+                          </m:r>
+                          <m:d>
+                            <m:dPr>
+                              <m:ctrlPr>
+                                <a:rPr lang="en-US" sz="1400" b="0" i="1" smtClean="0">
+                                  <a:latin typeface="Cambria Math" panose="02040503050406030204" pitchFamily="18" charset="0"/>
+                                </a:rPr>
+                              </m:ctrlPr>
+                            </m:dPr>
+                            <m:e>
+                              <m:r>
+                                <a:rPr lang="en-US" sz="1400" b="0" i="1" smtClean="0">
+                                  <a:latin typeface="Cambria Math" panose="02040503050406030204" pitchFamily="18" charset="0"/>
+                                </a:rPr>
+                                <m:t>𝑛</m:t>
+                              </m:r>
+                              <m:r>
+                                <a:rPr lang="en-US" sz="1400" b="0" i="1" smtClean="0">
+                                  <a:latin typeface="Cambria Math" panose="02040503050406030204" pitchFamily="18" charset="0"/>
+                                </a:rPr>
+                                <m:t>−1</m:t>
+                              </m:r>
+                            </m:e>
+                          </m:d>
+                        </m:oMath>
+                      </m:oMathPara>
+                    </a14:m>
+                    <a:endParaRPr lang="en-US" sz="1400" b="0" i="1" dirty="0">
+                      <a:latin typeface="Cambria Math" panose="02040503050406030204" pitchFamily="18" charset="0"/>
+                    </a:endParaRPr>
+                  </a:p>
+                </p:txBody>
+              </p:sp>
+            </mc:Choice>
+            <mc:Fallback xmlns="">
+              <p:sp>
+                <p:nvSpPr>
+                  <p:cNvPr id="229" name="TextBox 228"/>
+                  <p:cNvSpPr txBox="1">
+                    <a:spLocks noRot="1" noChangeAspect="1" noMove="1" noResize="1" noEditPoints="1" noAdjustHandles="1" noChangeArrowheads="1" noChangeShapeType="1" noTextEdit="1"/>
+                  </p:cNvSpPr>
+                  <p:nvPr/>
+                </p:nvSpPr>
+                <p:spPr>
+                  <a:xfrm>
+                    <a:off x="8326762" y="11959003"/>
+                    <a:ext cx="3166865" cy="287258"/>
+                  </a:xfrm>
+                  <a:prstGeom prst="rect">
+                    <a:avLst/>
+                  </a:prstGeom>
+                  <a:blipFill rotWithShape="0">
+                    <a:blip r:embed="rId27"/>
+                    <a:stretch>
+                      <a:fillRect l="-1282" b="-30556"/>
+                    </a:stretch>
+                  </a:blipFill>
+                </p:spPr>
+                <p:txBody>
+                  <a:bodyPr/>
+                  <a:lstStyle/>
+                  <a:p>
+                    <a:r>
+                      <a:rPr lang="en-US">
+                        <a:noFill/>
+                      </a:rPr>
+                      <a:t> </a:t>
+                    </a:r>
+                  </a:p>
+                </p:txBody>
+              </p:sp>
+            </mc:Fallback>
+          </mc:AlternateContent>
+          <mc:AlternateContent xmlns:mc="http://schemas.openxmlformats.org/markup-compatibility/2006" xmlns:a14="http://schemas.microsoft.com/office/drawing/2010/main">
+            <mc:Choice Requires="a14">
+              <p:sp>
+                <p:nvSpPr>
+                  <p:cNvPr id="12" name="Rectangle 11">
+                    <a:extLst>
+                      <a:ext uri="{FF2B5EF4-FFF2-40B4-BE49-F238E27FC236}">
+                        <a16:creationId xmlns:a16="http://schemas.microsoft.com/office/drawing/2014/main" id="{ECB2C9B1-83D0-4705-BDE6-AB67C4AA7F46}"/>
+                      </a:ext>
+                    </a:extLst>
+                  </p:cNvPr>
+                  <p:cNvSpPr/>
+                  <p:nvPr/>
+                </p:nvSpPr>
+                <p:spPr>
+                  <a:xfrm>
+                    <a:off x="9305565" y="12340706"/>
+                    <a:ext cx="1332681" cy="410371"/>
+                  </a:xfrm>
+                  <a:prstGeom prst="rect">
+                    <a:avLst/>
+                  </a:prstGeom>
+                  <a:ln>
+                    <a:solidFill>
+                      <a:schemeClr val="tx1"/>
+                    </a:solidFill>
+                  </a:ln>
+                </p:spPr>
+                <p:txBody>
+                  <a:bodyPr wrap="square">
+                    <a:spAutoFit/>
+                  </a:bodyPr>
+                  <a:lstStyle/>
+                  <a:p>
+                    <a:pPr/>
+                    <a14:m>
+                      <m:oMathPara xmlns:m="http://schemas.openxmlformats.org/officeDocument/2006/math">
+                        <m:oMathParaPr>
+                          <m:jc m:val="centerGroup"/>
+                        </m:oMathParaPr>
+                        <m:oMath xmlns:m="http://schemas.openxmlformats.org/officeDocument/2006/math">
+                          <m:r>
+                            <a:rPr lang="en-US" sz="1400" i="1">
+                              <a:latin typeface="Cambria Math" panose="02040503050406030204" pitchFamily="18" charset="0"/>
+                            </a:rPr>
+                            <m:t>𝑞</m:t>
+                          </m:r>
+                          <m:r>
+                            <a:rPr lang="en-US" sz="1400" i="1">
+                              <a:latin typeface="Cambria Math" panose="02040503050406030204" pitchFamily="18" charset="0"/>
+                            </a:rPr>
+                            <m:t>=</m:t>
+                          </m:r>
+                          <m:r>
+                            <a:rPr lang="en-US" sz="1400" i="1">
+                              <a:latin typeface="Cambria Math" panose="02040503050406030204" pitchFamily="18" charset="0"/>
+                            </a:rPr>
+                            <m:t>𝑛</m:t>
+                          </m:r>
+                          <m:r>
+                            <a:rPr lang="en-US" sz="1400" i="1">
+                              <a:latin typeface="Cambria Math" panose="02040503050406030204" pitchFamily="18" charset="0"/>
+                            </a:rPr>
+                            <m:t>−1</m:t>
+                          </m:r>
+                        </m:oMath>
+                      </m:oMathPara>
+                    </a14:m>
+                    <a:endParaRPr lang="en-US" sz="1400" dirty="0">
+                      <a:latin typeface="Arial" panose="020B0604020202020204" pitchFamily="34" charset="0"/>
+                      <a:cs typeface="Arial" panose="020B0604020202020204" pitchFamily="34" charset="0"/>
+                    </a:endParaRPr>
+                  </a:p>
+                </p:txBody>
+              </p:sp>
+            </mc:Choice>
+            <mc:Fallback xmlns="">
+              <p:sp>
+                <p:nvSpPr>
+                  <p:cNvPr id="230" name="Rectangle 229"/>
+                  <p:cNvSpPr>
+                    <a:spLocks noRot="1" noChangeAspect="1" noMove="1" noResize="1" noEditPoints="1" noAdjustHandles="1" noChangeArrowheads="1" noChangeShapeType="1" noTextEdit="1"/>
+                  </p:cNvSpPr>
+                  <p:nvPr/>
+                </p:nvSpPr>
+                <p:spPr>
+                  <a:xfrm>
+                    <a:off x="9305565" y="12340706"/>
+                    <a:ext cx="1332681" cy="410371"/>
+                  </a:xfrm>
+                  <a:prstGeom prst="rect">
+                    <a:avLst/>
+                  </a:prstGeom>
+                  <a:blipFill rotWithShape="0">
+                    <a:blip r:embed="rId28"/>
+                    <a:stretch>
+                      <a:fillRect/>
+                    </a:stretch>
+                  </a:blipFill>
+                  <a:ln>
+                    <a:solidFill>
+                      <a:schemeClr val="tx1"/>
+                    </a:solidFill>
+                  </a:ln>
+                </p:spPr>
+                <p:txBody>
+                  <a:bodyPr/>
+                  <a:lstStyle/>
+                  <a:p>
+                    <a:r>
+                      <a:rPr lang="en-US">
+                        <a:noFill/>
+                      </a:rPr>
+                      <a:t> </a:t>
+                    </a:r>
+                  </a:p>
+                </p:txBody>
+              </p:sp>
+            </mc:Fallback>
+          </mc:AlternateContent>
+        </p:grpSp>
+      </p:grpSp>
+      <mc:AlternateContent xmlns:mc="http://schemas.openxmlformats.org/markup-compatibility/2006" xmlns:a14="http://schemas.microsoft.com/office/drawing/2010/main">
+        <mc:Choice Requires="a14">
+          <p:sp>
+            <p:nvSpPr>
+              <p:cNvPr id="56" name="object 12">
+                <a:extLst>
+                  <a:ext uri="{FF2B5EF4-FFF2-40B4-BE49-F238E27FC236}">
+                    <a16:creationId xmlns:a16="http://schemas.microsoft.com/office/drawing/2014/main" id="{545AE814-89CF-4593-B64B-0CFFA4D8F7B7}"/>
+                  </a:ext>
+                </a:extLst>
+              </p:cNvPr>
+              <p:cNvSpPr txBox="1"/>
+              <p:nvPr/>
+            </p:nvSpPr>
+            <p:spPr>
+              <a:xfrm>
+                <a:off x="5223352" y="4799934"/>
+                <a:ext cx="5563501" cy="1593898"/>
+              </a:xfrm>
+              <a:prstGeom prst="rect">
+                <a:avLst/>
+              </a:prstGeom>
+            </p:spPr>
+            <p:txBody>
+              <a:bodyPr vert="horz" wrap="square" lIns="0" tIns="0" rIns="0" bIns="0" rtlCol="0">
+                <a:spAutoFit/>
+              </a:bodyPr>
+              <a:lstStyle/>
+              <a:p>
+                <a:pPr marL="298450" marR="6350" indent="-285750">
+                  <a:lnSpc>
+                    <a:spcPct val="103099"/>
+                  </a:lnSpc>
+                  <a:buFont typeface="Arial" panose="020B0604020202020204" pitchFamily="34" charset="0"/>
+                  <a:buChar char="•"/>
+                </a:pPr>
+                <a:r>
+                  <a:rPr lang="en-US" sz="1250" spc="10" dirty="0">
+                    <a:solidFill>
+                      <a:schemeClr val="tx1"/>
+                    </a:solidFill>
+                    <a:latin typeface="Arial"/>
+                    <a:cs typeface="Arial"/>
+                  </a:rPr>
+                  <a:t>Both 1</a:t>
+                </a:r>
+                <a:r>
+                  <a:rPr lang="en-US" sz="1250" spc="10" baseline="30000" dirty="0">
+                    <a:solidFill>
+                      <a:schemeClr val="tx1"/>
+                    </a:solidFill>
+                    <a:latin typeface="Arial"/>
+                    <a:cs typeface="Arial"/>
+                  </a:rPr>
+                  <a:t>st</a:t>
+                </a:r>
+                <a:r>
+                  <a:rPr lang="en-US" sz="1250" spc="10" dirty="0">
+                    <a:solidFill>
+                      <a:schemeClr val="tx1"/>
+                    </a:solidFill>
+                    <a:latin typeface="Arial"/>
+                    <a:cs typeface="Arial"/>
+                  </a:rPr>
+                  <a:t> and 2</a:t>
+                </a:r>
+                <a:r>
+                  <a:rPr lang="en-US" sz="1250" spc="10" baseline="30000" dirty="0">
+                    <a:solidFill>
+                      <a:schemeClr val="tx1"/>
+                    </a:solidFill>
+                    <a:latin typeface="Arial"/>
+                    <a:cs typeface="Arial"/>
+                  </a:rPr>
+                  <a:t>nd</a:t>
+                </a:r>
+                <a:r>
+                  <a:rPr lang="en-US" sz="1250" spc="10" dirty="0">
+                    <a:solidFill>
+                      <a:schemeClr val="tx1"/>
+                    </a:solidFill>
+                    <a:latin typeface="Arial"/>
+                    <a:cs typeface="Arial"/>
+                  </a:rPr>
+                  <a:t> order light is diffracted onto the detector.</a:t>
+                </a:r>
+              </a:p>
+              <a:p>
+                <a:pPr marL="298450" marR="6350" indent="-285750">
+                  <a:lnSpc>
+                    <a:spcPct val="103099"/>
+                  </a:lnSpc>
+                  <a:buFont typeface="Arial" panose="020B0604020202020204" pitchFamily="34" charset="0"/>
+                  <a:buChar char="•"/>
+                </a:pPr>
+                <a:r>
+                  <a:rPr lang="en-US" sz="1250" spc="10" dirty="0">
+                    <a:solidFill>
+                      <a:schemeClr val="tx1"/>
+                    </a:solidFill>
+                    <a:latin typeface="Arial"/>
+                    <a:cs typeface="Arial"/>
+                  </a:rPr>
+                  <a:t>Identify a matching pair of 1</a:t>
+                </a:r>
+                <a:r>
+                  <a:rPr lang="en-US" sz="1250" spc="10" baseline="30000" dirty="0">
+                    <a:solidFill>
+                      <a:schemeClr val="tx1"/>
+                    </a:solidFill>
+                    <a:latin typeface="Arial"/>
+                    <a:cs typeface="Arial"/>
+                  </a:rPr>
+                  <a:t>st</a:t>
+                </a:r>
+                <a:r>
+                  <a:rPr lang="en-US" sz="1250" spc="10" dirty="0">
+                    <a:solidFill>
+                      <a:schemeClr val="tx1"/>
+                    </a:solidFill>
+                    <a:latin typeface="Arial"/>
+                    <a:cs typeface="Arial"/>
+                  </a:rPr>
+                  <a:t> &amp; 2</a:t>
+                </a:r>
+                <a:r>
+                  <a:rPr lang="en-US" sz="1250" spc="10" baseline="30000" dirty="0">
+                    <a:solidFill>
+                      <a:schemeClr val="tx1"/>
+                    </a:solidFill>
+                    <a:latin typeface="Arial"/>
+                    <a:cs typeface="Arial"/>
+                  </a:rPr>
+                  <a:t>nd</a:t>
+                </a:r>
+                <a:r>
+                  <a:rPr lang="en-US" sz="1250" spc="10" dirty="0">
+                    <a:solidFill>
+                      <a:schemeClr val="tx1"/>
+                    </a:solidFill>
+                    <a:latin typeface="Arial"/>
+                    <a:cs typeface="Arial"/>
+                  </a:rPr>
+                  <a:t> order diffraction harmonics (bolded). Let their harmonic order be </a:t>
+                </a:r>
+                <a14:m>
+                  <m:oMath xmlns:m="http://schemas.openxmlformats.org/officeDocument/2006/math">
+                    <m:r>
+                      <a:rPr lang="en-US" sz="1250" i="0" spc="10" dirty="0" smtClean="0">
+                        <a:solidFill>
+                          <a:schemeClr val="tx1"/>
+                        </a:solidFill>
+                        <a:latin typeface="Cambria Math" panose="02040503050406030204" pitchFamily="18" charset="0"/>
+                        <a:cs typeface="Arial"/>
+                      </a:rPr>
+                      <m:t>4</m:t>
+                    </m:r>
+                    <m:r>
+                      <m:rPr>
+                        <m:sty m:val="p"/>
+                      </m:rPr>
+                      <a:rPr lang="en-US" sz="1250" i="0" spc="10" dirty="0" smtClean="0">
+                        <a:solidFill>
+                          <a:schemeClr val="tx1"/>
+                        </a:solidFill>
+                        <a:latin typeface="Cambria Math" panose="02040503050406030204" pitchFamily="18" charset="0"/>
+                        <a:cs typeface="Arial"/>
+                      </a:rPr>
+                      <m:t>q</m:t>
+                    </m:r>
+                    <m:r>
+                      <a:rPr lang="en-US" sz="1250" i="0" spc="10" dirty="0" smtClean="0">
+                        <a:solidFill>
+                          <a:schemeClr val="tx1"/>
+                        </a:solidFill>
+                        <a:latin typeface="Cambria Math" panose="02040503050406030204" pitchFamily="18" charset="0"/>
+                        <a:cs typeface="Arial"/>
+                      </a:rPr>
+                      <m:t>+1</m:t>
+                    </m:r>
+                  </m:oMath>
+                </a14:m>
+                <a:r>
+                  <a:rPr lang="en-US" sz="1250" spc="10" dirty="0">
+                    <a:solidFill>
+                      <a:schemeClr val="tx1"/>
+                    </a:solidFill>
+                    <a:latin typeface="Arial"/>
+                    <a:cs typeface="Arial"/>
+                  </a:rPr>
+                  <a:t>.</a:t>
+                </a:r>
+              </a:p>
+              <a:p>
+                <a:pPr marL="298450" marR="6350" indent="-285750">
+                  <a:lnSpc>
+                    <a:spcPct val="103099"/>
+                  </a:lnSpc>
+                  <a:buFont typeface="Arial" panose="020B0604020202020204" pitchFamily="34" charset="0"/>
+                  <a:buChar char="•"/>
+                </a:pPr>
+                <a:r>
+                  <a:rPr lang="en-US" sz="1250" spc="10" dirty="0">
+                    <a:solidFill>
+                      <a:schemeClr val="tx1"/>
+                    </a:solidFill>
+                    <a:latin typeface="Arial"/>
+                    <a:cs typeface="Arial"/>
+                  </a:rPr>
+                  <a:t>The m=1 </a:t>
+                </a:r>
+                <a14:m>
+                  <m:oMath xmlns:m="http://schemas.openxmlformats.org/officeDocument/2006/math">
+                    <m:sSup>
+                      <m:sSupPr>
+                        <m:ctrlPr>
+                          <a:rPr lang="en-US" sz="1250" b="0" i="1" spc="10" dirty="0" smtClean="0">
+                            <a:solidFill>
+                              <a:schemeClr val="tx1"/>
+                            </a:solidFill>
+                            <a:latin typeface="Cambria Math" panose="02040503050406030204" pitchFamily="18" charset="0"/>
+                            <a:cs typeface="Arial"/>
+                          </a:rPr>
+                        </m:ctrlPr>
+                      </m:sSupPr>
+                      <m:e>
+                        <m:d>
+                          <m:dPr>
+                            <m:ctrlPr>
+                              <a:rPr lang="en-US" sz="1250" i="1" spc="10" dirty="0" smtClean="0">
+                                <a:solidFill>
+                                  <a:schemeClr val="tx1"/>
+                                </a:solidFill>
+                                <a:latin typeface="Cambria Math" panose="02040503050406030204" pitchFamily="18" charset="0"/>
+                                <a:cs typeface="Arial"/>
+                              </a:rPr>
+                            </m:ctrlPr>
+                          </m:dPr>
+                          <m:e>
+                            <m:r>
+                              <a:rPr lang="en-US" sz="1250" i="0" spc="10" dirty="0" smtClean="0">
+                                <a:solidFill>
+                                  <a:schemeClr val="tx1"/>
+                                </a:solidFill>
+                                <a:latin typeface="Cambria Math" panose="02040503050406030204" pitchFamily="18" charset="0"/>
+                                <a:cs typeface="Arial"/>
+                              </a:rPr>
+                              <m:t>2</m:t>
+                            </m:r>
+                            <m:r>
+                              <m:rPr>
+                                <m:sty m:val="p"/>
+                              </m:rPr>
+                              <a:rPr lang="en-US" sz="1250" i="0" spc="10" dirty="0" smtClean="0">
+                                <a:solidFill>
+                                  <a:schemeClr val="tx1"/>
+                                </a:solidFill>
+                                <a:latin typeface="Cambria Math" panose="02040503050406030204" pitchFamily="18" charset="0"/>
+                                <a:cs typeface="Arial"/>
+                              </a:rPr>
+                              <m:t>q</m:t>
+                            </m:r>
+                            <m:r>
+                              <a:rPr lang="en-US" sz="1250" i="0" spc="10" dirty="0" smtClean="0">
+                                <a:solidFill>
+                                  <a:schemeClr val="tx1"/>
+                                </a:solidFill>
+                                <a:latin typeface="Cambria Math" panose="02040503050406030204" pitchFamily="18" charset="0"/>
+                                <a:cs typeface="Arial"/>
+                              </a:rPr>
+                              <m:t>+1</m:t>
+                            </m:r>
+                          </m:e>
+                        </m:d>
+                      </m:e>
+                      <m:sup>
+                        <m:r>
+                          <m:rPr>
+                            <m:sty m:val="p"/>
+                          </m:rPr>
+                          <a:rPr lang="en-US" sz="1250" i="0" spc="10" dirty="0" err="1" smtClean="0">
+                            <a:solidFill>
+                              <a:schemeClr val="tx1"/>
+                            </a:solidFill>
+                            <a:latin typeface="Cambria Math" panose="02040503050406030204" pitchFamily="18" charset="0"/>
+                            <a:cs typeface="Arial"/>
+                          </a:rPr>
+                          <m:t>th</m:t>
+                        </m:r>
+                      </m:sup>
+                    </m:sSup>
+                  </m:oMath>
+                </a14:m>
+                <a:r>
+                  <a:rPr lang="en-US" sz="1250" spc="10" dirty="0">
+                    <a:solidFill>
+                      <a:schemeClr val="tx1"/>
+                    </a:solidFill>
+                    <a:latin typeface="Arial"/>
+                    <a:cs typeface="Arial"/>
+                  </a:rPr>
+                  <a:t> harmonic lies on top of the m=2 </a:t>
+                </a:r>
+                <a14:m>
+                  <m:oMath xmlns:m="http://schemas.openxmlformats.org/officeDocument/2006/math">
+                    <m:sSup>
+                      <m:sSupPr>
+                        <m:ctrlPr>
+                          <a:rPr lang="en-US" sz="1250" b="0" i="1" spc="10" dirty="0" smtClean="0">
+                            <a:solidFill>
+                              <a:schemeClr val="tx1"/>
+                            </a:solidFill>
+                            <a:latin typeface="Cambria Math" panose="02040503050406030204" pitchFamily="18" charset="0"/>
+                            <a:cs typeface="Arial"/>
+                          </a:rPr>
+                        </m:ctrlPr>
+                      </m:sSupPr>
+                      <m:e>
+                        <m:d>
+                          <m:dPr>
+                            <m:ctrlPr>
+                              <a:rPr lang="en-US" sz="1250" i="1" spc="10" dirty="0" smtClean="0">
+                                <a:solidFill>
+                                  <a:schemeClr val="tx1"/>
+                                </a:solidFill>
+                                <a:latin typeface="Cambria Math" panose="02040503050406030204" pitchFamily="18" charset="0"/>
+                                <a:cs typeface="Arial"/>
+                              </a:rPr>
+                            </m:ctrlPr>
+                          </m:dPr>
+                          <m:e>
+                            <m:r>
+                              <a:rPr lang="en-US" sz="1250" i="0" spc="10" dirty="0" smtClean="0">
+                                <a:solidFill>
+                                  <a:schemeClr val="tx1"/>
+                                </a:solidFill>
+                                <a:latin typeface="Cambria Math" panose="02040503050406030204" pitchFamily="18" charset="0"/>
+                                <a:cs typeface="Arial"/>
+                              </a:rPr>
+                              <m:t>4</m:t>
+                            </m:r>
+                            <m:r>
+                              <m:rPr>
+                                <m:sty m:val="p"/>
+                              </m:rPr>
+                              <a:rPr lang="en-US" sz="1250" i="0" spc="10" dirty="0" smtClean="0">
+                                <a:solidFill>
+                                  <a:schemeClr val="tx1"/>
+                                </a:solidFill>
+                                <a:latin typeface="Cambria Math" panose="02040503050406030204" pitchFamily="18" charset="0"/>
+                                <a:cs typeface="Arial"/>
+                              </a:rPr>
+                              <m:t>q</m:t>
+                            </m:r>
+                            <m:r>
+                              <a:rPr lang="en-US" sz="1250" i="0" spc="10" dirty="0" smtClean="0">
+                                <a:solidFill>
+                                  <a:schemeClr val="tx1"/>
+                                </a:solidFill>
+                                <a:latin typeface="Cambria Math" panose="02040503050406030204" pitchFamily="18" charset="0"/>
+                                <a:cs typeface="Arial"/>
+                              </a:rPr>
+                              <m:t>+2</m:t>
+                            </m:r>
+                          </m:e>
+                        </m:d>
+                      </m:e>
+                      <m:sup>
+                        <m:r>
+                          <m:rPr>
+                            <m:sty m:val="p"/>
+                          </m:rPr>
+                          <a:rPr lang="en-US" sz="1250" i="0" spc="10" dirty="0" err="1" smtClean="0">
+                            <a:solidFill>
+                              <a:schemeClr val="tx1"/>
+                            </a:solidFill>
+                            <a:latin typeface="Cambria Math" panose="02040503050406030204" pitchFamily="18" charset="0"/>
+                            <a:cs typeface="Arial"/>
+                          </a:rPr>
+                          <m:t>th</m:t>
+                        </m:r>
+                      </m:sup>
+                    </m:sSup>
+                  </m:oMath>
+                </a14:m>
+                <a:r>
+                  <a:rPr lang="en-US" sz="1250" spc="10" dirty="0">
+                    <a:solidFill>
+                      <a:schemeClr val="tx1"/>
+                    </a:solidFill>
+                    <a:latin typeface="Arial"/>
+                    <a:cs typeface="Arial"/>
+                  </a:rPr>
+                  <a:t> harmonic.</a:t>
+                </a:r>
+              </a:p>
+              <a:p>
+                <a:pPr marL="298450" marR="6350" indent="-285750">
+                  <a:lnSpc>
+                    <a:spcPct val="103099"/>
+                  </a:lnSpc>
+                  <a:buFont typeface="Arial" panose="020B0604020202020204" pitchFamily="34" charset="0"/>
+                  <a:buChar char="•"/>
+                </a:pPr>
+                <a:r>
+                  <a:rPr lang="en-US" sz="1250" spc="10" dirty="0">
+                    <a:solidFill>
+                      <a:schemeClr val="tx1"/>
+                    </a:solidFill>
+                    <a:latin typeface="Arial"/>
+                    <a:cs typeface="Arial"/>
+                  </a:rPr>
+                  <a:t>Let </a:t>
+                </a:r>
+                <a14:m>
+                  <m:oMath xmlns:m="http://schemas.openxmlformats.org/officeDocument/2006/math">
+                    <m:r>
+                      <m:rPr>
+                        <m:sty m:val="p"/>
+                      </m:rPr>
+                      <a:rPr lang="en-US" sz="1250" i="0" spc="10" dirty="0" smtClean="0">
+                        <a:solidFill>
+                          <a:schemeClr val="tx1"/>
+                        </a:solidFill>
+                        <a:latin typeface="Cambria Math" panose="02040503050406030204" pitchFamily="18" charset="0"/>
+                        <a:cs typeface="Arial"/>
+                      </a:rPr>
+                      <m:t>n</m:t>
+                    </m:r>
+                  </m:oMath>
+                </a14:m>
+                <a:r>
+                  <a:rPr lang="en-US" sz="1250" spc="10" dirty="0">
+                    <a:solidFill>
+                      <a:schemeClr val="tx1"/>
+                    </a:solidFill>
+                    <a:latin typeface="Arial"/>
+                    <a:cs typeface="Arial"/>
+                  </a:rPr>
+                  <a:t> be the number of m=1 harmonics between the matching </a:t>
+                </a:r>
+                <a14:m>
+                  <m:oMath xmlns:m="http://schemas.openxmlformats.org/officeDocument/2006/math">
+                    <m:r>
+                      <a:rPr lang="en-US" sz="1250" i="0" spc="10" dirty="0" smtClean="0">
+                        <a:solidFill>
+                          <a:schemeClr val="tx1"/>
+                        </a:solidFill>
+                        <a:latin typeface="Cambria Math" panose="02040503050406030204" pitchFamily="18" charset="0"/>
+                        <a:cs typeface="Arial"/>
+                      </a:rPr>
+                      <m:t>4</m:t>
+                    </m:r>
+                    <m:r>
+                      <m:rPr>
+                        <m:sty m:val="p"/>
+                      </m:rPr>
+                      <a:rPr lang="en-US" sz="1250" i="0" spc="10" dirty="0" smtClean="0">
+                        <a:solidFill>
+                          <a:schemeClr val="tx1"/>
+                        </a:solidFill>
+                        <a:latin typeface="Cambria Math" panose="02040503050406030204" pitchFamily="18" charset="0"/>
+                        <a:cs typeface="Arial"/>
+                      </a:rPr>
+                      <m:t>q</m:t>
+                    </m:r>
+                    <m:r>
+                      <a:rPr lang="en-US" sz="1250" i="0" spc="10" dirty="0" smtClean="0">
+                        <a:solidFill>
+                          <a:schemeClr val="tx1"/>
+                        </a:solidFill>
+                        <a:latin typeface="Cambria Math" panose="02040503050406030204" pitchFamily="18" charset="0"/>
+                        <a:cs typeface="Arial"/>
+                      </a:rPr>
+                      <m:t>+1</m:t>
+                    </m:r>
+                  </m:oMath>
+                </a14:m>
+                <a:r>
+                  <a:rPr lang="en-US" sz="1250" spc="10" dirty="0">
+                    <a:solidFill>
+                      <a:schemeClr val="tx1"/>
+                    </a:solidFill>
+                    <a:latin typeface="Arial"/>
+                    <a:cs typeface="Arial"/>
+                  </a:rPr>
+                  <a:t> pair; then </a:t>
+                </a:r>
+                <a14:m>
+                  <m:oMath xmlns:m="http://schemas.openxmlformats.org/officeDocument/2006/math">
+                    <m:r>
+                      <m:rPr>
+                        <m:sty m:val="p"/>
+                      </m:rPr>
+                      <a:rPr lang="en-US" sz="1250" i="0" spc="10" dirty="0" smtClean="0">
+                        <a:solidFill>
+                          <a:schemeClr val="tx1"/>
+                        </a:solidFill>
+                        <a:latin typeface="Cambria Math" panose="02040503050406030204" pitchFamily="18" charset="0"/>
+                        <a:cs typeface="Arial"/>
+                      </a:rPr>
+                      <m:t>q</m:t>
+                    </m:r>
+                    <m:r>
+                      <a:rPr lang="en-US" sz="1250" i="0" spc="10" dirty="0" smtClean="0">
+                        <a:solidFill>
+                          <a:schemeClr val="tx1"/>
+                        </a:solidFill>
+                        <a:latin typeface="Cambria Math" panose="02040503050406030204" pitchFamily="18" charset="0"/>
+                        <a:cs typeface="Arial"/>
+                      </a:rPr>
+                      <m:t>=</m:t>
+                    </m:r>
+                    <m:r>
+                      <m:rPr>
+                        <m:sty m:val="p"/>
+                      </m:rPr>
+                      <a:rPr lang="en-US" sz="1250" i="0" spc="10" dirty="0" smtClean="0">
+                        <a:solidFill>
+                          <a:schemeClr val="tx1"/>
+                        </a:solidFill>
+                        <a:latin typeface="Cambria Math" panose="02040503050406030204" pitchFamily="18" charset="0"/>
+                        <a:cs typeface="Arial"/>
+                      </a:rPr>
+                      <m:t>n</m:t>
+                    </m:r>
+                    <m:r>
+                      <a:rPr lang="en-US" sz="1250" i="0" spc="10" dirty="0" smtClean="0">
+                        <a:solidFill>
+                          <a:schemeClr val="tx1"/>
+                        </a:solidFill>
+                        <a:latin typeface="Cambria Math" panose="02040503050406030204" pitchFamily="18" charset="0"/>
+                        <a:cs typeface="Arial"/>
+                      </a:rPr>
+                      <m:t>−1</m:t>
+                    </m:r>
+                  </m:oMath>
+                </a14:m>
+                <a:r>
+                  <a:rPr lang="en-US" sz="1250" spc="10" dirty="0">
+                    <a:solidFill>
+                      <a:schemeClr val="tx1"/>
+                    </a:solidFill>
+                    <a:latin typeface="Arial"/>
+                    <a:cs typeface="Arial"/>
+                  </a:rPr>
+                  <a:t>.</a:t>
+                </a:r>
+              </a:p>
+              <a:p>
+                <a:pPr marL="298450" marR="6350" indent="-285750">
+                  <a:lnSpc>
+                    <a:spcPct val="103099"/>
+                  </a:lnSpc>
+                  <a:buFont typeface="Arial" panose="020B0604020202020204" pitchFamily="34" charset="0"/>
+                  <a:buChar char="•"/>
+                </a:pPr>
+                <a:r>
+                  <a:rPr lang="en-US" sz="1250" spc="10" dirty="0">
+                    <a:solidFill>
+                      <a:schemeClr val="tx1"/>
+                    </a:solidFill>
+                    <a:latin typeface="Arial"/>
+                    <a:cs typeface="Arial"/>
+                  </a:rPr>
+                  <a:t>A known spectral feature (absorption edge) scales harmonic order to energy and calculates the blue shift of the fundamental.</a:t>
+                </a:r>
+              </a:p>
+            </p:txBody>
+          </p:sp>
+        </mc:Choice>
+        <mc:Fallback xmlns="">
+          <p:sp>
+            <p:nvSpPr>
+              <p:cNvPr id="56" name="object 12">
+                <a:extLst>
+                  <a:ext uri="{FF2B5EF4-FFF2-40B4-BE49-F238E27FC236}">
+                    <a16:creationId xmlns:a16="http://schemas.microsoft.com/office/drawing/2014/main" id="{545AE814-89CF-4593-B64B-0CFFA4D8F7B7}"/>
+                  </a:ext>
+                </a:extLst>
+              </p:cNvPr>
+              <p:cNvSpPr txBox="1">
+                <a:spLocks noRot="1" noChangeAspect="1" noMove="1" noResize="1" noEditPoints="1" noAdjustHandles="1" noChangeArrowheads="1" noChangeShapeType="1" noTextEdit="1"/>
+              </p:cNvSpPr>
+              <p:nvPr/>
+            </p:nvSpPr>
+            <p:spPr>
+              <a:xfrm>
+                <a:off x="5223352" y="4799934"/>
+                <a:ext cx="5563501" cy="1593898"/>
+              </a:xfrm>
+              <a:prstGeom prst="rect">
+                <a:avLst/>
+              </a:prstGeom>
+              <a:blipFill>
+                <a:blip r:embed="rId29"/>
+                <a:stretch>
+                  <a:fillRect l="-1535" t="-3435" r="-768" b="-4198"/>
+                </a:stretch>
+              </a:blipFill>
+            </p:spPr>
+            <p:txBody>
+              <a:bodyPr/>
+              <a:lstStyle/>
+              <a:p>
+                <a:r>
+                  <a:rPr lang="en-US">
+                    <a:noFill/>
+                  </a:rPr>
+                  <a:t> </a:t>
+                </a:r>
+              </a:p>
+            </p:txBody>
+          </p:sp>
+        </mc:Fallback>
+      </mc:AlternateContent>
+    </p:spTree>
+    <p:extLst>
+      <p:ext uri="{BB962C8B-B14F-4D97-AF65-F5344CB8AC3E}">
+        <p14:creationId xmlns:p14="http://schemas.microsoft.com/office/powerpoint/2010/main" val="1582006170"/>
+      </p:ext>
+    </p:extLst>
+  </p:cSld>
+  <p:clrMapOvr>
+    <a:masterClrMapping/>
+  </p:clrMapOvr>
+</p:sld>
+</file>
+
+<file path=ppt/slides/slide8.xml><?xml version="1.0" encoding="utf-8"?>
+<p:sld xmlns:a="http://schemas.openxmlformats.org/drawingml/2006/main" xmlns:r="http://schemas.openxmlformats.org/officeDocument/2006/relationships" xmlns:p="http://schemas.openxmlformats.org/presentationml/2006/main">
+  <p:cSld>
+    <p:spTree>
+      <p:nvGrpSpPr>
+        <p:cNvPr id="1" name=""/>
+        <p:cNvGrpSpPr/>
+        <p:nvPr/>
+      </p:nvGrpSpPr>
+      <p:grpSpPr>
+        <a:xfrm>
+          <a:off x="0" y="0"/>
+          <a:ext cx="0" cy="0"/>
+          <a:chOff x="0" y="0"/>
+          <a:chExt cx="0" cy="0"/>
+        </a:xfrm>
+      </p:grpSpPr>
+      <p:grpSp>
+        <p:nvGrpSpPr>
+          <p:cNvPr id="2" name="Group 1">
+            <a:extLst>
+              <a:ext uri="{FF2B5EF4-FFF2-40B4-BE49-F238E27FC236}">
+                <a16:creationId xmlns:a16="http://schemas.microsoft.com/office/drawing/2014/main" id="{A9CF3A47-6F27-4AF5-BF29-622E221D3B3B}"/>
+              </a:ext>
+            </a:extLst>
+          </p:cNvPr>
+          <p:cNvGrpSpPr/>
+          <p:nvPr/>
+        </p:nvGrpSpPr>
+        <p:grpSpPr>
+          <a:xfrm>
+            <a:off x="5172169" y="2888960"/>
+            <a:ext cx="4231299" cy="1609529"/>
+            <a:chOff x="7163870" y="6848671"/>
+            <a:chExt cx="4231299" cy="1609529"/>
+          </a:xfrm>
+        </p:grpSpPr>
+        <p:pic>
+          <p:nvPicPr>
+            <p:cNvPr id="3" name="Picture 2">
+              <a:extLst>
+                <a:ext uri="{FF2B5EF4-FFF2-40B4-BE49-F238E27FC236}">
+                  <a16:creationId xmlns:a16="http://schemas.microsoft.com/office/drawing/2014/main" id="{59D9E4EE-9F28-4D52-B8D7-C458B29EA6F9}"/>
+                </a:ext>
+              </a:extLst>
+            </p:cNvPr>
+            <p:cNvPicPr>
+              <a:picLocks noChangeAspect="1"/>
+            </p:cNvPicPr>
+            <p:nvPr/>
+          </p:nvPicPr>
+          <p:blipFill>
+            <a:blip r:embed="rId3" cstate="print">
+              <a:extLst>
+                <a:ext uri="{28A0092B-C50C-407E-A947-70E740481C1C}">
+                  <a14:useLocalDpi xmlns:a14="http://schemas.microsoft.com/office/drawing/2010/main" val="0"/>
+                </a:ext>
+              </a:extLst>
+            </a:blip>
+            <a:stretch>
+              <a:fillRect/>
+            </a:stretch>
+          </p:blipFill>
+          <p:spPr>
+            <a:xfrm>
+              <a:off x="7163870" y="6848671"/>
+              <a:ext cx="4014166" cy="1609529"/>
+            </a:xfrm>
+            <a:prstGeom prst="rect">
+              <a:avLst/>
+            </a:prstGeom>
+          </p:spPr>
+        </p:pic>
+        <p:sp>
+          <p:nvSpPr>
+            <p:cNvPr id="4" name="TextBox 3">
+              <a:extLst>
+                <a:ext uri="{FF2B5EF4-FFF2-40B4-BE49-F238E27FC236}">
+                  <a16:creationId xmlns:a16="http://schemas.microsoft.com/office/drawing/2014/main" id="{792B3A7A-728B-42D6-BAFC-AB5CB0E17AC7}"/>
+                </a:ext>
+              </a:extLst>
+            </p:cNvPr>
+            <p:cNvSpPr txBox="1"/>
+            <p:nvPr/>
+          </p:nvSpPr>
+          <p:spPr>
+            <a:xfrm>
+              <a:off x="9815891" y="8163733"/>
+              <a:ext cx="1579278" cy="215444"/>
+            </a:xfrm>
+            <a:prstGeom prst="rect">
+              <a:avLst/>
+            </a:prstGeom>
+            <a:noFill/>
+          </p:spPr>
+          <p:txBody>
+            <a:bodyPr wrap="none" rtlCol="0">
+              <a:spAutoFit/>
+            </a:bodyPr>
+            <a:lstStyle/>
+            <a:p>
+              <a:r>
+                <a:rPr lang="en-US" sz="800" dirty="0">
+                  <a:latin typeface="Arial" panose="020B0604020202020204" pitchFamily="34" charset="0"/>
+                  <a:cs typeface="Arial" panose="020B0604020202020204" pitchFamily="34" charset="0"/>
+                </a:rPr>
+                <a:t>Image credit: CELIA Bordeaux</a:t>
+              </a:r>
+            </a:p>
+          </p:txBody>
+        </p:sp>
+      </p:grpSp>
+      <mc:AlternateContent xmlns:mc="http://schemas.openxmlformats.org/markup-compatibility/2006" xmlns:a14="http://schemas.microsoft.com/office/drawing/2010/main">
+        <mc:Choice Requires="a14">
+          <p:sp>
+            <p:nvSpPr>
+              <p:cNvPr id="5" name="object 12">
+                <a:extLst>
+                  <a:ext uri="{FF2B5EF4-FFF2-40B4-BE49-F238E27FC236}">
+                    <a16:creationId xmlns:a16="http://schemas.microsoft.com/office/drawing/2014/main" id="{7909657A-33D2-4137-8C97-F7E7882B6DD9}"/>
+                  </a:ext>
+                </a:extLst>
+              </p:cNvPr>
+              <p:cNvSpPr txBox="1"/>
+              <p:nvPr/>
+            </p:nvSpPr>
+            <p:spPr>
+              <a:xfrm>
+                <a:off x="1649805" y="2990804"/>
+                <a:ext cx="2383473" cy="1783180"/>
+              </a:xfrm>
+              <a:prstGeom prst="rect">
+                <a:avLst/>
+              </a:prstGeom>
+            </p:spPr>
+            <p:txBody>
+              <a:bodyPr vert="horz" wrap="square" lIns="0" tIns="0" rIns="0" bIns="0" rtlCol="0">
+                <a:spAutoFit/>
+              </a:bodyPr>
+              <a:lstStyle/>
+              <a:p>
+                <a:pPr marL="298450" marR="6350" indent="-285750">
+                  <a:lnSpc>
+                    <a:spcPct val="103099"/>
+                  </a:lnSpc>
+                  <a:buFont typeface="Arial" panose="020B0604020202020204" pitchFamily="34" charset="0"/>
+                  <a:buChar char="•"/>
+                </a:pPr>
+                <a:r>
+                  <a:rPr lang="en-US" sz="1250" spc="10" dirty="0">
+                    <a:solidFill>
+                      <a:schemeClr val="tx1"/>
+                    </a:solidFill>
+                    <a:latin typeface="Arial"/>
+                    <a:cs typeface="Arial"/>
+                  </a:rPr>
+                  <a:t>0-</a:t>
+                </a:r>
+                <a14:m>
+                  <m:oMath xmlns:m="http://schemas.openxmlformats.org/officeDocument/2006/math">
+                    <m:r>
+                      <m:rPr>
+                        <m:sty m:val="p"/>
+                      </m:rPr>
+                      <a:rPr lang="en-US" sz="1250" b="0" i="0" spc="10" smtClean="0">
+                        <a:solidFill>
+                          <a:schemeClr val="tx1"/>
+                        </a:solidFill>
+                        <a:latin typeface="Cambria Math" panose="02040503050406030204" pitchFamily="18" charset="0"/>
+                        <a:cs typeface="Arial"/>
+                      </a:rPr>
+                      <m:t>π</m:t>
+                    </m:r>
+                  </m:oMath>
+                </a14:m>
+                <a:r>
+                  <a:rPr lang="en-US" sz="1250" spc="10" dirty="0">
+                    <a:solidFill>
+                      <a:schemeClr val="tx1"/>
+                    </a:solidFill>
+                    <a:latin typeface="Arial"/>
+                    <a:cs typeface="Arial"/>
+                  </a:rPr>
+                  <a:t> phase mask upstream yields a TEM01 profile at the focus.</a:t>
+                </a:r>
+              </a:p>
+              <a:p>
+                <a:pPr marL="298450" marR="6350" indent="-285750">
+                  <a:lnSpc>
+                    <a:spcPct val="103099"/>
+                  </a:lnSpc>
+                  <a:buFont typeface="Arial" panose="020B0604020202020204" pitchFamily="34" charset="0"/>
+                  <a:buChar char="•"/>
+                </a:pPr>
+                <a:r>
+                  <a:rPr lang="en-US" sz="1250" spc="10" dirty="0">
+                    <a:solidFill>
+                      <a:schemeClr val="tx1"/>
+                    </a:solidFill>
+                    <a:latin typeface="Arial"/>
+                    <a:cs typeface="Arial"/>
+                  </a:rPr>
+                  <a:t>Two spatially separated (~</a:t>
+                </a:r>
+                <a14:m>
+                  <m:oMath xmlns:m="http://schemas.openxmlformats.org/officeDocument/2006/math">
+                    <m:r>
+                      <m:rPr>
+                        <m:sty m:val="p"/>
+                      </m:rPr>
+                      <a:rPr lang="en-US" sz="1250" b="0" i="0" spc="10" smtClean="0">
+                        <a:solidFill>
+                          <a:schemeClr val="tx1"/>
+                        </a:solidFill>
+                        <a:latin typeface="Cambria Math" panose="02040503050406030204" pitchFamily="18" charset="0"/>
+                        <a:cs typeface="Arial"/>
+                      </a:rPr>
+                      <m:t>λf</m:t>
+                    </m:r>
+                    <m:r>
+                      <a:rPr lang="en-US" sz="1250" b="0" i="0" spc="10" smtClean="0">
+                        <a:solidFill>
+                          <a:schemeClr val="tx1"/>
+                        </a:solidFill>
+                        <a:latin typeface="Cambria Math" panose="02040503050406030204" pitchFamily="18" charset="0"/>
+                        <a:cs typeface="Arial"/>
+                      </a:rPr>
+                      <m:t>/</m:t>
+                    </m:r>
+                    <m:r>
+                      <m:rPr>
+                        <m:sty m:val="p"/>
+                      </m:rPr>
+                      <a:rPr lang="en-US" sz="1250" b="0" i="0" spc="10" smtClean="0">
+                        <a:solidFill>
+                          <a:schemeClr val="tx1"/>
+                        </a:solidFill>
+                        <a:latin typeface="Cambria Math" panose="02040503050406030204" pitchFamily="18" charset="0"/>
+                        <a:cs typeface="Arial"/>
+                      </a:rPr>
+                      <m:t>a</m:t>
+                    </m:r>
+                  </m:oMath>
+                </a14:m>
+                <a:r>
+                  <a:rPr lang="en-US" sz="1250" spc="10" dirty="0">
+                    <a:solidFill>
+                      <a:schemeClr val="tx1"/>
+                    </a:solidFill>
+                    <a:latin typeface="Arial"/>
+                    <a:cs typeface="Arial"/>
+                  </a:rPr>
+                  <a:t>) phase-locked harmonic light sources.</a:t>
+                </a:r>
+              </a:p>
+              <a:p>
+                <a:pPr marL="298450" marR="6350" indent="-285750">
+                  <a:lnSpc>
+                    <a:spcPct val="103099"/>
+                  </a:lnSpc>
+                  <a:buFont typeface="Arial" panose="020B0604020202020204" pitchFamily="34" charset="0"/>
+                  <a:buChar char="•"/>
+                </a:pPr>
+                <a:r>
+                  <a:rPr lang="en-US" sz="1250" spc="10" dirty="0">
+                    <a:solidFill>
+                      <a:schemeClr val="tx1"/>
+                    </a:solidFill>
+                    <a:latin typeface="Arial"/>
+                    <a:cs typeface="Arial"/>
+                  </a:rPr>
+                  <a:t>These sources will interfere in the far-field with spatial frequency ~</a:t>
+                </a:r>
+                <a14:m>
+                  <m:oMath xmlns:m="http://schemas.openxmlformats.org/officeDocument/2006/math">
+                    <m:r>
+                      <a:rPr lang="en-US" sz="1250" b="0" i="0" spc="10" smtClean="0">
+                        <a:solidFill>
+                          <a:schemeClr val="tx1"/>
+                        </a:solidFill>
+                        <a:latin typeface="Cambria Math" panose="02040503050406030204" pitchFamily="18" charset="0"/>
+                        <a:cs typeface="Arial"/>
+                      </a:rPr>
+                      <m:t>(2</m:t>
+                    </m:r>
+                    <m:r>
+                      <m:rPr>
+                        <m:sty m:val="p"/>
+                      </m:rPr>
+                      <a:rPr lang="en-US" sz="1250" b="0" i="0" spc="10" smtClean="0">
+                        <a:solidFill>
+                          <a:schemeClr val="tx1"/>
+                        </a:solidFill>
+                        <a:latin typeface="Cambria Math" panose="02040503050406030204" pitchFamily="18" charset="0"/>
+                        <a:cs typeface="Arial"/>
+                      </a:rPr>
+                      <m:t>q</m:t>
+                    </m:r>
+                    <m:r>
+                      <a:rPr lang="en-US" sz="1250" b="0" i="0" spc="10" smtClean="0">
+                        <a:solidFill>
+                          <a:schemeClr val="tx1"/>
+                        </a:solidFill>
+                        <a:latin typeface="Cambria Math" panose="02040503050406030204" pitchFamily="18" charset="0"/>
+                        <a:cs typeface="Arial"/>
+                      </a:rPr>
+                      <m:t>+1)</m:t>
+                    </m:r>
+                    <m:r>
+                      <m:rPr>
+                        <m:sty m:val="p"/>
+                      </m:rPr>
+                      <a:rPr lang="en-US" sz="1250" b="0" i="0" spc="10" smtClean="0">
+                        <a:solidFill>
+                          <a:schemeClr val="tx1"/>
+                        </a:solidFill>
+                        <a:latin typeface="Cambria Math" panose="02040503050406030204" pitchFamily="18" charset="0"/>
+                        <a:cs typeface="Arial"/>
+                      </a:rPr>
+                      <m:t>f</m:t>
+                    </m:r>
+                    <m:r>
+                      <a:rPr lang="en-US" sz="1250" b="0" i="0" spc="10" smtClean="0">
+                        <a:solidFill>
+                          <a:schemeClr val="tx1"/>
+                        </a:solidFill>
+                        <a:latin typeface="Cambria Math" panose="02040503050406030204" pitchFamily="18" charset="0"/>
+                        <a:cs typeface="Arial"/>
+                      </a:rPr>
+                      <m:t>/</m:t>
+                    </m:r>
+                    <m:r>
+                      <m:rPr>
+                        <m:sty m:val="p"/>
+                      </m:rPr>
+                      <a:rPr lang="en-US" sz="1250" b="0" i="0" spc="10" smtClean="0">
+                        <a:solidFill>
+                          <a:schemeClr val="tx1"/>
+                        </a:solidFill>
+                        <a:latin typeface="Cambria Math" panose="02040503050406030204" pitchFamily="18" charset="0"/>
+                        <a:cs typeface="Arial"/>
+                      </a:rPr>
+                      <m:t>a</m:t>
+                    </m:r>
+                  </m:oMath>
+                </a14:m>
+                <a:r>
+                  <a:rPr lang="en-US" sz="1250" spc="10" dirty="0">
+                    <a:solidFill>
+                      <a:schemeClr val="tx1"/>
+                    </a:solidFill>
+                    <a:latin typeface="Arial"/>
+                    <a:cs typeface="Arial"/>
+                  </a:rPr>
+                  <a:t>.</a:t>
+                </a:r>
+              </a:p>
+            </p:txBody>
+          </p:sp>
+        </mc:Choice>
+        <mc:Fallback xmlns="">
+          <p:sp>
+            <p:nvSpPr>
+              <p:cNvPr id="5" name="object 12">
+                <a:extLst>
+                  <a:ext uri="{FF2B5EF4-FFF2-40B4-BE49-F238E27FC236}">
+                    <a16:creationId xmlns:a16="http://schemas.microsoft.com/office/drawing/2014/main" id="{7909657A-33D2-4137-8C97-F7E7882B6DD9}"/>
+                  </a:ext>
+                </a:extLst>
+              </p:cNvPr>
+              <p:cNvSpPr txBox="1">
+                <a:spLocks noRot="1" noChangeAspect="1" noMove="1" noResize="1" noEditPoints="1" noAdjustHandles="1" noChangeArrowheads="1" noChangeShapeType="1" noTextEdit="1"/>
+              </p:cNvSpPr>
+              <p:nvPr/>
+            </p:nvSpPr>
+            <p:spPr>
+              <a:xfrm>
+                <a:off x="1649805" y="2990804"/>
+                <a:ext cx="2383473" cy="1783180"/>
+              </a:xfrm>
+              <a:prstGeom prst="rect">
+                <a:avLst/>
+              </a:prstGeom>
+              <a:blipFill>
+                <a:blip r:embed="rId4"/>
+                <a:stretch>
+                  <a:fillRect l="-3581" t="-3425" r="-4604" b="-4110"/>
+                </a:stretch>
+              </a:blipFill>
+            </p:spPr>
+            <p:txBody>
+              <a:bodyPr/>
+              <a:lstStyle/>
+              <a:p>
+                <a:r>
+                  <a:rPr lang="en-US">
+                    <a:noFill/>
+                  </a:rPr>
+                  <a:t> </a:t>
+                </a:r>
+              </a:p>
+            </p:txBody>
+          </p:sp>
+        </mc:Fallback>
+      </mc:AlternateContent>
+    </p:spTree>
+    <p:extLst>
+      <p:ext uri="{BB962C8B-B14F-4D97-AF65-F5344CB8AC3E}">
+        <p14:creationId xmlns:p14="http://schemas.microsoft.com/office/powerpoint/2010/main" val="3659908470"/>
       </p:ext>
     </p:extLst>
   </p:cSld>
@@ -13823,4 +18077,299 @@
     </a:ext>
   </a:extLst>
 </a:theme>
+</file>
+
+<file path=ppt/theme/theme2.xml><?xml version="1.0" encoding="utf-8"?>
+<a:theme xmlns:a="http://schemas.openxmlformats.org/drawingml/2006/main" name="Office Theme">
+  <a:themeElements>
+    <a:clrScheme name="Office">
+      <a:dk1>
+        <a:sysClr val="windowText" lastClr="000000"/>
+      </a:dk1>
+      <a:lt1>
+        <a:sysClr val="window" lastClr="FFFFFF"/>
+      </a:lt1>
+      <a:dk2>
+        <a:srgbClr val="44546A"/>
+      </a:dk2>
+      <a:lt2>
+        <a:srgbClr val="E7E6E6"/>
+      </a:lt2>
+      <a:accent1>
+        <a:srgbClr val="4472C4"/>
+      </a:accent1>
+      <a:accent2>
+        <a:srgbClr val="ED7D31"/>
+      </a:accent2>
+      <a:accent3>
+        <a:srgbClr val="A5A5A5"/>
+      </a:accent3>
+      <a:accent4>
+        <a:srgbClr val="FFC000"/>
+      </a:accent4>
+      <a:accent5>
+        <a:srgbClr val="5B9BD5"/>
+      </a:accent5>
+      <a:accent6>
+        <a:srgbClr val="70AD47"/>
+      </a:accent6>
+      <a:hlink>
+        <a:srgbClr val="0563C1"/>
+      </a:hlink>
+      <a:folHlink>
+        <a:srgbClr val="954F72"/>
+      </a:folHlink>
+    </a:clrScheme>
+    <a:fontScheme name="Office">
+      <a:majorFont>
+        <a:latin typeface="Calibri Light" panose="020F0302020204030204"/>
+        <a:ea typeface=""/>
+        <a:cs typeface=""/>
+        <a:font script="Jpan" typeface="游ゴシック Light"/>
+        <a:font script="Hang" typeface="맑은 고딕"/>
+        <a:font script="Hans" typeface="等线 Light"/>
+        <a:font script="Hant" typeface="新細明體"/>
+        <a:font script="Arab" typeface="Times New Roman"/>
+        <a:font script="Hebr" typeface="Times New Roman"/>
+        <a:font script="Thai" typeface="Angsana New"/>
+        <a:font script="Ethi" typeface="Nyala"/>
+        <a:font script="Beng" typeface="Vrinda"/>
+        <a:font script="Gujr" typeface="Shruti"/>
+        <a:font script="Khmr" typeface="MoolBoran"/>
+        <a:font script="Knda" typeface="Tunga"/>
+        <a:font script="Guru" typeface="Raavi"/>
+        <a:font script="Cans" typeface="Euphemia"/>
+        <a:font script="Cher" typeface="Plantagenet Cherokee"/>
+        <a:font script="Yiii" typeface="Microsoft Yi Baiti"/>
+        <a:font script="Tibt" typeface="Microsoft Himalaya"/>
+        <a:font script="Thaa" typeface="MV Boli"/>
+        <a:font script="Deva" typeface="Mangal"/>
+        <a:font script="Telu" typeface="Gautami"/>
+        <a:font script="Taml" typeface="Latha"/>
+        <a:font script="Syrc" typeface="Estrangelo Edessa"/>
+        <a:font script="Orya" typeface="Kalinga"/>
+        <a:font script="Mlym" typeface="Kartika"/>
+        <a:font script="Laoo" typeface="DokChampa"/>
+        <a:font script="Sinh" typeface="Iskoola Pota"/>
+        <a:font script="Mong" typeface="Mongolian Baiti"/>
+        <a:font script="Viet" typeface="Times New Roman"/>
+        <a:font script="Uigh" typeface="Microsoft Uighur"/>
+        <a:font script="Geor" typeface="Sylfaen"/>
+        <a:font script="Armn" typeface="Arial"/>
+        <a:font script="Bugi" typeface="Leelawadee UI"/>
+        <a:font script="Bopo" typeface="Microsoft JhengHei"/>
+        <a:font script="Java" typeface="Javanese Text"/>
+        <a:font script="Lisu" typeface="Segoe UI"/>
+        <a:font script="Mymr" typeface="Myanmar Text"/>
+        <a:font script="Nkoo" typeface="Ebrima"/>
+        <a:font script="Olck" typeface="Nirmala UI"/>
+        <a:font script="Osma" typeface="Ebrima"/>
+        <a:font script="Phag" typeface="Phagspa"/>
+        <a:font script="Syrn" typeface="Estrangelo Edessa"/>
+        <a:font script="Syrj" typeface="Estrangelo Edessa"/>
+        <a:font script="Syre" typeface="Estrangelo Edessa"/>
+        <a:font script="Sora" typeface="Nirmala UI"/>
+        <a:font script="Tale" typeface="Microsoft Tai Le"/>
+        <a:font script="Talu" typeface="Microsoft New Tai Lue"/>
+        <a:font script="Tfng" typeface="Ebrima"/>
+      </a:majorFont>
+      <a:minorFont>
+        <a:latin typeface="Calibri" panose="020F0502020204030204"/>
+        <a:ea typeface=""/>
+        <a:cs typeface=""/>
+        <a:font script="Jpan" typeface="游ゴシック"/>
+        <a:font script="Hang" typeface="맑은 고딕"/>
+        <a:font script="Hans" typeface="等线"/>
+        <a:font script="Hant" typeface="新細明體"/>
+        <a:font script="Arab" typeface="Arial"/>
+        <a:font script="Hebr" typeface="Arial"/>
+        <a:font script="Thai" typeface="Cordia New"/>
+        <a:font script="Ethi" typeface="Nyala"/>
+        <a:font script="Beng" typeface="Vrinda"/>
+        <a:font script="Gujr" typeface="Shruti"/>
+        <a:font script="Khmr" typeface="DaunPenh"/>
+        <a:font script="Knda" typeface="Tunga"/>
+        <a:font script="Guru" typeface="Raavi"/>
+        <a:font script="Cans" typeface="Euphemia"/>
+        <a:font script="Cher" typeface="Plantagenet Cherokee"/>
+        <a:font script="Yiii" typeface="Microsoft Yi Baiti"/>
+        <a:font script="Tibt" typeface="Microsoft Himalaya"/>
+        <a:font script="Thaa" typeface="MV Boli"/>
+        <a:font script="Deva" typeface="Mangal"/>
+        <a:font script="Telu" typeface="Gautami"/>
+        <a:font script="Taml" typeface="Latha"/>
+        <a:font script="Syrc" typeface="Estrangelo Edessa"/>
+        <a:font script="Orya" typeface="Kalinga"/>
+        <a:font script="Mlym" typeface="Kartika"/>
+        <a:font script="Laoo" typeface="DokChampa"/>
+        <a:font script="Sinh" typeface="Iskoola Pota"/>
+        <a:font script="Mong" typeface="Mongolian Baiti"/>
+        <a:font script="Viet" typeface="Arial"/>
+        <a:font script="Uigh" typeface="Microsoft Uighur"/>
+        <a:font script="Geor" typeface="Sylfaen"/>
+        <a:font script="Armn" typeface="Arial"/>
+        <a:font script="Bugi" typeface="Leelawadee UI"/>
+        <a:font script="Bopo" typeface="Microsoft JhengHei"/>
+        <a:font script="Java" typeface="Javanese Text"/>
+        <a:font script="Lisu" typeface="Segoe UI"/>
+        <a:font script="Mymr" typeface="Myanmar Text"/>
+        <a:font script="Nkoo" typeface="Ebrima"/>
+        <a:font script="Olck" typeface="Nirmala UI"/>
+        <a:font script="Osma" typeface="Ebrima"/>
+        <a:font script="Phag" typeface="Phagspa"/>
+        <a:font script="Syrn" typeface="Estrangelo Edessa"/>
+        <a:font script="Syrj" typeface="Estrangelo Edessa"/>
+        <a:font script="Syre" typeface="Estrangelo Edessa"/>
+        <a:font script="Sora" typeface="Nirmala UI"/>
+        <a:font script="Tale" typeface="Microsoft Tai Le"/>
+        <a:font script="Talu" typeface="Microsoft New Tai Lue"/>
+        <a:font script="Tfng" typeface="Ebrima"/>
+      </a:minorFont>
+    </a:fontScheme>
+    <a:fmtScheme name="Office">
+      <a:fillStyleLst>
+        <a:solidFill>
+          <a:schemeClr val="phClr"/>
+        </a:solidFill>
+        <a:gradFill rotWithShape="1">
+          <a:gsLst>
+            <a:gs pos="0">
+              <a:schemeClr val="phClr">
+                <a:lumMod val="110000"/>
+                <a:satMod val="105000"/>
+                <a:tint val="67000"/>
+              </a:schemeClr>
+            </a:gs>
+            <a:gs pos="50000">
+              <a:schemeClr val="phClr">
+                <a:lumMod val="105000"/>
+                <a:satMod val="103000"/>
+                <a:tint val="73000"/>
+              </a:schemeClr>
+            </a:gs>
+            <a:gs pos="100000">
+              <a:schemeClr val="phClr">
+                <a:lumMod val="105000"/>
+                <a:satMod val="109000"/>
+                <a:tint val="81000"/>
+              </a:schemeClr>
+            </a:gs>
+          </a:gsLst>
+          <a:lin ang="5400000" scaled="0"/>
+        </a:gradFill>
+        <a:gradFill rotWithShape="1">
+          <a:gsLst>
+            <a:gs pos="0">
+              <a:schemeClr val="phClr">
+                <a:satMod val="103000"/>
+                <a:lumMod val="102000"/>
+                <a:tint val="94000"/>
+              </a:schemeClr>
+            </a:gs>
+            <a:gs pos="50000">
+              <a:schemeClr val="phClr">
+                <a:satMod val="110000"/>
+                <a:lumMod val="100000"/>
+                <a:shade val="100000"/>
+              </a:schemeClr>
+            </a:gs>
+            <a:gs pos="100000">
+              <a:schemeClr val="phClr">
+                <a:lumMod val="99000"/>
+                <a:satMod val="120000"/>
+                <a:shade val="78000"/>
+              </a:schemeClr>
+            </a:gs>
+          </a:gsLst>
+          <a:lin ang="5400000" scaled="0"/>
+        </a:gradFill>
+      </a:fillStyleLst>
+      <a:lnStyleLst>
+        <a:ln w="6350" cap="flat" cmpd="sng" algn="ctr">
+          <a:solidFill>
+            <a:schemeClr val="phClr"/>
+          </a:solidFill>
+          <a:prstDash val="solid"/>
+          <a:miter lim="800000"/>
+        </a:ln>
+        <a:ln w="12700" cap="flat" cmpd="sng" algn="ctr">
+          <a:solidFill>
+            <a:schemeClr val="phClr"/>
+          </a:solidFill>
+          <a:prstDash val="solid"/>
+          <a:miter lim="800000"/>
+        </a:ln>
+        <a:ln w="19050" cap="flat" cmpd="sng" algn="ctr">
+          <a:solidFill>
+            <a:schemeClr val="phClr"/>
+          </a:solidFill>
+          <a:prstDash val="solid"/>
+          <a:miter lim="800000"/>
+        </a:ln>
+      </a:lnStyleLst>
+      <a:effectStyleLst>
+        <a:effectStyle>
+          <a:effectLst/>
+        </a:effectStyle>
+        <a:effectStyle>
+          <a:effectLst/>
+        </a:effectStyle>
+        <a:effectStyle>
+          <a:effectLst>
+            <a:outerShdw blurRad="57150" dist="19050" dir="5400000" algn="ctr" rotWithShape="0">
+              <a:srgbClr val="000000">
+                <a:alpha val="63000"/>
+              </a:srgbClr>
+            </a:outerShdw>
+          </a:effectLst>
+        </a:effectStyle>
+      </a:effectStyleLst>
+      <a:bgFillStyleLst>
+        <a:solidFill>
+          <a:schemeClr val="phClr"/>
+        </a:solidFill>
+        <a:solidFill>
+          <a:schemeClr val="phClr">
+            <a:tint val="95000"/>
+            <a:satMod val="170000"/>
+          </a:schemeClr>
+        </a:solidFill>
+        <a:gradFill rotWithShape="1">
+          <a:gsLst>
+            <a:gs pos="0">
+              <a:schemeClr val="phClr">
+                <a:tint val="93000"/>
+                <a:satMod val="150000"/>
+                <a:shade val="98000"/>
+                <a:lumMod val="102000"/>
+              </a:schemeClr>
+            </a:gs>
+            <a:gs pos="50000">
+              <a:schemeClr val="phClr">
+                <a:tint val="98000"/>
+                <a:satMod val="130000"/>
+                <a:shade val="90000"/>
+                <a:lumMod val="103000"/>
+              </a:schemeClr>
+            </a:gs>
+            <a:gs pos="100000">
+              <a:schemeClr val="phClr">
+                <a:shade val="63000"/>
+                <a:satMod val="120000"/>
+              </a:schemeClr>
+            </a:gs>
+          </a:gsLst>
+          <a:lin ang="5400000" scaled="0"/>
+        </a:gradFill>
+      </a:bgFillStyleLst>
+    </a:fmtScheme>
+  </a:themeElements>
+  <a:objectDefaults/>
+  <a:extraClrSchemeLst/>
+  <a:extLst>
+    <a:ext uri="{05A4C25C-085E-4340-85A3-A5531E510DB2}">
+      <thm15:themeFamily xmlns:thm15="http://schemas.microsoft.com/office/thememl/2012/main" name="Office Theme" id="{62F939B6-93AF-4DB8-9C6B-D6C7DFDC589F}" vid="{4A3C46E8-61CC-4603-A589-7422A47A8E4A}"/>
+    </a:ext>
+  </a:extLst>
+</a:theme>
 </file>
</xml_diff>